<commit_message>
Post Method--Bmi & Age Teach Updata
</commit_message>
<xml_diff>
--- a/PythonFlask/Teach.pptx
+++ b/PythonFlask/Teach.pptx
@@ -5,7 +5,7 @@
     <p:sldMasterId id="2147483648" r:id="rId1"/>
   </p:sldMasterIdLst>
   <p:notesMasterIdLst>
-    <p:notesMasterId r:id="rId11"/>
+    <p:notesMasterId r:id="rId12"/>
   </p:notesMasterIdLst>
   <p:sldIdLst>
     <p:sldId id="256" r:id="rId2"/>
@@ -17,6 +17,7 @@
     <p:sldId id="263" r:id="rId8"/>
     <p:sldId id="264" r:id="rId9"/>
     <p:sldId id="265" r:id="rId10"/>
+    <p:sldId id="266" r:id="rId11"/>
   </p:sldIdLst>
   <p:sldSz cx="12192000" cy="6858000"/>
   <p:notesSz cx="6858000" cy="9144000"/>
@@ -3349,6 +3350,229 @@
 </p:sld>
 </file>
 
+<file path=ppt/slides/slide10.xml><?xml version="1.0" encoding="utf-8"?>
+<p:sld xmlns:a="http://schemas.openxmlformats.org/drawingml/2006/main" xmlns:r="http://schemas.openxmlformats.org/officeDocument/2006/relationships" xmlns:p="http://schemas.openxmlformats.org/presentationml/2006/main">
+  <p:cSld>
+    <p:spTree>
+      <p:nvGrpSpPr>
+        <p:cNvPr id="1" name=""/>
+        <p:cNvGrpSpPr/>
+        <p:nvPr/>
+      </p:nvGrpSpPr>
+      <p:grpSpPr>
+        <a:xfrm>
+          <a:off x="0" y="0"/>
+          <a:ext cx="0" cy="0"/>
+          <a:chOff x="0" y="0"/>
+          <a:chExt cx="0" cy="0"/>
+        </a:xfrm>
+      </p:grpSpPr>
+      <p:sp>
+        <p:nvSpPr>
+          <p:cNvPr id="2" name="標題 1"/>
+          <p:cNvSpPr>
+            <a:spLocks noGrp="1"/>
+          </p:cNvSpPr>
+          <p:nvPr>
+            <p:ph type="title"/>
+          </p:nvPr>
+        </p:nvSpPr>
+        <p:spPr>
+          <a:xfrm>
+            <a:off x="838200" y="0"/>
+            <a:ext cx="9677400" cy="1098958"/>
+          </a:xfrm>
+        </p:spPr>
+        <p:txBody>
+          <a:bodyPr>
+            <a:normAutofit/>
+          </a:bodyPr>
+          <a:lstStyle/>
+          <a:p>
+            <a:r>
+              <a:rPr lang="en-US" altLang="zh-TW" dirty="0"/>
+              <a:t>7.Write Code: Post Method Test</a:t>
+            </a:r>
+            <a:endParaRPr lang="zh-TW" altLang="en-US" dirty="0"/>
+          </a:p>
+        </p:txBody>
+      </p:sp>
+      <p:sp>
+        <p:nvSpPr>
+          <p:cNvPr id="8" name="文字方塊 7"/>
+          <p:cNvSpPr txBox="1"/>
+          <p:nvPr/>
+        </p:nvSpPr>
+        <p:spPr>
+          <a:xfrm>
+            <a:off x="6746579" y="1261001"/>
+            <a:ext cx="2950973" cy="369332"/>
+          </a:xfrm>
+          <a:prstGeom prst="rect">
+            <a:avLst/>
+          </a:prstGeom>
+          <a:noFill/>
+        </p:spPr>
+        <p:txBody>
+          <a:bodyPr wrap="square" rtlCol="0">
+            <a:spAutoFit/>
+          </a:bodyPr>
+          <a:lstStyle/>
+          <a:p>
+            <a:r>
+              <a:rPr lang="en-US" altLang="zh-TW" dirty="0"/>
+              <a:t>Client1.py Run on Terminal.</a:t>
+            </a:r>
+          </a:p>
+        </p:txBody>
+      </p:sp>
+      <p:sp>
+        <p:nvSpPr>
+          <p:cNvPr id="10" name="文字方塊 9"/>
+          <p:cNvSpPr txBox="1"/>
+          <p:nvPr/>
+        </p:nvSpPr>
+        <p:spPr>
+          <a:xfrm>
+            <a:off x="2376753" y="1251062"/>
+            <a:ext cx="3068669" cy="369332"/>
+          </a:xfrm>
+          <a:prstGeom prst="rect">
+            <a:avLst/>
+          </a:prstGeom>
+          <a:noFill/>
+        </p:spPr>
+        <p:txBody>
+          <a:bodyPr wrap="square" rtlCol="0">
+            <a:spAutoFit/>
+          </a:bodyPr>
+          <a:lstStyle/>
+          <a:p>
+            <a:r>
+              <a:rPr lang="en-US" altLang="zh-TW" dirty="0"/>
+              <a:t>Server1.py Run on IDE Shell.</a:t>
+            </a:r>
+          </a:p>
+        </p:txBody>
+      </p:sp>
+      <p:sp>
+        <p:nvSpPr>
+          <p:cNvPr id="12" name="文字方塊 11"/>
+          <p:cNvSpPr txBox="1"/>
+          <p:nvPr/>
+        </p:nvSpPr>
+        <p:spPr>
+          <a:xfrm>
+            <a:off x="2376753" y="5762446"/>
+            <a:ext cx="8595297" cy="923330"/>
+          </a:xfrm>
+          <a:prstGeom prst="rect">
+            <a:avLst/>
+          </a:prstGeom>
+          <a:noFill/>
+        </p:spPr>
+        <p:txBody>
+          <a:bodyPr wrap="square" rtlCol="0">
+            <a:spAutoFit/>
+          </a:bodyPr>
+          <a:lstStyle/>
+          <a:p>
+            <a:r>
+              <a:rPr lang="en-US" altLang="zh-TW" dirty="0"/>
+              <a:t>Client1.py is run on terminal, because </a:t>
+            </a:r>
+            <a:r>
+              <a:rPr lang="en-US" altLang="zh-TW" dirty="0" err="1"/>
+              <a:t>Thonny</a:t>
+            </a:r>
+            <a:r>
+              <a:rPr lang="en-US" altLang="zh-TW" dirty="0"/>
+              <a:t> IDE can’t run two code at same time.</a:t>
+            </a:r>
+          </a:p>
+          <a:p>
+            <a:endParaRPr lang="en-US" altLang="zh-TW" dirty="0"/>
+          </a:p>
+          <a:p>
+            <a:r>
+              <a:rPr lang="en-US" altLang="zh-TW" dirty="0"/>
+              <a:t>If Client1.py can't run, you may need to change the Python environment.</a:t>
+            </a:r>
+          </a:p>
+        </p:txBody>
+      </p:sp>
+      <p:sp>
+        <p:nvSpPr>
+          <p:cNvPr id="13" name="文字方塊 12"/>
+          <p:cNvSpPr txBox="1"/>
+          <p:nvPr/>
+        </p:nvSpPr>
+        <p:spPr>
+          <a:xfrm>
+            <a:off x="4032187" y="807240"/>
+            <a:ext cx="3803776" cy="369332"/>
+          </a:xfrm>
+          <a:prstGeom prst="rect">
+            <a:avLst/>
+          </a:prstGeom>
+          <a:noFill/>
+        </p:spPr>
+        <p:txBody>
+          <a:bodyPr wrap="square" rtlCol="0">
+            <a:spAutoFit/>
+          </a:bodyPr>
+          <a:lstStyle/>
+          <a:p>
+            <a:r>
+              <a:rPr lang="en-US" altLang="zh-TW" dirty="0"/>
+              <a:t>Step3 Run Server1.py and Client1.py </a:t>
+            </a:r>
+          </a:p>
+        </p:txBody>
+      </p:sp>
+      <p:pic>
+        <p:nvPicPr>
+          <p:cNvPr id="6" name="圖片 5">
+            <a:extLst>
+              <a:ext uri="{FF2B5EF4-FFF2-40B4-BE49-F238E27FC236}">
+                <a16:creationId xmlns:a16="http://schemas.microsoft.com/office/drawing/2014/main" id="{11C31C61-BA04-49D4-BBC9-FAD20382AC57}"/>
+              </a:ext>
+            </a:extLst>
+          </p:cNvPr>
+          <p:cNvPicPr>
+            <a:picLocks noChangeAspect="1"/>
+          </p:cNvPicPr>
+          <p:nvPr/>
+        </p:nvPicPr>
+        <p:blipFill>
+          <a:blip r:embed="rId2"/>
+          <a:stretch>
+            <a:fillRect/>
+          </a:stretch>
+        </p:blipFill>
+        <p:spPr>
+          <a:xfrm>
+            <a:off x="2184503" y="1630333"/>
+            <a:ext cx="8331097" cy="3938579"/>
+          </a:xfrm>
+          <a:prstGeom prst="rect">
+            <a:avLst/>
+          </a:prstGeom>
+        </p:spPr>
+      </p:pic>
+    </p:spTree>
+    <p:extLst>
+      <p:ext uri="{BB962C8B-B14F-4D97-AF65-F5344CB8AC3E}">
+        <p14:creationId xmlns:p14="http://schemas.microsoft.com/office/powerpoint/2010/main" val="1131457318"/>
+      </p:ext>
+    </p:extLst>
+  </p:cSld>
+  <p:clrMapOvr>
+    <a:masterClrMapping/>
+  </p:clrMapOvr>
+</p:sld>
+</file>
+
 <file path=ppt/slides/slide2.xml><?xml version="1.0" encoding="utf-8"?>
 <p:sld xmlns:a="http://schemas.openxmlformats.org/drawingml/2006/main" xmlns:r="http://schemas.openxmlformats.org/officeDocument/2006/relationships" xmlns:p="http://schemas.openxmlformats.org/presentationml/2006/main">
   <p:cSld>
@@ -5178,43 +5402,14 @@
       </p:sp>
       <p:sp>
         <p:nvSpPr>
-          <p:cNvPr id="11" name="文字方塊 10"/>
-          <p:cNvSpPr txBox="1"/>
-          <p:nvPr/>
-        </p:nvSpPr>
-        <p:spPr>
-          <a:xfrm>
-            <a:off x="813047" y="807432"/>
-            <a:ext cx="3803776" cy="369332"/>
-          </a:xfrm>
-          <a:prstGeom prst="rect">
-            <a:avLst/>
-          </a:prstGeom>
-          <a:noFill/>
-        </p:spPr>
-        <p:txBody>
-          <a:bodyPr wrap="square" rtlCol="0">
-            <a:spAutoFit/>
-          </a:bodyPr>
-          <a:lstStyle/>
-          <a:p>
-            <a:r>
-              <a:rPr lang="en-US" altLang="zh-TW" dirty="0"/>
-              <a:t>Step2: Write Code on Client1.py </a:t>
-            </a:r>
-          </a:p>
-        </p:txBody>
-      </p:sp>
-      <p:sp>
-        <p:nvSpPr>
           <p:cNvPr id="5" name="矩形 4"/>
           <p:cNvSpPr/>
           <p:nvPr/>
         </p:nvSpPr>
         <p:spPr>
           <a:xfrm>
-            <a:off x="110404" y="1196348"/>
-            <a:ext cx="4809566" cy="5447645"/>
+            <a:off x="276225" y="1118542"/>
+            <a:ext cx="6515099" cy="5670783"/>
           </a:xfrm>
           <a:prstGeom prst="rect">
             <a:avLst/>
@@ -5230,330 +5425,330 @@
           <a:lstStyle/>
           <a:p>
             <a:r>
-              <a:rPr lang="en-US" altLang="zh-TW" sz="1200" dirty="0"/>
+              <a:rPr lang="en-US" altLang="zh-TW" sz="1250" dirty="0"/>
               <a:t>from flask import Flask, request, </a:t>
             </a:r>
             <a:r>
-              <a:rPr lang="en-US" altLang="zh-TW" sz="1200" dirty="0" err="1"/>
+              <a:rPr lang="en-US" altLang="zh-TW" sz="1250" dirty="0" err="1"/>
               <a:t>jsonify</a:t>
             </a:r>
-            <a:endParaRPr lang="en-US" altLang="zh-TW" sz="1200" dirty="0"/>
-          </a:p>
-          <a:p>
-            <a:r>
-              <a:rPr lang="en-US" altLang="zh-TW" sz="1200" dirty="0"/>
+            <a:endParaRPr lang="en-US" altLang="zh-TW" sz="1250" dirty="0"/>
+          </a:p>
+          <a:p>
+            <a:r>
+              <a:rPr lang="en-US" altLang="zh-TW" sz="1250" dirty="0"/>
               <a:t>from datetime import datetime</a:t>
             </a:r>
           </a:p>
           <a:p>
-            <a:endParaRPr lang="en-US" altLang="zh-TW" sz="1200" dirty="0"/>
-          </a:p>
-          <a:p>
-            <a:r>
-              <a:rPr lang="en-US" altLang="zh-TW" sz="1200" dirty="0"/>
+            <a:endParaRPr lang="en-US" altLang="zh-TW" sz="1250" dirty="0"/>
+          </a:p>
+          <a:p>
+            <a:r>
+              <a:rPr lang="en-US" altLang="zh-TW" sz="1250" dirty="0"/>
               <a:t>app = Flask(__name__)</a:t>
             </a:r>
           </a:p>
           <a:p>
-            <a:endParaRPr lang="en-US" altLang="zh-TW" sz="1200" dirty="0"/>
-          </a:p>
-          <a:p>
-            <a:r>
-              <a:rPr lang="en-US" altLang="zh-TW" sz="1200" dirty="0"/>
+            <a:endParaRPr lang="en-US" altLang="zh-TW" sz="1250" dirty="0"/>
+          </a:p>
+          <a:p>
+            <a:r>
+              <a:rPr lang="en-US" altLang="zh-TW" sz="1250" dirty="0"/>
               <a:t>@app.route('/')</a:t>
             </a:r>
           </a:p>
           <a:p>
             <a:r>
-              <a:rPr lang="en-US" altLang="zh-TW" sz="1200" dirty="0"/>
+              <a:rPr lang="en-US" altLang="zh-TW" sz="1250" dirty="0"/>
               <a:t>def hello():</a:t>
             </a:r>
           </a:p>
           <a:p>
             <a:r>
-              <a:rPr lang="en-US" altLang="zh-TW" sz="1200" dirty="0"/>
+              <a:rPr lang="en-US" altLang="zh-TW" sz="1250" dirty="0"/>
               <a:t>    return 'Hello World!'</a:t>
             </a:r>
           </a:p>
           <a:p>
-            <a:endParaRPr lang="en-US" altLang="zh-TW" sz="1200" dirty="0"/>
-          </a:p>
-          <a:p>
-            <a:r>
-              <a:rPr lang="en-US" altLang="zh-TW" sz="1200" dirty="0"/>
+            <a:endParaRPr lang="en-US" altLang="zh-TW" sz="1250" dirty="0"/>
+          </a:p>
+          <a:p>
+            <a:r>
+              <a:rPr lang="en-US" altLang="zh-TW" sz="1250" dirty="0"/>
               <a:t># POST Method</a:t>
             </a:r>
           </a:p>
           <a:p>
             <a:r>
-              <a:rPr lang="en-US" altLang="zh-TW" sz="1200" dirty="0"/>
+              <a:rPr lang="en-US" altLang="zh-TW" sz="1250" dirty="0"/>
               <a:t>@app.route('/submit', methods=['POST'])</a:t>
             </a:r>
           </a:p>
           <a:p>
             <a:r>
-              <a:rPr lang="en-US" altLang="zh-TW" sz="1200" dirty="0"/>
+              <a:rPr lang="en-US" altLang="zh-TW" sz="1250" dirty="0"/>
               <a:t>def </a:t>
             </a:r>
             <a:r>
-              <a:rPr lang="en-US" altLang="zh-TW" sz="1200" dirty="0" err="1"/>
+              <a:rPr lang="en-US" altLang="zh-TW" sz="1250" dirty="0" err="1"/>
               <a:t>submit_form</a:t>
             </a:r>
             <a:r>
-              <a:rPr lang="en-US" altLang="zh-TW" sz="1200" dirty="0"/>
+              <a:rPr lang="en-US" altLang="zh-TW" sz="1250" dirty="0"/>
               <a:t>():</a:t>
             </a:r>
           </a:p>
           <a:p>
             <a:r>
-              <a:rPr lang="en-US" altLang="zh-TW" sz="1200" dirty="0"/>
+              <a:rPr lang="en-US" altLang="zh-TW" sz="1250" dirty="0"/>
               <a:t>    data = </a:t>
             </a:r>
             <a:r>
-              <a:rPr lang="en-US" altLang="zh-TW" sz="1200" dirty="0" err="1"/>
+              <a:rPr lang="en-US" altLang="zh-TW" sz="1250" dirty="0" err="1"/>
               <a:t>request.get_json</a:t>
             </a:r>
             <a:r>
-              <a:rPr lang="en-US" altLang="zh-TW" sz="1200" dirty="0"/>
+              <a:rPr lang="en-US" altLang="zh-TW" sz="1250" dirty="0"/>
               <a:t>()</a:t>
             </a:r>
           </a:p>
           <a:p>
             <a:r>
-              <a:rPr lang="en-US" altLang="zh-TW" sz="1200" dirty="0"/>
+              <a:rPr lang="en-US" altLang="zh-TW" sz="1250" dirty="0"/>
               <a:t>    name = </a:t>
             </a:r>
             <a:r>
-              <a:rPr lang="en-US" altLang="zh-TW" sz="1200" dirty="0" err="1"/>
+              <a:rPr lang="en-US" altLang="zh-TW" sz="1250" dirty="0" err="1"/>
               <a:t>data.get</a:t>
             </a:r>
             <a:r>
-              <a:rPr lang="en-US" altLang="zh-TW" sz="1200" dirty="0"/>
+              <a:rPr lang="en-US" altLang="zh-TW" sz="1250" dirty="0"/>
               <a:t>('name')</a:t>
             </a:r>
           </a:p>
           <a:p>
             <a:r>
-              <a:rPr lang="en-US" altLang="zh-TW" sz="1200" dirty="0"/>
+              <a:rPr lang="en-US" altLang="zh-TW" sz="1250" dirty="0"/>
               <a:t>    password = </a:t>
             </a:r>
             <a:r>
-              <a:rPr lang="en-US" altLang="zh-TW" sz="1200" dirty="0" err="1"/>
+              <a:rPr lang="en-US" altLang="zh-TW" sz="1250" dirty="0" err="1"/>
               <a:t>data.get</a:t>
             </a:r>
             <a:r>
-              <a:rPr lang="en-US" altLang="zh-TW" sz="1200" dirty="0"/>
+              <a:rPr lang="en-US" altLang="zh-TW" sz="1250" dirty="0"/>
               <a:t>('password')</a:t>
             </a:r>
           </a:p>
           <a:p>
             <a:r>
-              <a:rPr lang="en-US" altLang="zh-TW" sz="1200" dirty="0"/>
+              <a:rPr lang="en-US" altLang="zh-TW" sz="1250" dirty="0"/>
               <a:t>    birthday = </a:t>
             </a:r>
             <a:r>
-              <a:rPr lang="en-US" altLang="zh-TW" sz="1200" dirty="0" err="1"/>
+              <a:rPr lang="en-US" altLang="zh-TW" sz="1250" dirty="0" err="1"/>
               <a:t>datetime.strptime</a:t>
             </a:r>
             <a:r>
-              <a:rPr lang="en-US" altLang="zh-TW" sz="1200" dirty="0"/>
+              <a:rPr lang="en-US" altLang="zh-TW" sz="1250" dirty="0"/>
               <a:t>((f"{</a:t>
             </a:r>
             <a:r>
-              <a:rPr lang="en-US" altLang="zh-TW" sz="1200" dirty="0" err="1"/>
+              <a:rPr lang="en-US" altLang="zh-TW" sz="1250" dirty="0" err="1"/>
               <a:t>data.get</a:t>
             </a:r>
             <a:r>
-              <a:rPr lang="en-US" altLang="zh-TW" sz="1200" dirty="0"/>
+              <a:rPr lang="en-US" altLang="zh-TW" sz="1250" dirty="0"/>
               <a:t>('birthday')}"), "%Y-%m-%d")</a:t>
             </a:r>
           </a:p>
           <a:p>
             <a:r>
-              <a:rPr lang="en-US" altLang="zh-TW" sz="1200" dirty="0"/>
+              <a:rPr lang="en-US" altLang="zh-TW" sz="1250" dirty="0"/>
               <a:t>    gender = </a:t>
             </a:r>
             <a:r>
-              <a:rPr lang="en-US" altLang="zh-TW" sz="1200" dirty="0" err="1"/>
+              <a:rPr lang="en-US" altLang="zh-TW" sz="1250" dirty="0" err="1"/>
               <a:t>data.get</a:t>
             </a:r>
             <a:r>
-              <a:rPr lang="en-US" altLang="zh-TW" sz="1200" dirty="0"/>
+              <a:rPr lang="en-US" altLang="zh-TW" sz="1250" dirty="0"/>
               <a:t>('gender')</a:t>
             </a:r>
           </a:p>
           <a:p>
             <a:r>
-              <a:rPr lang="en-US" altLang="zh-TW" sz="1200" dirty="0"/>
+              <a:rPr lang="en-US" altLang="zh-TW" sz="1250" dirty="0"/>
               <a:t>    height = </a:t>
             </a:r>
             <a:r>
-              <a:rPr lang="en-US" altLang="zh-TW" sz="1200" dirty="0" err="1"/>
+              <a:rPr lang="en-US" altLang="zh-TW" sz="1250" dirty="0" err="1"/>
               <a:t>data.get</a:t>
             </a:r>
             <a:r>
-              <a:rPr lang="en-US" altLang="zh-TW" sz="1200" dirty="0"/>
+              <a:rPr lang="en-US" altLang="zh-TW" sz="1250" dirty="0"/>
               <a:t>('height')</a:t>
             </a:r>
           </a:p>
           <a:p>
             <a:r>
-              <a:rPr lang="en-US" altLang="zh-TW" sz="1200" dirty="0"/>
+              <a:rPr lang="en-US" altLang="zh-TW" sz="1250" dirty="0"/>
               <a:t>    weight = </a:t>
             </a:r>
             <a:r>
-              <a:rPr lang="en-US" altLang="zh-TW" sz="1200" dirty="0" err="1"/>
+              <a:rPr lang="en-US" altLang="zh-TW" sz="1250" dirty="0" err="1"/>
               <a:t>data.get</a:t>
             </a:r>
             <a:r>
-              <a:rPr lang="en-US" altLang="zh-TW" sz="1200" dirty="0"/>
+              <a:rPr lang="en-US" altLang="zh-TW" sz="1250" dirty="0"/>
               <a:t>('weight')</a:t>
             </a:r>
           </a:p>
           <a:p>
             <a:r>
-              <a:rPr lang="en-US" altLang="zh-TW" sz="1200" dirty="0"/>
+              <a:rPr lang="en-US" altLang="zh-TW" sz="1250" dirty="0"/>
               <a:t>    </a:t>
             </a:r>
           </a:p>
           <a:p>
             <a:r>
-              <a:rPr lang="en-US" altLang="zh-TW" sz="1200" dirty="0"/>
+              <a:rPr lang="en-US" altLang="zh-TW" sz="1250" dirty="0"/>
               <a:t>    # </a:t>
             </a:r>
             <a:r>
-              <a:rPr lang="en-US" altLang="zh-TW" sz="1200" dirty="0" err="1"/>
+              <a:rPr lang="en-US" altLang="zh-TW" sz="1250" dirty="0" err="1"/>
               <a:t>bmi</a:t>
             </a:r>
             <a:r>
-              <a:rPr lang="en-US" altLang="zh-TW" sz="1200" dirty="0"/>
+              <a:rPr lang="en-US" altLang="zh-TW" sz="1250" dirty="0"/>
               <a:t> count</a:t>
             </a:r>
           </a:p>
           <a:p>
             <a:r>
-              <a:rPr lang="en-US" altLang="zh-TW" sz="1200" dirty="0"/>
+              <a:rPr lang="en-US" altLang="zh-TW" sz="1250" dirty="0"/>
               <a:t>    </a:t>
             </a:r>
             <a:r>
-              <a:rPr lang="en-US" altLang="zh-TW" sz="1200" dirty="0" err="1"/>
+              <a:rPr lang="en-US" altLang="zh-TW" sz="1250" dirty="0" err="1"/>
               <a:t>bmi</a:t>
             </a:r>
             <a:r>
-              <a:rPr lang="en-US" altLang="zh-TW" sz="1200" dirty="0"/>
+              <a:rPr lang="en-US" altLang="zh-TW" sz="1250" dirty="0"/>
               <a:t> = round(weight / height **2,2)</a:t>
             </a:r>
           </a:p>
           <a:p>
             <a:r>
-              <a:rPr lang="en-US" altLang="zh-TW" sz="1200" dirty="0"/>
+              <a:rPr lang="en-US" altLang="zh-TW" sz="1250" dirty="0"/>
               <a:t>    </a:t>
             </a:r>
           </a:p>
           <a:p>
             <a:r>
-              <a:rPr lang="en-US" altLang="zh-TW" sz="1200" dirty="0"/>
+              <a:rPr lang="en-US" altLang="zh-TW" sz="1250" dirty="0"/>
               <a:t>    # age count</a:t>
             </a:r>
           </a:p>
           <a:p>
             <a:r>
-              <a:rPr lang="en-US" altLang="zh-TW" sz="1200" dirty="0"/>
+              <a:rPr lang="en-US" altLang="zh-TW" sz="1250" dirty="0"/>
               <a:t>    today = </a:t>
             </a:r>
             <a:r>
-              <a:rPr lang="en-US" altLang="zh-TW" sz="1200" dirty="0" err="1"/>
+              <a:rPr lang="en-US" altLang="zh-TW" sz="1250" dirty="0" err="1"/>
               <a:t>datetime.today</a:t>
             </a:r>
             <a:r>
-              <a:rPr lang="en-US" altLang="zh-TW" sz="1200" dirty="0"/>
+              <a:rPr lang="en-US" altLang="zh-TW" sz="1250" dirty="0"/>
               <a:t>()</a:t>
             </a:r>
           </a:p>
           <a:p>
             <a:r>
-              <a:rPr lang="en-US" altLang="zh-TW" sz="1200" dirty="0"/>
+              <a:rPr lang="en-US" altLang="zh-TW" sz="1250" dirty="0"/>
               <a:t>    age = </a:t>
             </a:r>
             <a:r>
-              <a:rPr lang="en-US" altLang="zh-TW" sz="1200" dirty="0" err="1"/>
+              <a:rPr lang="en-US" altLang="zh-TW" sz="1250" dirty="0" err="1"/>
               <a:t>today.year</a:t>
             </a:r>
             <a:r>
-              <a:rPr lang="en-US" altLang="zh-TW" sz="1200" dirty="0"/>
+              <a:rPr lang="en-US" altLang="zh-TW" sz="1250" dirty="0"/>
               <a:t> - </a:t>
             </a:r>
             <a:r>
-              <a:rPr lang="en-US" altLang="zh-TW" sz="1200" dirty="0" err="1"/>
+              <a:rPr lang="en-US" altLang="zh-TW" sz="1250" dirty="0" err="1"/>
               <a:t>birthday.year</a:t>
             </a:r>
             <a:r>
-              <a:rPr lang="en-US" altLang="zh-TW" sz="1200" dirty="0"/>
+              <a:rPr lang="en-US" altLang="zh-TW" sz="1250" dirty="0"/>
               <a:t> - ((</a:t>
             </a:r>
             <a:r>
-              <a:rPr lang="en-US" altLang="zh-TW" sz="1200" dirty="0" err="1"/>
+              <a:rPr lang="en-US" altLang="zh-TW" sz="1250" dirty="0" err="1"/>
               <a:t>today.month</a:t>
             </a:r>
             <a:r>
-              <a:rPr lang="en-US" altLang="zh-TW" sz="1200" dirty="0"/>
+              <a:rPr lang="en-US" altLang="zh-TW" sz="1250" dirty="0"/>
               <a:t>, </a:t>
             </a:r>
             <a:r>
-              <a:rPr lang="en-US" altLang="zh-TW" sz="1200" dirty="0" err="1"/>
+              <a:rPr lang="en-US" altLang="zh-TW" sz="1250" dirty="0" err="1"/>
               <a:t>today.day</a:t>
             </a:r>
             <a:r>
-              <a:rPr lang="en-US" altLang="zh-TW" sz="1200" dirty="0"/>
+              <a:rPr lang="en-US" altLang="zh-TW" sz="1250" dirty="0"/>
               <a:t>) &lt; (</a:t>
             </a:r>
             <a:r>
-              <a:rPr lang="en-US" altLang="zh-TW" sz="1200" dirty="0" err="1"/>
+              <a:rPr lang="en-US" altLang="zh-TW" sz="1250" dirty="0" err="1"/>
               <a:t>birthday.month</a:t>
             </a:r>
             <a:r>
-              <a:rPr lang="en-US" altLang="zh-TW" sz="1200" dirty="0"/>
+              <a:rPr lang="en-US" altLang="zh-TW" sz="1250" dirty="0"/>
               <a:t>, </a:t>
             </a:r>
             <a:r>
-              <a:rPr lang="en-US" altLang="zh-TW" sz="1200" dirty="0" err="1"/>
+              <a:rPr lang="en-US" altLang="zh-TW" sz="1250" dirty="0" err="1"/>
               <a:t>birthday.day</a:t>
             </a:r>
             <a:r>
-              <a:rPr lang="en-US" altLang="zh-TW" sz="1200" dirty="0"/>
+              <a:rPr lang="en-US" altLang="zh-TW" sz="1250" dirty="0"/>
               <a:t>))</a:t>
             </a:r>
           </a:p>
           <a:p>
-            <a:endParaRPr lang="en-US" altLang="zh-TW" sz="1200" dirty="0"/>
-          </a:p>
-          <a:p>
-            <a:r>
-              <a:rPr lang="en-US" altLang="zh-TW" sz="1200" dirty="0"/>
+            <a:endParaRPr lang="en-US" altLang="zh-TW" sz="1250" dirty="0"/>
+          </a:p>
+          <a:p>
+            <a:r>
+              <a:rPr lang="en-US" altLang="zh-TW" sz="1250" dirty="0"/>
               <a:t>    return </a:t>
             </a:r>
             <a:r>
-              <a:rPr lang="en-US" altLang="zh-TW" sz="1200" dirty="0" err="1"/>
+              <a:rPr lang="en-US" altLang="zh-TW" sz="1250" dirty="0" err="1"/>
               <a:t>jsonify</a:t>
             </a:r>
             <a:r>
-              <a:rPr lang="en-US" altLang="zh-TW" sz="1200" dirty="0"/>
+              <a:rPr lang="en-US" altLang="zh-TW" sz="1250" dirty="0"/>
               <a:t>(message=</a:t>
             </a:r>
             <a:r>
-              <a:rPr lang="en-US" altLang="zh-TW" sz="1200" dirty="0" err="1"/>
+              <a:rPr lang="en-US" altLang="zh-TW" sz="1250" dirty="0" err="1"/>
               <a:t>f'Your</a:t>
             </a:r>
             <a:r>
-              <a:rPr lang="en-US" altLang="zh-TW" sz="1200" dirty="0"/>
+              <a:rPr lang="en-US" altLang="zh-TW" sz="1250" dirty="0"/>
               <a:t> AGE={age},BMI={</a:t>
             </a:r>
             <a:r>
-              <a:rPr lang="en-US" altLang="zh-TW" sz="1200" dirty="0" err="1"/>
+              <a:rPr lang="en-US" altLang="zh-TW" sz="1250" dirty="0" err="1"/>
               <a:t>bmi</a:t>
             </a:r>
             <a:r>
-              <a:rPr lang="en-US" altLang="zh-TW" sz="1200" dirty="0"/>
+              <a:rPr lang="en-US" altLang="zh-TW" sz="1250" dirty="0"/>
               <a:t>}')</a:t>
             </a:r>
           </a:p>
@@ -5561,14 +5756,14 @@
       </p:sp>
       <p:sp>
         <p:nvSpPr>
-          <p:cNvPr id="8" name="文字方塊 7"/>
+          <p:cNvPr id="13" name="文字方塊 12"/>
           <p:cNvSpPr txBox="1"/>
           <p:nvPr/>
         </p:nvSpPr>
         <p:spPr>
           <a:xfrm>
-            <a:off x="8826440" y="1427913"/>
-            <a:ext cx="2950973" cy="369332"/>
+            <a:off x="7496312" y="749210"/>
+            <a:ext cx="3803776" cy="369332"/>
           </a:xfrm>
           <a:prstGeom prst="rect">
             <a:avLst/>
@@ -5583,21 +5778,27 @@
           <a:p>
             <a:r>
               <a:rPr lang="en-US" altLang="zh-TW" dirty="0"/>
-              <a:t>Client1.py Run on Terminal.</a:t>
-            </a:r>
-          </a:p>
-        </p:txBody>
-      </p:sp>
-      <p:sp>
-        <p:nvSpPr>
-          <p:cNvPr id="10" name="文字方塊 9"/>
+              <a:t>Step2: Write Code on Client1.py </a:t>
+            </a:r>
+          </a:p>
+        </p:txBody>
+      </p:sp>
+      <p:sp>
+        <p:nvSpPr>
+          <p:cNvPr id="14" name="文字方塊 13">
+            <a:extLst>
+              <a:ext uri="{FF2B5EF4-FFF2-40B4-BE49-F238E27FC236}">
+                <a16:creationId xmlns:a16="http://schemas.microsoft.com/office/drawing/2014/main" id="{97F7441A-8531-418C-A102-69F983B057A5}"/>
+              </a:ext>
+            </a:extLst>
+          </p:cNvPr>
           <p:cNvSpPr txBox="1"/>
           <p:nvPr/>
         </p:nvSpPr>
         <p:spPr>
           <a:xfrm>
-            <a:off x="5057103" y="1427913"/>
-            <a:ext cx="3068669" cy="369332"/>
+            <a:off x="1889372" y="729626"/>
+            <a:ext cx="4035178" cy="369332"/>
           </a:xfrm>
           <a:prstGeom prst="rect">
             <a:avLst/>
@@ -5612,116 +5813,111 @@
           <a:p>
             <a:r>
               <a:rPr lang="en-US" altLang="zh-TW" dirty="0"/>
-              <a:t>Server1.py Run on IDE Shell.</a:t>
-            </a:r>
-          </a:p>
-        </p:txBody>
-      </p:sp>
-      <p:sp>
-        <p:nvSpPr>
-          <p:cNvPr id="12" name="文字方塊 11"/>
+              <a:t>Step1: Write Code on Server1.py </a:t>
+            </a:r>
+          </a:p>
+        </p:txBody>
+      </p:sp>
+      <p:sp>
+        <p:nvSpPr>
+          <p:cNvPr id="15" name="文字方塊 14">
+            <a:extLst>
+              <a:ext uri="{FF2B5EF4-FFF2-40B4-BE49-F238E27FC236}">
+                <a16:creationId xmlns:a16="http://schemas.microsoft.com/office/drawing/2014/main" id="{9DAA9AAD-4F13-4FAF-8A07-64C0AAE9D3B8}"/>
+              </a:ext>
+            </a:extLst>
+          </p:cNvPr>
           <p:cNvSpPr txBox="1"/>
           <p:nvPr/>
         </p:nvSpPr>
         <p:spPr>
           <a:xfrm>
-            <a:off x="5054028" y="5430087"/>
-            <a:ext cx="7053349" cy="1200329"/>
+            <a:off x="7496312" y="1118542"/>
+            <a:ext cx="4257675" cy="3693319"/>
           </a:xfrm>
           <a:prstGeom prst="rect">
             <a:avLst/>
           </a:prstGeom>
-          <a:noFill/>
-        </p:spPr>
-        <p:txBody>
-          <a:bodyPr wrap="square" rtlCol="0">
+          <a:solidFill>
+            <a:schemeClr val="bg2"/>
+          </a:solidFill>
+        </p:spPr>
+        <p:txBody>
+          <a:bodyPr wrap="square">
             <a:spAutoFit/>
           </a:bodyPr>
           <a:lstStyle/>
           <a:p>
             <a:r>
-              <a:rPr lang="en-US" altLang="zh-TW" dirty="0"/>
-              <a:t>Client1.py is run on terminal, because </a:t>
-            </a:r>
-            <a:r>
-              <a:rPr lang="en-US" altLang="zh-TW" dirty="0" err="1"/>
-              <a:t>Thonny</a:t>
-            </a:r>
-            <a:r>
-              <a:rPr lang="en-US" altLang="zh-TW" dirty="0"/>
-              <a:t> IDE can’t run two code at same time.</a:t>
-            </a:r>
-          </a:p>
-          <a:p>
-            <a:endParaRPr lang="en-US" altLang="zh-TW" dirty="0"/>
-          </a:p>
-          <a:p>
-            <a:r>
-              <a:rPr lang="en-US" altLang="zh-TW" dirty="0"/>
-              <a:t>If Client1.py can't run, you may need to change the Python environment.</a:t>
-            </a:r>
-          </a:p>
-        </p:txBody>
-      </p:sp>
-      <p:sp>
-        <p:nvSpPr>
-          <p:cNvPr id="13" name="文字方塊 12"/>
-          <p:cNvSpPr txBox="1"/>
-          <p:nvPr/>
-        </p:nvSpPr>
-        <p:spPr>
-          <a:xfrm>
-            <a:off x="6498151" y="1011682"/>
-            <a:ext cx="3803776" cy="369332"/>
-          </a:xfrm>
-          <a:prstGeom prst="rect">
-            <a:avLst/>
-          </a:prstGeom>
-          <a:noFill/>
-        </p:spPr>
-        <p:txBody>
-          <a:bodyPr wrap="square" rtlCol="0">
-            <a:spAutoFit/>
-          </a:bodyPr>
-          <a:lstStyle/>
-          <a:p>
-            <a:r>
-              <a:rPr lang="en-US" altLang="zh-TW" dirty="0"/>
-              <a:t>Step3: Run Server1.py and Client1.py </a:t>
-            </a:r>
-          </a:p>
-        </p:txBody>
-      </p:sp>
-      <p:pic>
-        <p:nvPicPr>
-          <p:cNvPr id="6" name="圖片 5">
-            <a:extLst>
-              <a:ext uri="{FF2B5EF4-FFF2-40B4-BE49-F238E27FC236}">
-                <a16:creationId xmlns:a16="http://schemas.microsoft.com/office/drawing/2014/main" id="{11C31C61-BA04-49D4-BBC9-FAD20382AC57}"/>
-              </a:ext>
-            </a:extLst>
-          </p:cNvPr>
-          <p:cNvPicPr>
-            <a:picLocks noChangeAspect="1"/>
-          </p:cNvPicPr>
-          <p:nvPr/>
-        </p:nvPicPr>
-        <p:blipFill>
-          <a:blip r:embed="rId2"/>
-          <a:stretch>
-            <a:fillRect/>
-          </a:stretch>
-        </p:blipFill>
-        <p:spPr>
-          <a:xfrm>
-            <a:off x="5057103" y="1797245"/>
-            <a:ext cx="6903156" cy="3263511"/>
-          </a:xfrm>
-          <a:prstGeom prst="rect">
-            <a:avLst/>
-          </a:prstGeom>
-        </p:spPr>
-      </p:pic>
+              <a:rPr lang="zh-TW" altLang="en-US" dirty="0"/>
+              <a:t>import requests</a:t>
+            </a:r>
+          </a:p>
+          <a:p>
+            <a:endParaRPr lang="zh-TW" altLang="en-US" dirty="0"/>
+          </a:p>
+          <a:p>
+            <a:r>
+              <a:rPr lang="zh-TW" altLang="en-US" dirty="0"/>
+              <a:t>url = 'http://127.0.0.1:5000/submit'</a:t>
+            </a:r>
+          </a:p>
+          <a:p>
+            <a:r>
+              <a:rPr lang="zh-TW" altLang="en-US" dirty="0"/>
+              <a:t>payload = {'name': 'wiki',</a:t>
+            </a:r>
+          </a:p>
+          <a:p>
+            <a:r>
+              <a:rPr lang="zh-TW" altLang="en-US" dirty="0"/>
+              <a:t>           'password': '123456',</a:t>
+            </a:r>
+          </a:p>
+          <a:p>
+            <a:r>
+              <a:rPr lang="zh-TW" altLang="en-US" dirty="0"/>
+              <a:t>           'birthday':'1990-04-24',</a:t>
+            </a:r>
+          </a:p>
+          <a:p>
+            <a:r>
+              <a:rPr lang="zh-TW" altLang="en-US" dirty="0"/>
+              <a:t>           'height':1.75,</a:t>
+            </a:r>
+          </a:p>
+          <a:p>
+            <a:r>
+              <a:rPr lang="zh-TW" altLang="en-US" dirty="0"/>
+              <a:t>           'weight':60}</a:t>
+            </a:r>
+          </a:p>
+          <a:p>
+            <a:endParaRPr lang="zh-TW" altLang="en-US" dirty="0"/>
+          </a:p>
+          <a:p>
+            <a:r>
+              <a:rPr lang="zh-TW" altLang="en-US" dirty="0"/>
+              <a:t>response = requests.post(url, json=payload)</a:t>
+            </a:r>
+          </a:p>
+          <a:p>
+            <a:endParaRPr lang="zh-TW" altLang="en-US" dirty="0"/>
+          </a:p>
+          <a:p>
+            <a:r>
+              <a:rPr lang="zh-TW" altLang="en-US" dirty="0"/>
+              <a:t>print('Status Code:', response.status_code)</a:t>
+            </a:r>
+          </a:p>
+          <a:p>
+            <a:r>
+              <a:rPr lang="zh-TW" altLang="en-US" dirty="0"/>
+              <a:t>print('Response JSON:', response.json())</a:t>
+            </a:r>
+          </a:p>
+        </p:txBody>
+      </p:sp>
     </p:spTree>
     <p:extLst>
       <p:ext uri="{BB962C8B-B14F-4D97-AF65-F5344CB8AC3E}">

</xml_diff>

<commit_message>
Post Method--Bmi & Age & csv to judge
</commit_message>
<xml_diff>
--- a/PythonFlask/Teach.pptx
+++ b/PythonFlask/Teach.pptx
@@ -5,7 +5,7 @@
     <p:sldMasterId id="2147483648" r:id="rId1"/>
   </p:sldMasterIdLst>
   <p:notesMasterIdLst>
-    <p:notesMasterId r:id="rId12"/>
+    <p:notesMasterId r:id="rId14"/>
   </p:notesMasterIdLst>
   <p:sldIdLst>
     <p:sldId id="256" r:id="rId2"/>
@@ -18,6 +18,8 @@
     <p:sldId id="264" r:id="rId9"/>
     <p:sldId id="265" r:id="rId10"/>
     <p:sldId id="266" r:id="rId11"/>
+    <p:sldId id="267" r:id="rId12"/>
+    <p:sldId id="268" r:id="rId13"/>
   </p:sldIdLst>
   <p:sldSz cx="12192000" cy="6858000"/>
   <p:notesSz cx="6858000" cy="9144000"/>
@@ -3564,6 +3566,1197 @@
     <p:extLst>
       <p:ext uri="{BB962C8B-B14F-4D97-AF65-F5344CB8AC3E}">
         <p14:creationId xmlns:p14="http://schemas.microsoft.com/office/powerpoint/2010/main" val="1131457318"/>
+      </p:ext>
+    </p:extLst>
+  </p:cSld>
+  <p:clrMapOvr>
+    <a:masterClrMapping/>
+  </p:clrMapOvr>
+</p:sld>
+</file>
+
+<file path=ppt/slides/slide11.xml><?xml version="1.0" encoding="utf-8"?>
+<p:sld xmlns:a="http://schemas.openxmlformats.org/drawingml/2006/main" xmlns:r="http://schemas.openxmlformats.org/officeDocument/2006/relationships" xmlns:p="http://schemas.openxmlformats.org/presentationml/2006/main">
+  <p:cSld>
+    <p:spTree>
+      <p:nvGrpSpPr>
+        <p:cNvPr id="1" name=""/>
+        <p:cNvGrpSpPr/>
+        <p:nvPr/>
+      </p:nvGrpSpPr>
+      <p:grpSpPr>
+        <a:xfrm>
+          <a:off x="0" y="0"/>
+          <a:ext cx="0" cy="0"/>
+          <a:chOff x="0" y="0"/>
+          <a:chExt cx="0" cy="0"/>
+        </a:xfrm>
+      </p:grpSpPr>
+      <p:sp>
+        <p:nvSpPr>
+          <p:cNvPr id="2" name="標題 1"/>
+          <p:cNvSpPr>
+            <a:spLocks noGrp="1"/>
+          </p:cNvSpPr>
+          <p:nvPr>
+            <p:ph type="title"/>
+          </p:nvPr>
+        </p:nvSpPr>
+        <p:spPr>
+          <a:xfrm>
+            <a:off x="838200" y="0"/>
+            <a:ext cx="9677400" cy="1098958"/>
+          </a:xfrm>
+        </p:spPr>
+        <p:txBody>
+          <a:bodyPr>
+            <a:normAutofit/>
+          </a:bodyPr>
+          <a:lstStyle/>
+          <a:p>
+            <a:r>
+              <a:rPr lang="en-US" altLang="zh-TW" dirty="0"/>
+              <a:t>8.Write Code: Post Method Test</a:t>
+            </a:r>
+            <a:endParaRPr lang="zh-TW" altLang="en-US" dirty="0"/>
+          </a:p>
+        </p:txBody>
+      </p:sp>
+      <p:sp>
+        <p:nvSpPr>
+          <p:cNvPr id="5" name="矩形 4"/>
+          <p:cNvSpPr/>
+          <p:nvPr/>
+        </p:nvSpPr>
+        <p:spPr>
+          <a:xfrm>
+            <a:off x="276225" y="1118542"/>
+            <a:ext cx="6515099" cy="5632311"/>
+          </a:xfrm>
+          <a:prstGeom prst="rect">
+            <a:avLst/>
+          </a:prstGeom>
+          <a:solidFill>
+            <a:schemeClr val="bg2"/>
+          </a:solidFill>
+        </p:spPr>
+        <p:txBody>
+          <a:bodyPr wrap="square">
+            <a:spAutoFit/>
+          </a:bodyPr>
+          <a:lstStyle/>
+          <a:p>
+            <a:r>
+              <a:rPr lang="en-US" altLang="zh-TW" sz="900" dirty="0"/>
+              <a:t>from flask import Flask, request, </a:t>
+            </a:r>
+            <a:r>
+              <a:rPr lang="en-US" altLang="zh-TW" sz="900" dirty="0" err="1"/>
+              <a:t>jsonify</a:t>
+            </a:r>
+            <a:endParaRPr lang="en-US" altLang="zh-TW" sz="900" dirty="0"/>
+          </a:p>
+          <a:p>
+            <a:r>
+              <a:rPr lang="en-US" altLang="zh-TW" sz="900" dirty="0"/>
+              <a:t>from datetime import datetime</a:t>
+            </a:r>
+          </a:p>
+          <a:p>
+            <a:r>
+              <a:rPr lang="en-US" altLang="zh-TW" sz="900" dirty="0"/>
+              <a:t>import math</a:t>
+            </a:r>
+          </a:p>
+          <a:p>
+            <a:r>
+              <a:rPr lang="en-US" altLang="zh-TW" sz="900" dirty="0"/>
+              <a:t>import pandas as pd</a:t>
+            </a:r>
+          </a:p>
+          <a:p>
+            <a:endParaRPr lang="en-US" altLang="zh-TW" sz="900" dirty="0"/>
+          </a:p>
+          <a:p>
+            <a:r>
+              <a:rPr lang="en-US" altLang="zh-TW" sz="900" dirty="0"/>
+              <a:t>app = Flask(__name__)</a:t>
+            </a:r>
+          </a:p>
+          <a:p>
+            <a:endParaRPr lang="en-US" altLang="zh-TW" sz="900" dirty="0"/>
+          </a:p>
+          <a:p>
+            <a:r>
+              <a:rPr lang="en-US" altLang="zh-TW" sz="900" dirty="0"/>
+              <a:t># POST Method</a:t>
+            </a:r>
+          </a:p>
+          <a:p>
+            <a:r>
+              <a:rPr lang="en-US" altLang="zh-TW" sz="900" dirty="0"/>
+              <a:t>@app.route('/submit', methods=['POST'])</a:t>
+            </a:r>
+          </a:p>
+          <a:p>
+            <a:r>
+              <a:rPr lang="en-US" altLang="zh-TW" sz="900" dirty="0"/>
+              <a:t>def </a:t>
+            </a:r>
+            <a:r>
+              <a:rPr lang="en-US" altLang="zh-TW" sz="900" dirty="0" err="1"/>
+              <a:t>submit_form</a:t>
+            </a:r>
+            <a:r>
+              <a:rPr lang="en-US" altLang="zh-TW" sz="900" dirty="0"/>
+              <a:t>():</a:t>
+            </a:r>
+          </a:p>
+          <a:p>
+            <a:r>
+              <a:rPr lang="en-US" altLang="zh-TW" sz="900" dirty="0"/>
+              <a:t>    data = </a:t>
+            </a:r>
+            <a:r>
+              <a:rPr lang="en-US" altLang="zh-TW" sz="900" dirty="0" err="1"/>
+              <a:t>request.get_json</a:t>
+            </a:r>
+            <a:r>
+              <a:rPr lang="en-US" altLang="zh-TW" sz="900" dirty="0"/>
+              <a:t>()</a:t>
+            </a:r>
+          </a:p>
+          <a:p>
+            <a:r>
+              <a:rPr lang="en-US" altLang="zh-TW" sz="900" dirty="0"/>
+              <a:t>    name = </a:t>
+            </a:r>
+            <a:r>
+              <a:rPr lang="en-US" altLang="zh-TW" sz="900" dirty="0" err="1"/>
+              <a:t>data.get</a:t>
+            </a:r>
+            <a:r>
+              <a:rPr lang="en-US" altLang="zh-TW" sz="900" dirty="0"/>
+              <a:t>('name')</a:t>
+            </a:r>
+          </a:p>
+          <a:p>
+            <a:r>
+              <a:rPr lang="en-US" altLang="zh-TW" sz="900" dirty="0"/>
+              <a:t>    password = </a:t>
+            </a:r>
+            <a:r>
+              <a:rPr lang="en-US" altLang="zh-TW" sz="900" dirty="0" err="1"/>
+              <a:t>data.get</a:t>
+            </a:r>
+            <a:r>
+              <a:rPr lang="en-US" altLang="zh-TW" sz="900" dirty="0"/>
+              <a:t>('password')</a:t>
+            </a:r>
+          </a:p>
+          <a:p>
+            <a:r>
+              <a:rPr lang="en-US" altLang="zh-TW" sz="900" dirty="0"/>
+              <a:t>    birthday = </a:t>
+            </a:r>
+            <a:r>
+              <a:rPr lang="en-US" altLang="zh-TW" sz="900" dirty="0" err="1"/>
+              <a:t>datetime.strptime</a:t>
+            </a:r>
+            <a:r>
+              <a:rPr lang="en-US" altLang="zh-TW" sz="900" dirty="0"/>
+              <a:t>((f"{</a:t>
+            </a:r>
+            <a:r>
+              <a:rPr lang="en-US" altLang="zh-TW" sz="900" dirty="0" err="1"/>
+              <a:t>data.get</a:t>
+            </a:r>
+            <a:r>
+              <a:rPr lang="en-US" altLang="zh-TW" sz="900" dirty="0"/>
+              <a:t>('birthday')}"), "%Y-%m-%d")</a:t>
+            </a:r>
+          </a:p>
+          <a:p>
+            <a:r>
+              <a:rPr lang="en-US" altLang="zh-TW" sz="900" dirty="0"/>
+              <a:t>    gender = </a:t>
+            </a:r>
+            <a:r>
+              <a:rPr lang="en-US" altLang="zh-TW" sz="900" dirty="0" err="1"/>
+              <a:t>data.get</a:t>
+            </a:r>
+            <a:r>
+              <a:rPr lang="en-US" altLang="zh-TW" sz="900" dirty="0"/>
+              <a:t>('gender')</a:t>
+            </a:r>
+          </a:p>
+          <a:p>
+            <a:r>
+              <a:rPr lang="en-US" altLang="zh-TW" sz="900" dirty="0"/>
+              <a:t>    height = </a:t>
+            </a:r>
+            <a:r>
+              <a:rPr lang="en-US" altLang="zh-TW" sz="900" dirty="0" err="1"/>
+              <a:t>data.get</a:t>
+            </a:r>
+            <a:r>
+              <a:rPr lang="en-US" altLang="zh-TW" sz="900" dirty="0"/>
+              <a:t>('height')</a:t>
+            </a:r>
+          </a:p>
+          <a:p>
+            <a:r>
+              <a:rPr lang="en-US" altLang="zh-TW" sz="900" dirty="0"/>
+              <a:t>    weight = </a:t>
+            </a:r>
+            <a:r>
+              <a:rPr lang="en-US" altLang="zh-TW" sz="900" dirty="0" err="1"/>
+              <a:t>data.get</a:t>
+            </a:r>
+            <a:r>
+              <a:rPr lang="en-US" altLang="zh-TW" sz="900" dirty="0"/>
+              <a:t>('weight')</a:t>
+            </a:r>
+          </a:p>
+          <a:p>
+            <a:r>
+              <a:rPr lang="en-US" altLang="zh-TW" sz="900" dirty="0"/>
+              <a:t>    </a:t>
+            </a:r>
+            <a:r>
+              <a:rPr lang="en-US" altLang="zh-TW" sz="900" dirty="0" err="1"/>
+              <a:t>bmi</a:t>
+            </a:r>
+            <a:r>
+              <a:rPr lang="en-US" altLang="zh-TW" sz="900" dirty="0"/>
+              <a:t> = round(weight / height **2,2)# </a:t>
+            </a:r>
+            <a:r>
+              <a:rPr lang="en-US" altLang="zh-TW" sz="900" dirty="0" err="1"/>
+              <a:t>bmi</a:t>
+            </a:r>
+            <a:r>
+              <a:rPr lang="en-US" altLang="zh-TW" sz="900" dirty="0"/>
+              <a:t> count</a:t>
+            </a:r>
+          </a:p>
+          <a:p>
+            <a:r>
+              <a:rPr lang="en-US" altLang="zh-TW" sz="900" dirty="0"/>
+              <a:t>    today = </a:t>
+            </a:r>
+            <a:r>
+              <a:rPr lang="en-US" altLang="zh-TW" sz="900" dirty="0" err="1"/>
+              <a:t>datetime.today</a:t>
+            </a:r>
+            <a:r>
+              <a:rPr lang="en-US" altLang="zh-TW" sz="900" dirty="0"/>
+              <a:t>()# age count</a:t>
+            </a:r>
+          </a:p>
+          <a:p>
+            <a:r>
+              <a:rPr lang="en-US" altLang="zh-TW" sz="900" dirty="0"/>
+              <a:t>    age = </a:t>
+            </a:r>
+            <a:r>
+              <a:rPr lang="en-US" altLang="zh-TW" sz="900" dirty="0" err="1"/>
+              <a:t>today.year</a:t>
+            </a:r>
+            <a:r>
+              <a:rPr lang="en-US" altLang="zh-TW" sz="900" dirty="0"/>
+              <a:t> - </a:t>
+            </a:r>
+            <a:r>
+              <a:rPr lang="en-US" altLang="zh-TW" sz="900" dirty="0" err="1"/>
+              <a:t>birthday.year</a:t>
+            </a:r>
+            <a:r>
+              <a:rPr lang="en-US" altLang="zh-TW" sz="900" dirty="0"/>
+              <a:t> - ((</a:t>
+            </a:r>
+            <a:r>
+              <a:rPr lang="en-US" altLang="zh-TW" sz="900" dirty="0" err="1"/>
+              <a:t>today.month</a:t>
+            </a:r>
+            <a:r>
+              <a:rPr lang="en-US" altLang="zh-TW" sz="900" dirty="0"/>
+              <a:t>, </a:t>
+            </a:r>
+            <a:r>
+              <a:rPr lang="en-US" altLang="zh-TW" sz="900" dirty="0" err="1"/>
+              <a:t>today.day</a:t>
+            </a:r>
+            <a:r>
+              <a:rPr lang="en-US" altLang="zh-TW" sz="900" dirty="0"/>
+              <a:t>) &lt; (</a:t>
+            </a:r>
+            <a:r>
+              <a:rPr lang="en-US" altLang="zh-TW" sz="900" dirty="0" err="1"/>
+              <a:t>birthday.month</a:t>
+            </a:r>
+            <a:r>
+              <a:rPr lang="en-US" altLang="zh-TW" sz="900" dirty="0"/>
+              <a:t>, </a:t>
+            </a:r>
+            <a:r>
+              <a:rPr lang="en-US" altLang="zh-TW" sz="900" dirty="0" err="1"/>
+              <a:t>birthday.day</a:t>
+            </a:r>
+            <a:r>
+              <a:rPr lang="en-US" altLang="zh-TW" sz="900" dirty="0"/>
+              <a:t>))</a:t>
+            </a:r>
+          </a:p>
+          <a:p>
+            <a:r>
+              <a:rPr lang="en-US" altLang="zh-TW" sz="900" dirty="0"/>
+              <a:t>    df = </a:t>
+            </a:r>
+            <a:r>
+              <a:rPr lang="en-US" altLang="zh-TW" sz="900" dirty="0" err="1"/>
+              <a:t>pd.read_csv</a:t>
+            </a:r>
+            <a:r>
+              <a:rPr lang="en-US" altLang="zh-TW" sz="900" dirty="0"/>
+              <a:t>('BMI_Normal.csv')</a:t>
+            </a:r>
+          </a:p>
+          <a:p>
+            <a:r>
+              <a:rPr lang="en-US" altLang="zh-TW" sz="900" dirty="0"/>
+              <a:t>    </a:t>
+            </a:r>
+            <a:r>
+              <a:rPr lang="en-US" altLang="zh-TW" sz="900" dirty="0" err="1"/>
+              <a:t>matched_rows</a:t>
+            </a:r>
+            <a:r>
+              <a:rPr lang="en-US" altLang="zh-TW" sz="900" dirty="0"/>
+              <a:t> = df[df['age'] == age].</a:t>
+            </a:r>
+            <a:r>
+              <a:rPr lang="en-US" altLang="zh-TW" sz="900" dirty="0" err="1"/>
+              <a:t>iloc</a:t>
+            </a:r>
+            <a:r>
+              <a:rPr lang="en-US" altLang="zh-TW" sz="900" dirty="0"/>
+              <a:t>[0]</a:t>
+            </a:r>
+          </a:p>
+          <a:p>
+            <a:r>
+              <a:rPr lang="en-US" altLang="zh-TW" sz="900" dirty="0"/>
+              <a:t>    print(</a:t>
+            </a:r>
+            <a:r>
+              <a:rPr lang="en-US" altLang="zh-TW" sz="900" dirty="0" err="1"/>
+              <a:t>matched_rows</a:t>
+            </a:r>
+            <a:r>
+              <a:rPr lang="en-US" altLang="zh-TW" sz="900" dirty="0"/>
+              <a:t>)</a:t>
+            </a:r>
+          </a:p>
+          <a:p>
+            <a:r>
+              <a:rPr lang="en-US" altLang="zh-TW" sz="900" dirty="0"/>
+              <a:t>    </a:t>
+            </a:r>
+            <a:r>
+              <a:rPr lang="en-US" altLang="zh-TW" sz="900" dirty="0" err="1"/>
+              <a:t>bmi_judge</a:t>
+            </a:r>
+            <a:r>
+              <a:rPr lang="en-US" altLang="zh-TW" sz="900" dirty="0"/>
+              <a:t> = 'wrong data'</a:t>
+            </a:r>
+          </a:p>
+          <a:p>
+            <a:r>
+              <a:rPr lang="en-US" altLang="zh-TW" sz="900" dirty="0"/>
+              <a:t>    if gender=='male':</a:t>
+            </a:r>
+          </a:p>
+          <a:p>
+            <a:r>
+              <a:rPr lang="en-US" altLang="zh-TW" sz="900" dirty="0"/>
+              <a:t>        if </a:t>
+            </a:r>
+            <a:r>
+              <a:rPr lang="en-US" altLang="zh-TW" sz="900" dirty="0" err="1"/>
+              <a:t>bmi</a:t>
+            </a:r>
+            <a:r>
+              <a:rPr lang="en-US" altLang="zh-TW" sz="900" dirty="0"/>
+              <a:t>&lt;</a:t>
+            </a:r>
+            <a:r>
+              <a:rPr lang="en-US" altLang="zh-TW" sz="900" dirty="0" err="1"/>
+              <a:t>matched_rows</a:t>
+            </a:r>
+            <a:r>
+              <a:rPr lang="en-US" altLang="zh-TW" sz="900" dirty="0"/>
+              <a:t>['</a:t>
+            </a:r>
+            <a:r>
+              <a:rPr lang="en-US" altLang="zh-TW" sz="900" dirty="0" err="1"/>
+              <a:t>male_min</a:t>
+            </a:r>
+            <a:r>
+              <a:rPr lang="en-US" altLang="zh-TW" sz="900" dirty="0"/>
+              <a:t>']:</a:t>
+            </a:r>
+          </a:p>
+          <a:p>
+            <a:r>
+              <a:rPr lang="en-US" altLang="zh-TW" sz="900" dirty="0"/>
+              <a:t>            </a:t>
+            </a:r>
+            <a:r>
+              <a:rPr lang="en-US" altLang="zh-TW" sz="900" dirty="0" err="1"/>
+              <a:t>bmi_judge</a:t>
+            </a:r>
+            <a:r>
+              <a:rPr lang="en-US" altLang="zh-TW" sz="900" dirty="0"/>
+              <a:t>='Too thin'</a:t>
+            </a:r>
+          </a:p>
+          <a:p>
+            <a:r>
+              <a:rPr lang="en-US" altLang="zh-TW" sz="900" dirty="0"/>
+              <a:t>        </a:t>
+            </a:r>
+            <a:r>
+              <a:rPr lang="en-US" altLang="zh-TW" sz="900" dirty="0" err="1"/>
+              <a:t>elif</a:t>
+            </a:r>
+            <a:r>
+              <a:rPr lang="en-US" altLang="zh-TW" sz="900" dirty="0"/>
+              <a:t> </a:t>
+            </a:r>
+            <a:r>
+              <a:rPr lang="en-US" altLang="zh-TW" sz="900" dirty="0" err="1"/>
+              <a:t>bmi</a:t>
+            </a:r>
+            <a:r>
+              <a:rPr lang="en-US" altLang="zh-TW" sz="900" dirty="0"/>
+              <a:t>&gt;=</a:t>
+            </a:r>
+            <a:r>
+              <a:rPr lang="en-US" altLang="zh-TW" sz="900" dirty="0" err="1"/>
+              <a:t>matched_rows</a:t>
+            </a:r>
+            <a:r>
+              <a:rPr lang="en-US" altLang="zh-TW" sz="900" dirty="0"/>
+              <a:t>['</a:t>
+            </a:r>
+            <a:r>
+              <a:rPr lang="en-US" altLang="zh-TW" sz="900" dirty="0" err="1"/>
+              <a:t>male_min</a:t>
+            </a:r>
+            <a:r>
+              <a:rPr lang="en-US" altLang="zh-TW" sz="900" dirty="0"/>
+              <a:t>'] and </a:t>
+            </a:r>
+            <a:r>
+              <a:rPr lang="en-US" altLang="zh-TW" sz="900" dirty="0" err="1"/>
+              <a:t>bmi</a:t>
+            </a:r>
+            <a:r>
+              <a:rPr lang="en-US" altLang="zh-TW" sz="900" dirty="0"/>
+              <a:t>&lt;=</a:t>
+            </a:r>
+            <a:r>
+              <a:rPr lang="en-US" altLang="zh-TW" sz="900" dirty="0" err="1"/>
+              <a:t>matched_rows</a:t>
+            </a:r>
+            <a:r>
+              <a:rPr lang="en-US" altLang="zh-TW" sz="900" dirty="0"/>
+              <a:t>['</a:t>
+            </a:r>
+            <a:r>
+              <a:rPr lang="en-US" altLang="zh-TW" sz="900" dirty="0" err="1"/>
+              <a:t>male_max</a:t>
+            </a:r>
+            <a:r>
+              <a:rPr lang="en-US" altLang="zh-TW" sz="900" dirty="0"/>
+              <a:t>']:</a:t>
+            </a:r>
+          </a:p>
+          <a:p>
+            <a:r>
+              <a:rPr lang="en-US" altLang="zh-TW" sz="900" dirty="0"/>
+              <a:t>            </a:t>
+            </a:r>
+            <a:r>
+              <a:rPr lang="en-US" altLang="zh-TW" sz="900" dirty="0" err="1"/>
+              <a:t>bmi_judge</a:t>
+            </a:r>
+            <a:r>
+              <a:rPr lang="en-US" altLang="zh-TW" sz="900" dirty="0"/>
+              <a:t>='Normal'</a:t>
+            </a:r>
+          </a:p>
+          <a:p>
+            <a:r>
+              <a:rPr lang="en-US" altLang="zh-TW" sz="900" dirty="0"/>
+              <a:t>        else:</a:t>
+            </a:r>
+          </a:p>
+          <a:p>
+            <a:r>
+              <a:rPr lang="en-US" altLang="zh-TW" sz="900" dirty="0"/>
+              <a:t>            </a:t>
+            </a:r>
+            <a:r>
+              <a:rPr lang="en-US" altLang="zh-TW" sz="900" dirty="0" err="1"/>
+              <a:t>bmi_judge</a:t>
+            </a:r>
+            <a:r>
+              <a:rPr lang="en-US" altLang="zh-TW" sz="900" dirty="0"/>
+              <a:t>='Too fat'</a:t>
+            </a:r>
+          </a:p>
+          <a:p>
+            <a:r>
+              <a:rPr lang="en-US" altLang="zh-TW" sz="900" dirty="0"/>
+              <a:t>    </a:t>
+            </a:r>
+            <a:r>
+              <a:rPr lang="en-US" altLang="zh-TW" sz="900" dirty="0" err="1"/>
+              <a:t>elif</a:t>
+            </a:r>
+            <a:r>
+              <a:rPr lang="en-US" altLang="zh-TW" sz="900" dirty="0"/>
+              <a:t> gender=='female':</a:t>
+            </a:r>
+          </a:p>
+          <a:p>
+            <a:r>
+              <a:rPr lang="en-US" altLang="zh-TW" sz="900" dirty="0"/>
+              <a:t>        if </a:t>
+            </a:r>
+            <a:r>
+              <a:rPr lang="en-US" altLang="zh-TW" sz="900" dirty="0" err="1"/>
+              <a:t>bmi</a:t>
+            </a:r>
+            <a:r>
+              <a:rPr lang="en-US" altLang="zh-TW" sz="900" dirty="0"/>
+              <a:t>&lt;</a:t>
+            </a:r>
+            <a:r>
+              <a:rPr lang="en-US" altLang="zh-TW" sz="900" dirty="0" err="1"/>
+              <a:t>matched_rows</a:t>
+            </a:r>
+            <a:r>
+              <a:rPr lang="en-US" altLang="zh-TW" sz="900" dirty="0"/>
+              <a:t>['</a:t>
+            </a:r>
+            <a:r>
+              <a:rPr lang="en-US" altLang="zh-TW" sz="900" dirty="0" err="1"/>
+              <a:t>female_min</a:t>
+            </a:r>
+            <a:r>
+              <a:rPr lang="en-US" altLang="zh-TW" sz="900" dirty="0"/>
+              <a:t>']:</a:t>
+            </a:r>
+          </a:p>
+          <a:p>
+            <a:r>
+              <a:rPr lang="en-US" altLang="zh-TW" sz="900" dirty="0"/>
+              <a:t>            </a:t>
+            </a:r>
+            <a:r>
+              <a:rPr lang="en-US" altLang="zh-TW" sz="900" dirty="0" err="1"/>
+              <a:t>bmi_judge</a:t>
+            </a:r>
+            <a:r>
+              <a:rPr lang="en-US" altLang="zh-TW" sz="900" dirty="0"/>
+              <a:t>='Too thin'</a:t>
+            </a:r>
+          </a:p>
+          <a:p>
+            <a:r>
+              <a:rPr lang="en-US" altLang="zh-TW" sz="900" dirty="0"/>
+              <a:t>        </a:t>
+            </a:r>
+            <a:r>
+              <a:rPr lang="en-US" altLang="zh-TW" sz="900" dirty="0" err="1"/>
+              <a:t>elif</a:t>
+            </a:r>
+            <a:r>
+              <a:rPr lang="en-US" altLang="zh-TW" sz="900" dirty="0"/>
+              <a:t> </a:t>
+            </a:r>
+            <a:r>
+              <a:rPr lang="en-US" altLang="zh-TW" sz="900" dirty="0" err="1"/>
+              <a:t>bmi</a:t>
+            </a:r>
+            <a:r>
+              <a:rPr lang="en-US" altLang="zh-TW" sz="900" dirty="0"/>
+              <a:t>&gt;=</a:t>
+            </a:r>
+            <a:r>
+              <a:rPr lang="en-US" altLang="zh-TW" sz="900" dirty="0" err="1"/>
+              <a:t>matched_rows</a:t>
+            </a:r>
+            <a:r>
+              <a:rPr lang="en-US" altLang="zh-TW" sz="900" dirty="0"/>
+              <a:t>['</a:t>
+            </a:r>
+            <a:r>
+              <a:rPr lang="en-US" altLang="zh-TW" sz="900" dirty="0" err="1"/>
+              <a:t>female_min</a:t>
+            </a:r>
+            <a:r>
+              <a:rPr lang="en-US" altLang="zh-TW" sz="900" dirty="0"/>
+              <a:t>'] and </a:t>
+            </a:r>
+            <a:r>
+              <a:rPr lang="en-US" altLang="zh-TW" sz="900" dirty="0" err="1"/>
+              <a:t>bmi</a:t>
+            </a:r>
+            <a:r>
+              <a:rPr lang="en-US" altLang="zh-TW" sz="900" dirty="0"/>
+              <a:t>&lt;=</a:t>
+            </a:r>
+            <a:r>
+              <a:rPr lang="en-US" altLang="zh-TW" sz="900" dirty="0" err="1"/>
+              <a:t>matched_rows</a:t>
+            </a:r>
+            <a:r>
+              <a:rPr lang="en-US" altLang="zh-TW" sz="900" dirty="0"/>
+              <a:t>['</a:t>
+            </a:r>
+            <a:r>
+              <a:rPr lang="en-US" altLang="zh-TW" sz="900" dirty="0" err="1"/>
+              <a:t>female_max</a:t>
+            </a:r>
+            <a:r>
+              <a:rPr lang="en-US" altLang="zh-TW" sz="900" dirty="0"/>
+              <a:t>']:</a:t>
+            </a:r>
+          </a:p>
+          <a:p>
+            <a:r>
+              <a:rPr lang="en-US" altLang="zh-TW" sz="900" dirty="0"/>
+              <a:t>            </a:t>
+            </a:r>
+            <a:r>
+              <a:rPr lang="en-US" altLang="zh-TW" sz="900" dirty="0" err="1"/>
+              <a:t>bmi_judge</a:t>
+            </a:r>
+            <a:r>
+              <a:rPr lang="en-US" altLang="zh-TW" sz="900" dirty="0"/>
+              <a:t>='Normal'</a:t>
+            </a:r>
+          </a:p>
+          <a:p>
+            <a:r>
+              <a:rPr lang="en-US" altLang="zh-TW" sz="900" dirty="0"/>
+              <a:t>        else:</a:t>
+            </a:r>
+          </a:p>
+          <a:p>
+            <a:r>
+              <a:rPr lang="en-US" altLang="zh-TW" sz="900" dirty="0"/>
+              <a:t>            </a:t>
+            </a:r>
+            <a:r>
+              <a:rPr lang="en-US" altLang="zh-TW" sz="900" dirty="0" err="1"/>
+              <a:t>bmi_judge</a:t>
+            </a:r>
+            <a:r>
+              <a:rPr lang="en-US" altLang="zh-TW" sz="900" dirty="0"/>
+              <a:t>='Too fat'</a:t>
+            </a:r>
+          </a:p>
+          <a:p>
+            <a:r>
+              <a:rPr lang="en-US" altLang="zh-TW" sz="900" dirty="0"/>
+              <a:t>        </a:t>
+            </a:r>
+          </a:p>
+          <a:p>
+            <a:r>
+              <a:rPr lang="en-US" altLang="zh-TW" sz="900" dirty="0"/>
+              <a:t>    return </a:t>
+            </a:r>
+            <a:r>
+              <a:rPr lang="en-US" altLang="zh-TW" sz="900" dirty="0" err="1"/>
+              <a:t>jsonify</a:t>
+            </a:r>
+            <a:r>
+              <a:rPr lang="en-US" altLang="zh-TW" sz="900" dirty="0"/>
+              <a:t>(message=</a:t>
+            </a:r>
+            <a:r>
+              <a:rPr lang="en-US" altLang="zh-TW" sz="900" dirty="0" err="1"/>
+              <a:t>f'Your</a:t>
+            </a:r>
+            <a:r>
+              <a:rPr lang="en-US" altLang="zh-TW" sz="900" dirty="0"/>
+              <a:t> AGE={age},BMI={</a:t>
+            </a:r>
+            <a:r>
+              <a:rPr lang="en-US" altLang="zh-TW" sz="900" dirty="0" err="1"/>
+              <a:t>bmi</a:t>
+            </a:r>
+            <a:r>
+              <a:rPr lang="en-US" altLang="zh-TW" sz="900" dirty="0"/>
+              <a:t>},{</a:t>
+            </a:r>
+            <a:r>
+              <a:rPr lang="en-US" altLang="zh-TW" sz="900" dirty="0" err="1"/>
+              <a:t>bmi_judge</a:t>
+            </a:r>
+            <a:r>
+              <a:rPr lang="en-US" altLang="zh-TW" sz="900" dirty="0"/>
+              <a:t>}.')</a:t>
+            </a:r>
+          </a:p>
+        </p:txBody>
+      </p:sp>
+      <p:sp>
+        <p:nvSpPr>
+          <p:cNvPr id="13" name="文字方塊 12"/>
+          <p:cNvSpPr txBox="1"/>
+          <p:nvPr/>
+        </p:nvSpPr>
+        <p:spPr>
+          <a:xfrm>
+            <a:off x="7496312" y="749210"/>
+            <a:ext cx="3803776" cy="369332"/>
+          </a:xfrm>
+          <a:prstGeom prst="rect">
+            <a:avLst/>
+          </a:prstGeom>
+          <a:noFill/>
+        </p:spPr>
+        <p:txBody>
+          <a:bodyPr wrap="square" rtlCol="0">
+            <a:spAutoFit/>
+          </a:bodyPr>
+          <a:lstStyle/>
+          <a:p>
+            <a:r>
+              <a:rPr lang="en-US" altLang="zh-TW" dirty="0"/>
+              <a:t>Step2: Write Code on Client1.py </a:t>
+            </a:r>
+          </a:p>
+        </p:txBody>
+      </p:sp>
+      <p:sp>
+        <p:nvSpPr>
+          <p:cNvPr id="14" name="文字方塊 13">
+            <a:extLst>
+              <a:ext uri="{FF2B5EF4-FFF2-40B4-BE49-F238E27FC236}">
+                <a16:creationId xmlns:a16="http://schemas.microsoft.com/office/drawing/2014/main" id="{97F7441A-8531-418C-A102-69F983B057A5}"/>
+              </a:ext>
+            </a:extLst>
+          </p:cNvPr>
+          <p:cNvSpPr txBox="1"/>
+          <p:nvPr/>
+        </p:nvSpPr>
+        <p:spPr>
+          <a:xfrm>
+            <a:off x="1889372" y="729626"/>
+            <a:ext cx="4035178" cy="369332"/>
+          </a:xfrm>
+          <a:prstGeom prst="rect">
+            <a:avLst/>
+          </a:prstGeom>
+          <a:noFill/>
+        </p:spPr>
+        <p:txBody>
+          <a:bodyPr wrap="square" rtlCol="0">
+            <a:spAutoFit/>
+          </a:bodyPr>
+          <a:lstStyle/>
+          <a:p>
+            <a:r>
+              <a:rPr lang="en-US" altLang="zh-TW" dirty="0"/>
+              <a:t>Step1: Write Code on Server1.py </a:t>
+            </a:r>
+          </a:p>
+        </p:txBody>
+      </p:sp>
+      <p:sp>
+        <p:nvSpPr>
+          <p:cNvPr id="15" name="文字方塊 14">
+            <a:extLst>
+              <a:ext uri="{FF2B5EF4-FFF2-40B4-BE49-F238E27FC236}">
+                <a16:creationId xmlns:a16="http://schemas.microsoft.com/office/drawing/2014/main" id="{9DAA9AAD-4F13-4FAF-8A07-64C0AAE9D3B8}"/>
+              </a:ext>
+            </a:extLst>
+          </p:cNvPr>
+          <p:cNvSpPr txBox="1"/>
+          <p:nvPr/>
+        </p:nvSpPr>
+        <p:spPr>
+          <a:xfrm>
+            <a:off x="7496312" y="1118542"/>
+            <a:ext cx="4257675" cy="3970318"/>
+          </a:xfrm>
+          <a:prstGeom prst="rect">
+            <a:avLst/>
+          </a:prstGeom>
+          <a:solidFill>
+            <a:schemeClr val="bg2"/>
+          </a:solidFill>
+        </p:spPr>
+        <p:txBody>
+          <a:bodyPr wrap="square">
+            <a:spAutoFit/>
+          </a:bodyPr>
+          <a:lstStyle/>
+          <a:p>
+            <a:r>
+              <a:rPr lang="en-US" altLang="zh-TW" dirty="0"/>
+              <a:t>import requests</a:t>
+            </a:r>
+          </a:p>
+          <a:p>
+            <a:endParaRPr lang="en-US" altLang="zh-TW" dirty="0"/>
+          </a:p>
+          <a:p>
+            <a:r>
+              <a:rPr lang="en-US" altLang="zh-TW" dirty="0" err="1"/>
+              <a:t>url</a:t>
+            </a:r>
+            <a:r>
+              <a:rPr lang="en-US" altLang="zh-TW" dirty="0"/>
+              <a:t> = 'http://127.0.0.1:5000/submit'</a:t>
+            </a:r>
+          </a:p>
+          <a:p>
+            <a:r>
+              <a:rPr lang="en-US" altLang="zh-TW" dirty="0"/>
+              <a:t>payload = {'name': 'wiki',</a:t>
+            </a:r>
+          </a:p>
+          <a:p>
+            <a:r>
+              <a:rPr lang="en-US" altLang="zh-TW" dirty="0"/>
+              <a:t>           'password': '123456',</a:t>
+            </a:r>
+          </a:p>
+          <a:p>
+            <a:r>
+              <a:rPr lang="en-US" altLang="zh-TW" dirty="0"/>
+              <a:t>           'birthday':'1990-04-24',</a:t>
+            </a:r>
+          </a:p>
+          <a:p>
+            <a:r>
+              <a:rPr lang="en-US" altLang="zh-TW" dirty="0"/>
+              <a:t>           '</a:t>
+            </a:r>
+            <a:r>
+              <a:rPr lang="en-US" altLang="zh-TW" dirty="0" err="1"/>
+              <a:t>gender':'male</a:t>
+            </a:r>
+            <a:r>
+              <a:rPr lang="en-US" altLang="zh-TW" dirty="0"/>
+              <a:t>’,</a:t>
+            </a:r>
+          </a:p>
+          <a:p>
+            <a:r>
+              <a:rPr lang="en-US" altLang="zh-TW" dirty="0"/>
+              <a:t>           'height':1.75,</a:t>
+            </a:r>
+          </a:p>
+          <a:p>
+            <a:r>
+              <a:rPr lang="en-US" altLang="zh-TW" dirty="0"/>
+              <a:t>           'weight':60}</a:t>
+            </a:r>
+          </a:p>
+          <a:p>
+            <a:endParaRPr lang="en-US" altLang="zh-TW" dirty="0"/>
+          </a:p>
+          <a:p>
+            <a:r>
+              <a:rPr lang="en-US" altLang="zh-TW" dirty="0"/>
+              <a:t>response = </a:t>
+            </a:r>
+            <a:r>
+              <a:rPr lang="en-US" altLang="zh-TW" dirty="0" err="1"/>
+              <a:t>requests.post</a:t>
+            </a:r>
+            <a:r>
+              <a:rPr lang="en-US" altLang="zh-TW" dirty="0"/>
+              <a:t>(</a:t>
+            </a:r>
+            <a:r>
+              <a:rPr lang="en-US" altLang="zh-TW" dirty="0" err="1"/>
+              <a:t>url</a:t>
+            </a:r>
+            <a:r>
+              <a:rPr lang="en-US" altLang="zh-TW" dirty="0"/>
+              <a:t>, json=payload)</a:t>
+            </a:r>
+          </a:p>
+          <a:p>
+            <a:endParaRPr lang="en-US" altLang="zh-TW" dirty="0"/>
+          </a:p>
+          <a:p>
+            <a:r>
+              <a:rPr lang="en-US" altLang="zh-TW" dirty="0"/>
+              <a:t>print('Status Code:', </a:t>
+            </a:r>
+            <a:r>
+              <a:rPr lang="en-US" altLang="zh-TW" dirty="0" err="1"/>
+              <a:t>response.status_code</a:t>
+            </a:r>
+            <a:r>
+              <a:rPr lang="en-US" altLang="zh-TW" dirty="0"/>
+              <a:t>)</a:t>
+            </a:r>
+          </a:p>
+          <a:p>
+            <a:r>
+              <a:rPr lang="en-US" altLang="zh-TW" dirty="0"/>
+              <a:t>print('Response JSON:', </a:t>
+            </a:r>
+            <a:r>
+              <a:rPr lang="en-US" altLang="zh-TW" dirty="0" err="1"/>
+              <a:t>response.json</a:t>
+            </a:r>
+            <a:r>
+              <a:rPr lang="en-US" altLang="zh-TW" dirty="0"/>
+              <a:t>())</a:t>
+            </a:r>
+            <a:endParaRPr lang="zh-TW" altLang="en-US" dirty="0"/>
+          </a:p>
+        </p:txBody>
+      </p:sp>
+    </p:spTree>
+    <p:extLst>
+      <p:ext uri="{BB962C8B-B14F-4D97-AF65-F5344CB8AC3E}">
+        <p14:creationId xmlns:p14="http://schemas.microsoft.com/office/powerpoint/2010/main" val="2694586329"/>
+      </p:ext>
+    </p:extLst>
+  </p:cSld>
+  <p:clrMapOvr>
+    <a:masterClrMapping/>
+  </p:clrMapOvr>
+</p:sld>
+</file>
+
+<file path=ppt/slides/slide12.xml><?xml version="1.0" encoding="utf-8"?>
+<p:sld xmlns:a="http://schemas.openxmlformats.org/drawingml/2006/main" xmlns:r="http://schemas.openxmlformats.org/officeDocument/2006/relationships" xmlns:p="http://schemas.openxmlformats.org/presentationml/2006/main">
+  <p:cSld>
+    <p:spTree>
+      <p:nvGrpSpPr>
+        <p:cNvPr id="1" name=""/>
+        <p:cNvGrpSpPr/>
+        <p:nvPr/>
+      </p:nvGrpSpPr>
+      <p:grpSpPr>
+        <a:xfrm>
+          <a:off x="0" y="0"/>
+          <a:ext cx="0" cy="0"/>
+          <a:chOff x="0" y="0"/>
+          <a:chExt cx="0" cy="0"/>
+        </a:xfrm>
+      </p:grpSpPr>
+      <p:sp>
+        <p:nvSpPr>
+          <p:cNvPr id="2" name="標題 1"/>
+          <p:cNvSpPr>
+            <a:spLocks noGrp="1"/>
+          </p:cNvSpPr>
+          <p:nvPr>
+            <p:ph type="title"/>
+          </p:nvPr>
+        </p:nvSpPr>
+        <p:spPr>
+          <a:xfrm>
+            <a:off x="838200" y="0"/>
+            <a:ext cx="9677400" cy="1098958"/>
+          </a:xfrm>
+        </p:spPr>
+        <p:txBody>
+          <a:bodyPr>
+            <a:normAutofit/>
+          </a:bodyPr>
+          <a:lstStyle/>
+          <a:p>
+            <a:r>
+              <a:rPr lang="en-US" altLang="zh-TW" dirty="0"/>
+              <a:t>8.Write Code: Post Method Test</a:t>
+            </a:r>
+            <a:endParaRPr lang="zh-TW" altLang="en-US" dirty="0"/>
+          </a:p>
+        </p:txBody>
+      </p:sp>
+      <p:sp>
+        <p:nvSpPr>
+          <p:cNvPr id="8" name="文字方塊 7"/>
+          <p:cNvSpPr txBox="1"/>
+          <p:nvPr/>
+        </p:nvSpPr>
+        <p:spPr>
+          <a:xfrm>
+            <a:off x="6746579" y="1261001"/>
+            <a:ext cx="2950973" cy="369332"/>
+          </a:xfrm>
+          <a:prstGeom prst="rect">
+            <a:avLst/>
+          </a:prstGeom>
+          <a:noFill/>
+        </p:spPr>
+        <p:txBody>
+          <a:bodyPr wrap="square" rtlCol="0">
+            <a:spAutoFit/>
+          </a:bodyPr>
+          <a:lstStyle/>
+          <a:p>
+            <a:r>
+              <a:rPr lang="en-US" altLang="zh-TW" dirty="0"/>
+              <a:t>Client1.py Run on Terminal.</a:t>
+            </a:r>
+          </a:p>
+        </p:txBody>
+      </p:sp>
+      <p:sp>
+        <p:nvSpPr>
+          <p:cNvPr id="10" name="文字方塊 9"/>
+          <p:cNvSpPr txBox="1"/>
+          <p:nvPr/>
+        </p:nvSpPr>
+        <p:spPr>
+          <a:xfrm>
+            <a:off x="2376753" y="1251062"/>
+            <a:ext cx="3068669" cy="369332"/>
+          </a:xfrm>
+          <a:prstGeom prst="rect">
+            <a:avLst/>
+          </a:prstGeom>
+          <a:noFill/>
+        </p:spPr>
+        <p:txBody>
+          <a:bodyPr wrap="square" rtlCol="0">
+            <a:spAutoFit/>
+          </a:bodyPr>
+          <a:lstStyle/>
+          <a:p>
+            <a:r>
+              <a:rPr lang="en-US" altLang="zh-TW" dirty="0"/>
+              <a:t>Server1.py Run on IDE Shell.</a:t>
+            </a:r>
+          </a:p>
+        </p:txBody>
+      </p:sp>
+      <p:sp>
+        <p:nvSpPr>
+          <p:cNvPr id="12" name="文字方塊 11"/>
+          <p:cNvSpPr txBox="1"/>
+          <p:nvPr/>
+        </p:nvSpPr>
+        <p:spPr>
+          <a:xfrm>
+            <a:off x="2376753" y="6211669"/>
+            <a:ext cx="8595297" cy="646331"/>
+          </a:xfrm>
+          <a:prstGeom prst="rect">
+            <a:avLst/>
+          </a:prstGeom>
+          <a:noFill/>
+        </p:spPr>
+        <p:txBody>
+          <a:bodyPr wrap="square" rtlCol="0">
+            <a:spAutoFit/>
+          </a:bodyPr>
+          <a:lstStyle/>
+          <a:p>
+            <a:r>
+              <a:rPr lang="en-US" altLang="zh-TW" dirty="0"/>
+              <a:t>Client1.py is run on terminal, because </a:t>
+            </a:r>
+            <a:r>
+              <a:rPr lang="en-US" altLang="zh-TW" dirty="0" err="1"/>
+              <a:t>Thonny</a:t>
+            </a:r>
+            <a:r>
+              <a:rPr lang="en-US" altLang="zh-TW" dirty="0"/>
+              <a:t> IDE can’t run two code at same time.</a:t>
+            </a:r>
+          </a:p>
+          <a:p>
+            <a:r>
+              <a:rPr lang="en-US" altLang="zh-TW" dirty="0"/>
+              <a:t>If Client1.py can't run, you may need to change the Python environment.</a:t>
+            </a:r>
+          </a:p>
+        </p:txBody>
+      </p:sp>
+      <p:sp>
+        <p:nvSpPr>
+          <p:cNvPr id="13" name="文字方塊 12"/>
+          <p:cNvSpPr txBox="1"/>
+          <p:nvPr/>
+        </p:nvSpPr>
+        <p:spPr>
+          <a:xfrm>
+            <a:off x="4032187" y="807240"/>
+            <a:ext cx="3803776" cy="369332"/>
+          </a:xfrm>
+          <a:prstGeom prst="rect">
+            <a:avLst/>
+          </a:prstGeom>
+          <a:noFill/>
+        </p:spPr>
+        <p:txBody>
+          <a:bodyPr wrap="square" rtlCol="0">
+            <a:spAutoFit/>
+          </a:bodyPr>
+          <a:lstStyle/>
+          <a:p>
+            <a:r>
+              <a:rPr lang="en-US" altLang="zh-TW" dirty="0"/>
+              <a:t>Step3 Run Server1.py and Client1.py </a:t>
+            </a:r>
+          </a:p>
+        </p:txBody>
+      </p:sp>
+      <p:pic>
+        <p:nvPicPr>
+          <p:cNvPr id="4" name="圖片 3">
+            <a:extLst>
+              <a:ext uri="{FF2B5EF4-FFF2-40B4-BE49-F238E27FC236}">
+                <a16:creationId xmlns:a16="http://schemas.microsoft.com/office/drawing/2014/main" id="{4F48D18D-C578-4910-8817-47F9C2E3E737}"/>
+              </a:ext>
+            </a:extLst>
+          </p:cNvPr>
+          <p:cNvPicPr>
+            <a:picLocks noChangeAspect="1"/>
+          </p:cNvPicPr>
+          <p:nvPr/>
+        </p:nvPicPr>
+        <p:blipFill>
+          <a:blip r:embed="rId2"/>
+          <a:stretch>
+            <a:fillRect/>
+          </a:stretch>
+        </p:blipFill>
+        <p:spPr>
+          <a:xfrm>
+            <a:off x="1363133" y="1570580"/>
+            <a:ext cx="9861579" cy="4651028"/>
+          </a:xfrm>
+          <a:prstGeom prst="rect">
+            <a:avLst/>
+          </a:prstGeom>
+        </p:spPr>
+      </p:pic>
+    </p:spTree>
+    <p:extLst>
+      <p:ext uri="{BB962C8B-B14F-4D97-AF65-F5344CB8AC3E}">
+        <p14:creationId xmlns:p14="http://schemas.microsoft.com/office/powerpoint/2010/main" val="108368899"/>
       </p:ext>
     </p:extLst>
   </p:cSld>

</xml_diff>

<commit_message>
Post Method--Bmi & Age & csv to judge & csv to UserData Save
</commit_message>
<xml_diff>
--- a/PythonFlask/Teach.pptx
+++ b/PythonFlask/Teach.pptx
@@ -5,7 +5,7 @@
     <p:sldMasterId id="2147483648" r:id="rId1"/>
   </p:sldMasterIdLst>
   <p:notesMasterIdLst>
-    <p:notesMasterId r:id="rId14"/>
+    <p:notesMasterId r:id="rId16"/>
   </p:notesMasterIdLst>
   <p:sldIdLst>
     <p:sldId id="256" r:id="rId2"/>
@@ -20,6 +20,8 @@
     <p:sldId id="266" r:id="rId11"/>
     <p:sldId id="267" r:id="rId12"/>
     <p:sldId id="268" r:id="rId13"/>
+    <p:sldId id="269" r:id="rId14"/>
+    <p:sldId id="270" r:id="rId15"/>
   </p:sldIdLst>
   <p:sldSz cx="12192000" cy="6858000"/>
   <p:notesSz cx="6858000" cy="9144000"/>
@@ -3630,8 +3632,8 @@
         </p:nvSpPr>
         <p:spPr>
           <a:xfrm>
-            <a:off x="276225" y="1118542"/>
-            <a:ext cx="6515099" cy="5632311"/>
+            <a:off x="352425" y="1038876"/>
+            <a:ext cx="6515099" cy="5786199"/>
           </a:xfrm>
           <a:prstGeom prst="rect">
             <a:avLst/>
@@ -3647,672 +3649,660 @@
           <a:lstStyle/>
           <a:p>
             <a:r>
-              <a:rPr lang="en-US" altLang="zh-TW" sz="900" dirty="0"/>
+              <a:rPr lang="en-US" altLang="zh-TW" sz="1000" dirty="0"/>
               <a:t>from flask import Flask, request, </a:t>
             </a:r>
             <a:r>
-              <a:rPr lang="en-US" altLang="zh-TW" sz="900" dirty="0" err="1"/>
+              <a:rPr lang="en-US" altLang="zh-TW" sz="1000" dirty="0" err="1"/>
               <a:t>jsonify</a:t>
             </a:r>
-            <a:endParaRPr lang="en-US" altLang="zh-TW" sz="900" dirty="0"/>
-          </a:p>
-          <a:p>
-            <a:r>
-              <a:rPr lang="en-US" altLang="zh-TW" sz="900" dirty="0"/>
+            <a:endParaRPr lang="en-US" altLang="zh-TW" sz="1000" dirty="0"/>
+          </a:p>
+          <a:p>
+            <a:r>
+              <a:rPr lang="en-US" altLang="zh-TW" sz="1000" dirty="0"/>
               <a:t>from datetime import datetime</a:t>
             </a:r>
           </a:p>
           <a:p>
             <a:r>
-              <a:rPr lang="en-US" altLang="zh-TW" sz="900" dirty="0"/>
+              <a:rPr lang="en-US" altLang="zh-TW" sz="1000" dirty="0"/>
               <a:t>import math</a:t>
             </a:r>
           </a:p>
           <a:p>
             <a:r>
-              <a:rPr lang="en-US" altLang="zh-TW" sz="900" dirty="0"/>
+              <a:rPr lang="en-US" altLang="zh-TW" sz="1000" dirty="0"/>
               <a:t>import pandas as pd</a:t>
             </a:r>
           </a:p>
           <a:p>
-            <a:endParaRPr lang="en-US" altLang="zh-TW" sz="900" dirty="0"/>
-          </a:p>
-          <a:p>
-            <a:r>
-              <a:rPr lang="en-US" altLang="zh-TW" sz="900" dirty="0"/>
+            <a:r>
+              <a:rPr lang="en-US" altLang="zh-TW" sz="1000" dirty="0"/>
               <a:t>app = Flask(__name__)</a:t>
             </a:r>
           </a:p>
           <a:p>
-            <a:endParaRPr lang="en-US" altLang="zh-TW" sz="900" dirty="0"/>
-          </a:p>
-          <a:p>
-            <a:r>
-              <a:rPr lang="en-US" altLang="zh-TW" sz="900" dirty="0"/>
+            <a:r>
+              <a:rPr lang="en-US" altLang="zh-TW" sz="1000" dirty="0"/>
               <a:t># POST Method</a:t>
             </a:r>
           </a:p>
           <a:p>
             <a:r>
-              <a:rPr lang="en-US" altLang="zh-TW" sz="900" dirty="0"/>
+              <a:rPr lang="en-US" altLang="zh-TW" sz="1000" dirty="0"/>
               <a:t>@app.route('/submit', methods=['POST'])</a:t>
             </a:r>
           </a:p>
           <a:p>
             <a:r>
-              <a:rPr lang="en-US" altLang="zh-TW" sz="900" dirty="0"/>
+              <a:rPr lang="en-US" altLang="zh-TW" sz="1000" dirty="0"/>
               <a:t>def </a:t>
             </a:r>
             <a:r>
-              <a:rPr lang="en-US" altLang="zh-TW" sz="900" dirty="0" err="1"/>
+              <a:rPr lang="en-US" altLang="zh-TW" sz="1000" dirty="0" err="1"/>
               <a:t>submit_form</a:t>
             </a:r>
             <a:r>
-              <a:rPr lang="en-US" altLang="zh-TW" sz="900" dirty="0"/>
+              <a:rPr lang="en-US" altLang="zh-TW" sz="1000" dirty="0"/>
               <a:t>():</a:t>
             </a:r>
           </a:p>
           <a:p>
             <a:r>
-              <a:rPr lang="en-US" altLang="zh-TW" sz="900" dirty="0"/>
+              <a:rPr lang="en-US" altLang="zh-TW" sz="1000" dirty="0"/>
               <a:t>    data = </a:t>
             </a:r>
             <a:r>
-              <a:rPr lang="en-US" altLang="zh-TW" sz="900" dirty="0" err="1"/>
+              <a:rPr lang="en-US" altLang="zh-TW" sz="1000" dirty="0" err="1"/>
               <a:t>request.get_json</a:t>
             </a:r>
             <a:r>
-              <a:rPr lang="en-US" altLang="zh-TW" sz="900" dirty="0"/>
+              <a:rPr lang="en-US" altLang="zh-TW" sz="1000" dirty="0"/>
               <a:t>()</a:t>
             </a:r>
           </a:p>
           <a:p>
             <a:r>
-              <a:rPr lang="en-US" altLang="zh-TW" sz="900" dirty="0"/>
+              <a:rPr lang="en-US" altLang="zh-TW" sz="1000" dirty="0"/>
               <a:t>    name = </a:t>
             </a:r>
             <a:r>
-              <a:rPr lang="en-US" altLang="zh-TW" sz="900" dirty="0" err="1"/>
+              <a:rPr lang="en-US" altLang="zh-TW" sz="1000" dirty="0" err="1"/>
               <a:t>data.get</a:t>
             </a:r>
             <a:r>
-              <a:rPr lang="en-US" altLang="zh-TW" sz="900" dirty="0"/>
+              <a:rPr lang="en-US" altLang="zh-TW" sz="1000" dirty="0"/>
               <a:t>('name')</a:t>
             </a:r>
           </a:p>
           <a:p>
             <a:r>
-              <a:rPr lang="en-US" altLang="zh-TW" sz="900" dirty="0"/>
+              <a:rPr lang="en-US" altLang="zh-TW" sz="1000" dirty="0"/>
               <a:t>    password = </a:t>
             </a:r>
             <a:r>
-              <a:rPr lang="en-US" altLang="zh-TW" sz="900" dirty="0" err="1"/>
+              <a:rPr lang="en-US" altLang="zh-TW" sz="1000" dirty="0" err="1"/>
               <a:t>data.get</a:t>
             </a:r>
             <a:r>
-              <a:rPr lang="en-US" altLang="zh-TW" sz="900" dirty="0"/>
+              <a:rPr lang="en-US" altLang="zh-TW" sz="1000" dirty="0"/>
               <a:t>('password')</a:t>
             </a:r>
           </a:p>
           <a:p>
             <a:r>
-              <a:rPr lang="en-US" altLang="zh-TW" sz="900" dirty="0"/>
+              <a:rPr lang="en-US" altLang="zh-TW" sz="1000" dirty="0"/>
               <a:t>    birthday = </a:t>
             </a:r>
             <a:r>
-              <a:rPr lang="en-US" altLang="zh-TW" sz="900" dirty="0" err="1"/>
+              <a:rPr lang="en-US" altLang="zh-TW" sz="1000" dirty="0" err="1"/>
               <a:t>datetime.strptime</a:t>
             </a:r>
             <a:r>
-              <a:rPr lang="en-US" altLang="zh-TW" sz="900" dirty="0"/>
+              <a:rPr lang="en-US" altLang="zh-TW" sz="1000" dirty="0"/>
               <a:t>((f"{</a:t>
             </a:r>
             <a:r>
-              <a:rPr lang="en-US" altLang="zh-TW" sz="900" dirty="0" err="1"/>
+              <a:rPr lang="en-US" altLang="zh-TW" sz="1000" dirty="0" err="1"/>
               <a:t>data.get</a:t>
             </a:r>
             <a:r>
-              <a:rPr lang="en-US" altLang="zh-TW" sz="900" dirty="0"/>
+              <a:rPr lang="en-US" altLang="zh-TW" sz="1000" dirty="0"/>
               <a:t>('birthday')}"), "%Y-%m-%d")</a:t>
             </a:r>
           </a:p>
           <a:p>
             <a:r>
-              <a:rPr lang="en-US" altLang="zh-TW" sz="900" dirty="0"/>
+              <a:rPr lang="en-US" altLang="zh-TW" sz="1000" dirty="0"/>
               <a:t>    gender = </a:t>
             </a:r>
             <a:r>
-              <a:rPr lang="en-US" altLang="zh-TW" sz="900" dirty="0" err="1"/>
+              <a:rPr lang="en-US" altLang="zh-TW" sz="1000" dirty="0" err="1"/>
               <a:t>data.get</a:t>
             </a:r>
             <a:r>
-              <a:rPr lang="en-US" altLang="zh-TW" sz="900" dirty="0"/>
+              <a:rPr lang="en-US" altLang="zh-TW" sz="1000" dirty="0"/>
               <a:t>('gender')</a:t>
             </a:r>
           </a:p>
           <a:p>
             <a:r>
-              <a:rPr lang="en-US" altLang="zh-TW" sz="900" dirty="0"/>
+              <a:rPr lang="en-US" altLang="zh-TW" sz="1000" dirty="0"/>
               <a:t>    height = </a:t>
             </a:r>
             <a:r>
-              <a:rPr lang="en-US" altLang="zh-TW" sz="900" dirty="0" err="1"/>
+              <a:rPr lang="en-US" altLang="zh-TW" sz="1000" dirty="0" err="1"/>
               <a:t>data.get</a:t>
             </a:r>
             <a:r>
-              <a:rPr lang="en-US" altLang="zh-TW" sz="900" dirty="0"/>
+              <a:rPr lang="en-US" altLang="zh-TW" sz="1000" dirty="0"/>
               <a:t>('height')</a:t>
             </a:r>
           </a:p>
           <a:p>
             <a:r>
-              <a:rPr lang="en-US" altLang="zh-TW" sz="900" dirty="0"/>
+              <a:rPr lang="en-US" altLang="zh-TW" sz="1000" dirty="0"/>
               <a:t>    weight = </a:t>
             </a:r>
             <a:r>
-              <a:rPr lang="en-US" altLang="zh-TW" sz="900" dirty="0" err="1"/>
+              <a:rPr lang="en-US" altLang="zh-TW" sz="1000" dirty="0" err="1"/>
               <a:t>data.get</a:t>
             </a:r>
             <a:r>
-              <a:rPr lang="en-US" altLang="zh-TW" sz="900" dirty="0"/>
+              <a:rPr lang="en-US" altLang="zh-TW" sz="1000" dirty="0"/>
               <a:t>('weight')</a:t>
             </a:r>
           </a:p>
           <a:p>
             <a:r>
-              <a:rPr lang="en-US" altLang="zh-TW" sz="900" dirty="0"/>
+              <a:rPr lang="en-US" altLang="zh-TW" sz="1000" dirty="0"/>
               <a:t>    </a:t>
             </a:r>
             <a:r>
-              <a:rPr lang="en-US" altLang="zh-TW" sz="900" dirty="0" err="1"/>
+              <a:rPr lang="en-US" altLang="zh-TW" sz="1000" dirty="0" err="1"/>
               <a:t>bmi</a:t>
             </a:r>
             <a:r>
-              <a:rPr lang="en-US" altLang="zh-TW" sz="900" dirty="0"/>
+              <a:rPr lang="en-US" altLang="zh-TW" sz="1000" dirty="0"/>
               <a:t> = round(weight / height **2,2)# </a:t>
             </a:r>
             <a:r>
-              <a:rPr lang="en-US" altLang="zh-TW" sz="900" dirty="0" err="1"/>
+              <a:rPr lang="en-US" altLang="zh-TW" sz="1000" dirty="0" err="1"/>
               <a:t>bmi</a:t>
             </a:r>
             <a:r>
-              <a:rPr lang="en-US" altLang="zh-TW" sz="900" dirty="0"/>
+              <a:rPr lang="en-US" altLang="zh-TW" sz="1000" dirty="0"/>
               <a:t> count</a:t>
             </a:r>
           </a:p>
           <a:p>
             <a:r>
-              <a:rPr lang="en-US" altLang="zh-TW" sz="900" dirty="0"/>
+              <a:rPr lang="en-US" altLang="zh-TW" sz="1000" dirty="0"/>
               <a:t>    today = </a:t>
             </a:r>
             <a:r>
-              <a:rPr lang="en-US" altLang="zh-TW" sz="900" dirty="0" err="1"/>
+              <a:rPr lang="en-US" altLang="zh-TW" sz="1000" dirty="0" err="1"/>
               <a:t>datetime.today</a:t>
             </a:r>
             <a:r>
-              <a:rPr lang="en-US" altLang="zh-TW" sz="900" dirty="0"/>
+              <a:rPr lang="en-US" altLang="zh-TW" sz="1000" dirty="0"/>
               <a:t>()# age count</a:t>
             </a:r>
           </a:p>
           <a:p>
             <a:r>
-              <a:rPr lang="en-US" altLang="zh-TW" sz="900" dirty="0"/>
+              <a:rPr lang="en-US" altLang="zh-TW" sz="1000" dirty="0"/>
               <a:t>    age = </a:t>
             </a:r>
             <a:r>
-              <a:rPr lang="en-US" altLang="zh-TW" sz="900" dirty="0" err="1"/>
+              <a:rPr lang="en-US" altLang="zh-TW" sz="1000" dirty="0" err="1"/>
               <a:t>today.year</a:t>
             </a:r>
             <a:r>
-              <a:rPr lang="en-US" altLang="zh-TW" sz="900" dirty="0"/>
+              <a:rPr lang="en-US" altLang="zh-TW" sz="1000" dirty="0"/>
               <a:t> - </a:t>
             </a:r>
             <a:r>
-              <a:rPr lang="en-US" altLang="zh-TW" sz="900" dirty="0" err="1"/>
+              <a:rPr lang="en-US" altLang="zh-TW" sz="1000" dirty="0" err="1"/>
               <a:t>birthday.year</a:t>
             </a:r>
             <a:r>
-              <a:rPr lang="en-US" altLang="zh-TW" sz="900" dirty="0"/>
+              <a:rPr lang="en-US" altLang="zh-TW" sz="1000" dirty="0"/>
               <a:t> - ((</a:t>
             </a:r>
             <a:r>
-              <a:rPr lang="en-US" altLang="zh-TW" sz="900" dirty="0" err="1"/>
+              <a:rPr lang="en-US" altLang="zh-TW" sz="1000" dirty="0" err="1"/>
               <a:t>today.month</a:t>
             </a:r>
             <a:r>
-              <a:rPr lang="en-US" altLang="zh-TW" sz="900" dirty="0"/>
+              <a:rPr lang="en-US" altLang="zh-TW" sz="1000" dirty="0"/>
               <a:t>, </a:t>
             </a:r>
             <a:r>
-              <a:rPr lang="en-US" altLang="zh-TW" sz="900" dirty="0" err="1"/>
+              <a:rPr lang="en-US" altLang="zh-TW" sz="1000" dirty="0" err="1"/>
               <a:t>today.day</a:t>
             </a:r>
             <a:r>
-              <a:rPr lang="en-US" altLang="zh-TW" sz="900" dirty="0"/>
+              <a:rPr lang="en-US" altLang="zh-TW" sz="1000" dirty="0"/>
               <a:t>) &lt; (</a:t>
             </a:r>
             <a:r>
-              <a:rPr lang="en-US" altLang="zh-TW" sz="900" dirty="0" err="1"/>
+              <a:rPr lang="en-US" altLang="zh-TW" sz="1000" dirty="0" err="1"/>
               <a:t>birthday.month</a:t>
             </a:r>
             <a:r>
-              <a:rPr lang="en-US" altLang="zh-TW" sz="900" dirty="0"/>
+              <a:rPr lang="en-US" altLang="zh-TW" sz="1000" dirty="0"/>
               <a:t>, </a:t>
             </a:r>
             <a:r>
-              <a:rPr lang="en-US" altLang="zh-TW" sz="900" dirty="0" err="1"/>
+              <a:rPr lang="en-US" altLang="zh-TW" sz="1000" dirty="0" err="1"/>
               <a:t>birthday.day</a:t>
             </a:r>
             <a:r>
-              <a:rPr lang="en-US" altLang="zh-TW" sz="900" dirty="0"/>
+              <a:rPr lang="en-US" altLang="zh-TW" sz="1000" dirty="0"/>
               <a:t>))</a:t>
             </a:r>
           </a:p>
           <a:p>
             <a:r>
-              <a:rPr lang="en-US" altLang="zh-TW" sz="900" dirty="0"/>
+              <a:rPr lang="en-US" altLang="zh-TW" sz="1000" dirty="0"/>
               <a:t>    df = </a:t>
             </a:r>
             <a:r>
-              <a:rPr lang="en-US" altLang="zh-TW" sz="900" dirty="0" err="1"/>
+              <a:rPr lang="en-US" altLang="zh-TW" sz="1000" dirty="0" err="1"/>
               <a:t>pd.read_csv</a:t>
             </a:r>
             <a:r>
-              <a:rPr lang="en-US" altLang="zh-TW" sz="900" dirty="0"/>
+              <a:rPr lang="en-US" altLang="zh-TW" sz="1000" dirty="0"/>
               <a:t>('BMI_Normal.csv')</a:t>
             </a:r>
           </a:p>
           <a:p>
             <a:r>
-              <a:rPr lang="en-US" altLang="zh-TW" sz="900" dirty="0"/>
+              <a:rPr lang="en-US" altLang="zh-TW" sz="1000" dirty="0"/>
               <a:t>    </a:t>
             </a:r>
             <a:r>
-              <a:rPr lang="en-US" altLang="zh-TW" sz="900" dirty="0" err="1"/>
+              <a:rPr lang="en-US" altLang="zh-TW" sz="1000" dirty="0" err="1"/>
               <a:t>matched_rows</a:t>
             </a:r>
             <a:r>
-              <a:rPr lang="en-US" altLang="zh-TW" sz="900" dirty="0"/>
+              <a:rPr lang="en-US" altLang="zh-TW" sz="1000" dirty="0"/>
               <a:t> = df[df['age'] == age].</a:t>
             </a:r>
             <a:r>
-              <a:rPr lang="en-US" altLang="zh-TW" sz="900" dirty="0" err="1"/>
+              <a:rPr lang="en-US" altLang="zh-TW" sz="1000" dirty="0" err="1"/>
               <a:t>iloc</a:t>
             </a:r>
             <a:r>
-              <a:rPr lang="en-US" altLang="zh-TW" sz="900" dirty="0"/>
+              <a:rPr lang="en-US" altLang="zh-TW" sz="1000" dirty="0"/>
               <a:t>[0]</a:t>
             </a:r>
           </a:p>
           <a:p>
             <a:r>
-              <a:rPr lang="en-US" altLang="zh-TW" sz="900" dirty="0"/>
+              <a:rPr lang="en-US" altLang="zh-TW" sz="1000" dirty="0"/>
               <a:t>    print(</a:t>
             </a:r>
             <a:r>
-              <a:rPr lang="en-US" altLang="zh-TW" sz="900" dirty="0" err="1"/>
+              <a:rPr lang="en-US" altLang="zh-TW" sz="1000" dirty="0" err="1"/>
               <a:t>matched_rows</a:t>
             </a:r>
             <a:r>
-              <a:rPr lang="en-US" altLang="zh-TW" sz="900" dirty="0"/>
+              <a:rPr lang="en-US" altLang="zh-TW" sz="1000" dirty="0"/>
               <a:t>)</a:t>
             </a:r>
           </a:p>
           <a:p>
             <a:r>
-              <a:rPr lang="en-US" altLang="zh-TW" sz="900" dirty="0"/>
+              <a:rPr lang="en-US" altLang="zh-TW" sz="1000" dirty="0"/>
               <a:t>    </a:t>
             </a:r>
             <a:r>
-              <a:rPr lang="en-US" altLang="zh-TW" sz="900" dirty="0" err="1"/>
+              <a:rPr lang="en-US" altLang="zh-TW" sz="1000" dirty="0" err="1"/>
               <a:t>bmi_judge</a:t>
             </a:r>
             <a:r>
-              <a:rPr lang="en-US" altLang="zh-TW" sz="900" dirty="0"/>
+              <a:rPr lang="en-US" altLang="zh-TW" sz="1000" dirty="0"/>
               <a:t> = 'wrong data'</a:t>
             </a:r>
           </a:p>
           <a:p>
             <a:r>
-              <a:rPr lang="en-US" altLang="zh-TW" sz="900" dirty="0"/>
+              <a:rPr lang="en-US" altLang="zh-TW" sz="1000" dirty="0"/>
               <a:t>    if gender=='male':</a:t>
             </a:r>
           </a:p>
           <a:p>
             <a:r>
-              <a:rPr lang="en-US" altLang="zh-TW" sz="900" dirty="0"/>
+              <a:rPr lang="en-US" altLang="zh-TW" sz="1000" dirty="0"/>
               <a:t>        if </a:t>
             </a:r>
             <a:r>
-              <a:rPr lang="en-US" altLang="zh-TW" sz="900" dirty="0" err="1"/>
+              <a:rPr lang="en-US" altLang="zh-TW" sz="1000" dirty="0" err="1"/>
               <a:t>bmi</a:t>
             </a:r>
             <a:r>
-              <a:rPr lang="en-US" altLang="zh-TW" sz="900" dirty="0"/>
+              <a:rPr lang="en-US" altLang="zh-TW" sz="1000" dirty="0"/>
               <a:t>&lt;</a:t>
             </a:r>
             <a:r>
-              <a:rPr lang="en-US" altLang="zh-TW" sz="900" dirty="0" err="1"/>
+              <a:rPr lang="en-US" altLang="zh-TW" sz="1000" dirty="0" err="1"/>
               <a:t>matched_rows</a:t>
             </a:r>
             <a:r>
-              <a:rPr lang="en-US" altLang="zh-TW" sz="900" dirty="0"/>
+              <a:rPr lang="en-US" altLang="zh-TW" sz="1000" dirty="0"/>
               <a:t>['</a:t>
             </a:r>
             <a:r>
-              <a:rPr lang="en-US" altLang="zh-TW" sz="900" dirty="0" err="1"/>
+              <a:rPr lang="en-US" altLang="zh-TW" sz="1000" dirty="0" err="1"/>
               <a:t>male_min</a:t>
             </a:r>
             <a:r>
-              <a:rPr lang="en-US" altLang="zh-TW" sz="900" dirty="0"/>
+              <a:rPr lang="en-US" altLang="zh-TW" sz="1000" dirty="0"/>
               <a:t>']:</a:t>
             </a:r>
           </a:p>
           <a:p>
             <a:r>
-              <a:rPr lang="en-US" altLang="zh-TW" sz="900" dirty="0"/>
+              <a:rPr lang="en-US" altLang="zh-TW" sz="1000" dirty="0"/>
               <a:t>            </a:t>
             </a:r>
             <a:r>
-              <a:rPr lang="en-US" altLang="zh-TW" sz="900" dirty="0" err="1"/>
+              <a:rPr lang="en-US" altLang="zh-TW" sz="1000" dirty="0" err="1"/>
               <a:t>bmi_judge</a:t>
             </a:r>
             <a:r>
-              <a:rPr lang="en-US" altLang="zh-TW" sz="900" dirty="0"/>
+              <a:rPr lang="en-US" altLang="zh-TW" sz="1000" dirty="0"/>
               <a:t>='Too thin'</a:t>
             </a:r>
           </a:p>
           <a:p>
             <a:r>
-              <a:rPr lang="en-US" altLang="zh-TW" sz="900" dirty="0"/>
+              <a:rPr lang="en-US" altLang="zh-TW" sz="1000" dirty="0"/>
               <a:t>        </a:t>
             </a:r>
             <a:r>
-              <a:rPr lang="en-US" altLang="zh-TW" sz="900" dirty="0" err="1"/>
+              <a:rPr lang="en-US" altLang="zh-TW" sz="1000" dirty="0" err="1"/>
               <a:t>elif</a:t>
             </a:r>
             <a:r>
-              <a:rPr lang="en-US" altLang="zh-TW" sz="900" dirty="0"/>
+              <a:rPr lang="en-US" altLang="zh-TW" sz="1000" dirty="0"/>
               <a:t> </a:t>
             </a:r>
             <a:r>
-              <a:rPr lang="en-US" altLang="zh-TW" sz="900" dirty="0" err="1"/>
+              <a:rPr lang="en-US" altLang="zh-TW" sz="1000" dirty="0" err="1"/>
               <a:t>bmi</a:t>
             </a:r>
             <a:r>
-              <a:rPr lang="en-US" altLang="zh-TW" sz="900" dirty="0"/>
+              <a:rPr lang="en-US" altLang="zh-TW" sz="1000" dirty="0"/>
               <a:t>&gt;=</a:t>
             </a:r>
             <a:r>
-              <a:rPr lang="en-US" altLang="zh-TW" sz="900" dirty="0" err="1"/>
+              <a:rPr lang="en-US" altLang="zh-TW" sz="1000" dirty="0" err="1"/>
               <a:t>matched_rows</a:t>
             </a:r>
             <a:r>
-              <a:rPr lang="en-US" altLang="zh-TW" sz="900" dirty="0"/>
+              <a:rPr lang="en-US" altLang="zh-TW" sz="1000" dirty="0"/>
               <a:t>['</a:t>
             </a:r>
             <a:r>
-              <a:rPr lang="en-US" altLang="zh-TW" sz="900" dirty="0" err="1"/>
+              <a:rPr lang="en-US" altLang="zh-TW" sz="1000" dirty="0" err="1"/>
               <a:t>male_min</a:t>
             </a:r>
             <a:r>
-              <a:rPr lang="en-US" altLang="zh-TW" sz="900" dirty="0"/>
+              <a:rPr lang="en-US" altLang="zh-TW" sz="1000" dirty="0"/>
               <a:t>'] and </a:t>
             </a:r>
             <a:r>
-              <a:rPr lang="en-US" altLang="zh-TW" sz="900" dirty="0" err="1"/>
+              <a:rPr lang="en-US" altLang="zh-TW" sz="1000" dirty="0" err="1"/>
               <a:t>bmi</a:t>
             </a:r>
             <a:r>
-              <a:rPr lang="en-US" altLang="zh-TW" sz="900" dirty="0"/>
+              <a:rPr lang="en-US" altLang="zh-TW" sz="1000" dirty="0"/>
               <a:t>&lt;=</a:t>
             </a:r>
             <a:r>
-              <a:rPr lang="en-US" altLang="zh-TW" sz="900" dirty="0" err="1"/>
+              <a:rPr lang="en-US" altLang="zh-TW" sz="1000" dirty="0" err="1"/>
               <a:t>matched_rows</a:t>
             </a:r>
             <a:r>
-              <a:rPr lang="en-US" altLang="zh-TW" sz="900" dirty="0"/>
+              <a:rPr lang="en-US" altLang="zh-TW" sz="1000" dirty="0"/>
               <a:t>['</a:t>
             </a:r>
             <a:r>
-              <a:rPr lang="en-US" altLang="zh-TW" sz="900" dirty="0" err="1"/>
+              <a:rPr lang="en-US" altLang="zh-TW" sz="1000" dirty="0" err="1"/>
               <a:t>male_max</a:t>
             </a:r>
             <a:r>
-              <a:rPr lang="en-US" altLang="zh-TW" sz="900" dirty="0"/>
+              <a:rPr lang="en-US" altLang="zh-TW" sz="1000" dirty="0"/>
               <a:t>']:</a:t>
             </a:r>
           </a:p>
           <a:p>
             <a:r>
-              <a:rPr lang="en-US" altLang="zh-TW" sz="900" dirty="0"/>
+              <a:rPr lang="en-US" altLang="zh-TW" sz="1000" dirty="0"/>
               <a:t>            </a:t>
             </a:r>
             <a:r>
-              <a:rPr lang="en-US" altLang="zh-TW" sz="900" dirty="0" err="1"/>
+              <a:rPr lang="en-US" altLang="zh-TW" sz="1000" dirty="0" err="1"/>
               <a:t>bmi_judge</a:t>
             </a:r>
             <a:r>
-              <a:rPr lang="en-US" altLang="zh-TW" sz="900" dirty="0"/>
+              <a:rPr lang="en-US" altLang="zh-TW" sz="1000" dirty="0"/>
               <a:t>='Normal'</a:t>
             </a:r>
           </a:p>
           <a:p>
             <a:r>
-              <a:rPr lang="en-US" altLang="zh-TW" sz="900" dirty="0"/>
+              <a:rPr lang="en-US" altLang="zh-TW" sz="1000" dirty="0"/>
               <a:t>        else:</a:t>
             </a:r>
           </a:p>
           <a:p>
             <a:r>
-              <a:rPr lang="en-US" altLang="zh-TW" sz="900" dirty="0"/>
+              <a:rPr lang="en-US" altLang="zh-TW" sz="1000" dirty="0"/>
               <a:t>            </a:t>
             </a:r>
             <a:r>
-              <a:rPr lang="en-US" altLang="zh-TW" sz="900" dirty="0" err="1"/>
+              <a:rPr lang="en-US" altLang="zh-TW" sz="1000" dirty="0" err="1"/>
               <a:t>bmi_judge</a:t>
             </a:r>
             <a:r>
-              <a:rPr lang="en-US" altLang="zh-TW" sz="900" dirty="0"/>
+              <a:rPr lang="en-US" altLang="zh-TW" sz="1000" dirty="0"/>
               <a:t>='Too fat'</a:t>
             </a:r>
           </a:p>
           <a:p>
             <a:r>
-              <a:rPr lang="en-US" altLang="zh-TW" sz="900" dirty="0"/>
+              <a:rPr lang="en-US" altLang="zh-TW" sz="1000" dirty="0"/>
               <a:t>    </a:t>
             </a:r>
             <a:r>
-              <a:rPr lang="en-US" altLang="zh-TW" sz="900" dirty="0" err="1"/>
+              <a:rPr lang="en-US" altLang="zh-TW" sz="1000" dirty="0" err="1"/>
               <a:t>elif</a:t>
             </a:r>
             <a:r>
-              <a:rPr lang="en-US" altLang="zh-TW" sz="900" dirty="0"/>
+              <a:rPr lang="en-US" altLang="zh-TW" sz="1000" dirty="0"/>
               <a:t> gender=='female':</a:t>
             </a:r>
           </a:p>
           <a:p>
             <a:r>
-              <a:rPr lang="en-US" altLang="zh-TW" sz="900" dirty="0"/>
+              <a:rPr lang="en-US" altLang="zh-TW" sz="1000" dirty="0"/>
               <a:t>        if </a:t>
             </a:r>
             <a:r>
-              <a:rPr lang="en-US" altLang="zh-TW" sz="900" dirty="0" err="1"/>
+              <a:rPr lang="en-US" altLang="zh-TW" sz="1000" dirty="0" err="1"/>
               <a:t>bmi</a:t>
             </a:r>
             <a:r>
-              <a:rPr lang="en-US" altLang="zh-TW" sz="900" dirty="0"/>
+              <a:rPr lang="en-US" altLang="zh-TW" sz="1000" dirty="0"/>
               <a:t>&lt;</a:t>
             </a:r>
             <a:r>
-              <a:rPr lang="en-US" altLang="zh-TW" sz="900" dirty="0" err="1"/>
+              <a:rPr lang="en-US" altLang="zh-TW" sz="1000" dirty="0" err="1"/>
               <a:t>matched_rows</a:t>
             </a:r>
             <a:r>
-              <a:rPr lang="en-US" altLang="zh-TW" sz="900" dirty="0"/>
+              <a:rPr lang="en-US" altLang="zh-TW" sz="1000" dirty="0"/>
               <a:t>['</a:t>
             </a:r>
             <a:r>
-              <a:rPr lang="en-US" altLang="zh-TW" sz="900" dirty="0" err="1"/>
+              <a:rPr lang="en-US" altLang="zh-TW" sz="1000" dirty="0" err="1"/>
               <a:t>female_min</a:t>
             </a:r>
             <a:r>
-              <a:rPr lang="en-US" altLang="zh-TW" sz="900" dirty="0"/>
+              <a:rPr lang="en-US" altLang="zh-TW" sz="1000" dirty="0"/>
               <a:t>']:</a:t>
             </a:r>
           </a:p>
           <a:p>
             <a:r>
-              <a:rPr lang="en-US" altLang="zh-TW" sz="900" dirty="0"/>
+              <a:rPr lang="en-US" altLang="zh-TW" sz="1000" dirty="0"/>
               <a:t>            </a:t>
             </a:r>
             <a:r>
-              <a:rPr lang="en-US" altLang="zh-TW" sz="900" dirty="0" err="1"/>
+              <a:rPr lang="en-US" altLang="zh-TW" sz="1000" dirty="0" err="1"/>
               <a:t>bmi_judge</a:t>
             </a:r>
             <a:r>
-              <a:rPr lang="en-US" altLang="zh-TW" sz="900" dirty="0"/>
+              <a:rPr lang="en-US" altLang="zh-TW" sz="1000" dirty="0"/>
               <a:t>='Too thin'</a:t>
             </a:r>
           </a:p>
           <a:p>
             <a:r>
-              <a:rPr lang="en-US" altLang="zh-TW" sz="900" dirty="0"/>
+              <a:rPr lang="en-US" altLang="zh-TW" sz="1000" dirty="0"/>
               <a:t>        </a:t>
             </a:r>
             <a:r>
-              <a:rPr lang="en-US" altLang="zh-TW" sz="900" dirty="0" err="1"/>
+              <a:rPr lang="en-US" altLang="zh-TW" sz="1000" dirty="0" err="1"/>
               <a:t>elif</a:t>
             </a:r>
             <a:r>
-              <a:rPr lang="en-US" altLang="zh-TW" sz="900" dirty="0"/>
+              <a:rPr lang="en-US" altLang="zh-TW" sz="1000" dirty="0"/>
               <a:t> </a:t>
             </a:r>
             <a:r>
-              <a:rPr lang="en-US" altLang="zh-TW" sz="900" dirty="0" err="1"/>
+              <a:rPr lang="en-US" altLang="zh-TW" sz="1000" dirty="0" err="1"/>
               <a:t>bmi</a:t>
             </a:r>
             <a:r>
-              <a:rPr lang="en-US" altLang="zh-TW" sz="900" dirty="0"/>
+              <a:rPr lang="en-US" altLang="zh-TW" sz="1000" dirty="0"/>
               <a:t>&gt;=</a:t>
             </a:r>
             <a:r>
-              <a:rPr lang="en-US" altLang="zh-TW" sz="900" dirty="0" err="1"/>
+              <a:rPr lang="en-US" altLang="zh-TW" sz="1000" dirty="0" err="1"/>
               <a:t>matched_rows</a:t>
             </a:r>
             <a:r>
-              <a:rPr lang="en-US" altLang="zh-TW" sz="900" dirty="0"/>
+              <a:rPr lang="en-US" altLang="zh-TW" sz="1000" dirty="0"/>
               <a:t>['</a:t>
             </a:r>
             <a:r>
-              <a:rPr lang="en-US" altLang="zh-TW" sz="900" dirty="0" err="1"/>
+              <a:rPr lang="en-US" altLang="zh-TW" sz="1000" dirty="0" err="1"/>
               <a:t>female_min</a:t>
             </a:r>
             <a:r>
-              <a:rPr lang="en-US" altLang="zh-TW" sz="900" dirty="0"/>
+              <a:rPr lang="en-US" altLang="zh-TW" sz="1000" dirty="0"/>
               <a:t>'] and </a:t>
             </a:r>
             <a:r>
-              <a:rPr lang="en-US" altLang="zh-TW" sz="900" dirty="0" err="1"/>
+              <a:rPr lang="en-US" altLang="zh-TW" sz="1000" dirty="0" err="1"/>
               <a:t>bmi</a:t>
             </a:r>
             <a:r>
-              <a:rPr lang="en-US" altLang="zh-TW" sz="900" dirty="0"/>
+              <a:rPr lang="en-US" altLang="zh-TW" sz="1000" dirty="0"/>
               <a:t>&lt;=</a:t>
             </a:r>
             <a:r>
-              <a:rPr lang="en-US" altLang="zh-TW" sz="900" dirty="0" err="1"/>
+              <a:rPr lang="en-US" altLang="zh-TW" sz="1000" dirty="0" err="1"/>
               <a:t>matched_rows</a:t>
             </a:r>
             <a:r>
-              <a:rPr lang="en-US" altLang="zh-TW" sz="900" dirty="0"/>
+              <a:rPr lang="en-US" altLang="zh-TW" sz="1000" dirty="0"/>
               <a:t>['</a:t>
             </a:r>
             <a:r>
-              <a:rPr lang="en-US" altLang="zh-TW" sz="900" dirty="0" err="1"/>
+              <a:rPr lang="en-US" altLang="zh-TW" sz="1000" dirty="0" err="1"/>
               <a:t>female_max</a:t>
             </a:r>
             <a:r>
-              <a:rPr lang="en-US" altLang="zh-TW" sz="900" dirty="0"/>
+              <a:rPr lang="en-US" altLang="zh-TW" sz="1000" dirty="0"/>
               <a:t>']:</a:t>
             </a:r>
           </a:p>
           <a:p>
             <a:r>
-              <a:rPr lang="en-US" altLang="zh-TW" sz="900" dirty="0"/>
+              <a:rPr lang="en-US" altLang="zh-TW" sz="1000" dirty="0"/>
               <a:t>            </a:t>
             </a:r>
             <a:r>
-              <a:rPr lang="en-US" altLang="zh-TW" sz="900" dirty="0" err="1"/>
+              <a:rPr lang="en-US" altLang="zh-TW" sz="1000" dirty="0" err="1"/>
               <a:t>bmi_judge</a:t>
             </a:r>
             <a:r>
-              <a:rPr lang="en-US" altLang="zh-TW" sz="900" dirty="0"/>
+              <a:rPr lang="en-US" altLang="zh-TW" sz="1000" dirty="0"/>
               <a:t>='Normal'</a:t>
             </a:r>
           </a:p>
           <a:p>
             <a:r>
-              <a:rPr lang="en-US" altLang="zh-TW" sz="900" dirty="0"/>
+              <a:rPr lang="en-US" altLang="zh-TW" sz="1000" dirty="0"/>
               <a:t>        else:</a:t>
             </a:r>
           </a:p>
           <a:p>
             <a:r>
-              <a:rPr lang="en-US" altLang="zh-TW" sz="900" dirty="0"/>
+              <a:rPr lang="en-US" altLang="zh-TW" sz="1000" dirty="0"/>
               <a:t>            </a:t>
             </a:r>
             <a:r>
-              <a:rPr lang="en-US" altLang="zh-TW" sz="900" dirty="0" err="1"/>
+              <a:rPr lang="en-US" altLang="zh-TW" sz="1000" dirty="0" err="1"/>
               <a:t>bmi_judge</a:t>
             </a:r>
             <a:r>
-              <a:rPr lang="en-US" altLang="zh-TW" sz="900" dirty="0"/>
+              <a:rPr lang="en-US" altLang="zh-TW" sz="1000" dirty="0"/>
               <a:t>='Too fat'</a:t>
             </a:r>
           </a:p>
           <a:p>
             <a:r>
-              <a:rPr lang="en-US" altLang="zh-TW" sz="900" dirty="0"/>
-              <a:t>        </a:t>
-            </a:r>
-          </a:p>
-          <a:p>
-            <a:r>
-              <a:rPr lang="en-US" altLang="zh-TW" sz="900" dirty="0"/>
+              <a:rPr lang="en-US" altLang="zh-TW" sz="1000" dirty="0"/>
               <a:t>    return </a:t>
             </a:r>
             <a:r>
-              <a:rPr lang="en-US" altLang="zh-TW" sz="900" dirty="0" err="1"/>
+              <a:rPr lang="en-US" altLang="zh-TW" sz="1000" dirty="0" err="1"/>
               <a:t>jsonify</a:t>
             </a:r>
             <a:r>
-              <a:rPr lang="en-US" altLang="zh-TW" sz="900" dirty="0"/>
+              <a:rPr lang="en-US" altLang="zh-TW" sz="1000" dirty="0"/>
               <a:t>(message=</a:t>
             </a:r>
             <a:r>
-              <a:rPr lang="en-US" altLang="zh-TW" sz="900" dirty="0" err="1"/>
+              <a:rPr lang="en-US" altLang="zh-TW" sz="1000" dirty="0" err="1"/>
               <a:t>f'Your</a:t>
             </a:r>
             <a:r>
-              <a:rPr lang="en-US" altLang="zh-TW" sz="900" dirty="0"/>
+              <a:rPr lang="en-US" altLang="zh-TW" sz="1000" dirty="0"/>
               <a:t> AGE={age},BMI={</a:t>
             </a:r>
             <a:r>
-              <a:rPr lang="en-US" altLang="zh-TW" sz="900" dirty="0" err="1"/>
+              <a:rPr lang="en-US" altLang="zh-TW" sz="1000" dirty="0" err="1"/>
               <a:t>bmi</a:t>
             </a:r>
             <a:r>
-              <a:rPr lang="en-US" altLang="zh-TW" sz="900" dirty="0"/>
+              <a:rPr lang="en-US" altLang="zh-TW" sz="1000" dirty="0"/>
               <a:t>},{</a:t>
             </a:r>
             <a:r>
-              <a:rPr lang="en-US" altLang="zh-TW" sz="900" dirty="0" err="1"/>
+              <a:rPr lang="en-US" altLang="zh-TW" sz="1000" dirty="0" err="1"/>
               <a:t>bmi_judge</a:t>
             </a:r>
             <a:r>
-              <a:rPr lang="en-US" altLang="zh-TW" sz="900" dirty="0"/>
+              <a:rPr lang="en-US" altLang="zh-TW" sz="1000" dirty="0"/>
               <a:t>}.')</a:t>
             </a:r>
           </a:p>
@@ -4757,6 +4747,838 @@
     <p:extLst>
       <p:ext uri="{BB962C8B-B14F-4D97-AF65-F5344CB8AC3E}">
         <p14:creationId xmlns:p14="http://schemas.microsoft.com/office/powerpoint/2010/main" val="108368899"/>
+      </p:ext>
+    </p:extLst>
+  </p:cSld>
+  <p:clrMapOvr>
+    <a:masterClrMapping/>
+  </p:clrMapOvr>
+</p:sld>
+</file>
+
+<file path=ppt/slides/slide13.xml><?xml version="1.0" encoding="utf-8"?>
+<p:sld xmlns:a="http://schemas.openxmlformats.org/drawingml/2006/main" xmlns:r="http://schemas.openxmlformats.org/officeDocument/2006/relationships" xmlns:p="http://schemas.openxmlformats.org/presentationml/2006/main">
+  <p:cSld>
+    <p:spTree>
+      <p:nvGrpSpPr>
+        <p:cNvPr id="1" name=""/>
+        <p:cNvGrpSpPr/>
+        <p:nvPr/>
+      </p:nvGrpSpPr>
+      <p:grpSpPr>
+        <a:xfrm>
+          <a:off x="0" y="0"/>
+          <a:ext cx="0" cy="0"/>
+          <a:chOff x="0" y="0"/>
+          <a:chExt cx="0" cy="0"/>
+        </a:xfrm>
+      </p:grpSpPr>
+      <p:sp>
+        <p:nvSpPr>
+          <p:cNvPr id="2" name="標題 1"/>
+          <p:cNvSpPr>
+            <a:spLocks noGrp="1"/>
+          </p:cNvSpPr>
+          <p:nvPr>
+            <p:ph type="title"/>
+          </p:nvPr>
+        </p:nvSpPr>
+        <p:spPr>
+          <a:xfrm>
+            <a:off x="838200" y="0"/>
+            <a:ext cx="9677400" cy="1098958"/>
+          </a:xfrm>
+        </p:spPr>
+        <p:txBody>
+          <a:bodyPr>
+            <a:normAutofit/>
+          </a:bodyPr>
+          <a:lstStyle/>
+          <a:p>
+            <a:r>
+              <a:rPr lang="en-US" altLang="zh-TW" dirty="0"/>
+              <a:t>9.Write Code: Post Method Test</a:t>
+            </a:r>
+            <a:endParaRPr lang="zh-TW" altLang="en-US" dirty="0"/>
+          </a:p>
+        </p:txBody>
+      </p:sp>
+      <p:sp>
+        <p:nvSpPr>
+          <p:cNvPr id="5" name="矩形 4"/>
+          <p:cNvSpPr/>
+          <p:nvPr/>
+        </p:nvSpPr>
+        <p:spPr>
+          <a:xfrm>
+            <a:off x="276226" y="1118542"/>
+            <a:ext cx="4761442" cy="5170646"/>
+          </a:xfrm>
+          <a:prstGeom prst="rect">
+            <a:avLst/>
+          </a:prstGeom>
+          <a:solidFill>
+            <a:schemeClr val="bg2"/>
+          </a:solidFill>
+        </p:spPr>
+        <p:txBody>
+          <a:bodyPr wrap="square">
+            <a:spAutoFit/>
+          </a:bodyPr>
+          <a:lstStyle/>
+          <a:p>
+            <a:r>
+              <a:rPr lang="zh-TW" altLang="en-US" sz="1000" dirty="0"/>
+              <a:t>from flask import Flask, request, jsonify</a:t>
+            </a:r>
+          </a:p>
+          <a:p>
+            <a:r>
+              <a:rPr lang="zh-TW" altLang="en-US" sz="1000" dirty="0"/>
+              <a:t>from datetime import datetime</a:t>
+            </a:r>
+          </a:p>
+          <a:p>
+            <a:r>
+              <a:rPr lang="zh-TW" altLang="en-US" sz="1000" dirty="0"/>
+              <a:t>import math</a:t>
+            </a:r>
+          </a:p>
+          <a:p>
+            <a:r>
+              <a:rPr lang="zh-TW" altLang="en-US" sz="1000" dirty="0"/>
+              <a:t>import pandas as pd</a:t>
+            </a:r>
+          </a:p>
+          <a:p>
+            <a:r>
+              <a:rPr lang="zh-TW" altLang="en-US" sz="1000" dirty="0"/>
+              <a:t>import os</a:t>
+            </a:r>
+          </a:p>
+          <a:p>
+            <a:endParaRPr lang="zh-TW" altLang="en-US" sz="1000" dirty="0"/>
+          </a:p>
+          <a:p>
+            <a:r>
+              <a:rPr lang="zh-TW" altLang="en-US" sz="1000" dirty="0"/>
+              <a:t>app = Flask(__name__)</a:t>
+            </a:r>
+          </a:p>
+          <a:p>
+            <a:endParaRPr lang="zh-TW" altLang="en-US" sz="1000" dirty="0"/>
+          </a:p>
+          <a:p>
+            <a:r>
+              <a:rPr lang="zh-TW" altLang="en-US" sz="1000" dirty="0"/>
+              <a:t># POST Method</a:t>
+            </a:r>
+          </a:p>
+          <a:p>
+            <a:r>
+              <a:rPr lang="zh-TW" altLang="en-US" sz="1000" dirty="0"/>
+              <a:t>@app.route('/submit', methods=['POST'])</a:t>
+            </a:r>
+          </a:p>
+          <a:p>
+            <a:r>
+              <a:rPr lang="zh-TW" altLang="en-US" sz="1000" dirty="0"/>
+              <a:t>def submit_form():</a:t>
+            </a:r>
+          </a:p>
+          <a:p>
+            <a:r>
+              <a:rPr lang="zh-TW" altLang="en-US" sz="1000" dirty="0"/>
+              <a:t>    data = request.get_json()</a:t>
+            </a:r>
+          </a:p>
+          <a:p>
+            <a:r>
+              <a:rPr lang="zh-TW" altLang="en-US" sz="1000" dirty="0"/>
+              <a:t>    name = data.get('name')</a:t>
+            </a:r>
+          </a:p>
+          <a:p>
+            <a:r>
+              <a:rPr lang="zh-TW" altLang="en-US" sz="1000" dirty="0"/>
+              <a:t>    password = data.get('password')</a:t>
+            </a:r>
+          </a:p>
+          <a:p>
+            <a:r>
+              <a:rPr lang="zh-TW" altLang="en-US" sz="1000" dirty="0"/>
+              <a:t>    birthday = datetime.strptime((f"{data.get('birthday')}"), "%Y-%m-%d")</a:t>
+            </a:r>
+          </a:p>
+          <a:p>
+            <a:r>
+              <a:rPr lang="zh-TW" altLang="en-US" sz="1000" dirty="0"/>
+              <a:t>    gender = data.get('gender')</a:t>
+            </a:r>
+          </a:p>
+          <a:p>
+            <a:r>
+              <a:rPr lang="zh-TW" altLang="en-US" sz="1000" dirty="0"/>
+              <a:t>    height = data.get('height')</a:t>
+            </a:r>
+          </a:p>
+          <a:p>
+            <a:r>
+              <a:rPr lang="zh-TW" altLang="en-US" sz="1000" dirty="0"/>
+              <a:t>    weight = data.get('weight')</a:t>
+            </a:r>
+          </a:p>
+          <a:p>
+            <a:r>
+              <a:rPr lang="zh-TW" altLang="en-US" sz="1000" dirty="0"/>
+              <a:t>    bmi = round(weight / height **2,2)# bmi count</a:t>
+            </a:r>
+          </a:p>
+          <a:p>
+            <a:r>
+              <a:rPr lang="zh-TW" altLang="en-US" sz="1000" dirty="0"/>
+              <a:t>    today = datetime.today()</a:t>
+            </a:r>
+          </a:p>
+          <a:p>
+            <a:r>
+              <a:rPr lang="zh-TW" altLang="en-US" sz="1000" dirty="0"/>
+              <a:t>    age = today.year - birthday.year - ((today.month, today.day) &lt; (birthday.month, birthday.day))</a:t>
+            </a:r>
+          </a:p>
+          <a:p>
+            <a:r>
+              <a:rPr lang="zh-TW" altLang="en-US" sz="1000" dirty="0"/>
+              <a:t>    df = pd.read_csv('BMI_Normal.csv')</a:t>
+            </a:r>
+          </a:p>
+          <a:p>
+            <a:r>
+              <a:rPr lang="zh-TW" altLang="en-US" sz="1000" dirty="0"/>
+              <a:t>    matched_rows = df[df['age'] == age].iloc[0]</a:t>
+            </a:r>
+          </a:p>
+          <a:p>
+            <a:r>
+              <a:rPr lang="zh-TW" altLang="en-US" sz="1000" dirty="0"/>
+              <a:t>    #print(matched_rows)</a:t>
+            </a:r>
+          </a:p>
+          <a:p>
+            <a:r>
+              <a:rPr lang="zh-TW" altLang="en-US" sz="1000" dirty="0"/>
+              <a:t>    bmi_judge = 'wrong data'</a:t>
+            </a:r>
+          </a:p>
+          <a:p>
+            <a:r>
+              <a:rPr lang="zh-TW" altLang="en-US" sz="1000" dirty="0"/>
+              <a:t>    if gender=='male':</a:t>
+            </a:r>
+          </a:p>
+          <a:p>
+            <a:r>
+              <a:rPr lang="zh-TW" altLang="en-US" sz="1000" dirty="0"/>
+              <a:t>        if bmi&lt;matched_rows['male_min']:</a:t>
+            </a:r>
+          </a:p>
+          <a:p>
+            <a:r>
+              <a:rPr lang="zh-TW" altLang="en-US" sz="1000" dirty="0"/>
+              <a:t>            bmi_judge='Too thin'</a:t>
+            </a:r>
+          </a:p>
+          <a:p>
+            <a:r>
+              <a:rPr lang="zh-TW" altLang="en-US" sz="1000" dirty="0"/>
+              <a:t>        elif bmi&gt;=matched_rows['male_min'] and bmi&lt;=matched_rows['male_max']:</a:t>
+            </a:r>
+          </a:p>
+          <a:p>
+            <a:r>
+              <a:rPr lang="zh-TW" altLang="en-US" sz="1000" dirty="0"/>
+              <a:t>            bmi_judge='Normal'</a:t>
+            </a:r>
+          </a:p>
+          <a:p>
+            <a:r>
+              <a:rPr lang="zh-TW" altLang="en-US" sz="1000" dirty="0"/>
+              <a:t>        else:</a:t>
+            </a:r>
+          </a:p>
+          <a:p>
+            <a:r>
+              <a:rPr lang="zh-TW" altLang="en-US" sz="1000" dirty="0"/>
+              <a:t>            bmi_judge='Too fat'</a:t>
+            </a:r>
+          </a:p>
+        </p:txBody>
+      </p:sp>
+      <p:sp>
+        <p:nvSpPr>
+          <p:cNvPr id="14" name="文字方塊 13">
+            <a:extLst>
+              <a:ext uri="{FF2B5EF4-FFF2-40B4-BE49-F238E27FC236}">
+                <a16:creationId xmlns:a16="http://schemas.microsoft.com/office/drawing/2014/main" id="{97F7441A-8531-418C-A102-69F983B057A5}"/>
+              </a:ext>
+            </a:extLst>
+          </p:cNvPr>
+          <p:cNvSpPr txBox="1"/>
+          <p:nvPr/>
+        </p:nvSpPr>
+        <p:spPr>
+          <a:xfrm>
+            <a:off x="1078690" y="761784"/>
+            <a:ext cx="4035178" cy="369332"/>
+          </a:xfrm>
+          <a:prstGeom prst="rect">
+            <a:avLst/>
+          </a:prstGeom>
+          <a:noFill/>
+        </p:spPr>
+        <p:txBody>
+          <a:bodyPr wrap="square" rtlCol="0">
+            <a:spAutoFit/>
+          </a:bodyPr>
+          <a:lstStyle/>
+          <a:p>
+            <a:r>
+              <a:rPr lang="en-US" altLang="zh-TW" dirty="0"/>
+              <a:t>Step1: Write Code on Server1.py </a:t>
+            </a:r>
+          </a:p>
+        </p:txBody>
+      </p:sp>
+      <p:sp>
+        <p:nvSpPr>
+          <p:cNvPr id="15" name="文字方塊 14">
+            <a:extLst>
+              <a:ext uri="{FF2B5EF4-FFF2-40B4-BE49-F238E27FC236}">
+                <a16:creationId xmlns:a16="http://schemas.microsoft.com/office/drawing/2014/main" id="{9DAA9AAD-4F13-4FAF-8A07-64C0AAE9D3B8}"/>
+              </a:ext>
+            </a:extLst>
+          </p:cNvPr>
+          <p:cNvSpPr txBox="1"/>
+          <p:nvPr/>
+        </p:nvSpPr>
+        <p:spPr>
+          <a:xfrm>
+            <a:off x="5354358" y="895434"/>
+            <a:ext cx="6470787" cy="5940088"/>
+          </a:xfrm>
+          <a:prstGeom prst="rect">
+            <a:avLst/>
+          </a:prstGeom>
+          <a:solidFill>
+            <a:schemeClr val="bg2"/>
+          </a:solidFill>
+        </p:spPr>
+        <p:txBody>
+          <a:bodyPr wrap="square">
+            <a:spAutoFit/>
+          </a:bodyPr>
+          <a:lstStyle/>
+          <a:p>
+            <a:r>
+              <a:rPr lang="zh-TW" altLang="en-US" sz="1000" dirty="0"/>
+              <a:t> elif gender=='female':</a:t>
+            </a:r>
+          </a:p>
+          <a:p>
+            <a:r>
+              <a:rPr lang="zh-TW" altLang="en-US" sz="1000" dirty="0"/>
+              <a:t>        if bmi&lt;matched_rows['female_min']:</a:t>
+            </a:r>
+          </a:p>
+          <a:p>
+            <a:r>
+              <a:rPr lang="zh-TW" altLang="en-US" sz="1000" dirty="0"/>
+              <a:t>            bmi_judge='Too thin'</a:t>
+            </a:r>
+          </a:p>
+          <a:p>
+            <a:r>
+              <a:rPr lang="zh-TW" altLang="en-US" sz="1000" dirty="0"/>
+              <a:t>        elif bmi&gt;=matched_rows['female_min'] and bmi&lt;=matched_rows['female_max']:</a:t>
+            </a:r>
+          </a:p>
+          <a:p>
+            <a:r>
+              <a:rPr lang="zh-TW" altLang="en-US" sz="1000" dirty="0"/>
+              <a:t>            bmi_judge='Normal'</a:t>
+            </a:r>
+          </a:p>
+          <a:p>
+            <a:r>
+              <a:rPr lang="zh-TW" altLang="en-US" sz="1000" dirty="0"/>
+              <a:t>        else:</a:t>
+            </a:r>
+          </a:p>
+          <a:p>
+            <a:r>
+              <a:rPr lang="zh-TW" altLang="en-US" sz="1000" dirty="0"/>
+              <a:t>            bmi_judge='Too fat' </a:t>
+            </a:r>
+            <a:endParaRPr lang="en-US" altLang="zh-TW" sz="1000" dirty="0"/>
+          </a:p>
+          <a:p>
+            <a:r>
+              <a:rPr lang="zh-TW" altLang="en-US" sz="1000" dirty="0"/>
+              <a:t>filename = f"UserData\{name}.csv"</a:t>
+            </a:r>
+          </a:p>
+          <a:p>
+            <a:r>
+              <a:rPr lang="zh-TW" altLang="en-US" sz="1000" dirty="0"/>
+              <a:t>    if os.path.exists(filename): # file exists</a:t>
+            </a:r>
+          </a:p>
+          <a:p>
+            <a:r>
+              <a:rPr lang="zh-TW" altLang="en-US" sz="1000" dirty="0"/>
+              <a:t>        load_df = pd.read_csv(filename)# file load</a:t>
+            </a:r>
+          </a:p>
+          <a:p>
+            <a:r>
+              <a:rPr lang="zh-TW" altLang="en-US" sz="1000" dirty="0"/>
+              <a:t>        stored_password = str(load_df.iloc[0]['password'])# password load</a:t>
+            </a:r>
+          </a:p>
+          <a:p>
+            <a:r>
+              <a:rPr lang="zh-TW" altLang="en-US" sz="1000" dirty="0"/>
+              <a:t>        if stored_password != password:# password incorrect</a:t>
+            </a:r>
+          </a:p>
+          <a:p>
+            <a:r>
+              <a:rPr lang="zh-TW" altLang="en-US" sz="1000" dirty="0"/>
+              <a:t>            return jsonify(message="password error!"), 403</a:t>
+            </a:r>
+          </a:p>
+          <a:p>
+            <a:r>
+              <a:rPr lang="zh-TW" altLang="en-US" sz="1000" dirty="0"/>
+              <a:t>        else:# password correct</a:t>
+            </a:r>
+          </a:p>
+          <a:p>
+            <a:r>
+              <a:rPr lang="zh-TW" altLang="en-US" sz="1000" dirty="0"/>
+              <a:t>            user_data = { #Save Data</a:t>
+            </a:r>
+          </a:p>
+          <a:p>
+            <a:r>
+              <a:rPr lang="zh-TW" altLang="en-US" sz="1000" dirty="0"/>
+              <a:t>                'height': height,</a:t>
+            </a:r>
+          </a:p>
+          <a:p>
+            <a:r>
+              <a:rPr lang="zh-TW" altLang="en-US" sz="1000" dirty="0"/>
+              <a:t>                'weight': weight,</a:t>
+            </a:r>
+          </a:p>
+          <a:p>
+            <a:r>
+              <a:rPr lang="zh-TW" altLang="en-US" sz="1000" dirty="0"/>
+              <a:t>                'bmi': bmi,</a:t>
+            </a:r>
+          </a:p>
+          <a:p>
+            <a:r>
+              <a:rPr lang="zh-TW" altLang="en-US" sz="1000" dirty="0"/>
+              <a:t>                'bmi_judge':bmi_judge,</a:t>
+            </a:r>
+          </a:p>
+          <a:p>
+            <a:r>
+              <a:rPr lang="zh-TW" altLang="en-US" sz="1000" dirty="0"/>
+              <a:t>                'build_time':today</a:t>
+            </a:r>
+          </a:p>
+          <a:p>
+            <a:r>
+              <a:rPr lang="zh-TW" altLang="en-US" sz="1000" dirty="0"/>
+              <a:t>            }</a:t>
+            </a:r>
+          </a:p>
+          <a:p>
+            <a:r>
+              <a:rPr lang="zh-TW" altLang="en-US" sz="1000" dirty="0"/>
+              <a:t>            load_df = pd.concat([load_df, pd.DataFrame([user_data])], ignore_index=True)</a:t>
+            </a:r>
+          </a:p>
+          <a:p>
+            <a:r>
+              <a:rPr lang="zh-TW" altLang="en-US" sz="1000" dirty="0"/>
+              <a:t>            load_df.to_csv(filename, index=False)</a:t>
+            </a:r>
+          </a:p>
+          <a:p>
+            <a:r>
+              <a:rPr lang="zh-TW" altLang="en-US" sz="1000" dirty="0"/>
+              <a:t>    else:# no files</a:t>
+            </a:r>
+          </a:p>
+          <a:p>
+            <a:r>
+              <a:rPr lang="zh-TW" altLang="en-US" sz="1000" dirty="0"/>
+              <a:t>        user_data = {#Save Data</a:t>
+            </a:r>
+          </a:p>
+          <a:p>
+            <a:r>
+              <a:rPr lang="zh-TW" altLang="en-US" sz="1000" dirty="0"/>
+              <a:t>            'password': password,</a:t>
+            </a:r>
+          </a:p>
+          <a:p>
+            <a:r>
+              <a:rPr lang="zh-TW" altLang="en-US" sz="1000" dirty="0"/>
+              <a:t>            'birthday': birthday,</a:t>
+            </a:r>
+          </a:p>
+          <a:p>
+            <a:r>
+              <a:rPr lang="zh-TW" altLang="en-US" sz="1000" dirty="0"/>
+              <a:t>            'gender': gender,</a:t>
+            </a:r>
+          </a:p>
+          <a:p>
+            <a:r>
+              <a:rPr lang="zh-TW" altLang="en-US" sz="1000" dirty="0"/>
+              <a:t>            'height': height,</a:t>
+            </a:r>
+          </a:p>
+          <a:p>
+            <a:r>
+              <a:rPr lang="zh-TW" altLang="en-US" sz="1000" dirty="0"/>
+              <a:t>            'weight': weight,</a:t>
+            </a:r>
+          </a:p>
+          <a:p>
+            <a:r>
+              <a:rPr lang="zh-TW" altLang="en-US" sz="1000" dirty="0"/>
+              <a:t>            'bmi': bmi,</a:t>
+            </a:r>
+          </a:p>
+          <a:p>
+            <a:r>
+              <a:rPr lang="zh-TW" altLang="en-US" sz="1000" dirty="0"/>
+              <a:t>            'bmi_judge':bmi_judge,</a:t>
+            </a:r>
+          </a:p>
+          <a:p>
+            <a:r>
+              <a:rPr lang="zh-TW" altLang="en-US" sz="1000" dirty="0"/>
+              <a:t>            'build_time':today</a:t>
+            </a:r>
+          </a:p>
+          <a:p>
+            <a:r>
+              <a:rPr lang="zh-TW" altLang="en-US" sz="1000" dirty="0"/>
+              <a:t>        }</a:t>
+            </a:r>
+          </a:p>
+          <a:p>
+            <a:r>
+              <a:rPr lang="zh-TW" altLang="en-US" sz="1000" dirty="0"/>
+              <a:t>        save_df = pd.DataFrame([user_data])</a:t>
+            </a:r>
+          </a:p>
+          <a:p>
+            <a:r>
+              <a:rPr lang="zh-TW" altLang="en-US" sz="1000" dirty="0"/>
+              <a:t>        save_filename = f"UserData\{name}.csv".replace("/", "_")</a:t>
+            </a:r>
+          </a:p>
+          <a:p>
+            <a:r>
+              <a:rPr lang="zh-TW" altLang="en-US" sz="1000" dirty="0"/>
+              <a:t>        save_df.to_csv(save_filename, index=False)</a:t>
+            </a:r>
+          </a:p>
+          <a:p>
+            <a:r>
+              <a:rPr lang="zh-TW" altLang="en-US" sz="1000" dirty="0"/>
+              <a:t>    return jsonify(message=f'Your AGE={age},BMI={bmi},{bmi_judge}.')</a:t>
+            </a:r>
+          </a:p>
+        </p:txBody>
+      </p:sp>
+      <p:cxnSp>
+        <p:nvCxnSpPr>
+          <p:cNvPr id="4" name="接點: 肘形 3">
+            <a:extLst>
+              <a:ext uri="{FF2B5EF4-FFF2-40B4-BE49-F238E27FC236}">
+                <a16:creationId xmlns:a16="http://schemas.microsoft.com/office/drawing/2014/main" id="{A118B400-6BFE-4F80-A74A-5BD947C38D56}"/>
+              </a:ext>
+            </a:extLst>
+          </p:cNvPr>
+          <p:cNvCxnSpPr>
+            <a:stCxn id="5" idx="2"/>
+            <a:endCxn id="15" idx="0"/>
+          </p:cNvCxnSpPr>
+          <p:nvPr/>
+        </p:nvCxnSpPr>
+        <p:spPr>
+          <a:xfrm rot="5400000" flipH="1" flipV="1">
+            <a:off x="2926472" y="625908"/>
+            <a:ext cx="5393754" cy="5932805"/>
+          </a:xfrm>
+          <a:prstGeom prst="bentConnector5">
+            <a:avLst>
+              <a:gd name="adj1" fmla="val -1099"/>
+              <a:gd name="adj2" fmla="val 42797"/>
+              <a:gd name="adj3" fmla="val 102040"/>
+            </a:avLst>
+          </a:prstGeom>
+          <a:ln w="12700">
+            <a:tailEnd type="triangle"/>
+          </a:ln>
+        </p:spPr>
+        <p:style>
+          <a:lnRef idx="1">
+            <a:schemeClr val="accent1"/>
+          </a:lnRef>
+          <a:fillRef idx="0">
+            <a:schemeClr val="accent1"/>
+          </a:fillRef>
+          <a:effectRef idx="0">
+            <a:schemeClr val="accent1"/>
+          </a:effectRef>
+          <a:fontRef idx="minor">
+            <a:schemeClr val="tx1"/>
+          </a:fontRef>
+        </p:style>
+      </p:cxnSp>
+    </p:spTree>
+    <p:extLst>
+      <p:ext uri="{BB962C8B-B14F-4D97-AF65-F5344CB8AC3E}">
+        <p14:creationId xmlns:p14="http://schemas.microsoft.com/office/powerpoint/2010/main" val="4129571222"/>
+      </p:ext>
+    </p:extLst>
+  </p:cSld>
+  <p:clrMapOvr>
+    <a:masterClrMapping/>
+  </p:clrMapOvr>
+</p:sld>
+</file>
+
+<file path=ppt/slides/slide14.xml><?xml version="1.0" encoding="utf-8"?>
+<p:sld xmlns:a="http://schemas.openxmlformats.org/drawingml/2006/main" xmlns:r="http://schemas.openxmlformats.org/officeDocument/2006/relationships" xmlns:p="http://schemas.openxmlformats.org/presentationml/2006/main">
+  <p:cSld>
+    <p:spTree>
+      <p:nvGrpSpPr>
+        <p:cNvPr id="1" name=""/>
+        <p:cNvGrpSpPr/>
+        <p:nvPr/>
+      </p:nvGrpSpPr>
+      <p:grpSpPr>
+        <a:xfrm>
+          <a:off x="0" y="0"/>
+          <a:ext cx="0" cy="0"/>
+          <a:chOff x="0" y="0"/>
+          <a:chExt cx="0" cy="0"/>
+        </a:xfrm>
+      </p:grpSpPr>
+      <p:sp>
+        <p:nvSpPr>
+          <p:cNvPr id="2" name="標題 1"/>
+          <p:cNvSpPr>
+            <a:spLocks noGrp="1"/>
+          </p:cNvSpPr>
+          <p:nvPr>
+            <p:ph type="title"/>
+          </p:nvPr>
+        </p:nvSpPr>
+        <p:spPr>
+          <a:xfrm>
+            <a:off x="838200" y="0"/>
+            <a:ext cx="9677400" cy="1098958"/>
+          </a:xfrm>
+        </p:spPr>
+        <p:txBody>
+          <a:bodyPr>
+            <a:normAutofit/>
+          </a:bodyPr>
+          <a:lstStyle/>
+          <a:p>
+            <a:r>
+              <a:rPr lang="en-US" altLang="zh-TW" dirty="0"/>
+              <a:t>9.Write Code: Post Method Test</a:t>
+            </a:r>
+            <a:endParaRPr lang="zh-TW" altLang="en-US" dirty="0"/>
+          </a:p>
+        </p:txBody>
+      </p:sp>
+      <p:sp>
+        <p:nvSpPr>
+          <p:cNvPr id="8" name="文字方塊 7"/>
+          <p:cNvSpPr txBox="1"/>
+          <p:nvPr/>
+        </p:nvSpPr>
+        <p:spPr>
+          <a:xfrm>
+            <a:off x="8325877" y="1283624"/>
+            <a:ext cx="2950973" cy="369332"/>
+          </a:xfrm>
+          <a:prstGeom prst="rect">
+            <a:avLst/>
+          </a:prstGeom>
+          <a:noFill/>
+        </p:spPr>
+        <p:txBody>
+          <a:bodyPr wrap="square" rtlCol="0">
+            <a:spAutoFit/>
+          </a:bodyPr>
+          <a:lstStyle/>
+          <a:p>
+            <a:r>
+              <a:rPr lang="en-US" altLang="zh-TW" dirty="0"/>
+              <a:t>Client1.py Run on Terminal.</a:t>
+            </a:r>
+          </a:p>
+        </p:txBody>
+      </p:sp>
+      <p:sp>
+        <p:nvSpPr>
+          <p:cNvPr id="10" name="文字方塊 9"/>
+          <p:cNvSpPr txBox="1"/>
+          <p:nvPr/>
+        </p:nvSpPr>
+        <p:spPr>
+          <a:xfrm>
+            <a:off x="4142565" y="1276280"/>
+            <a:ext cx="3068669" cy="369332"/>
+          </a:xfrm>
+          <a:prstGeom prst="rect">
+            <a:avLst/>
+          </a:prstGeom>
+          <a:noFill/>
+        </p:spPr>
+        <p:txBody>
+          <a:bodyPr wrap="square" rtlCol="0">
+            <a:spAutoFit/>
+          </a:bodyPr>
+          <a:lstStyle/>
+          <a:p>
+            <a:r>
+              <a:rPr lang="en-US" altLang="zh-TW" dirty="0"/>
+              <a:t>Server1.py Run on IDE Shell.</a:t>
+            </a:r>
+          </a:p>
+        </p:txBody>
+      </p:sp>
+      <p:sp>
+        <p:nvSpPr>
+          <p:cNvPr id="12" name="文字方塊 11"/>
+          <p:cNvSpPr txBox="1"/>
+          <p:nvPr/>
+        </p:nvSpPr>
+        <p:spPr>
+          <a:xfrm>
+            <a:off x="4264820" y="5375428"/>
+            <a:ext cx="8595297" cy="646331"/>
+          </a:xfrm>
+          <a:prstGeom prst="rect">
+            <a:avLst/>
+          </a:prstGeom>
+          <a:noFill/>
+        </p:spPr>
+        <p:txBody>
+          <a:bodyPr wrap="square" rtlCol="0">
+            <a:spAutoFit/>
+          </a:bodyPr>
+          <a:lstStyle/>
+          <a:p>
+            <a:r>
+              <a:rPr lang="en-US" altLang="zh-TW" dirty="0"/>
+              <a:t>Client1.py is run on terminal, because </a:t>
+            </a:r>
+            <a:r>
+              <a:rPr lang="en-US" altLang="zh-TW" dirty="0" err="1"/>
+              <a:t>Thonny</a:t>
+            </a:r>
+            <a:r>
+              <a:rPr lang="en-US" altLang="zh-TW" dirty="0"/>
+              <a:t> IDE can’t run two code at same time.</a:t>
+            </a:r>
+          </a:p>
+          <a:p>
+            <a:r>
+              <a:rPr lang="en-US" altLang="zh-TW" dirty="0"/>
+              <a:t>If Client1.py can't run, you may need to change the Python environment.</a:t>
+            </a:r>
+          </a:p>
+        </p:txBody>
+      </p:sp>
+      <p:sp>
+        <p:nvSpPr>
+          <p:cNvPr id="13" name="文字方塊 12"/>
+          <p:cNvSpPr txBox="1"/>
+          <p:nvPr/>
+        </p:nvSpPr>
+        <p:spPr>
+          <a:xfrm>
+            <a:off x="3407458" y="821960"/>
+            <a:ext cx="3803776" cy="369332"/>
+          </a:xfrm>
+          <a:prstGeom prst="rect">
+            <a:avLst/>
+          </a:prstGeom>
+          <a:noFill/>
+        </p:spPr>
+        <p:txBody>
+          <a:bodyPr wrap="square" rtlCol="0">
+            <a:spAutoFit/>
+          </a:bodyPr>
+          <a:lstStyle/>
+          <a:p>
+            <a:r>
+              <a:rPr lang="en-US" altLang="zh-TW" dirty="0"/>
+              <a:t>Step2 Run Server1.py and Client1.py </a:t>
+            </a:r>
+          </a:p>
+        </p:txBody>
+      </p:sp>
+      <p:pic>
+        <p:nvPicPr>
+          <p:cNvPr id="15" name="圖片 14">
+            <a:extLst>
+              <a:ext uri="{FF2B5EF4-FFF2-40B4-BE49-F238E27FC236}">
+                <a16:creationId xmlns:a16="http://schemas.microsoft.com/office/drawing/2014/main" id="{5F890ED5-1EF2-4409-8681-79E48FE94732}"/>
+              </a:ext>
+            </a:extLst>
+          </p:cNvPr>
+          <p:cNvPicPr>
+            <a:picLocks noChangeAspect="1"/>
+          </p:cNvPicPr>
+          <p:nvPr/>
+        </p:nvPicPr>
+        <p:blipFill>
+          <a:blip r:embed="rId2"/>
+          <a:stretch>
+            <a:fillRect/>
+          </a:stretch>
+        </p:blipFill>
+        <p:spPr>
+          <a:xfrm>
+            <a:off x="0" y="1215091"/>
+            <a:ext cx="12192000" cy="4099148"/>
+          </a:xfrm>
+          <a:prstGeom prst="rect">
+            <a:avLst/>
+          </a:prstGeom>
+        </p:spPr>
+      </p:pic>
+    </p:spTree>
+    <p:extLst>
+      <p:ext uri="{BB962C8B-B14F-4D97-AF65-F5344CB8AC3E}">
+        <p14:creationId xmlns:p14="http://schemas.microsoft.com/office/powerpoint/2010/main" val="255708276"/>
       </p:ext>
     </p:extLst>
   </p:cSld>

</xml_diff>

<commit_message>
Teach of Web Server Building for cPanel
</commit_message>
<xml_diff>
--- a/PythonFlask/Teach.pptx
+++ b/PythonFlask/Teach.pptx
@@ -5,7 +5,7 @@
     <p:sldMasterId id="2147483648" r:id="rId1"/>
   </p:sldMasterIdLst>
   <p:notesMasterIdLst>
-    <p:notesMasterId r:id="rId16"/>
+    <p:notesMasterId r:id="rId24"/>
   </p:notesMasterIdLst>
   <p:sldIdLst>
     <p:sldId id="256" r:id="rId2"/>
@@ -22,6 +22,14 @@
     <p:sldId id="268" r:id="rId13"/>
     <p:sldId id="269" r:id="rId14"/>
     <p:sldId id="270" r:id="rId15"/>
+    <p:sldId id="271" r:id="rId16"/>
+    <p:sldId id="272" r:id="rId17"/>
+    <p:sldId id="273" r:id="rId18"/>
+    <p:sldId id="274" r:id="rId19"/>
+    <p:sldId id="275" r:id="rId20"/>
+    <p:sldId id="276" r:id="rId21"/>
+    <p:sldId id="277" r:id="rId22"/>
+    <p:sldId id="278" r:id="rId23"/>
   </p:sldIdLst>
   <p:sldSz cx="12192000" cy="6858000"/>
   <p:notesSz cx="6858000" cy="9144000"/>
@@ -475,6 +483,90 @@
     </a:lvl9pPr>
   </p:notesStyle>
 </p:notesMaster>
+</file>
+
+<file path=ppt/notesSlides/notesSlide1.xml><?xml version="1.0" encoding="utf-8"?>
+<p:notes xmlns:a="http://schemas.openxmlformats.org/drawingml/2006/main" xmlns:r="http://schemas.openxmlformats.org/officeDocument/2006/relationships" xmlns:p="http://schemas.openxmlformats.org/presentationml/2006/main">
+  <p:cSld>
+    <p:spTree>
+      <p:nvGrpSpPr>
+        <p:cNvPr id="1" name=""/>
+        <p:cNvGrpSpPr/>
+        <p:nvPr/>
+      </p:nvGrpSpPr>
+      <p:grpSpPr>
+        <a:xfrm>
+          <a:off x="0" y="0"/>
+          <a:ext cx="0" cy="0"/>
+          <a:chOff x="0" y="0"/>
+          <a:chExt cx="0" cy="0"/>
+        </a:xfrm>
+      </p:grpSpPr>
+      <p:sp>
+        <p:nvSpPr>
+          <p:cNvPr id="2" name="投影片影像版面配置區 1"/>
+          <p:cNvSpPr>
+            <a:spLocks noGrp="1" noRot="1" noChangeAspect="1"/>
+          </p:cNvSpPr>
+          <p:nvPr>
+            <p:ph type="sldImg"/>
+          </p:nvPr>
+        </p:nvSpPr>
+        <p:spPr/>
+      </p:sp>
+      <p:sp>
+        <p:nvSpPr>
+          <p:cNvPr id="3" name="備忘稿版面配置區 2"/>
+          <p:cNvSpPr>
+            <a:spLocks noGrp="1"/>
+          </p:cNvSpPr>
+          <p:nvPr>
+            <p:ph type="body" idx="1"/>
+          </p:nvPr>
+        </p:nvSpPr>
+        <p:spPr/>
+        <p:txBody>
+          <a:bodyPr/>
+          <a:lstStyle/>
+          <a:p>
+            <a:endParaRPr lang="zh-TW" altLang="en-US" dirty="0"/>
+          </a:p>
+        </p:txBody>
+      </p:sp>
+      <p:sp>
+        <p:nvSpPr>
+          <p:cNvPr id="4" name="投影片編號版面配置區 3"/>
+          <p:cNvSpPr>
+            <a:spLocks noGrp="1"/>
+          </p:cNvSpPr>
+          <p:nvPr>
+            <p:ph type="sldNum" sz="quarter" idx="5"/>
+          </p:nvPr>
+        </p:nvSpPr>
+        <p:spPr/>
+        <p:txBody>
+          <a:bodyPr/>
+          <a:lstStyle/>
+          <a:p>
+            <a:fld id="{A9FCBE1C-0420-43B9-B59B-38F9F1B71FEA}" type="slidenum">
+              <a:rPr lang="zh-TW" altLang="en-US" smtClean="0"/>
+              <a:t>15</a:t>
+            </a:fld>
+            <a:endParaRPr lang="zh-TW" altLang="en-US"/>
+          </a:p>
+        </p:txBody>
+      </p:sp>
+    </p:spTree>
+    <p:extLst>
+      <p:ext uri="{BB962C8B-B14F-4D97-AF65-F5344CB8AC3E}">
+        <p14:creationId xmlns:p14="http://schemas.microsoft.com/office/powerpoint/2010/main" val="176359505"/>
+      </p:ext>
+    </p:extLst>
+  </p:cSld>
+  <p:clrMapOvr>
+    <a:masterClrMapping/>
+  </p:clrMapOvr>
+</p:notes>
 </file>
 
 <file path=ppt/slideLayouts/slideLayout1.xml><?xml version="1.0" encoding="utf-8"?>
@@ -5540,7 +5632,7 @@
           <a:p>
             <a:r>
               <a:rPr lang="en-US" altLang="zh-TW" dirty="0"/>
-              <a:t>Step2 Run Server1.py and Client1.py </a:t>
+              <a:t>Step2: Run Server1.py and Client1.py </a:t>
             </a:r>
           </a:p>
         </p:txBody>
@@ -5579,6 +5671,696 @@
     <p:extLst>
       <p:ext uri="{BB962C8B-B14F-4D97-AF65-F5344CB8AC3E}">
         <p14:creationId xmlns:p14="http://schemas.microsoft.com/office/powerpoint/2010/main" val="255708276"/>
+      </p:ext>
+    </p:extLst>
+  </p:cSld>
+  <p:clrMapOvr>
+    <a:masterClrMapping/>
+  </p:clrMapOvr>
+</p:sld>
+</file>
+
+<file path=ppt/slides/slide15.xml><?xml version="1.0" encoding="utf-8"?>
+<p:sld xmlns:a="http://schemas.openxmlformats.org/drawingml/2006/main" xmlns:r="http://schemas.openxmlformats.org/officeDocument/2006/relationships" xmlns:p="http://schemas.openxmlformats.org/presentationml/2006/main">
+  <p:cSld>
+    <p:spTree>
+      <p:nvGrpSpPr>
+        <p:cNvPr id="1" name=""/>
+        <p:cNvGrpSpPr/>
+        <p:nvPr/>
+      </p:nvGrpSpPr>
+      <p:grpSpPr>
+        <a:xfrm>
+          <a:off x="0" y="0"/>
+          <a:ext cx="0" cy="0"/>
+          <a:chOff x="0" y="0"/>
+          <a:chExt cx="0" cy="0"/>
+        </a:xfrm>
+      </p:grpSpPr>
+      <p:sp>
+        <p:nvSpPr>
+          <p:cNvPr id="2" name="標題 1"/>
+          <p:cNvSpPr>
+            <a:spLocks noGrp="1"/>
+          </p:cNvSpPr>
+          <p:nvPr>
+            <p:ph type="title"/>
+          </p:nvPr>
+        </p:nvSpPr>
+        <p:spPr>
+          <a:xfrm>
+            <a:off x="838200" y="0"/>
+            <a:ext cx="11150600" cy="1098958"/>
+          </a:xfrm>
+        </p:spPr>
+        <p:txBody>
+          <a:bodyPr>
+            <a:normAutofit/>
+          </a:bodyPr>
+          <a:lstStyle/>
+          <a:p>
+            <a:r>
+              <a:rPr lang="en-US" altLang="zh-TW" dirty="0"/>
+              <a:t>10.Web Server Building for cPanel</a:t>
+            </a:r>
+            <a:endParaRPr lang="zh-TW" altLang="en-US" dirty="0"/>
+          </a:p>
+        </p:txBody>
+      </p:sp>
+      <p:sp>
+        <p:nvSpPr>
+          <p:cNvPr id="13" name="文字方塊 12"/>
+          <p:cNvSpPr txBox="1"/>
+          <p:nvPr/>
+        </p:nvSpPr>
+        <p:spPr>
+          <a:xfrm>
+            <a:off x="1028311" y="861892"/>
+            <a:ext cx="9047022" cy="369332"/>
+          </a:xfrm>
+          <a:prstGeom prst="rect">
+            <a:avLst/>
+          </a:prstGeom>
+          <a:noFill/>
+        </p:spPr>
+        <p:txBody>
+          <a:bodyPr wrap="square" rtlCol="0">
+            <a:spAutoFit/>
+          </a:bodyPr>
+          <a:lstStyle/>
+          <a:p>
+            <a:r>
+              <a:rPr lang="en-US" altLang="zh-TW" dirty="0"/>
+              <a:t>Step1: Paid and apply for a cloud server.  (My teaching uses bigcloud.com.tw)</a:t>
+            </a:r>
+          </a:p>
+        </p:txBody>
+      </p:sp>
+      <p:sp>
+        <p:nvSpPr>
+          <p:cNvPr id="11" name="文字方塊 10">
+            <a:extLst>
+              <a:ext uri="{FF2B5EF4-FFF2-40B4-BE49-F238E27FC236}">
+                <a16:creationId xmlns:a16="http://schemas.microsoft.com/office/drawing/2014/main" id="{7ED1861A-0CD9-429B-BBEF-48F37C41E0A9}"/>
+              </a:ext>
+            </a:extLst>
+          </p:cNvPr>
+          <p:cNvSpPr txBox="1"/>
+          <p:nvPr/>
+        </p:nvSpPr>
+        <p:spPr>
+          <a:xfrm>
+            <a:off x="1146845" y="5996108"/>
+            <a:ext cx="9817488" cy="646331"/>
+          </a:xfrm>
+          <a:prstGeom prst="rect">
+            <a:avLst/>
+          </a:prstGeom>
+          <a:noFill/>
+        </p:spPr>
+        <p:txBody>
+          <a:bodyPr wrap="square" rtlCol="0">
+            <a:spAutoFit/>
+          </a:bodyPr>
+          <a:lstStyle/>
+          <a:p>
+            <a:r>
+              <a:rPr lang="en-US" altLang="zh-TW" dirty="0"/>
+              <a:t>Not necessarily </a:t>
+            </a:r>
+            <a:r>
+              <a:rPr lang="en-US" altLang="zh-TW" dirty="0" err="1"/>
+              <a:t>Bigcloud</a:t>
+            </a:r>
+            <a:r>
+              <a:rPr lang="en-US" altLang="zh-TW" dirty="0"/>
+              <a:t>, you can use AWS, Azure, firebase or Alibaba Cloud…</a:t>
+            </a:r>
+          </a:p>
+          <a:p>
+            <a:r>
+              <a:rPr lang="en-US" altLang="zh-TW" dirty="0"/>
+              <a:t>But when you want to bid for the R.O.C gov. Project, Data center must for Chunghwa Telecom’s Device.</a:t>
+            </a:r>
+          </a:p>
+        </p:txBody>
+      </p:sp>
+      <p:pic>
+        <p:nvPicPr>
+          <p:cNvPr id="14" name="圖片 13">
+            <a:extLst>
+              <a:ext uri="{FF2B5EF4-FFF2-40B4-BE49-F238E27FC236}">
+                <a16:creationId xmlns:a16="http://schemas.microsoft.com/office/drawing/2014/main" id="{644C801C-D885-489B-A4B3-5C4E614DBD47}"/>
+              </a:ext>
+            </a:extLst>
+          </p:cNvPr>
+          <p:cNvPicPr>
+            <a:picLocks noChangeAspect="1"/>
+          </p:cNvPicPr>
+          <p:nvPr/>
+        </p:nvPicPr>
+        <p:blipFill>
+          <a:blip r:embed="rId3"/>
+          <a:stretch>
+            <a:fillRect/>
+          </a:stretch>
+        </p:blipFill>
+        <p:spPr>
+          <a:xfrm>
+            <a:off x="2062398" y="1247611"/>
+            <a:ext cx="7317513" cy="4732109"/>
+          </a:xfrm>
+          <a:prstGeom prst="rect">
+            <a:avLst/>
+          </a:prstGeom>
+        </p:spPr>
+      </p:pic>
+    </p:spTree>
+    <p:extLst>
+      <p:ext uri="{BB962C8B-B14F-4D97-AF65-F5344CB8AC3E}">
+        <p14:creationId xmlns:p14="http://schemas.microsoft.com/office/powerpoint/2010/main" val="1204840303"/>
+      </p:ext>
+    </p:extLst>
+  </p:cSld>
+  <p:clrMapOvr>
+    <a:masterClrMapping/>
+  </p:clrMapOvr>
+</p:sld>
+</file>
+
+<file path=ppt/slides/slide16.xml><?xml version="1.0" encoding="utf-8"?>
+<p:sld xmlns:a="http://schemas.openxmlformats.org/drawingml/2006/main" xmlns:r="http://schemas.openxmlformats.org/officeDocument/2006/relationships" xmlns:p="http://schemas.openxmlformats.org/presentationml/2006/main">
+  <p:cSld>
+    <p:spTree>
+      <p:nvGrpSpPr>
+        <p:cNvPr id="1" name=""/>
+        <p:cNvGrpSpPr/>
+        <p:nvPr/>
+      </p:nvGrpSpPr>
+      <p:grpSpPr>
+        <a:xfrm>
+          <a:off x="0" y="0"/>
+          <a:ext cx="0" cy="0"/>
+          <a:chOff x="0" y="0"/>
+          <a:chExt cx="0" cy="0"/>
+        </a:xfrm>
+      </p:grpSpPr>
+      <p:sp>
+        <p:nvSpPr>
+          <p:cNvPr id="2" name="標題 1"/>
+          <p:cNvSpPr>
+            <a:spLocks noGrp="1"/>
+          </p:cNvSpPr>
+          <p:nvPr>
+            <p:ph type="title"/>
+          </p:nvPr>
+        </p:nvSpPr>
+        <p:spPr>
+          <a:xfrm>
+            <a:off x="838200" y="0"/>
+            <a:ext cx="11150600" cy="1098958"/>
+          </a:xfrm>
+        </p:spPr>
+        <p:txBody>
+          <a:bodyPr>
+            <a:normAutofit/>
+          </a:bodyPr>
+          <a:lstStyle/>
+          <a:p>
+            <a:r>
+              <a:rPr lang="en-US" altLang="zh-TW" dirty="0"/>
+              <a:t>10.Web Server Building for cPanel</a:t>
+            </a:r>
+            <a:endParaRPr lang="zh-TW" altLang="en-US" dirty="0"/>
+          </a:p>
+        </p:txBody>
+      </p:sp>
+      <p:sp>
+        <p:nvSpPr>
+          <p:cNvPr id="13" name="文字方塊 12"/>
+          <p:cNvSpPr txBox="1"/>
+          <p:nvPr/>
+        </p:nvSpPr>
+        <p:spPr>
+          <a:xfrm>
+            <a:off x="1028311" y="861892"/>
+            <a:ext cx="9047022" cy="369332"/>
+          </a:xfrm>
+          <a:prstGeom prst="rect">
+            <a:avLst/>
+          </a:prstGeom>
+          <a:noFill/>
+        </p:spPr>
+        <p:txBody>
+          <a:bodyPr wrap="square" rtlCol="0">
+            <a:spAutoFit/>
+          </a:bodyPr>
+          <a:lstStyle/>
+          <a:p>
+            <a:r>
+              <a:rPr lang="en-US" altLang="zh-TW" dirty="0"/>
+              <a:t>Step2: Create</a:t>
+            </a:r>
+            <a:r>
+              <a:rPr lang="zh-TW" altLang="en-US" dirty="0"/>
+              <a:t> </a:t>
+            </a:r>
+            <a:r>
+              <a:rPr lang="en-US" altLang="zh-TW" dirty="0"/>
+              <a:t>python server</a:t>
+            </a:r>
+            <a:r>
+              <a:rPr lang="zh-TW" altLang="en-US" dirty="0"/>
+              <a:t> </a:t>
+            </a:r>
+            <a:r>
+              <a:rPr lang="en-US" altLang="zh-TW" dirty="0"/>
+              <a:t>on cPanel.</a:t>
+            </a:r>
+          </a:p>
+        </p:txBody>
+      </p:sp>
+      <p:pic>
+        <p:nvPicPr>
+          <p:cNvPr id="10" name="圖片 9">
+            <a:extLst>
+              <a:ext uri="{FF2B5EF4-FFF2-40B4-BE49-F238E27FC236}">
+                <a16:creationId xmlns:a16="http://schemas.microsoft.com/office/drawing/2014/main" id="{FFB9FA8C-8430-4E84-80F5-8FD59771BE3E}"/>
+              </a:ext>
+            </a:extLst>
+          </p:cNvPr>
+          <p:cNvPicPr>
+            <a:picLocks noChangeAspect="1"/>
+          </p:cNvPicPr>
+          <p:nvPr/>
+        </p:nvPicPr>
+        <p:blipFill>
+          <a:blip r:embed="rId2"/>
+          <a:stretch>
+            <a:fillRect/>
+          </a:stretch>
+        </p:blipFill>
+        <p:spPr>
+          <a:xfrm>
+            <a:off x="0" y="1231224"/>
+            <a:ext cx="12192000" cy="4870643"/>
+          </a:xfrm>
+          <a:prstGeom prst="rect">
+            <a:avLst/>
+          </a:prstGeom>
+        </p:spPr>
+      </p:pic>
+    </p:spTree>
+    <p:extLst>
+      <p:ext uri="{BB962C8B-B14F-4D97-AF65-F5344CB8AC3E}">
+        <p14:creationId xmlns:p14="http://schemas.microsoft.com/office/powerpoint/2010/main" val="1413768136"/>
+      </p:ext>
+    </p:extLst>
+  </p:cSld>
+  <p:clrMapOvr>
+    <a:masterClrMapping/>
+  </p:clrMapOvr>
+</p:sld>
+</file>
+
+<file path=ppt/slides/slide17.xml><?xml version="1.0" encoding="utf-8"?>
+<p:sld xmlns:a="http://schemas.openxmlformats.org/drawingml/2006/main" xmlns:r="http://schemas.openxmlformats.org/officeDocument/2006/relationships" xmlns:p="http://schemas.openxmlformats.org/presentationml/2006/main">
+  <p:cSld>
+    <p:spTree>
+      <p:nvGrpSpPr>
+        <p:cNvPr id="1" name=""/>
+        <p:cNvGrpSpPr/>
+        <p:nvPr/>
+      </p:nvGrpSpPr>
+      <p:grpSpPr>
+        <a:xfrm>
+          <a:off x="0" y="0"/>
+          <a:ext cx="0" cy="0"/>
+          <a:chOff x="0" y="0"/>
+          <a:chExt cx="0" cy="0"/>
+        </a:xfrm>
+      </p:grpSpPr>
+      <p:sp>
+        <p:nvSpPr>
+          <p:cNvPr id="2" name="標題 1"/>
+          <p:cNvSpPr>
+            <a:spLocks noGrp="1"/>
+          </p:cNvSpPr>
+          <p:nvPr>
+            <p:ph type="title"/>
+          </p:nvPr>
+        </p:nvSpPr>
+        <p:spPr>
+          <a:xfrm>
+            <a:off x="838200" y="0"/>
+            <a:ext cx="11150600" cy="1098958"/>
+          </a:xfrm>
+        </p:spPr>
+        <p:txBody>
+          <a:bodyPr>
+            <a:normAutofit/>
+          </a:bodyPr>
+          <a:lstStyle/>
+          <a:p>
+            <a:r>
+              <a:rPr lang="en-US" altLang="zh-TW" dirty="0"/>
+              <a:t>10.Web Server Building for cPanel</a:t>
+            </a:r>
+            <a:endParaRPr lang="zh-TW" altLang="en-US" dirty="0"/>
+          </a:p>
+        </p:txBody>
+      </p:sp>
+      <p:pic>
+        <p:nvPicPr>
+          <p:cNvPr id="11" name="圖片 10">
+            <a:extLst>
+              <a:ext uri="{FF2B5EF4-FFF2-40B4-BE49-F238E27FC236}">
+                <a16:creationId xmlns:a16="http://schemas.microsoft.com/office/drawing/2014/main" id="{2A788BF9-0427-4C86-9174-081889A94EF9}"/>
+              </a:ext>
+            </a:extLst>
+          </p:cNvPr>
+          <p:cNvPicPr>
+            <a:picLocks noChangeAspect="1"/>
+          </p:cNvPicPr>
+          <p:nvPr/>
+        </p:nvPicPr>
+        <p:blipFill>
+          <a:blip r:embed="rId2"/>
+          <a:stretch>
+            <a:fillRect/>
+          </a:stretch>
+        </p:blipFill>
+        <p:spPr>
+          <a:xfrm>
+            <a:off x="355600" y="1231224"/>
+            <a:ext cx="11252200" cy="5574661"/>
+          </a:xfrm>
+          <a:prstGeom prst="rect">
+            <a:avLst/>
+          </a:prstGeom>
+        </p:spPr>
+      </p:pic>
+      <p:sp>
+        <p:nvSpPr>
+          <p:cNvPr id="14" name="文字方塊 13">
+            <a:extLst>
+              <a:ext uri="{FF2B5EF4-FFF2-40B4-BE49-F238E27FC236}">
+                <a16:creationId xmlns:a16="http://schemas.microsoft.com/office/drawing/2014/main" id="{3C90CFE4-542F-497B-9176-4AC2D38C63F4}"/>
+              </a:ext>
+            </a:extLst>
+          </p:cNvPr>
+          <p:cNvSpPr txBox="1"/>
+          <p:nvPr/>
+        </p:nvSpPr>
+        <p:spPr>
+          <a:xfrm>
+            <a:off x="1028311" y="861892"/>
+            <a:ext cx="9047022" cy="369332"/>
+          </a:xfrm>
+          <a:prstGeom prst="rect">
+            <a:avLst/>
+          </a:prstGeom>
+          <a:noFill/>
+        </p:spPr>
+        <p:txBody>
+          <a:bodyPr wrap="square" rtlCol="0">
+            <a:spAutoFit/>
+          </a:bodyPr>
+          <a:lstStyle/>
+          <a:p>
+            <a:r>
+              <a:rPr lang="en-US" altLang="zh-TW" dirty="0"/>
+              <a:t>Step2: Create</a:t>
+            </a:r>
+            <a:r>
+              <a:rPr lang="zh-TW" altLang="en-US" dirty="0"/>
+              <a:t> </a:t>
+            </a:r>
+            <a:r>
+              <a:rPr lang="en-US" altLang="zh-TW" dirty="0"/>
+              <a:t>python server</a:t>
+            </a:r>
+            <a:r>
+              <a:rPr lang="zh-TW" altLang="en-US" dirty="0"/>
+              <a:t> </a:t>
+            </a:r>
+            <a:r>
+              <a:rPr lang="en-US" altLang="zh-TW" dirty="0"/>
+              <a:t>on cPanel.</a:t>
+            </a:r>
+          </a:p>
+        </p:txBody>
+      </p:sp>
+    </p:spTree>
+    <p:extLst>
+      <p:ext uri="{BB962C8B-B14F-4D97-AF65-F5344CB8AC3E}">
+        <p14:creationId xmlns:p14="http://schemas.microsoft.com/office/powerpoint/2010/main" val="932852051"/>
+      </p:ext>
+    </p:extLst>
+  </p:cSld>
+  <p:clrMapOvr>
+    <a:masterClrMapping/>
+  </p:clrMapOvr>
+</p:sld>
+</file>
+
+<file path=ppt/slides/slide18.xml><?xml version="1.0" encoding="utf-8"?>
+<p:sld xmlns:a="http://schemas.openxmlformats.org/drawingml/2006/main" xmlns:r="http://schemas.openxmlformats.org/officeDocument/2006/relationships" xmlns:p="http://schemas.openxmlformats.org/presentationml/2006/main">
+  <p:cSld>
+    <p:spTree>
+      <p:nvGrpSpPr>
+        <p:cNvPr id="1" name=""/>
+        <p:cNvGrpSpPr/>
+        <p:nvPr/>
+      </p:nvGrpSpPr>
+      <p:grpSpPr>
+        <a:xfrm>
+          <a:off x="0" y="0"/>
+          <a:ext cx="0" cy="0"/>
+          <a:chOff x="0" y="0"/>
+          <a:chExt cx="0" cy="0"/>
+        </a:xfrm>
+      </p:grpSpPr>
+      <p:sp>
+        <p:nvSpPr>
+          <p:cNvPr id="2" name="標題 1"/>
+          <p:cNvSpPr>
+            <a:spLocks noGrp="1"/>
+          </p:cNvSpPr>
+          <p:nvPr>
+            <p:ph type="title"/>
+          </p:nvPr>
+        </p:nvSpPr>
+        <p:spPr>
+          <a:xfrm>
+            <a:off x="838200" y="0"/>
+            <a:ext cx="11150600" cy="1098958"/>
+          </a:xfrm>
+        </p:spPr>
+        <p:txBody>
+          <a:bodyPr>
+            <a:normAutofit/>
+          </a:bodyPr>
+          <a:lstStyle/>
+          <a:p>
+            <a:r>
+              <a:rPr lang="en-US" altLang="zh-TW" dirty="0"/>
+              <a:t>10.Web Server Building for cPanel</a:t>
+            </a:r>
+            <a:endParaRPr lang="zh-TW" altLang="en-US" dirty="0"/>
+          </a:p>
+        </p:txBody>
+      </p:sp>
+      <p:sp>
+        <p:nvSpPr>
+          <p:cNvPr id="13" name="文字方塊 12"/>
+          <p:cNvSpPr txBox="1"/>
+          <p:nvPr/>
+        </p:nvSpPr>
+        <p:spPr>
+          <a:xfrm>
+            <a:off x="1028311" y="861892"/>
+            <a:ext cx="9047022" cy="369332"/>
+          </a:xfrm>
+          <a:prstGeom prst="rect">
+            <a:avLst/>
+          </a:prstGeom>
+          <a:noFill/>
+        </p:spPr>
+        <p:txBody>
+          <a:bodyPr wrap="square" rtlCol="0">
+            <a:spAutoFit/>
+          </a:bodyPr>
+          <a:lstStyle/>
+          <a:p>
+            <a:r>
+              <a:rPr lang="en-US" altLang="zh-TW" dirty="0"/>
+              <a:t>Step3: upload and Create app root of files &amp; folders.</a:t>
+            </a:r>
+          </a:p>
+        </p:txBody>
+      </p:sp>
+      <p:pic>
+        <p:nvPicPr>
+          <p:cNvPr id="6" name="圖片 5">
+            <a:extLst>
+              <a:ext uri="{FF2B5EF4-FFF2-40B4-BE49-F238E27FC236}">
+                <a16:creationId xmlns:a16="http://schemas.microsoft.com/office/drawing/2014/main" id="{DC13ADBF-3719-4BCC-9E61-278117DE593B}"/>
+              </a:ext>
+            </a:extLst>
+          </p:cNvPr>
+          <p:cNvPicPr>
+            <a:picLocks noChangeAspect="1"/>
+          </p:cNvPicPr>
+          <p:nvPr/>
+        </p:nvPicPr>
+        <p:blipFill>
+          <a:blip r:embed="rId2"/>
+          <a:stretch>
+            <a:fillRect/>
+          </a:stretch>
+        </p:blipFill>
+        <p:spPr>
+          <a:xfrm>
+            <a:off x="0" y="1231224"/>
+            <a:ext cx="12192000" cy="5304018"/>
+          </a:xfrm>
+          <a:prstGeom prst="rect">
+            <a:avLst/>
+          </a:prstGeom>
+        </p:spPr>
+      </p:pic>
+    </p:spTree>
+    <p:extLst>
+      <p:ext uri="{BB962C8B-B14F-4D97-AF65-F5344CB8AC3E}">
+        <p14:creationId xmlns:p14="http://schemas.microsoft.com/office/powerpoint/2010/main" val="3953544752"/>
+      </p:ext>
+    </p:extLst>
+  </p:cSld>
+  <p:clrMapOvr>
+    <a:masterClrMapping/>
+  </p:clrMapOvr>
+</p:sld>
+</file>
+
+<file path=ppt/slides/slide19.xml><?xml version="1.0" encoding="utf-8"?>
+<p:sld xmlns:a="http://schemas.openxmlformats.org/drawingml/2006/main" xmlns:r="http://schemas.openxmlformats.org/officeDocument/2006/relationships" xmlns:p="http://schemas.openxmlformats.org/presentationml/2006/main">
+  <p:cSld>
+    <p:spTree>
+      <p:nvGrpSpPr>
+        <p:cNvPr id="1" name=""/>
+        <p:cNvGrpSpPr/>
+        <p:nvPr/>
+      </p:nvGrpSpPr>
+      <p:grpSpPr>
+        <a:xfrm>
+          <a:off x="0" y="0"/>
+          <a:ext cx="0" cy="0"/>
+          <a:chOff x="0" y="0"/>
+          <a:chExt cx="0" cy="0"/>
+        </a:xfrm>
+      </p:grpSpPr>
+      <p:sp>
+        <p:nvSpPr>
+          <p:cNvPr id="2" name="標題 1"/>
+          <p:cNvSpPr>
+            <a:spLocks noGrp="1"/>
+          </p:cNvSpPr>
+          <p:nvPr>
+            <p:ph type="title"/>
+          </p:nvPr>
+        </p:nvSpPr>
+        <p:spPr>
+          <a:xfrm>
+            <a:off x="838200" y="0"/>
+            <a:ext cx="11150600" cy="1098958"/>
+          </a:xfrm>
+        </p:spPr>
+        <p:txBody>
+          <a:bodyPr>
+            <a:normAutofit/>
+          </a:bodyPr>
+          <a:lstStyle/>
+          <a:p>
+            <a:r>
+              <a:rPr lang="en-US" altLang="zh-TW" dirty="0"/>
+              <a:t>10.Web Server Building for cPanel</a:t>
+            </a:r>
+            <a:endParaRPr lang="zh-TW" altLang="en-US" dirty="0"/>
+          </a:p>
+        </p:txBody>
+      </p:sp>
+      <p:sp>
+        <p:nvSpPr>
+          <p:cNvPr id="13" name="文字方塊 12"/>
+          <p:cNvSpPr txBox="1"/>
+          <p:nvPr/>
+        </p:nvSpPr>
+        <p:spPr>
+          <a:xfrm>
+            <a:off x="1028311" y="861892"/>
+            <a:ext cx="9047022" cy="369332"/>
+          </a:xfrm>
+          <a:prstGeom prst="rect">
+            <a:avLst/>
+          </a:prstGeom>
+          <a:noFill/>
+        </p:spPr>
+        <p:txBody>
+          <a:bodyPr wrap="square" rtlCol="0">
+            <a:spAutoFit/>
+          </a:bodyPr>
+          <a:lstStyle/>
+          <a:p>
+            <a:r>
+              <a:rPr lang="en-US" altLang="zh-TW" dirty="0"/>
+              <a:t>Step4:updata python server</a:t>
+            </a:r>
+            <a:r>
+              <a:rPr lang="zh-TW" altLang="en-US" dirty="0"/>
+              <a:t> </a:t>
+            </a:r>
+            <a:r>
+              <a:rPr lang="en-US" altLang="zh-TW" dirty="0"/>
+              <a:t>environmental from requirements.txt</a:t>
+            </a:r>
+          </a:p>
+        </p:txBody>
+      </p:sp>
+      <p:pic>
+        <p:nvPicPr>
+          <p:cNvPr id="7" name="圖片 6">
+            <a:extLst>
+              <a:ext uri="{FF2B5EF4-FFF2-40B4-BE49-F238E27FC236}">
+                <a16:creationId xmlns:a16="http://schemas.microsoft.com/office/drawing/2014/main" id="{5E9274D0-5DD3-48D0-9F29-FD5A9E4E7671}"/>
+              </a:ext>
+            </a:extLst>
+          </p:cNvPr>
+          <p:cNvPicPr>
+            <a:picLocks noChangeAspect="1"/>
+          </p:cNvPicPr>
+          <p:nvPr/>
+        </p:nvPicPr>
+        <p:blipFill>
+          <a:blip r:embed="rId2"/>
+          <a:stretch>
+            <a:fillRect/>
+          </a:stretch>
+        </p:blipFill>
+        <p:spPr>
+          <a:xfrm>
+            <a:off x="0" y="1409235"/>
+            <a:ext cx="12192000" cy="4970863"/>
+          </a:xfrm>
+          <a:prstGeom prst="rect">
+            <a:avLst/>
+          </a:prstGeom>
+        </p:spPr>
+      </p:pic>
+    </p:spTree>
+    <p:extLst>
+      <p:ext uri="{BB962C8B-B14F-4D97-AF65-F5344CB8AC3E}">
+        <p14:creationId xmlns:p14="http://schemas.microsoft.com/office/powerpoint/2010/main" val="3531104175"/>
       </p:ext>
     </p:extLst>
   </p:cSld>
@@ -5788,6 +6570,1664 @@
     <p:extLst>
       <p:ext uri="{BB962C8B-B14F-4D97-AF65-F5344CB8AC3E}">
         <p14:creationId xmlns:p14="http://schemas.microsoft.com/office/powerpoint/2010/main" val="3303869585"/>
+      </p:ext>
+    </p:extLst>
+  </p:cSld>
+  <p:clrMapOvr>
+    <a:masterClrMapping/>
+  </p:clrMapOvr>
+</p:sld>
+</file>
+
+<file path=ppt/slides/slide20.xml><?xml version="1.0" encoding="utf-8"?>
+<p:sld xmlns:a="http://schemas.openxmlformats.org/drawingml/2006/main" xmlns:r="http://schemas.openxmlformats.org/officeDocument/2006/relationships" xmlns:p="http://schemas.openxmlformats.org/presentationml/2006/main">
+  <p:cSld>
+    <p:spTree>
+      <p:nvGrpSpPr>
+        <p:cNvPr id="1" name=""/>
+        <p:cNvGrpSpPr/>
+        <p:nvPr/>
+      </p:nvGrpSpPr>
+      <p:grpSpPr>
+        <a:xfrm>
+          <a:off x="0" y="0"/>
+          <a:ext cx="0" cy="0"/>
+          <a:chOff x="0" y="0"/>
+          <a:chExt cx="0" cy="0"/>
+        </a:xfrm>
+      </p:grpSpPr>
+      <p:sp>
+        <p:nvSpPr>
+          <p:cNvPr id="2" name="標題 1"/>
+          <p:cNvSpPr>
+            <a:spLocks noGrp="1"/>
+          </p:cNvSpPr>
+          <p:nvPr>
+            <p:ph type="title"/>
+          </p:nvPr>
+        </p:nvSpPr>
+        <p:spPr>
+          <a:xfrm>
+            <a:off x="838200" y="0"/>
+            <a:ext cx="11150600" cy="1098958"/>
+          </a:xfrm>
+        </p:spPr>
+        <p:txBody>
+          <a:bodyPr>
+            <a:normAutofit/>
+          </a:bodyPr>
+          <a:lstStyle/>
+          <a:p>
+            <a:r>
+              <a:rPr lang="en-US" altLang="zh-TW" dirty="0"/>
+              <a:t>10.Web Server Building for cPanel</a:t>
+            </a:r>
+            <a:endParaRPr lang="zh-TW" altLang="en-US" dirty="0"/>
+          </a:p>
+        </p:txBody>
+      </p:sp>
+      <p:sp>
+        <p:nvSpPr>
+          <p:cNvPr id="13" name="文字方塊 12"/>
+          <p:cNvSpPr txBox="1"/>
+          <p:nvPr/>
+        </p:nvSpPr>
+        <p:spPr>
+          <a:xfrm>
+            <a:off x="1028311" y="861892"/>
+            <a:ext cx="9047022" cy="369332"/>
+          </a:xfrm>
+          <a:prstGeom prst="rect">
+            <a:avLst/>
+          </a:prstGeom>
+          <a:noFill/>
+        </p:spPr>
+        <p:txBody>
+          <a:bodyPr wrap="square" rtlCol="0">
+            <a:spAutoFit/>
+          </a:bodyPr>
+          <a:lstStyle/>
+          <a:p>
+            <a:r>
+              <a:rPr lang="en-US" altLang="zh-TW" dirty="0"/>
+              <a:t>Step5:Run Server</a:t>
+            </a:r>
+          </a:p>
+        </p:txBody>
+      </p:sp>
+      <p:pic>
+        <p:nvPicPr>
+          <p:cNvPr id="8" name="圖片 7">
+            <a:extLst>
+              <a:ext uri="{FF2B5EF4-FFF2-40B4-BE49-F238E27FC236}">
+                <a16:creationId xmlns:a16="http://schemas.microsoft.com/office/drawing/2014/main" id="{520E9839-2AF1-4B79-B8C0-ABB4F6BB70AB}"/>
+              </a:ext>
+            </a:extLst>
+          </p:cNvPr>
+          <p:cNvPicPr>
+            <a:picLocks noChangeAspect="1"/>
+          </p:cNvPicPr>
+          <p:nvPr/>
+        </p:nvPicPr>
+        <p:blipFill>
+          <a:blip r:embed="rId2"/>
+          <a:stretch>
+            <a:fillRect/>
+          </a:stretch>
+        </p:blipFill>
+        <p:spPr>
+          <a:xfrm>
+            <a:off x="127000" y="1403177"/>
+            <a:ext cx="11768667" cy="4325781"/>
+          </a:xfrm>
+          <a:prstGeom prst="rect">
+            <a:avLst/>
+          </a:prstGeom>
+        </p:spPr>
+      </p:pic>
+    </p:spTree>
+    <p:extLst>
+      <p:ext uri="{BB962C8B-B14F-4D97-AF65-F5344CB8AC3E}">
+        <p14:creationId xmlns:p14="http://schemas.microsoft.com/office/powerpoint/2010/main" val="405182351"/>
+      </p:ext>
+    </p:extLst>
+  </p:cSld>
+  <p:clrMapOvr>
+    <a:masterClrMapping/>
+  </p:clrMapOvr>
+</p:sld>
+</file>
+
+<file path=ppt/slides/slide21.xml><?xml version="1.0" encoding="utf-8"?>
+<p:sld xmlns:a="http://schemas.openxmlformats.org/drawingml/2006/main" xmlns:r="http://schemas.openxmlformats.org/officeDocument/2006/relationships" xmlns:p="http://schemas.openxmlformats.org/presentationml/2006/main">
+  <p:cSld>
+    <p:spTree>
+      <p:nvGrpSpPr>
+        <p:cNvPr id="1" name=""/>
+        <p:cNvGrpSpPr/>
+        <p:nvPr/>
+      </p:nvGrpSpPr>
+      <p:grpSpPr>
+        <a:xfrm>
+          <a:off x="0" y="0"/>
+          <a:ext cx="0" cy="0"/>
+          <a:chOff x="0" y="0"/>
+          <a:chExt cx="0" cy="0"/>
+        </a:xfrm>
+      </p:grpSpPr>
+      <p:sp>
+        <p:nvSpPr>
+          <p:cNvPr id="2" name="標題 1"/>
+          <p:cNvSpPr>
+            <a:spLocks noGrp="1"/>
+          </p:cNvSpPr>
+          <p:nvPr>
+            <p:ph type="title"/>
+          </p:nvPr>
+        </p:nvSpPr>
+        <p:spPr>
+          <a:xfrm>
+            <a:off x="838200" y="0"/>
+            <a:ext cx="11150600" cy="1098958"/>
+          </a:xfrm>
+        </p:spPr>
+        <p:txBody>
+          <a:bodyPr>
+            <a:normAutofit/>
+          </a:bodyPr>
+          <a:lstStyle/>
+          <a:p>
+            <a:r>
+              <a:rPr lang="en-US" altLang="zh-TW" dirty="0"/>
+              <a:t>10.Web Server Building for cPanel</a:t>
+            </a:r>
+            <a:endParaRPr lang="zh-TW" altLang="en-US" dirty="0"/>
+          </a:p>
+        </p:txBody>
+      </p:sp>
+      <p:sp>
+        <p:nvSpPr>
+          <p:cNvPr id="13" name="文字方塊 12"/>
+          <p:cNvSpPr txBox="1"/>
+          <p:nvPr/>
+        </p:nvSpPr>
+        <p:spPr>
+          <a:xfrm>
+            <a:off x="838200" y="847412"/>
+            <a:ext cx="3831557" cy="369332"/>
+          </a:xfrm>
+          <a:prstGeom prst="rect">
+            <a:avLst/>
+          </a:prstGeom>
+          <a:noFill/>
+        </p:spPr>
+        <p:txBody>
+          <a:bodyPr wrap="square" rtlCol="0">
+            <a:spAutoFit/>
+          </a:bodyPr>
+          <a:lstStyle/>
+          <a:p>
+            <a:r>
+              <a:rPr lang="en-US" altLang="zh-TW" dirty="0"/>
+              <a:t>Step6: Client1.py Code &amp; Test Run</a:t>
+            </a:r>
+          </a:p>
+        </p:txBody>
+      </p:sp>
+      <p:sp>
+        <p:nvSpPr>
+          <p:cNvPr id="20" name="文字方塊 19">
+            <a:extLst>
+              <a:ext uri="{FF2B5EF4-FFF2-40B4-BE49-F238E27FC236}">
+                <a16:creationId xmlns:a16="http://schemas.microsoft.com/office/drawing/2014/main" id="{5FE14693-66EF-4F50-B2D3-8F2C74DC68E4}"/>
+              </a:ext>
+            </a:extLst>
+          </p:cNvPr>
+          <p:cNvSpPr txBox="1"/>
+          <p:nvPr/>
+        </p:nvSpPr>
+        <p:spPr>
+          <a:xfrm>
+            <a:off x="330590" y="1428410"/>
+            <a:ext cx="4339167" cy="3139321"/>
+          </a:xfrm>
+          <a:prstGeom prst="rect">
+            <a:avLst/>
+          </a:prstGeom>
+          <a:solidFill>
+            <a:schemeClr val="bg1">
+              <a:lumMod val="95000"/>
+            </a:schemeClr>
+          </a:solidFill>
+        </p:spPr>
+        <p:txBody>
+          <a:bodyPr wrap="square">
+            <a:spAutoFit/>
+          </a:bodyPr>
+          <a:lstStyle/>
+          <a:p>
+            <a:r>
+              <a:rPr lang="zh-TW" altLang="en-US" dirty="0"/>
+              <a:t>import requests</a:t>
+            </a:r>
+          </a:p>
+          <a:p>
+            <a:r>
+              <a:rPr lang="zh-TW" altLang="en-US" dirty="0"/>
+              <a:t>url = 'http://wiciar.com/bmi/submit'</a:t>
+            </a:r>
+          </a:p>
+          <a:p>
+            <a:r>
+              <a:rPr lang="zh-TW" altLang="en-US" dirty="0"/>
+              <a:t>payload = {'name': 'wiki',</a:t>
+            </a:r>
+          </a:p>
+          <a:p>
+            <a:r>
+              <a:rPr lang="zh-TW" altLang="en-US" dirty="0"/>
+              <a:t>           'password': 'abc123',</a:t>
+            </a:r>
+          </a:p>
+          <a:p>
+            <a:r>
+              <a:rPr lang="zh-TW" altLang="en-US" dirty="0"/>
+              <a:t>           'birthday':'1990-04-24',</a:t>
+            </a:r>
+          </a:p>
+          <a:p>
+            <a:r>
+              <a:rPr lang="zh-TW" altLang="en-US" dirty="0"/>
+              <a:t>           'gender':'male',</a:t>
+            </a:r>
+          </a:p>
+          <a:p>
+            <a:r>
+              <a:rPr lang="zh-TW" altLang="en-US" dirty="0"/>
+              <a:t>           'height':1.88,</a:t>
+            </a:r>
+          </a:p>
+          <a:p>
+            <a:r>
+              <a:rPr lang="zh-TW" altLang="en-US" dirty="0"/>
+              <a:t>           'weight':44}</a:t>
+            </a:r>
+          </a:p>
+          <a:p>
+            <a:r>
+              <a:rPr lang="zh-TW" altLang="en-US" dirty="0"/>
+              <a:t>response = requests.post(url, json=payload)</a:t>
+            </a:r>
+          </a:p>
+          <a:p>
+            <a:r>
+              <a:rPr lang="zh-TW" altLang="en-US" dirty="0"/>
+              <a:t>print('Status Code:', response.status_code)</a:t>
+            </a:r>
+          </a:p>
+          <a:p>
+            <a:r>
+              <a:rPr lang="zh-TW" altLang="en-US" dirty="0"/>
+              <a:t>print('Response JSON:', response.json())</a:t>
+            </a:r>
+          </a:p>
+        </p:txBody>
+      </p:sp>
+      <p:pic>
+        <p:nvPicPr>
+          <p:cNvPr id="22" name="圖片 21">
+            <a:extLst>
+              <a:ext uri="{FF2B5EF4-FFF2-40B4-BE49-F238E27FC236}">
+                <a16:creationId xmlns:a16="http://schemas.microsoft.com/office/drawing/2014/main" id="{B6B24B65-F0F4-42F9-B831-E34BDF95E960}"/>
+              </a:ext>
+            </a:extLst>
+          </p:cNvPr>
+          <p:cNvPicPr>
+            <a:picLocks noChangeAspect="1"/>
+          </p:cNvPicPr>
+          <p:nvPr/>
+        </p:nvPicPr>
+        <p:blipFill>
+          <a:blip r:embed="rId2"/>
+          <a:stretch>
+            <a:fillRect/>
+          </a:stretch>
+        </p:blipFill>
+        <p:spPr>
+          <a:xfrm>
+            <a:off x="5001444" y="871101"/>
+            <a:ext cx="6655669" cy="4642189"/>
+          </a:xfrm>
+          <a:prstGeom prst="rect">
+            <a:avLst/>
+          </a:prstGeom>
+        </p:spPr>
+      </p:pic>
+    </p:spTree>
+    <p:extLst>
+      <p:ext uri="{BB962C8B-B14F-4D97-AF65-F5344CB8AC3E}">
+        <p14:creationId xmlns:p14="http://schemas.microsoft.com/office/powerpoint/2010/main" val="3441155849"/>
+      </p:ext>
+    </p:extLst>
+  </p:cSld>
+  <p:clrMapOvr>
+    <a:masterClrMapping/>
+  </p:clrMapOvr>
+</p:sld>
+</file>
+
+<file path=ppt/slides/slide22.xml><?xml version="1.0" encoding="utf-8"?>
+<p:sld xmlns:a="http://schemas.openxmlformats.org/drawingml/2006/main" xmlns:r="http://schemas.openxmlformats.org/officeDocument/2006/relationships" xmlns:p="http://schemas.openxmlformats.org/presentationml/2006/main">
+  <p:cSld>
+    <p:spTree>
+      <p:nvGrpSpPr>
+        <p:cNvPr id="1" name=""/>
+        <p:cNvGrpSpPr/>
+        <p:nvPr/>
+      </p:nvGrpSpPr>
+      <p:grpSpPr>
+        <a:xfrm>
+          <a:off x="0" y="0"/>
+          <a:ext cx="0" cy="0"/>
+          <a:chOff x="0" y="0"/>
+          <a:chExt cx="0" cy="0"/>
+        </a:xfrm>
+      </p:grpSpPr>
+      <p:sp>
+        <p:nvSpPr>
+          <p:cNvPr id="2" name="標題 1"/>
+          <p:cNvSpPr>
+            <a:spLocks noGrp="1"/>
+          </p:cNvSpPr>
+          <p:nvPr>
+            <p:ph type="title"/>
+          </p:nvPr>
+        </p:nvSpPr>
+        <p:spPr>
+          <a:xfrm>
+            <a:off x="838200" y="0"/>
+            <a:ext cx="11150600" cy="1098958"/>
+          </a:xfrm>
+        </p:spPr>
+        <p:txBody>
+          <a:bodyPr>
+            <a:normAutofit/>
+          </a:bodyPr>
+          <a:lstStyle/>
+          <a:p>
+            <a:r>
+              <a:rPr lang="en-US" altLang="zh-TW" dirty="0"/>
+              <a:t>10.Web Server Building for cPanel</a:t>
+            </a:r>
+            <a:endParaRPr lang="zh-TW" altLang="en-US" dirty="0"/>
+          </a:p>
+        </p:txBody>
+      </p:sp>
+      <p:sp>
+        <p:nvSpPr>
+          <p:cNvPr id="13" name="文字方塊 12"/>
+          <p:cNvSpPr txBox="1"/>
+          <p:nvPr/>
+        </p:nvSpPr>
+        <p:spPr>
+          <a:xfrm>
+            <a:off x="9706643" y="364813"/>
+            <a:ext cx="2375289" cy="369332"/>
+          </a:xfrm>
+          <a:prstGeom prst="rect">
+            <a:avLst/>
+          </a:prstGeom>
+          <a:noFill/>
+        </p:spPr>
+        <p:txBody>
+          <a:bodyPr wrap="square" rtlCol="0">
+            <a:spAutoFit/>
+          </a:bodyPr>
+          <a:lstStyle/>
+          <a:p>
+            <a:r>
+              <a:rPr lang="en-US" altLang="zh-TW" dirty="0"/>
+              <a:t>Server1.py  Code</a:t>
+            </a:r>
+          </a:p>
+        </p:txBody>
+      </p:sp>
+      <p:sp>
+        <p:nvSpPr>
+          <p:cNvPr id="7" name="文字方塊 6">
+            <a:extLst>
+              <a:ext uri="{FF2B5EF4-FFF2-40B4-BE49-F238E27FC236}">
+                <a16:creationId xmlns:a16="http://schemas.microsoft.com/office/drawing/2014/main" id="{D7287385-39A0-4F67-B983-424BB891EC44}"/>
+              </a:ext>
+            </a:extLst>
+          </p:cNvPr>
+          <p:cNvSpPr txBox="1"/>
+          <p:nvPr/>
+        </p:nvSpPr>
+        <p:spPr>
+          <a:xfrm>
+            <a:off x="127005" y="793414"/>
+            <a:ext cx="5173133" cy="5786199"/>
+          </a:xfrm>
+          <a:prstGeom prst="rect">
+            <a:avLst/>
+          </a:prstGeom>
+          <a:solidFill>
+            <a:schemeClr val="bg1">
+              <a:lumMod val="95000"/>
+            </a:schemeClr>
+          </a:solidFill>
+        </p:spPr>
+        <p:txBody>
+          <a:bodyPr wrap="square">
+            <a:spAutoFit/>
+          </a:bodyPr>
+          <a:lstStyle/>
+          <a:p>
+            <a:r>
+              <a:rPr lang="en-US" altLang="zh-TW" sz="1000" dirty="0"/>
+              <a:t>from flask import Flask, request, </a:t>
+            </a:r>
+            <a:r>
+              <a:rPr lang="en-US" altLang="zh-TW" sz="1000" dirty="0" err="1"/>
+              <a:t>jsonify</a:t>
+            </a:r>
+            <a:endParaRPr lang="en-US" altLang="zh-TW" sz="1000" dirty="0"/>
+          </a:p>
+          <a:p>
+            <a:r>
+              <a:rPr lang="en-US" altLang="zh-TW" sz="1000" dirty="0"/>
+              <a:t>from datetime import datetime</a:t>
+            </a:r>
+          </a:p>
+          <a:p>
+            <a:r>
+              <a:rPr lang="en-US" altLang="zh-TW" sz="1000" dirty="0"/>
+              <a:t>import math</a:t>
+            </a:r>
+          </a:p>
+          <a:p>
+            <a:r>
+              <a:rPr lang="en-US" altLang="zh-TW" sz="1000" dirty="0"/>
+              <a:t>import pandas as pd</a:t>
+            </a:r>
+          </a:p>
+          <a:p>
+            <a:r>
+              <a:rPr lang="en-US" altLang="zh-TW" sz="1000" dirty="0"/>
+              <a:t>import </a:t>
+            </a:r>
+            <a:r>
+              <a:rPr lang="en-US" altLang="zh-TW" sz="1000" dirty="0" err="1"/>
+              <a:t>os</a:t>
+            </a:r>
+            <a:endParaRPr lang="en-US" altLang="zh-TW" sz="1000" dirty="0"/>
+          </a:p>
+          <a:p>
+            <a:endParaRPr lang="en-US" altLang="zh-TW" sz="1000" dirty="0"/>
+          </a:p>
+          <a:p>
+            <a:r>
+              <a:rPr lang="en-US" altLang="zh-TW" sz="1000" dirty="0"/>
+              <a:t>app = Flask(__name__)</a:t>
+            </a:r>
+          </a:p>
+          <a:p>
+            <a:endParaRPr lang="en-US" altLang="zh-TW" sz="1000" dirty="0"/>
+          </a:p>
+          <a:p>
+            <a:r>
+              <a:rPr lang="en-US" altLang="zh-TW" sz="1000" dirty="0"/>
+              <a:t># GET Method</a:t>
+            </a:r>
+          </a:p>
+          <a:p>
+            <a:r>
+              <a:rPr lang="en-US" altLang="zh-TW" sz="1000" dirty="0"/>
+              <a:t>@app.route('/')</a:t>
+            </a:r>
+          </a:p>
+          <a:p>
+            <a:r>
+              <a:rPr lang="en-US" altLang="zh-TW" sz="1000" dirty="0"/>
+              <a:t>def hello():</a:t>
+            </a:r>
+          </a:p>
+          <a:p>
+            <a:r>
+              <a:rPr lang="en-US" altLang="zh-TW" sz="1000" dirty="0"/>
+              <a:t>    return 'Hello BMI...'</a:t>
+            </a:r>
+          </a:p>
+          <a:p>
+            <a:endParaRPr lang="en-US" altLang="zh-TW" sz="1000" dirty="0"/>
+          </a:p>
+          <a:p>
+            <a:r>
+              <a:rPr lang="en-US" altLang="zh-TW" sz="1000" dirty="0"/>
+              <a:t># POST Method</a:t>
+            </a:r>
+          </a:p>
+          <a:p>
+            <a:r>
+              <a:rPr lang="en-US" altLang="zh-TW" sz="1000" dirty="0"/>
+              <a:t>@app.route('/submit', methods=['POST'])</a:t>
+            </a:r>
+          </a:p>
+          <a:p>
+            <a:r>
+              <a:rPr lang="en-US" altLang="zh-TW" sz="1000" dirty="0"/>
+              <a:t>def </a:t>
+            </a:r>
+            <a:r>
+              <a:rPr lang="en-US" altLang="zh-TW" sz="1000" dirty="0" err="1"/>
+              <a:t>submit_form</a:t>
+            </a:r>
+            <a:r>
+              <a:rPr lang="en-US" altLang="zh-TW" sz="1000" dirty="0"/>
+              <a:t>():</a:t>
+            </a:r>
+          </a:p>
+          <a:p>
+            <a:r>
+              <a:rPr lang="en-US" altLang="zh-TW" sz="1000" dirty="0"/>
+              <a:t>    data = </a:t>
+            </a:r>
+            <a:r>
+              <a:rPr lang="en-US" altLang="zh-TW" sz="1000" dirty="0" err="1"/>
+              <a:t>request.get_json</a:t>
+            </a:r>
+            <a:r>
+              <a:rPr lang="en-US" altLang="zh-TW" sz="1000" dirty="0"/>
+              <a:t>()</a:t>
+            </a:r>
+          </a:p>
+          <a:p>
+            <a:r>
+              <a:rPr lang="en-US" altLang="zh-TW" sz="1000" dirty="0"/>
+              <a:t>    name = </a:t>
+            </a:r>
+            <a:r>
+              <a:rPr lang="en-US" altLang="zh-TW" sz="1000" dirty="0" err="1"/>
+              <a:t>data.get</a:t>
+            </a:r>
+            <a:r>
+              <a:rPr lang="en-US" altLang="zh-TW" sz="1000" dirty="0"/>
+              <a:t>('name')</a:t>
+            </a:r>
+          </a:p>
+          <a:p>
+            <a:r>
+              <a:rPr lang="en-US" altLang="zh-TW" sz="1000" dirty="0"/>
+              <a:t>    password = </a:t>
+            </a:r>
+            <a:r>
+              <a:rPr lang="en-US" altLang="zh-TW" sz="1000" dirty="0" err="1"/>
+              <a:t>data.get</a:t>
+            </a:r>
+            <a:r>
+              <a:rPr lang="en-US" altLang="zh-TW" sz="1000" dirty="0"/>
+              <a:t>('password')</a:t>
+            </a:r>
+          </a:p>
+          <a:p>
+            <a:r>
+              <a:rPr lang="en-US" altLang="zh-TW" sz="1000" dirty="0"/>
+              <a:t>    birthday = </a:t>
+            </a:r>
+            <a:r>
+              <a:rPr lang="en-US" altLang="zh-TW" sz="1000" dirty="0" err="1"/>
+              <a:t>datetime.strptime</a:t>
+            </a:r>
+            <a:r>
+              <a:rPr lang="en-US" altLang="zh-TW" sz="1000" dirty="0"/>
+              <a:t>((f"{</a:t>
+            </a:r>
+            <a:r>
+              <a:rPr lang="en-US" altLang="zh-TW" sz="1000" dirty="0" err="1"/>
+              <a:t>data.get</a:t>
+            </a:r>
+            <a:r>
+              <a:rPr lang="en-US" altLang="zh-TW" sz="1000" dirty="0"/>
+              <a:t>('birthday')}"), "%Y-%m-%d")</a:t>
+            </a:r>
+          </a:p>
+          <a:p>
+            <a:r>
+              <a:rPr lang="en-US" altLang="zh-TW" sz="1000" dirty="0"/>
+              <a:t>    gender = </a:t>
+            </a:r>
+            <a:r>
+              <a:rPr lang="en-US" altLang="zh-TW" sz="1000" dirty="0" err="1"/>
+              <a:t>data.get</a:t>
+            </a:r>
+            <a:r>
+              <a:rPr lang="en-US" altLang="zh-TW" sz="1000" dirty="0"/>
+              <a:t>('gender')</a:t>
+            </a:r>
+          </a:p>
+          <a:p>
+            <a:r>
+              <a:rPr lang="en-US" altLang="zh-TW" sz="1000" dirty="0"/>
+              <a:t>    height = </a:t>
+            </a:r>
+            <a:r>
+              <a:rPr lang="en-US" altLang="zh-TW" sz="1000" dirty="0" err="1"/>
+              <a:t>data.get</a:t>
+            </a:r>
+            <a:r>
+              <a:rPr lang="en-US" altLang="zh-TW" sz="1000" dirty="0"/>
+              <a:t>('height')</a:t>
+            </a:r>
+          </a:p>
+          <a:p>
+            <a:r>
+              <a:rPr lang="en-US" altLang="zh-TW" sz="1000" dirty="0"/>
+              <a:t>    weight = </a:t>
+            </a:r>
+            <a:r>
+              <a:rPr lang="en-US" altLang="zh-TW" sz="1000" dirty="0" err="1"/>
+              <a:t>data.get</a:t>
+            </a:r>
+            <a:r>
+              <a:rPr lang="en-US" altLang="zh-TW" sz="1000" dirty="0"/>
+              <a:t>('weight')</a:t>
+            </a:r>
+          </a:p>
+          <a:p>
+            <a:r>
+              <a:rPr lang="en-US" altLang="zh-TW" sz="1000" dirty="0"/>
+              <a:t>    </a:t>
+            </a:r>
+            <a:r>
+              <a:rPr lang="en-US" altLang="zh-TW" sz="1000" dirty="0" err="1"/>
+              <a:t>bmi</a:t>
+            </a:r>
+            <a:r>
+              <a:rPr lang="en-US" altLang="zh-TW" sz="1000" dirty="0"/>
+              <a:t> = round(weight / height **2,2)# </a:t>
+            </a:r>
+            <a:r>
+              <a:rPr lang="en-US" altLang="zh-TW" sz="1000" dirty="0" err="1"/>
+              <a:t>bmi</a:t>
+            </a:r>
+            <a:r>
+              <a:rPr lang="en-US" altLang="zh-TW" sz="1000" dirty="0"/>
+              <a:t> count</a:t>
+            </a:r>
+          </a:p>
+          <a:p>
+            <a:r>
+              <a:rPr lang="en-US" altLang="zh-TW" sz="1000" dirty="0"/>
+              <a:t>    today = </a:t>
+            </a:r>
+            <a:r>
+              <a:rPr lang="en-US" altLang="zh-TW" sz="1000" dirty="0" err="1"/>
+              <a:t>datetime.today</a:t>
+            </a:r>
+            <a:r>
+              <a:rPr lang="en-US" altLang="zh-TW" sz="1000" dirty="0"/>
+              <a:t>()</a:t>
+            </a:r>
+          </a:p>
+          <a:p>
+            <a:r>
+              <a:rPr lang="en-US" altLang="zh-TW" sz="1000" dirty="0"/>
+              <a:t>    age = </a:t>
+            </a:r>
+            <a:r>
+              <a:rPr lang="en-US" altLang="zh-TW" sz="1000" dirty="0" err="1"/>
+              <a:t>today.year</a:t>
+            </a:r>
+            <a:r>
+              <a:rPr lang="en-US" altLang="zh-TW" sz="1000" dirty="0"/>
+              <a:t> - </a:t>
+            </a:r>
+            <a:r>
+              <a:rPr lang="en-US" altLang="zh-TW" sz="1000" dirty="0" err="1"/>
+              <a:t>birthday.year</a:t>
+            </a:r>
+            <a:r>
+              <a:rPr lang="en-US" altLang="zh-TW" sz="1000" dirty="0"/>
+              <a:t> - ((</a:t>
+            </a:r>
+            <a:r>
+              <a:rPr lang="en-US" altLang="zh-TW" sz="1000" dirty="0" err="1"/>
+              <a:t>today.month</a:t>
+            </a:r>
+            <a:r>
+              <a:rPr lang="en-US" altLang="zh-TW" sz="1000" dirty="0"/>
+              <a:t>, </a:t>
+            </a:r>
+            <a:r>
+              <a:rPr lang="en-US" altLang="zh-TW" sz="1000" dirty="0" err="1"/>
+              <a:t>today.day</a:t>
+            </a:r>
+            <a:r>
+              <a:rPr lang="en-US" altLang="zh-TW" sz="1000" dirty="0"/>
+              <a:t>) &lt; (</a:t>
+            </a:r>
+            <a:r>
+              <a:rPr lang="en-US" altLang="zh-TW" sz="1000" dirty="0" err="1"/>
+              <a:t>birthday.month</a:t>
+            </a:r>
+            <a:r>
+              <a:rPr lang="en-US" altLang="zh-TW" sz="1000" dirty="0"/>
+              <a:t>, </a:t>
+            </a:r>
+            <a:r>
+              <a:rPr lang="en-US" altLang="zh-TW" sz="1000" dirty="0" err="1"/>
+              <a:t>birthday.day</a:t>
+            </a:r>
+            <a:r>
+              <a:rPr lang="en-US" altLang="zh-TW" sz="1000" dirty="0"/>
+              <a:t>))</a:t>
+            </a:r>
+          </a:p>
+          <a:p>
+            <a:r>
+              <a:rPr lang="en-US" altLang="zh-TW" sz="1000" dirty="0"/>
+              <a:t>    df = </a:t>
+            </a:r>
+            <a:r>
+              <a:rPr lang="en-US" altLang="zh-TW" sz="1000" dirty="0" err="1"/>
+              <a:t>pd.read_csv</a:t>
+            </a:r>
+            <a:r>
+              <a:rPr lang="en-US" altLang="zh-TW" sz="1000" dirty="0"/>
+              <a:t>('BMI_Normal.csv')</a:t>
+            </a:r>
+          </a:p>
+          <a:p>
+            <a:r>
+              <a:rPr lang="en-US" altLang="zh-TW" sz="1000" dirty="0"/>
+              <a:t>    </a:t>
+            </a:r>
+            <a:r>
+              <a:rPr lang="en-US" altLang="zh-TW" sz="1000" dirty="0" err="1"/>
+              <a:t>matched_rows</a:t>
+            </a:r>
+            <a:r>
+              <a:rPr lang="en-US" altLang="zh-TW" sz="1000" dirty="0"/>
+              <a:t> = df[df['age'] == age].</a:t>
+            </a:r>
+            <a:r>
+              <a:rPr lang="en-US" altLang="zh-TW" sz="1000" dirty="0" err="1"/>
+              <a:t>iloc</a:t>
+            </a:r>
+            <a:r>
+              <a:rPr lang="en-US" altLang="zh-TW" sz="1000" dirty="0"/>
+              <a:t>[0]</a:t>
+            </a:r>
+          </a:p>
+          <a:p>
+            <a:r>
+              <a:rPr lang="en-US" altLang="zh-TW" sz="1000" dirty="0"/>
+              <a:t>    #print(matched_rows)</a:t>
+            </a:r>
+          </a:p>
+          <a:p>
+            <a:r>
+              <a:rPr lang="en-US" altLang="zh-TW" sz="1000" dirty="0"/>
+              <a:t>    </a:t>
+            </a:r>
+            <a:r>
+              <a:rPr lang="en-US" altLang="zh-TW" sz="1000" dirty="0" err="1"/>
+              <a:t>bmi_judge</a:t>
+            </a:r>
+            <a:r>
+              <a:rPr lang="en-US" altLang="zh-TW" sz="1000" dirty="0"/>
+              <a:t> = 'wrong data'</a:t>
+            </a:r>
+          </a:p>
+          <a:p>
+            <a:r>
+              <a:rPr lang="en-US" altLang="zh-TW" sz="1000" dirty="0"/>
+              <a:t>    if gender=='male':</a:t>
+            </a:r>
+          </a:p>
+          <a:p>
+            <a:r>
+              <a:rPr lang="en-US" altLang="zh-TW" sz="1000" dirty="0"/>
+              <a:t>        if </a:t>
+            </a:r>
+            <a:r>
+              <a:rPr lang="en-US" altLang="zh-TW" sz="1000" dirty="0" err="1"/>
+              <a:t>bmi</a:t>
+            </a:r>
+            <a:r>
+              <a:rPr lang="en-US" altLang="zh-TW" sz="1000" dirty="0"/>
+              <a:t>&lt;</a:t>
+            </a:r>
+            <a:r>
+              <a:rPr lang="en-US" altLang="zh-TW" sz="1000" dirty="0" err="1"/>
+              <a:t>matched_rows</a:t>
+            </a:r>
+            <a:r>
+              <a:rPr lang="en-US" altLang="zh-TW" sz="1000" dirty="0"/>
+              <a:t>['</a:t>
+            </a:r>
+            <a:r>
+              <a:rPr lang="en-US" altLang="zh-TW" sz="1000" dirty="0" err="1"/>
+              <a:t>male_min</a:t>
+            </a:r>
+            <a:r>
+              <a:rPr lang="en-US" altLang="zh-TW" sz="1000" dirty="0"/>
+              <a:t>']:</a:t>
+            </a:r>
+          </a:p>
+          <a:p>
+            <a:r>
+              <a:rPr lang="en-US" altLang="zh-TW" sz="1000" dirty="0"/>
+              <a:t>            </a:t>
+            </a:r>
+            <a:r>
+              <a:rPr lang="en-US" altLang="zh-TW" sz="1000" dirty="0" err="1"/>
+              <a:t>bmi_judge</a:t>
+            </a:r>
+            <a:r>
+              <a:rPr lang="en-US" altLang="zh-TW" sz="1000" dirty="0"/>
+              <a:t>='Too thin'</a:t>
+            </a:r>
+          </a:p>
+          <a:p>
+            <a:r>
+              <a:rPr lang="en-US" altLang="zh-TW" sz="1000" dirty="0"/>
+              <a:t>        </a:t>
+            </a:r>
+            <a:r>
+              <a:rPr lang="en-US" altLang="zh-TW" sz="1000" dirty="0" err="1"/>
+              <a:t>elif</a:t>
+            </a:r>
+            <a:r>
+              <a:rPr lang="en-US" altLang="zh-TW" sz="1000" dirty="0"/>
+              <a:t> </a:t>
+            </a:r>
+            <a:r>
+              <a:rPr lang="en-US" altLang="zh-TW" sz="1000" dirty="0" err="1"/>
+              <a:t>bmi</a:t>
+            </a:r>
+            <a:r>
+              <a:rPr lang="en-US" altLang="zh-TW" sz="1000" dirty="0"/>
+              <a:t>&gt;=</a:t>
+            </a:r>
+            <a:r>
+              <a:rPr lang="en-US" altLang="zh-TW" sz="1000" dirty="0" err="1"/>
+              <a:t>matched_rows</a:t>
+            </a:r>
+            <a:r>
+              <a:rPr lang="en-US" altLang="zh-TW" sz="1000" dirty="0"/>
+              <a:t>['</a:t>
+            </a:r>
+            <a:r>
+              <a:rPr lang="en-US" altLang="zh-TW" sz="1000" dirty="0" err="1"/>
+              <a:t>male_min</a:t>
+            </a:r>
+            <a:r>
+              <a:rPr lang="en-US" altLang="zh-TW" sz="1000" dirty="0"/>
+              <a:t>'] and </a:t>
+            </a:r>
+            <a:r>
+              <a:rPr lang="en-US" altLang="zh-TW" sz="1000" dirty="0" err="1"/>
+              <a:t>bmi</a:t>
+            </a:r>
+            <a:r>
+              <a:rPr lang="en-US" altLang="zh-TW" sz="1000" dirty="0"/>
+              <a:t>&lt;=</a:t>
+            </a:r>
+            <a:r>
+              <a:rPr lang="en-US" altLang="zh-TW" sz="1000" dirty="0" err="1"/>
+              <a:t>matched_rows</a:t>
+            </a:r>
+            <a:r>
+              <a:rPr lang="en-US" altLang="zh-TW" sz="1000" dirty="0"/>
+              <a:t>['</a:t>
+            </a:r>
+            <a:r>
+              <a:rPr lang="en-US" altLang="zh-TW" sz="1000" dirty="0" err="1"/>
+              <a:t>male_max</a:t>
+            </a:r>
+            <a:r>
+              <a:rPr lang="en-US" altLang="zh-TW" sz="1000" dirty="0"/>
+              <a:t>']:</a:t>
+            </a:r>
+          </a:p>
+          <a:p>
+            <a:r>
+              <a:rPr lang="en-US" altLang="zh-TW" sz="1000" dirty="0"/>
+              <a:t>            </a:t>
+            </a:r>
+            <a:r>
+              <a:rPr lang="en-US" altLang="zh-TW" sz="1000" dirty="0" err="1"/>
+              <a:t>bmi_judge</a:t>
+            </a:r>
+            <a:r>
+              <a:rPr lang="en-US" altLang="zh-TW" sz="1000" dirty="0"/>
+              <a:t>='Normal'</a:t>
+            </a:r>
+          </a:p>
+          <a:p>
+            <a:r>
+              <a:rPr lang="en-US" altLang="zh-TW" sz="1000" dirty="0"/>
+              <a:t>        else:</a:t>
+            </a:r>
+          </a:p>
+          <a:p>
+            <a:r>
+              <a:rPr lang="en-US" altLang="zh-TW" sz="1000" dirty="0"/>
+              <a:t>            </a:t>
+            </a:r>
+            <a:r>
+              <a:rPr lang="en-US" altLang="zh-TW" sz="1000" dirty="0" err="1"/>
+              <a:t>bmi_judge</a:t>
+            </a:r>
+            <a:r>
+              <a:rPr lang="en-US" altLang="zh-TW" sz="1000" dirty="0"/>
+              <a:t>='Too fat'</a:t>
+            </a:r>
+            <a:endParaRPr lang="zh-TW" altLang="en-US" sz="1000" dirty="0"/>
+          </a:p>
+        </p:txBody>
+      </p:sp>
+      <p:sp>
+        <p:nvSpPr>
+          <p:cNvPr id="9" name="文字方塊 8">
+            <a:extLst>
+              <a:ext uri="{FF2B5EF4-FFF2-40B4-BE49-F238E27FC236}">
+                <a16:creationId xmlns:a16="http://schemas.microsoft.com/office/drawing/2014/main" id="{3564425C-597D-4EAF-955A-71A024873500}"/>
+              </a:ext>
+            </a:extLst>
+          </p:cNvPr>
+          <p:cNvSpPr txBox="1"/>
+          <p:nvPr/>
+        </p:nvSpPr>
+        <p:spPr>
+          <a:xfrm>
+            <a:off x="5765800" y="910854"/>
+            <a:ext cx="6096000" cy="5940088"/>
+          </a:xfrm>
+          <a:prstGeom prst="rect">
+            <a:avLst/>
+          </a:prstGeom>
+          <a:solidFill>
+            <a:schemeClr val="bg1">
+              <a:lumMod val="95000"/>
+            </a:schemeClr>
+          </a:solidFill>
+        </p:spPr>
+        <p:txBody>
+          <a:bodyPr wrap="square">
+            <a:spAutoFit/>
+          </a:bodyPr>
+          <a:lstStyle/>
+          <a:p>
+            <a:r>
+              <a:rPr lang="en-US" altLang="zh-TW" sz="1000" dirty="0"/>
+              <a:t> </a:t>
+            </a:r>
+            <a:r>
+              <a:rPr lang="en-US" altLang="zh-TW" sz="1000" dirty="0" err="1"/>
+              <a:t>elif</a:t>
+            </a:r>
+            <a:r>
+              <a:rPr lang="en-US" altLang="zh-TW" sz="1000" dirty="0"/>
+              <a:t> gender=='female':</a:t>
+            </a:r>
+          </a:p>
+          <a:p>
+            <a:r>
+              <a:rPr lang="en-US" altLang="zh-TW" sz="1000" dirty="0"/>
+              <a:t>        if </a:t>
+            </a:r>
+            <a:r>
+              <a:rPr lang="en-US" altLang="zh-TW" sz="1000" dirty="0" err="1"/>
+              <a:t>bmi</a:t>
+            </a:r>
+            <a:r>
+              <a:rPr lang="en-US" altLang="zh-TW" sz="1000" dirty="0"/>
+              <a:t>&lt;</a:t>
+            </a:r>
+            <a:r>
+              <a:rPr lang="en-US" altLang="zh-TW" sz="1000" dirty="0" err="1"/>
+              <a:t>matched_rows</a:t>
+            </a:r>
+            <a:r>
+              <a:rPr lang="en-US" altLang="zh-TW" sz="1000" dirty="0"/>
+              <a:t>['</a:t>
+            </a:r>
+            <a:r>
+              <a:rPr lang="en-US" altLang="zh-TW" sz="1000" dirty="0" err="1"/>
+              <a:t>female_min</a:t>
+            </a:r>
+            <a:r>
+              <a:rPr lang="en-US" altLang="zh-TW" sz="1000" dirty="0"/>
+              <a:t>']:</a:t>
+            </a:r>
+          </a:p>
+          <a:p>
+            <a:r>
+              <a:rPr lang="en-US" altLang="zh-TW" sz="1000" dirty="0"/>
+              <a:t>            </a:t>
+            </a:r>
+            <a:r>
+              <a:rPr lang="en-US" altLang="zh-TW" sz="1000" dirty="0" err="1"/>
+              <a:t>bmi_judge</a:t>
+            </a:r>
+            <a:r>
+              <a:rPr lang="en-US" altLang="zh-TW" sz="1000" dirty="0"/>
+              <a:t>='Too thin'</a:t>
+            </a:r>
+          </a:p>
+          <a:p>
+            <a:r>
+              <a:rPr lang="en-US" altLang="zh-TW" sz="1000" dirty="0"/>
+              <a:t>        </a:t>
+            </a:r>
+            <a:r>
+              <a:rPr lang="en-US" altLang="zh-TW" sz="1000" dirty="0" err="1"/>
+              <a:t>elif</a:t>
+            </a:r>
+            <a:r>
+              <a:rPr lang="en-US" altLang="zh-TW" sz="1000" dirty="0"/>
+              <a:t> </a:t>
+            </a:r>
+            <a:r>
+              <a:rPr lang="en-US" altLang="zh-TW" sz="1000" dirty="0" err="1"/>
+              <a:t>bmi</a:t>
+            </a:r>
+            <a:r>
+              <a:rPr lang="en-US" altLang="zh-TW" sz="1000" dirty="0"/>
+              <a:t>&gt;=</a:t>
+            </a:r>
+            <a:r>
+              <a:rPr lang="en-US" altLang="zh-TW" sz="1000" dirty="0" err="1"/>
+              <a:t>matched_rows</a:t>
+            </a:r>
+            <a:r>
+              <a:rPr lang="en-US" altLang="zh-TW" sz="1000" dirty="0"/>
+              <a:t>['</a:t>
+            </a:r>
+            <a:r>
+              <a:rPr lang="en-US" altLang="zh-TW" sz="1000" dirty="0" err="1"/>
+              <a:t>female_min</a:t>
+            </a:r>
+            <a:r>
+              <a:rPr lang="en-US" altLang="zh-TW" sz="1000" dirty="0"/>
+              <a:t>'] and </a:t>
+            </a:r>
+            <a:r>
+              <a:rPr lang="en-US" altLang="zh-TW" sz="1000" dirty="0" err="1"/>
+              <a:t>bmi</a:t>
+            </a:r>
+            <a:r>
+              <a:rPr lang="en-US" altLang="zh-TW" sz="1000" dirty="0"/>
+              <a:t>&lt;=</a:t>
+            </a:r>
+            <a:r>
+              <a:rPr lang="en-US" altLang="zh-TW" sz="1000" dirty="0" err="1"/>
+              <a:t>matched_rows</a:t>
+            </a:r>
+            <a:r>
+              <a:rPr lang="en-US" altLang="zh-TW" sz="1000" dirty="0"/>
+              <a:t>['</a:t>
+            </a:r>
+            <a:r>
+              <a:rPr lang="en-US" altLang="zh-TW" sz="1000" dirty="0" err="1"/>
+              <a:t>female_max</a:t>
+            </a:r>
+            <a:r>
+              <a:rPr lang="en-US" altLang="zh-TW" sz="1000" dirty="0"/>
+              <a:t>']:</a:t>
+            </a:r>
+          </a:p>
+          <a:p>
+            <a:r>
+              <a:rPr lang="en-US" altLang="zh-TW" sz="1000" dirty="0"/>
+              <a:t>            </a:t>
+            </a:r>
+            <a:r>
+              <a:rPr lang="en-US" altLang="zh-TW" sz="1000" dirty="0" err="1"/>
+              <a:t>bmi_judge</a:t>
+            </a:r>
+            <a:r>
+              <a:rPr lang="en-US" altLang="zh-TW" sz="1000" dirty="0"/>
+              <a:t>='Normal'</a:t>
+            </a:r>
+          </a:p>
+          <a:p>
+            <a:r>
+              <a:rPr lang="en-US" altLang="zh-TW" sz="1000" dirty="0"/>
+              <a:t>        else:</a:t>
+            </a:r>
+          </a:p>
+          <a:p>
+            <a:r>
+              <a:rPr lang="en-US" altLang="zh-TW" sz="1000" dirty="0"/>
+              <a:t>            </a:t>
+            </a:r>
+            <a:r>
+              <a:rPr lang="en-US" altLang="zh-TW" sz="1000" dirty="0" err="1"/>
+              <a:t>bmi_judge</a:t>
+            </a:r>
+            <a:r>
+              <a:rPr lang="en-US" altLang="zh-TW" sz="1000" dirty="0"/>
+              <a:t>='Too fat'</a:t>
+            </a:r>
+          </a:p>
+          <a:p>
+            <a:r>
+              <a:rPr lang="en-US" altLang="zh-TW" sz="1000" dirty="0"/>
+              <a:t>    filename = </a:t>
+            </a:r>
+            <a:r>
+              <a:rPr lang="en-US" altLang="zh-TW" sz="1000" dirty="0" err="1"/>
+              <a:t>f"UserData</a:t>
+            </a:r>
+            <a:r>
+              <a:rPr lang="en-US" altLang="zh-TW" sz="1000" dirty="0"/>
+              <a:t>//{name}.csv"</a:t>
+            </a:r>
+          </a:p>
+          <a:p>
+            <a:r>
+              <a:rPr lang="en-US" altLang="zh-TW" sz="1000" dirty="0"/>
+              <a:t>    if </a:t>
+            </a:r>
+            <a:r>
+              <a:rPr lang="en-US" altLang="zh-TW" sz="1000" dirty="0" err="1"/>
+              <a:t>os.path.exists</a:t>
+            </a:r>
+            <a:r>
+              <a:rPr lang="en-US" altLang="zh-TW" sz="1000" dirty="0"/>
+              <a:t>(filename): # file exists</a:t>
+            </a:r>
+          </a:p>
+          <a:p>
+            <a:r>
+              <a:rPr lang="en-US" altLang="zh-TW" sz="1000" dirty="0"/>
+              <a:t>        </a:t>
+            </a:r>
+            <a:r>
+              <a:rPr lang="en-US" altLang="zh-TW" sz="1000" dirty="0" err="1"/>
+              <a:t>load_df</a:t>
+            </a:r>
+            <a:r>
+              <a:rPr lang="en-US" altLang="zh-TW" sz="1000" dirty="0"/>
+              <a:t> = </a:t>
+            </a:r>
+            <a:r>
+              <a:rPr lang="en-US" altLang="zh-TW" sz="1000" dirty="0" err="1"/>
+              <a:t>pd.read_csv</a:t>
+            </a:r>
+            <a:r>
+              <a:rPr lang="en-US" altLang="zh-TW" sz="1000" dirty="0"/>
+              <a:t>(filename)# file load</a:t>
+            </a:r>
+          </a:p>
+          <a:p>
+            <a:r>
+              <a:rPr lang="en-US" altLang="zh-TW" sz="1000" dirty="0"/>
+              <a:t>        </a:t>
+            </a:r>
+            <a:r>
+              <a:rPr lang="en-US" altLang="zh-TW" sz="1000" dirty="0" err="1"/>
+              <a:t>stored_password</a:t>
+            </a:r>
+            <a:r>
+              <a:rPr lang="en-US" altLang="zh-TW" sz="1000" dirty="0"/>
+              <a:t> = str(</a:t>
+            </a:r>
+            <a:r>
+              <a:rPr lang="en-US" altLang="zh-TW" sz="1000" dirty="0" err="1"/>
+              <a:t>load_df.iloc</a:t>
+            </a:r>
+            <a:r>
+              <a:rPr lang="en-US" altLang="zh-TW" sz="1000" dirty="0"/>
+              <a:t>[0]['password'])# password load</a:t>
+            </a:r>
+          </a:p>
+          <a:p>
+            <a:r>
+              <a:rPr lang="en-US" altLang="zh-TW" sz="1000" dirty="0"/>
+              <a:t>        if </a:t>
+            </a:r>
+            <a:r>
+              <a:rPr lang="en-US" altLang="zh-TW" sz="1000" dirty="0" err="1"/>
+              <a:t>stored_password</a:t>
+            </a:r>
+            <a:r>
+              <a:rPr lang="en-US" altLang="zh-TW" sz="1000" dirty="0"/>
+              <a:t> != password:# password incorrect</a:t>
+            </a:r>
+          </a:p>
+          <a:p>
+            <a:r>
+              <a:rPr lang="en-US" altLang="zh-TW" sz="1000" dirty="0"/>
+              <a:t>            return </a:t>
+            </a:r>
+            <a:r>
+              <a:rPr lang="en-US" altLang="zh-TW" sz="1000" dirty="0" err="1"/>
+              <a:t>jsonify</a:t>
+            </a:r>
+            <a:r>
+              <a:rPr lang="en-US" altLang="zh-TW" sz="1000" dirty="0"/>
+              <a:t>(message="password error!"), 403</a:t>
+            </a:r>
+          </a:p>
+          <a:p>
+            <a:r>
+              <a:rPr lang="en-US" altLang="zh-TW" sz="1000" dirty="0"/>
+              <a:t>        else:# password correct</a:t>
+            </a:r>
+          </a:p>
+          <a:p>
+            <a:r>
+              <a:rPr lang="en-US" altLang="zh-TW" sz="1000" dirty="0"/>
+              <a:t>            </a:t>
+            </a:r>
+            <a:r>
+              <a:rPr lang="en-US" altLang="zh-TW" sz="1000" dirty="0" err="1"/>
+              <a:t>user_data</a:t>
+            </a:r>
+            <a:r>
+              <a:rPr lang="en-US" altLang="zh-TW" sz="1000" dirty="0"/>
+              <a:t> = { #Save Data</a:t>
+            </a:r>
+          </a:p>
+          <a:p>
+            <a:r>
+              <a:rPr lang="en-US" altLang="zh-TW" sz="1000" dirty="0"/>
+              <a:t>                'height': height,</a:t>
+            </a:r>
+          </a:p>
+          <a:p>
+            <a:r>
+              <a:rPr lang="en-US" altLang="zh-TW" sz="1000" dirty="0"/>
+              <a:t>                'weight': weight,</a:t>
+            </a:r>
+          </a:p>
+          <a:p>
+            <a:r>
+              <a:rPr lang="en-US" altLang="zh-TW" sz="1000" dirty="0"/>
+              <a:t>                '</a:t>
+            </a:r>
+            <a:r>
+              <a:rPr lang="en-US" altLang="zh-TW" sz="1000" dirty="0" err="1"/>
+              <a:t>bmi</a:t>
+            </a:r>
+            <a:r>
+              <a:rPr lang="en-US" altLang="zh-TW" sz="1000" dirty="0"/>
+              <a:t>': </a:t>
+            </a:r>
+            <a:r>
+              <a:rPr lang="en-US" altLang="zh-TW" sz="1000" dirty="0" err="1"/>
+              <a:t>bmi</a:t>
+            </a:r>
+            <a:r>
+              <a:rPr lang="en-US" altLang="zh-TW" sz="1000" dirty="0"/>
+              <a:t>,</a:t>
+            </a:r>
+          </a:p>
+          <a:p>
+            <a:r>
+              <a:rPr lang="en-US" altLang="zh-TW" sz="1000" dirty="0"/>
+              <a:t>                'bmi_judge':</a:t>
+            </a:r>
+            <a:r>
+              <a:rPr lang="en-US" altLang="zh-TW" sz="1000" dirty="0" err="1"/>
+              <a:t>bmi_judge</a:t>
+            </a:r>
+            <a:r>
+              <a:rPr lang="en-US" altLang="zh-TW" sz="1000" dirty="0"/>
+              <a:t>,</a:t>
+            </a:r>
+          </a:p>
+          <a:p>
+            <a:r>
+              <a:rPr lang="en-US" altLang="zh-TW" sz="1000" dirty="0"/>
+              <a:t>                '</a:t>
+            </a:r>
+            <a:r>
+              <a:rPr lang="en-US" altLang="zh-TW" sz="1000" dirty="0" err="1"/>
+              <a:t>build_time':today</a:t>
+            </a:r>
+            <a:endParaRPr lang="en-US" altLang="zh-TW" sz="1000" dirty="0"/>
+          </a:p>
+          <a:p>
+            <a:r>
+              <a:rPr lang="en-US" altLang="zh-TW" sz="1000" dirty="0"/>
+              <a:t>            }</a:t>
+            </a:r>
+          </a:p>
+          <a:p>
+            <a:r>
+              <a:rPr lang="en-US" altLang="zh-TW" sz="1000" dirty="0"/>
+              <a:t>            </a:t>
+            </a:r>
+            <a:r>
+              <a:rPr lang="en-US" altLang="zh-TW" sz="1000" dirty="0" err="1"/>
+              <a:t>load_df</a:t>
+            </a:r>
+            <a:r>
+              <a:rPr lang="en-US" altLang="zh-TW" sz="1000" dirty="0"/>
+              <a:t> = </a:t>
+            </a:r>
+            <a:r>
+              <a:rPr lang="en-US" altLang="zh-TW" sz="1000" dirty="0" err="1"/>
+              <a:t>pd.concat</a:t>
+            </a:r>
+            <a:r>
+              <a:rPr lang="en-US" altLang="zh-TW" sz="1000" dirty="0"/>
+              <a:t>([</a:t>
+            </a:r>
+            <a:r>
+              <a:rPr lang="en-US" altLang="zh-TW" sz="1000" dirty="0" err="1"/>
+              <a:t>load_df</a:t>
+            </a:r>
+            <a:r>
+              <a:rPr lang="en-US" altLang="zh-TW" sz="1000" dirty="0"/>
+              <a:t>, </a:t>
+            </a:r>
+            <a:r>
+              <a:rPr lang="en-US" altLang="zh-TW" sz="1000" dirty="0" err="1"/>
+              <a:t>pd.DataFrame</a:t>
+            </a:r>
+            <a:r>
+              <a:rPr lang="en-US" altLang="zh-TW" sz="1000" dirty="0"/>
+              <a:t>([</a:t>
+            </a:r>
+            <a:r>
+              <a:rPr lang="en-US" altLang="zh-TW" sz="1000" dirty="0" err="1"/>
+              <a:t>user_data</a:t>
+            </a:r>
+            <a:r>
+              <a:rPr lang="en-US" altLang="zh-TW" sz="1000" dirty="0"/>
+              <a:t>])], </a:t>
+            </a:r>
+            <a:r>
+              <a:rPr lang="en-US" altLang="zh-TW" sz="1000" dirty="0" err="1"/>
+              <a:t>ignore_index</a:t>
+            </a:r>
+            <a:r>
+              <a:rPr lang="en-US" altLang="zh-TW" sz="1000" dirty="0"/>
+              <a:t>=True)</a:t>
+            </a:r>
+          </a:p>
+          <a:p>
+            <a:r>
+              <a:rPr lang="en-US" altLang="zh-TW" sz="1000" dirty="0"/>
+              <a:t>            </a:t>
+            </a:r>
+            <a:r>
+              <a:rPr lang="en-US" altLang="zh-TW" sz="1000" dirty="0" err="1"/>
+              <a:t>load_df.to_csv</a:t>
+            </a:r>
+            <a:r>
+              <a:rPr lang="en-US" altLang="zh-TW" sz="1000" dirty="0"/>
+              <a:t>(filename, index=False)</a:t>
+            </a:r>
+          </a:p>
+          <a:p>
+            <a:r>
+              <a:rPr lang="en-US" altLang="zh-TW" sz="1000" dirty="0"/>
+              <a:t>    else:# no files</a:t>
+            </a:r>
+          </a:p>
+          <a:p>
+            <a:r>
+              <a:rPr lang="en-US" altLang="zh-TW" sz="1000" dirty="0"/>
+              <a:t>        </a:t>
+            </a:r>
+            <a:r>
+              <a:rPr lang="en-US" altLang="zh-TW" sz="1000" dirty="0" err="1"/>
+              <a:t>user_data</a:t>
+            </a:r>
+            <a:r>
+              <a:rPr lang="en-US" altLang="zh-TW" sz="1000" dirty="0"/>
+              <a:t> = {#Save Data</a:t>
+            </a:r>
+          </a:p>
+          <a:p>
+            <a:r>
+              <a:rPr lang="en-US" altLang="zh-TW" sz="1000" dirty="0"/>
+              <a:t>            'password': password,</a:t>
+            </a:r>
+          </a:p>
+          <a:p>
+            <a:r>
+              <a:rPr lang="en-US" altLang="zh-TW" sz="1000" dirty="0"/>
+              <a:t>            'birthday': birthday,</a:t>
+            </a:r>
+          </a:p>
+          <a:p>
+            <a:r>
+              <a:rPr lang="en-US" altLang="zh-TW" sz="1000" dirty="0"/>
+              <a:t>            'gender': gender,</a:t>
+            </a:r>
+          </a:p>
+          <a:p>
+            <a:r>
+              <a:rPr lang="en-US" altLang="zh-TW" sz="1000" dirty="0"/>
+              <a:t>            'height': height,</a:t>
+            </a:r>
+          </a:p>
+          <a:p>
+            <a:r>
+              <a:rPr lang="en-US" altLang="zh-TW" sz="1000" dirty="0"/>
+              <a:t>            'weight': weight,</a:t>
+            </a:r>
+          </a:p>
+          <a:p>
+            <a:r>
+              <a:rPr lang="en-US" altLang="zh-TW" sz="1000" dirty="0"/>
+              <a:t>            '</a:t>
+            </a:r>
+            <a:r>
+              <a:rPr lang="en-US" altLang="zh-TW" sz="1000" dirty="0" err="1"/>
+              <a:t>bmi</a:t>
+            </a:r>
+            <a:r>
+              <a:rPr lang="en-US" altLang="zh-TW" sz="1000" dirty="0"/>
+              <a:t>': </a:t>
+            </a:r>
+            <a:r>
+              <a:rPr lang="en-US" altLang="zh-TW" sz="1000" dirty="0" err="1"/>
+              <a:t>bmi</a:t>
+            </a:r>
+            <a:r>
+              <a:rPr lang="en-US" altLang="zh-TW" sz="1000" dirty="0"/>
+              <a:t>,</a:t>
+            </a:r>
+          </a:p>
+          <a:p>
+            <a:r>
+              <a:rPr lang="en-US" altLang="zh-TW" sz="1000" dirty="0"/>
+              <a:t>            'bmi_judge':</a:t>
+            </a:r>
+            <a:r>
+              <a:rPr lang="en-US" altLang="zh-TW" sz="1000" dirty="0" err="1"/>
+              <a:t>bmi_judge</a:t>
+            </a:r>
+            <a:r>
+              <a:rPr lang="en-US" altLang="zh-TW" sz="1000" dirty="0"/>
+              <a:t>,</a:t>
+            </a:r>
+          </a:p>
+          <a:p>
+            <a:r>
+              <a:rPr lang="en-US" altLang="zh-TW" sz="1000" dirty="0"/>
+              <a:t>            '</a:t>
+            </a:r>
+            <a:r>
+              <a:rPr lang="en-US" altLang="zh-TW" sz="1000" dirty="0" err="1"/>
+              <a:t>build_time':today</a:t>
+            </a:r>
+            <a:endParaRPr lang="en-US" altLang="zh-TW" sz="1000" dirty="0"/>
+          </a:p>
+          <a:p>
+            <a:r>
+              <a:rPr lang="en-US" altLang="zh-TW" sz="1000" dirty="0"/>
+              <a:t>        }</a:t>
+            </a:r>
+          </a:p>
+          <a:p>
+            <a:r>
+              <a:rPr lang="en-US" altLang="zh-TW" sz="1000" dirty="0"/>
+              <a:t>        </a:t>
+            </a:r>
+            <a:r>
+              <a:rPr lang="en-US" altLang="zh-TW" sz="1000" dirty="0" err="1"/>
+              <a:t>save_df</a:t>
+            </a:r>
+            <a:r>
+              <a:rPr lang="en-US" altLang="zh-TW" sz="1000" dirty="0"/>
+              <a:t> = </a:t>
+            </a:r>
+            <a:r>
+              <a:rPr lang="en-US" altLang="zh-TW" sz="1000" dirty="0" err="1"/>
+              <a:t>pd.DataFrame</a:t>
+            </a:r>
+            <a:r>
+              <a:rPr lang="en-US" altLang="zh-TW" sz="1000" dirty="0"/>
+              <a:t>([</a:t>
+            </a:r>
+            <a:r>
+              <a:rPr lang="en-US" altLang="zh-TW" sz="1000" dirty="0" err="1"/>
+              <a:t>user_data</a:t>
+            </a:r>
+            <a:r>
+              <a:rPr lang="en-US" altLang="zh-TW" sz="1000" dirty="0"/>
+              <a:t>])</a:t>
+            </a:r>
+          </a:p>
+          <a:p>
+            <a:r>
+              <a:rPr lang="en-US" altLang="zh-TW" sz="1000" dirty="0"/>
+              <a:t>        #save_filename = </a:t>
+            </a:r>
+            <a:r>
+              <a:rPr lang="en-US" altLang="zh-TW" sz="1000" dirty="0" err="1"/>
+              <a:t>f"UserData</a:t>
+            </a:r>
+            <a:r>
+              <a:rPr lang="en-US" altLang="zh-TW" sz="1000" dirty="0"/>
+              <a:t>\{name}.</a:t>
+            </a:r>
+            <a:r>
+              <a:rPr lang="en-US" altLang="zh-TW" sz="1000" dirty="0" err="1"/>
+              <a:t>csv".replace</a:t>
+            </a:r>
+            <a:r>
+              <a:rPr lang="en-US" altLang="zh-TW" sz="1000" dirty="0"/>
+              <a:t>("/", "_")</a:t>
+            </a:r>
+          </a:p>
+          <a:p>
+            <a:r>
+              <a:rPr lang="en-US" altLang="zh-TW" sz="1000" dirty="0"/>
+              <a:t>        </a:t>
+            </a:r>
+            <a:r>
+              <a:rPr lang="en-US" altLang="zh-TW" sz="1000" dirty="0" err="1"/>
+              <a:t>save_df.to_csv</a:t>
+            </a:r>
+            <a:r>
+              <a:rPr lang="en-US" altLang="zh-TW" sz="1000" dirty="0"/>
+              <a:t>(filename, index=False)</a:t>
+            </a:r>
+          </a:p>
+          <a:p>
+            <a:r>
+              <a:rPr lang="en-US" altLang="zh-TW" sz="1000" dirty="0"/>
+              <a:t>    return </a:t>
+            </a:r>
+            <a:r>
+              <a:rPr lang="en-US" altLang="zh-TW" sz="1000" dirty="0" err="1"/>
+              <a:t>jsonify</a:t>
+            </a:r>
+            <a:r>
+              <a:rPr lang="en-US" altLang="zh-TW" sz="1000" dirty="0"/>
+              <a:t>(message=</a:t>
+            </a:r>
+            <a:r>
+              <a:rPr lang="en-US" altLang="zh-TW" sz="1000" dirty="0" err="1"/>
+              <a:t>f'Your</a:t>
+            </a:r>
+            <a:r>
+              <a:rPr lang="en-US" altLang="zh-TW" sz="1000" dirty="0"/>
+              <a:t> AGE={age},BMI={</a:t>
+            </a:r>
+            <a:r>
+              <a:rPr lang="en-US" altLang="zh-TW" sz="1000" dirty="0" err="1"/>
+              <a:t>bmi</a:t>
+            </a:r>
+            <a:r>
+              <a:rPr lang="en-US" altLang="zh-TW" sz="1000" dirty="0"/>
+              <a:t>},{</a:t>
+            </a:r>
+            <a:r>
+              <a:rPr lang="en-US" altLang="zh-TW" sz="1000" dirty="0" err="1"/>
+              <a:t>bmi_judge</a:t>
+            </a:r>
+            <a:r>
+              <a:rPr lang="en-US" altLang="zh-TW" sz="1000" dirty="0"/>
+              <a:t>}.')</a:t>
+            </a:r>
+            <a:endParaRPr lang="zh-TW" altLang="en-US" sz="1000" dirty="0"/>
+          </a:p>
+        </p:txBody>
+      </p:sp>
+      <p:cxnSp>
+        <p:nvCxnSpPr>
+          <p:cNvPr id="10" name="接點: 肘形 9">
+            <a:extLst>
+              <a:ext uri="{FF2B5EF4-FFF2-40B4-BE49-F238E27FC236}">
+                <a16:creationId xmlns:a16="http://schemas.microsoft.com/office/drawing/2014/main" id="{DF811142-1D9A-49E9-A6FB-63A6226A78D5}"/>
+              </a:ext>
+            </a:extLst>
+          </p:cNvPr>
+          <p:cNvCxnSpPr>
+            <a:cxnSpLocks/>
+            <a:stCxn id="7" idx="2"/>
+            <a:endCxn id="9" idx="0"/>
+          </p:cNvCxnSpPr>
+          <p:nvPr/>
+        </p:nvCxnSpPr>
+        <p:spPr>
+          <a:xfrm rot="5400000" flipH="1" flipV="1">
+            <a:off x="2929306" y="695120"/>
+            <a:ext cx="5668759" cy="6100228"/>
+          </a:xfrm>
+          <a:prstGeom prst="bentConnector5">
+            <a:avLst>
+              <a:gd name="adj1" fmla="val -2689"/>
+              <a:gd name="adj2" fmla="val 46218"/>
+              <a:gd name="adj3" fmla="val 102838"/>
+            </a:avLst>
+          </a:prstGeom>
+          <a:ln w="12700">
+            <a:tailEnd type="triangle"/>
+          </a:ln>
+        </p:spPr>
+        <p:style>
+          <a:lnRef idx="1">
+            <a:schemeClr val="accent1"/>
+          </a:lnRef>
+          <a:fillRef idx="0">
+            <a:schemeClr val="accent1"/>
+          </a:fillRef>
+          <a:effectRef idx="0">
+            <a:schemeClr val="accent1"/>
+          </a:effectRef>
+          <a:fontRef idx="minor">
+            <a:schemeClr val="tx1"/>
+          </a:fontRef>
+        </p:style>
+      </p:cxnSp>
+    </p:spTree>
+    <p:extLst>
+      <p:ext uri="{BB962C8B-B14F-4D97-AF65-F5344CB8AC3E}">
+        <p14:creationId xmlns:p14="http://schemas.microsoft.com/office/powerpoint/2010/main" val="2557906499"/>
       </p:ext>
     </p:extLst>
   </p:cSld>

</xml_diff>

<commit_message>
Client_UI1 Teach for python
</commit_message>
<xml_diff>
--- a/PythonFlask/Teach.pptx
+++ b/PythonFlask/Teach.pptx
@@ -5,7 +5,7 @@
     <p:sldMasterId id="2147483648" r:id="rId1"/>
   </p:sldMasterIdLst>
   <p:notesMasterIdLst>
-    <p:notesMasterId r:id="rId24"/>
+    <p:notesMasterId r:id="rId26"/>
   </p:notesMasterIdLst>
   <p:sldIdLst>
     <p:sldId id="256" r:id="rId2"/>
@@ -30,6 +30,8 @@
     <p:sldId id="276" r:id="rId21"/>
     <p:sldId id="277" r:id="rId22"/>
     <p:sldId id="278" r:id="rId23"/>
+    <p:sldId id="279" r:id="rId24"/>
+    <p:sldId id="280" r:id="rId25"/>
   </p:sldIdLst>
   <p:sldSz cx="12192000" cy="6858000"/>
   <p:notesSz cx="6858000" cy="9144000"/>
@@ -218,7 +220,7 @@
           <a:p>
             <a:fld id="{1C5EF040-7B1D-4DB6-8941-7DB3A9759384}" type="datetimeFigureOut">
               <a:rPr lang="zh-TW" altLang="en-US" smtClean="0"/>
-              <a:t>2025/5/12</a:t>
+              <a:t>2025/5/13</a:t>
             </a:fld>
             <a:endParaRPr lang="zh-TW" altLang="en-US"/>
           </a:p>
@@ -569,6 +571,174 @@
 </p:notes>
 </file>
 
+<file path=ppt/notesSlides/notesSlide2.xml><?xml version="1.0" encoding="utf-8"?>
+<p:notes xmlns:a="http://schemas.openxmlformats.org/drawingml/2006/main" xmlns:r="http://schemas.openxmlformats.org/officeDocument/2006/relationships" xmlns:p="http://schemas.openxmlformats.org/presentationml/2006/main">
+  <p:cSld>
+    <p:spTree>
+      <p:nvGrpSpPr>
+        <p:cNvPr id="1" name=""/>
+        <p:cNvGrpSpPr/>
+        <p:nvPr/>
+      </p:nvGrpSpPr>
+      <p:grpSpPr>
+        <a:xfrm>
+          <a:off x="0" y="0"/>
+          <a:ext cx="0" cy="0"/>
+          <a:chOff x="0" y="0"/>
+          <a:chExt cx="0" cy="0"/>
+        </a:xfrm>
+      </p:grpSpPr>
+      <p:sp>
+        <p:nvSpPr>
+          <p:cNvPr id="2" name="投影片影像版面配置區 1"/>
+          <p:cNvSpPr>
+            <a:spLocks noGrp="1" noRot="1" noChangeAspect="1"/>
+          </p:cNvSpPr>
+          <p:nvPr>
+            <p:ph type="sldImg"/>
+          </p:nvPr>
+        </p:nvSpPr>
+        <p:spPr/>
+      </p:sp>
+      <p:sp>
+        <p:nvSpPr>
+          <p:cNvPr id="3" name="備忘稿版面配置區 2"/>
+          <p:cNvSpPr>
+            <a:spLocks noGrp="1"/>
+          </p:cNvSpPr>
+          <p:nvPr>
+            <p:ph type="body" idx="1"/>
+          </p:nvPr>
+        </p:nvSpPr>
+        <p:spPr/>
+        <p:txBody>
+          <a:bodyPr/>
+          <a:lstStyle/>
+          <a:p>
+            <a:endParaRPr lang="zh-TW" altLang="en-US" dirty="0"/>
+          </a:p>
+        </p:txBody>
+      </p:sp>
+      <p:sp>
+        <p:nvSpPr>
+          <p:cNvPr id="4" name="投影片編號版面配置區 3"/>
+          <p:cNvSpPr>
+            <a:spLocks noGrp="1"/>
+          </p:cNvSpPr>
+          <p:nvPr>
+            <p:ph type="sldNum" sz="quarter" idx="5"/>
+          </p:nvPr>
+        </p:nvSpPr>
+        <p:spPr/>
+        <p:txBody>
+          <a:bodyPr/>
+          <a:lstStyle/>
+          <a:p>
+            <a:fld id="{A9FCBE1C-0420-43B9-B59B-38F9F1B71FEA}" type="slidenum">
+              <a:rPr lang="zh-TW" altLang="en-US" smtClean="0"/>
+              <a:t>23</a:t>
+            </a:fld>
+            <a:endParaRPr lang="zh-TW" altLang="en-US"/>
+          </a:p>
+        </p:txBody>
+      </p:sp>
+    </p:spTree>
+    <p:extLst>
+      <p:ext uri="{BB962C8B-B14F-4D97-AF65-F5344CB8AC3E}">
+        <p14:creationId xmlns:p14="http://schemas.microsoft.com/office/powerpoint/2010/main" val="3742616297"/>
+      </p:ext>
+    </p:extLst>
+  </p:cSld>
+  <p:clrMapOvr>
+    <a:masterClrMapping/>
+  </p:clrMapOvr>
+</p:notes>
+</file>
+
+<file path=ppt/notesSlides/notesSlide3.xml><?xml version="1.0" encoding="utf-8"?>
+<p:notes xmlns:a="http://schemas.openxmlformats.org/drawingml/2006/main" xmlns:r="http://schemas.openxmlformats.org/officeDocument/2006/relationships" xmlns:p="http://schemas.openxmlformats.org/presentationml/2006/main">
+  <p:cSld>
+    <p:spTree>
+      <p:nvGrpSpPr>
+        <p:cNvPr id="1" name=""/>
+        <p:cNvGrpSpPr/>
+        <p:nvPr/>
+      </p:nvGrpSpPr>
+      <p:grpSpPr>
+        <a:xfrm>
+          <a:off x="0" y="0"/>
+          <a:ext cx="0" cy="0"/>
+          <a:chOff x="0" y="0"/>
+          <a:chExt cx="0" cy="0"/>
+        </a:xfrm>
+      </p:grpSpPr>
+      <p:sp>
+        <p:nvSpPr>
+          <p:cNvPr id="2" name="投影片影像版面配置區 1"/>
+          <p:cNvSpPr>
+            <a:spLocks noGrp="1" noRot="1" noChangeAspect="1"/>
+          </p:cNvSpPr>
+          <p:nvPr>
+            <p:ph type="sldImg"/>
+          </p:nvPr>
+        </p:nvSpPr>
+        <p:spPr/>
+      </p:sp>
+      <p:sp>
+        <p:nvSpPr>
+          <p:cNvPr id="3" name="備忘稿版面配置區 2"/>
+          <p:cNvSpPr>
+            <a:spLocks noGrp="1"/>
+          </p:cNvSpPr>
+          <p:nvPr>
+            <p:ph type="body" idx="1"/>
+          </p:nvPr>
+        </p:nvSpPr>
+        <p:spPr/>
+        <p:txBody>
+          <a:bodyPr/>
+          <a:lstStyle/>
+          <a:p>
+            <a:endParaRPr lang="zh-TW" altLang="en-US" dirty="0"/>
+          </a:p>
+        </p:txBody>
+      </p:sp>
+      <p:sp>
+        <p:nvSpPr>
+          <p:cNvPr id="4" name="投影片編號版面配置區 3"/>
+          <p:cNvSpPr>
+            <a:spLocks noGrp="1"/>
+          </p:cNvSpPr>
+          <p:nvPr>
+            <p:ph type="sldNum" sz="quarter" idx="5"/>
+          </p:nvPr>
+        </p:nvSpPr>
+        <p:spPr/>
+        <p:txBody>
+          <a:bodyPr/>
+          <a:lstStyle/>
+          <a:p>
+            <a:fld id="{A9FCBE1C-0420-43B9-B59B-38F9F1B71FEA}" type="slidenum">
+              <a:rPr lang="zh-TW" altLang="en-US" smtClean="0"/>
+              <a:t>24</a:t>
+            </a:fld>
+            <a:endParaRPr lang="zh-TW" altLang="en-US"/>
+          </a:p>
+        </p:txBody>
+      </p:sp>
+    </p:spTree>
+    <p:extLst>
+      <p:ext uri="{BB962C8B-B14F-4D97-AF65-F5344CB8AC3E}">
+        <p14:creationId xmlns:p14="http://schemas.microsoft.com/office/powerpoint/2010/main" val="58443040"/>
+      </p:ext>
+    </p:extLst>
+  </p:cSld>
+  <p:clrMapOvr>
+    <a:masterClrMapping/>
+  </p:clrMapOvr>
+</p:notes>
+</file>
+
 <file path=ppt/slideLayouts/slideLayout1.xml><?xml version="1.0" encoding="utf-8"?>
 <p:sldLayout xmlns:a="http://schemas.openxmlformats.org/drawingml/2006/main" xmlns:r="http://schemas.openxmlformats.org/officeDocument/2006/relationships" xmlns:p="http://schemas.openxmlformats.org/presentationml/2006/main" type="title" preserve="1">
   <p:cSld name="標題投影片">
@@ -698,7 +868,7 @@
           <a:p>
             <a:fld id="{17851A2F-B788-4D8B-B789-29E10C7702D5}" type="datetimeFigureOut">
               <a:rPr lang="zh-TW" altLang="en-US" smtClean="0"/>
-              <a:t>2025/5/12</a:t>
+              <a:t>2025/5/13</a:t>
             </a:fld>
             <a:endParaRPr lang="zh-TW" altLang="en-US"/>
           </a:p>
@@ -866,7 +1036,7 @@
           <a:p>
             <a:fld id="{17851A2F-B788-4D8B-B789-29E10C7702D5}" type="datetimeFigureOut">
               <a:rPr lang="zh-TW" altLang="en-US" smtClean="0"/>
-              <a:t>2025/5/12</a:t>
+              <a:t>2025/5/13</a:t>
             </a:fld>
             <a:endParaRPr lang="zh-TW" altLang="en-US"/>
           </a:p>
@@ -1044,7 +1214,7 @@
           <a:p>
             <a:fld id="{17851A2F-B788-4D8B-B789-29E10C7702D5}" type="datetimeFigureOut">
               <a:rPr lang="zh-TW" altLang="en-US" smtClean="0"/>
-              <a:t>2025/5/12</a:t>
+              <a:t>2025/5/13</a:t>
             </a:fld>
             <a:endParaRPr lang="zh-TW" altLang="en-US"/>
           </a:p>
@@ -1212,7 +1382,7 @@
           <a:p>
             <a:fld id="{17851A2F-B788-4D8B-B789-29E10C7702D5}" type="datetimeFigureOut">
               <a:rPr lang="zh-TW" altLang="en-US" smtClean="0"/>
-              <a:t>2025/5/12</a:t>
+              <a:t>2025/5/13</a:t>
             </a:fld>
             <a:endParaRPr lang="zh-TW" altLang="en-US"/>
           </a:p>
@@ -1457,7 +1627,7 @@
           <a:p>
             <a:fld id="{17851A2F-B788-4D8B-B789-29E10C7702D5}" type="datetimeFigureOut">
               <a:rPr lang="zh-TW" altLang="en-US" smtClean="0"/>
-              <a:t>2025/5/12</a:t>
+              <a:t>2025/5/13</a:t>
             </a:fld>
             <a:endParaRPr lang="zh-TW" altLang="en-US"/>
           </a:p>
@@ -1686,7 +1856,7 @@
           <a:p>
             <a:fld id="{17851A2F-B788-4D8B-B789-29E10C7702D5}" type="datetimeFigureOut">
               <a:rPr lang="zh-TW" altLang="en-US" smtClean="0"/>
-              <a:t>2025/5/12</a:t>
+              <a:t>2025/5/13</a:t>
             </a:fld>
             <a:endParaRPr lang="zh-TW" altLang="en-US"/>
           </a:p>
@@ -2050,7 +2220,7 @@
           <a:p>
             <a:fld id="{17851A2F-B788-4D8B-B789-29E10C7702D5}" type="datetimeFigureOut">
               <a:rPr lang="zh-TW" altLang="en-US" smtClean="0"/>
-              <a:t>2025/5/12</a:t>
+              <a:t>2025/5/13</a:t>
             </a:fld>
             <a:endParaRPr lang="zh-TW" altLang="en-US"/>
           </a:p>
@@ -2167,7 +2337,7 @@
           <a:p>
             <a:fld id="{17851A2F-B788-4D8B-B789-29E10C7702D5}" type="datetimeFigureOut">
               <a:rPr lang="zh-TW" altLang="en-US" smtClean="0"/>
-              <a:t>2025/5/12</a:t>
+              <a:t>2025/5/13</a:t>
             </a:fld>
             <a:endParaRPr lang="zh-TW" altLang="en-US"/>
           </a:p>
@@ -2262,7 +2432,7 @@
           <a:p>
             <a:fld id="{17851A2F-B788-4D8B-B789-29E10C7702D5}" type="datetimeFigureOut">
               <a:rPr lang="zh-TW" altLang="en-US" smtClean="0"/>
-              <a:t>2025/5/12</a:t>
+              <a:t>2025/5/13</a:t>
             </a:fld>
             <a:endParaRPr lang="zh-TW" altLang="en-US"/>
           </a:p>
@@ -2537,7 +2707,7 @@
           <a:p>
             <a:fld id="{17851A2F-B788-4D8B-B789-29E10C7702D5}" type="datetimeFigureOut">
               <a:rPr lang="zh-TW" altLang="en-US" smtClean="0"/>
-              <a:t>2025/5/12</a:t>
+              <a:t>2025/5/13</a:t>
             </a:fld>
             <a:endParaRPr lang="zh-TW" altLang="en-US"/>
           </a:p>
@@ -2789,7 +2959,7 @@
           <a:p>
             <a:fld id="{17851A2F-B788-4D8B-B789-29E10C7702D5}" type="datetimeFigureOut">
               <a:rPr lang="zh-TW" altLang="en-US" smtClean="0"/>
-              <a:t>2025/5/12</a:t>
+              <a:t>2025/5/13</a:t>
             </a:fld>
             <a:endParaRPr lang="zh-TW" altLang="en-US"/>
           </a:p>
@@ -3000,7 +3170,7 @@
           <a:p>
             <a:fld id="{17851A2F-B788-4D8B-B789-29E10C7702D5}" type="datetimeFigureOut">
               <a:rPr lang="zh-TW" altLang="en-US" smtClean="0"/>
-              <a:t>2025/5/12</a:t>
+              <a:t>2025/5/13</a:t>
             </a:fld>
             <a:endParaRPr lang="zh-TW" altLang="en-US"/>
           </a:p>
@@ -8228,6 +8398,1330 @@
     <p:extLst>
       <p:ext uri="{BB962C8B-B14F-4D97-AF65-F5344CB8AC3E}">
         <p14:creationId xmlns:p14="http://schemas.microsoft.com/office/powerpoint/2010/main" val="2557906499"/>
+      </p:ext>
+    </p:extLst>
+  </p:cSld>
+  <p:clrMapOvr>
+    <a:masterClrMapping/>
+  </p:clrMapOvr>
+</p:sld>
+</file>
+
+<file path=ppt/slides/slide23.xml><?xml version="1.0" encoding="utf-8"?>
+<p:sld xmlns:a="http://schemas.openxmlformats.org/drawingml/2006/main" xmlns:r="http://schemas.openxmlformats.org/officeDocument/2006/relationships" xmlns:p="http://schemas.openxmlformats.org/presentationml/2006/main">
+  <p:cSld>
+    <p:spTree>
+      <p:nvGrpSpPr>
+        <p:cNvPr id="1" name=""/>
+        <p:cNvGrpSpPr/>
+        <p:nvPr/>
+      </p:nvGrpSpPr>
+      <p:grpSpPr>
+        <a:xfrm>
+          <a:off x="0" y="0"/>
+          <a:ext cx="0" cy="0"/>
+          <a:chOff x="0" y="0"/>
+          <a:chExt cx="0" cy="0"/>
+        </a:xfrm>
+      </p:grpSpPr>
+      <p:sp>
+        <p:nvSpPr>
+          <p:cNvPr id="2" name="標題 1"/>
+          <p:cNvSpPr>
+            <a:spLocks noGrp="1"/>
+          </p:cNvSpPr>
+          <p:nvPr>
+            <p:ph type="title"/>
+          </p:nvPr>
+        </p:nvSpPr>
+        <p:spPr>
+          <a:xfrm>
+            <a:off x="880533" y="-180147"/>
+            <a:ext cx="11150600" cy="1098958"/>
+          </a:xfrm>
+        </p:spPr>
+        <p:txBody>
+          <a:bodyPr>
+            <a:normAutofit/>
+          </a:bodyPr>
+          <a:lstStyle/>
+          <a:p>
+            <a:r>
+              <a:rPr lang="en-US" altLang="zh-TW" dirty="0"/>
+              <a:t>11.Client UI Design</a:t>
+            </a:r>
+            <a:r>
+              <a:rPr lang="zh-TW" altLang="en-US" dirty="0"/>
+              <a:t> </a:t>
+            </a:r>
+            <a:r>
+              <a:rPr lang="en-US" altLang="zh-TW" dirty="0"/>
+              <a:t>for Python</a:t>
+            </a:r>
+            <a:endParaRPr lang="zh-TW" altLang="en-US" dirty="0"/>
+          </a:p>
+        </p:txBody>
+      </p:sp>
+      <p:sp>
+        <p:nvSpPr>
+          <p:cNvPr id="12" name="文字方塊 11">
+            <a:extLst>
+              <a:ext uri="{FF2B5EF4-FFF2-40B4-BE49-F238E27FC236}">
+                <a16:creationId xmlns:a16="http://schemas.microsoft.com/office/drawing/2014/main" id="{B19002D0-11BF-4EFE-8FA3-FAAAA00C4C2F}"/>
+              </a:ext>
+            </a:extLst>
+          </p:cNvPr>
+          <p:cNvSpPr txBox="1"/>
+          <p:nvPr/>
+        </p:nvSpPr>
+        <p:spPr>
+          <a:xfrm>
+            <a:off x="76200" y="683343"/>
+            <a:ext cx="5503333" cy="5929124"/>
+          </a:xfrm>
+          <a:prstGeom prst="rect">
+            <a:avLst/>
+          </a:prstGeom>
+          <a:solidFill>
+            <a:schemeClr val="bg1">
+              <a:lumMod val="95000"/>
+            </a:schemeClr>
+          </a:solidFill>
+        </p:spPr>
+        <p:txBody>
+          <a:bodyPr wrap="square">
+            <a:spAutoFit/>
+          </a:bodyPr>
+          <a:lstStyle/>
+          <a:p>
+            <a:r>
+              <a:rPr lang="en-US" altLang="zh-TW" sz="1000" dirty="0"/>
+              <a:t>import </a:t>
+            </a:r>
+            <a:r>
+              <a:rPr lang="en-US" altLang="zh-TW" sz="1000" dirty="0" err="1"/>
+              <a:t>tkinter</a:t>
+            </a:r>
+            <a:r>
+              <a:rPr lang="en-US" altLang="zh-TW" sz="1000" dirty="0"/>
+              <a:t> as </a:t>
+            </a:r>
+            <a:r>
+              <a:rPr lang="en-US" altLang="zh-TW" sz="1000" dirty="0" err="1"/>
+              <a:t>tk</a:t>
+            </a:r>
+            <a:endParaRPr lang="en-US" altLang="zh-TW" sz="1000" dirty="0"/>
+          </a:p>
+          <a:p>
+            <a:r>
+              <a:rPr lang="en-US" altLang="zh-TW" sz="1000" dirty="0"/>
+              <a:t>import requests</a:t>
+            </a:r>
+          </a:p>
+          <a:p>
+            <a:endParaRPr lang="en-US" altLang="zh-TW" sz="1000" dirty="0"/>
+          </a:p>
+          <a:p>
+            <a:r>
+              <a:rPr lang="en-US" altLang="zh-TW" sz="1000" dirty="0"/>
+              <a:t>root = </a:t>
+            </a:r>
+            <a:r>
+              <a:rPr lang="en-US" altLang="zh-TW" sz="1000" dirty="0" err="1"/>
+              <a:t>tk.Tk</a:t>
+            </a:r>
+            <a:r>
+              <a:rPr lang="en-US" altLang="zh-TW" sz="1000" dirty="0"/>
+              <a:t>()</a:t>
+            </a:r>
+          </a:p>
+          <a:p>
+            <a:r>
+              <a:rPr lang="en-US" altLang="zh-TW" sz="1000" dirty="0" err="1"/>
+              <a:t>root.title</a:t>
+            </a:r>
+            <a:r>
+              <a:rPr lang="en-US" altLang="zh-TW" sz="1000" dirty="0"/>
+              <a:t>('BMI Input')</a:t>
+            </a:r>
+          </a:p>
+          <a:p>
+            <a:r>
+              <a:rPr lang="en-US" altLang="zh-TW" sz="1000" dirty="0" err="1"/>
+              <a:t>root.geometry</a:t>
+            </a:r>
+            <a:r>
+              <a:rPr lang="en-US" altLang="zh-TW" sz="1000" dirty="0"/>
+              <a:t>('720x720')</a:t>
+            </a:r>
+          </a:p>
+          <a:p>
+            <a:endParaRPr lang="en-US" altLang="zh-TW" sz="1000" dirty="0"/>
+          </a:p>
+          <a:p>
+            <a:r>
+              <a:rPr lang="en-US" altLang="zh-TW" sz="1000" dirty="0"/>
+              <a:t>gender = </a:t>
+            </a:r>
+            <a:r>
+              <a:rPr lang="en-US" altLang="zh-TW" sz="1000" dirty="0" err="1"/>
+              <a:t>tk.StringVar</a:t>
+            </a:r>
+            <a:r>
+              <a:rPr lang="en-US" altLang="zh-TW" sz="1000" dirty="0"/>
+              <a:t>()</a:t>
+            </a:r>
+          </a:p>
+          <a:p>
+            <a:r>
+              <a:rPr lang="en-US" altLang="zh-TW" sz="1000" dirty="0"/>
+              <a:t>name = </a:t>
+            </a:r>
+            <a:r>
+              <a:rPr lang="en-US" altLang="zh-TW" sz="1000" dirty="0" err="1"/>
+              <a:t>tk.StringVar</a:t>
+            </a:r>
+            <a:r>
+              <a:rPr lang="en-US" altLang="zh-TW" sz="1000" dirty="0"/>
+              <a:t>()</a:t>
+            </a:r>
+          </a:p>
+          <a:p>
+            <a:r>
+              <a:rPr lang="en-US" altLang="zh-TW" sz="1000" dirty="0"/>
+              <a:t>password = </a:t>
+            </a:r>
+            <a:r>
+              <a:rPr lang="en-US" altLang="zh-TW" sz="1000" dirty="0" err="1"/>
+              <a:t>tk.StringVar</a:t>
+            </a:r>
+            <a:r>
+              <a:rPr lang="en-US" altLang="zh-TW" sz="1000" dirty="0"/>
+              <a:t>()</a:t>
+            </a:r>
+          </a:p>
+          <a:p>
+            <a:r>
+              <a:rPr lang="en-US" altLang="zh-TW" sz="1000" dirty="0"/>
+              <a:t>birthday = </a:t>
+            </a:r>
+            <a:r>
+              <a:rPr lang="en-US" altLang="zh-TW" sz="1000" dirty="0" err="1"/>
+              <a:t>tk.StringVar</a:t>
+            </a:r>
+            <a:r>
+              <a:rPr lang="en-US" altLang="zh-TW" sz="1000" dirty="0"/>
+              <a:t>()</a:t>
+            </a:r>
+          </a:p>
+          <a:p>
+            <a:r>
+              <a:rPr lang="en-US" altLang="zh-TW" sz="1000" dirty="0"/>
+              <a:t>height = </a:t>
+            </a:r>
+            <a:r>
+              <a:rPr lang="en-US" altLang="zh-TW" sz="1000" dirty="0" err="1"/>
+              <a:t>tk.StringVar</a:t>
+            </a:r>
+            <a:r>
+              <a:rPr lang="en-US" altLang="zh-TW" sz="1000" dirty="0"/>
+              <a:t>()</a:t>
+            </a:r>
+          </a:p>
+          <a:p>
+            <a:r>
+              <a:rPr lang="en-US" altLang="zh-TW" sz="1000" dirty="0"/>
+              <a:t>weight = </a:t>
+            </a:r>
+            <a:r>
+              <a:rPr lang="en-US" altLang="zh-TW" sz="1000" dirty="0" err="1"/>
+              <a:t>tk.StringVar</a:t>
+            </a:r>
+            <a:r>
+              <a:rPr lang="en-US" altLang="zh-TW" sz="1000" dirty="0"/>
+              <a:t>()</a:t>
+            </a:r>
+          </a:p>
+          <a:p>
+            <a:r>
+              <a:rPr lang="en-US" altLang="zh-TW" sz="1000" dirty="0" err="1"/>
+              <a:t>jsonText</a:t>
+            </a:r>
+            <a:r>
+              <a:rPr lang="en-US" altLang="zh-TW" sz="1000" dirty="0"/>
+              <a:t> = </a:t>
+            </a:r>
+            <a:r>
+              <a:rPr lang="en-US" altLang="zh-TW" sz="1000" dirty="0" err="1"/>
+              <a:t>tk.StringVar</a:t>
+            </a:r>
+            <a:r>
+              <a:rPr lang="en-US" altLang="zh-TW" sz="1000" dirty="0"/>
+              <a:t>()</a:t>
+            </a:r>
+          </a:p>
+          <a:p>
+            <a:r>
+              <a:rPr lang="en-US" altLang="zh-TW" sz="1000" dirty="0" err="1"/>
+              <a:t>serverText</a:t>
+            </a:r>
+            <a:r>
+              <a:rPr lang="en-US" altLang="zh-TW" sz="1000" dirty="0"/>
+              <a:t> = </a:t>
+            </a:r>
+            <a:r>
+              <a:rPr lang="en-US" altLang="zh-TW" sz="1000" dirty="0" err="1"/>
+              <a:t>tk.StringVar</a:t>
+            </a:r>
+            <a:r>
+              <a:rPr lang="en-US" altLang="zh-TW" sz="1000" dirty="0"/>
+              <a:t>()</a:t>
+            </a:r>
+          </a:p>
+          <a:p>
+            <a:endParaRPr lang="en-US" altLang="zh-TW" sz="1000" dirty="0"/>
+          </a:p>
+          <a:p>
+            <a:r>
+              <a:rPr lang="en-US" altLang="zh-TW" sz="1000" dirty="0"/>
+              <a:t>radio_btn1 = </a:t>
+            </a:r>
+            <a:r>
+              <a:rPr lang="en-US" altLang="zh-TW" sz="1000" dirty="0" err="1"/>
+              <a:t>tk.Radiobutton</a:t>
+            </a:r>
+            <a:r>
+              <a:rPr lang="en-US" altLang="zh-TW" sz="1000" dirty="0"/>
+              <a:t>(</a:t>
+            </a:r>
+            <a:r>
+              <a:rPr lang="en-US" altLang="zh-TW" sz="1000" dirty="0" err="1"/>
+              <a:t>root,text</a:t>
+            </a:r>
+            <a:r>
+              <a:rPr lang="en-US" altLang="zh-TW" sz="1000" dirty="0"/>
+              <a:t>='</a:t>
+            </a:r>
+            <a:r>
+              <a:rPr lang="en-US" altLang="zh-TW" sz="1000" dirty="0" err="1"/>
+              <a:t>Male',font</a:t>
+            </a:r>
+            <a:r>
+              <a:rPr lang="en-US" altLang="zh-TW" sz="1000" dirty="0"/>
+              <a:t>=('Arial',30,'bold'),variable=</a:t>
+            </a:r>
+            <a:r>
+              <a:rPr lang="en-US" altLang="zh-TW" sz="1000" dirty="0" err="1"/>
+              <a:t>gender,value</a:t>
+            </a:r>
+            <a:r>
+              <a:rPr lang="en-US" altLang="zh-TW" sz="1000" dirty="0"/>
+              <a:t>='male')</a:t>
+            </a:r>
+          </a:p>
+          <a:p>
+            <a:r>
+              <a:rPr lang="en-US" altLang="zh-TW" sz="1000" dirty="0"/>
+              <a:t>radio_btn2 = </a:t>
+            </a:r>
+            <a:r>
+              <a:rPr lang="en-US" altLang="zh-TW" sz="1000" dirty="0" err="1"/>
+              <a:t>tk.Radiobutton</a:t>
+            </a:r>
+            <a:r>
+              <a:rPr lang="en-US" altLang="zh-TW" sz="1000" dirty="0"/>
+              <a:t>(</a:t>
+            </a:r>
+            <a:r>
+              <a:rPr lang="en-US" altLang="zh-TW" sz="1000" dirty="0" err="1"/>
+              <a:t>root,text</a:t>
+            </a:r>
+            <a:r>
+              <a:rPr lang="en-US" altLang="zh-TW" sz="1000" dirty="0"/>
+              <a:t>='</a:t>
+            </a:r>
+            <a:r>
+              <a:rPr lang="en-US" altLang="zh-TW" sz="1000" dirty="0" err="1"/>
+              <a:t>Female',font</a:t>
+            </a:r>
+            <a:r>
+              <a:rPr lang="en-US" altLang="zh-TW" sz="1000" dirty="0"/>
+              <a:t>=('Arial',30,'bold'),variable=</a:t>
+            </a:r>
+            <a:r>
+              <a:rPr lang="en-US" altLang="zh-TW" sz="1000" dirty="0" err="1"/>
+              <a:t>gender,value</a:t>
+            </a:r>
+            <a:r>
+              <a:rPr lang="en-US" altLang="zh-TW" sz="1000" dirty="0"/>
+              <a:t>='female')</a:t>
+            </a:r>
+          </a:p>
+          <a:p>
+            <a:r>
+              <a:rPr lang="en-US" altLang="zh-TW" sz="1000" dirty="0"/>
+              <a:t>radio_btn1.select()</a:t>
+            </a:r>
+          </a:p>
+          <a:p>
+            <a:endParaRPr lang="en-US" altLang="zh-TW" sz="1000" dirty="0"/>
+          </a:p>
+          <a:p>
+            <a:r>
+              <a:rPr lang="en-US" altLang="zh-TW" sz="1000" dirty="0" err="1"/>
+              <a:t>labelName</a:t>
+            </a:r>
+            <a:r>
+              <a:rPr lang="en-US" altLang="zh-TW" sz="1000" dirty="0"/>
+              <a:t> = </a:t>
+            </a:r>
+            <a:r>
+              <a:rPr lang="en-US" altLang="zh-TW" sz="1000" dirty="0" err="1"/>
+              <a:t>tk.Label</a:t>
+            </a:r>
+            <a:r>
+              <a:rPr lang="en-US" altLang="zh-TW" sz="1000" dirty="0"/>
+              <a:t>(root, text='Name:')</a:t>
+            </a:r>
+          </a:p>
+          <a:p>
+            <a:r>
+              <a:rPr lang="en-US" altLang="zh-TW" sz="1000" dirty="0" err="1"/>
+              <a:t>entryName</a:t>
+            </a:r>
+            <a:r>
+              <a:rPr lang="en-US" altLang="zh-TW" sz="1000" dirty="0"/>
+              <a:t> = </a:t>
+            </a:r>
+            <a:r>
+              <a:rPr lang="en-US" altLang="zh-TW" sz="1000" dirty="0" err="1"/>
+              <a:t>tk.Entry</a:t>
+            </a:r>
+            <a:r>
+              <a:rPr lang="en-US" altLang="zh-TW" sz="1000" dirty="0"/>
+              <a:t>(</a:t>
+            </a:r>
+            <a:r>
+              <a:rPr lang="en-US" altLang="zh-TW" sz="1000" dirty="0" err="1"/>
+              <a:t>root,font</a:t>
+            </a:r>
+            <a:r>
+              <a:rPr lang="en-US" altLang="zh-TW" sz="1000" dirty="0"/>
+              <a:t>=('Arial',30,'bold'),</a:t>
+            </a:r>
+            <a:r>
+              <a:rPr lang="en-US" altLang="zh-TW" sz="1000" dirty="0" err="1"/>
+              <a:t>textvariable</a:t>
+            </a:r>
+            <a:r>
+              <a:rPr lang="en-US" altLang="zh-TW" sz="1000" dirty="0"/>
+              <a:t>=name)</a:t>
+            </a:r>
+          </a:p>
+          <a:p>
+            <a:endParaRPr lang="en-US" altLang="zh-TW" sz="1000" dirty="0"/>
+          </a:p>
+          <a:p>
+            <a:r>
+              <a:rPr lang="en-US" altLang="zh-TW" sz="1000" dirty="0" err="1"/>
+              <a:t>labelPassword</a:t>
+            </a:r>
+            <a:r>
+              <a:rPr lang="en-US" altLang="zh-TW" sz="1000" dirty="0"/>
+              <a:t> = </a:t>
+            </a:r>
+            <a:r>
+              <a:rPr lang="en-US" altLang="zh-TW" sz="1000" dirty="0" err="1"/>
+              <a:t>tk.Label</a:t>
+            </a:r>
+            <a:r>
+              <a:rPr lang="en-US" altLang="zh-TW" sz="1000" dirty="0"/>
+              <a:t>(root, text='Password:')</a:t>
+            </a:r>
+          </a:p>
+          <a:p>
+            <a:r>
+              <a:rPr lang="en-US" altLang="zh-TW" sz="1000" dirty="0" err="1"/>
+              <a:t>entryPassword</a:t>
+            </a:r>
+            <a:r>
+              <a:rPr lang="en-US" altLang="zh-TW" sz="1000" dirty="0"/>
+              <a:t> = </a:t>
+            </a:r>
+            <a:r>
+              <a:rPr lang="en-US" altLang="zh-TW" sz="1000" dirty="0" err="1"/>
+              <a:t>tk.Entry</a:t>
+            </a:r>
+            <a:r>
+              <a:rPr lang="en-US" altLang="zh-TW" sz="1000" dirty="0"/>
+              <a:t>(</a:t>
+            </a:r>
+            <a:r>
+              <a:rPr lang="en-US" altLang="zh-TW" sz="1000" dirty="0" err="1"/>
+              <a:t>root,show</a:t>
+            </a:r>
+            <a:r>
+              <a:rPr lang="en-US" altLang="zh-TW" sz="1000" dirty="0"/>
+              <a:t>='*',font=('Arial',30,'bold'),</a:t>
+            </a:r>
+            <a:r>
+              <a:rPr lang="en-US" altLang="zh-TW" sz="1000" dirty="0" err="1"/>
+              <a:t>textvariable</a:t>
+            </a:r>
+            <a:r>
+              <a:rPr lang="en-US" altLang="zh-TW" sz="1000" dirty="0"/>
+              <a:t>=password)</a:t>
+            </a:r>
+          </a:p>
+          <a:p>
+            <a:endParaRPr lang="en-US" altLang="zh-TW" sz="1000" dirty="0"/>
+          </a:p>
+          <a:p>
+            <a:r>
+              <a:rPr lang="en-US" altLang="zh-TW" sz="1000" dirty="0" err="1"/>
+              <a:t>labelHeight</a:t>
+            </a:r>
+            <a:r>
+              <a:rPr lang="en-US" altLang="zh-TW" sz="1000" dirty="0"/>
+              <a:t> = </a:t>
+            </a:r>
+            <a:r>
+              <a:rPr lang="en-US" altLang="zh-TW" sz="1000" dirty="0" err="1"/>
+              <a:t>tk.Label</a:t>
+            </a:r>
+            <a:r>
+              <a:rPr lang="en-US" altLang="zh-TW" sz="1000" dirty="0"/>
+              <a:t>(root, text='Height(m):')</a:t>
+            </a:r>
+          </a:p>
+          <a:p>
+            <a:r>
+              <a:rPr lang="en-US" altLang="zh-TW" sz="1000" dirty="0" err="1"/>
+              <a:t>entryHeight</a:t>
+            </a:r>
+            <a:r>
+              <a:rPr lang="en-US" altLang="zh-TW" sz="1000" dirty="0"/>
+              <a:t> = </a:t>
+            </a:r>
+            <a:r>
+              <a:rPr lang="en-US" altLang="zh-TW" sz="1000" dirty="0" err="1"/>
+              <a:t>tk.Entry</a:t>
+            </a:r>
+            <a:r>
+              <a:rPr lang="en-US" altLang="zh-TW" sz="1000" dirty="0"/>
+              <a:t>(</a:t>
+            </a:r>
+            <a:r>
+              <a:rPr lang="en-US" altLang="zh-TW" sz="1000" dirty="0" err="1"/>
+              <a:t>root,font</a:t>
+            </a:r>
+            <a:r>
+              <a:rPr lang="en-US" altLang="zh-TW" sz="1000" dirty="0"/>
+              <a:t>=('Arial',30,'bold'),</a:t>
+            </a:r>
+            <a:r>
+              <a:rPr lang="en-US" altLang="zh-TW" sz="1000" dirty="0" err="1"/>
+              <a:t>textvariable</a:t>
+            </a:r>
+            <a:r>
+              <a:rPr lang="en-US" altLang="zh-TW" sz="1000" dirty="0"/>
+              <a:t>=height)</a:t>
+            </a:r>
+          </a:p>
+          <a:p>
+            <a:endParaRPr lang="en-US" altLang="zh-TW" sz="1000" dirty="0"/>
+          </a:p>
+          <a:p>
+            <a:r>
+              <a:rPr lang="en-US" altLang="zh-TW" sz="1000" dirty="0" err="1"/>
+              <a:t>labelWeight</a:t>
+            </a:r>
+            <a:r>
+              <a:rPr lang="en-US" altLang="zh-TW" sz="1000" dirty="0"/>
+              <a:t> = </a:t>
+            </a:r>
+            <a:r>
+              <a:rPr lang="en-US" altLang="zh-TW" sz="1000" dirty="0" err="1"/>
+              <a:t>tk.Label</a:t>
+            </a:r>
+            <a:r>
+              <a:rPr lang="en-US" altLang="zh-TW" sz="1000" dirty="0"/>
+              <a:t>(root, text='Weight(kg):')</a:t>
+            </a:r>
+          </a:p>
+          <a:p>
+            <a:r>
+              <a:rPr lang="en-US" altLang="zh-TW" sz="1000" dirty="0" err="1"/>
+              <a:t>entryWeight</a:t>
+            </a:r>
+            <a:r>
+              <a:rPr lang="en-US" altLang="zh-TW" sz="1000" dirty="0"/>
+              <a:t> = </a:t>
+            </a:r>
+            <a:r>
+              <a:rPr lang="en-US" altLang="zh-TW" sz="1000" dirty="0" err="1"/>
+              <a:t>tk.Entry</a:t>
+            </a:r>
+            <a:r>
+              <a:rPr lang="en-US" altLang="zh-TW" sz="1000" dirty="0"/>
+              <a:t>(</a:t>
+            </a:r>
+            <a:r>
+              <a:rPr lang="en-US" altLang="zh-TW" sz="1000" dirty="0" err="1"/>
+              <a:t>root,font</a:t>
+            </a:r>
+            <a:r>
+              <a:rPr lang="en-US" altLang="zh-TW" sz="1000" dirty="0"/>
+              <a:t>=('Arial',30,'bold'),</a:t>
+            </a:r>
+            <a:r>
+              <a:rPr lang="en-US" altLang="zh-TW" sz="1000" dirty="0" err="1"/>
+              <a:t>textvariable</a:t>
+            </a:r>
+            <a:r>
+              <a:rPr lang="en-US" altLang="zh-TW" sz="1000" dirty="0"/>
+              <a:t>=weight)</a:t>
+            </a:r>
+          </a:p>
+          <a:p>
+            <a:endParaRPr lang="en-US" altLang="zh-TW" sz="1000" dirty="0"/>
+          </a:p>
+          <a:p>
+            <a:r>
+              <a:rPr lang="en-US" altLang="zh-TW" sz="1000" dirty="0" err="1"/>
+              <a:t>labelBirthday</a:t>
+            </a:r>
+            <a:r>
+              <a:rPr lang="en-US" altLang="zh-TW" sz="1000" dirty="0"/>
+              <a:t> = </a:t>
+            </a:r>
+            <a:r>
+              <a:rPr lang="en-US" altLang="zh-TW" sz="1000" dirty="0" err="1"/>
+              <a:t>tk.Label</a:t>
+            </a:r>
+            <a:r>
+              <a:rPr lang="en-US" altLang="zh-TW" sz="1000" dirty="0"/>
+              <a:t>(root, text='Birthday(UTC):')</a:t>
+            </a:r>
+          </a:p>
+          <a:p>
+            <a:r>
+              <a:rPr lang="en-US" altLang="zh-TW" sz="1000" dirty="0" err="1"/>
+              <a:t>entryBirthday</a:t>
+            </a:r>
+            <a:r>
+              <a:rPr lang="en-US" altLang="zh-TW" sz="1000" dirty="0"/>
+              <a:t> = </a:t>
+            </a:r>
+            <a:r>
+              <a:rPr lang="en-US" altLang="zh-TW" sz="1000" dirty="0" err="1"/>
+              <a:t>tk.Entry</a:t>
+            </a:r>
+            <a:r>
+              <a:rPr lang="en-US" altLang="zh-TW" sz="1000" dirty="0"/>
+              <a:t>(</a:t>
+            </a:r>
+            <a:r>
+              <a:rPr lang="en-US" altLang="zh-TW" sz="1000" dirty="0" err="1"/>
+              <a:t>root,font</a:t>
+            </a:r>
+            <a:r>
+              <a:rPr lang="en-US" altLang="zh-TW" sz="1000" dirty="0"/>
+              <a:t>=('Arial',30,'bold'),</a:t>
+            </a:r>
+            <a:r>
+              <a:rPr lang="en-US" altLang="zh-TW" sz="1000" dirty="0" err="1"/>
+              <a:t>textvariable</a:t>
+            </a:r>
+            <a:r>
+              <a:rPr lang="en-US" altLang="zh-TW" sz="1000" dirty="0"/>
+              <a:t>=birthday)</a:t>
+            </a:r>
+          </a:p>
+          <a:p>
+            <a:endParaRPr lang="en-US" altLang="zh-TW" sz="1000" dirty="0"/>
+          </a:p>
+          <a:p>
+            <a:r>
+              <a:rPr lang="en-US" altLang="zh-TW" sz="1000" dirty="0" err="1"/>
+              <a:t>Jsonlabel</a:t>
+            </a:r>
+            <a:r>
+              <a:rPr lang="en-US" altLang="zh-TW" sz="1000" dirty="0"/>
+              <a:t> = </a:t>
+            </a:r>
+            <a:r>
+              <a:rPr lang="en-US" altLang="zh-TW" sz="1000" dirty="0" err="1"/>
+              <a:t>tk.Label</a:t>
+            </a:r>
+            <a:r>
+              <a:rPr lang="en-US" altLang="zh-TW" sz="1000" dirty="0"/>
+              <a:t>(</a:t>
+            </a:r>
+            <a:r>
+              <a:rPr lang="en-US" altLang="zh-TW" sz="1000" dirty="0" err="1"/>
+              <a:t>root,textvariable</a:t>
+            </a:r>
+            <a:r>
+              <a:rPr lang="en-US" altLang="zh-TW" sz="1000" dirty="0"/>
+              <a:t>=</a:t>
+            </a:r>
+            <a:r>
+              <a:rPr lang="en-US" altLang="zh-TW" sz="1000" dirty="0" err="1"/>
+              <a:t>jsonText,font</a:t>
+            </a:r>
+            <a:r>
+              <a:rPr lang="en-US" altLang="zh-TW" sz="1000" dirty="0"/>
+              <a:t>=('Arial',20,'bold'),</a:t>
+            </a:r>
+            <a:r>
+              <a:rPr lang="en-US" altLang="zh-TW" sz="1000" dirty="0" err="1"/>
+              <a:t>fg</a:t>
+            </a:r>
+            <a:r>
+              <a:rPr lang="en-US" altLang="zh-TW" sz="1000" dirty="0"/>
+              <a:t>='#f00')</a:t>
+            </a:r>
+          </a:p>
+          <a:p>
+            <a:endParaRPr lang="en-US" altLang="zh-TW" sz="1000" dirty="0"/>
+          </a:p>
+          <a:p>
+            <a:r>
+              <a:rPr lang="en-US" altLang="zh-TW" sz="1000" dirty="0" err="1"/>
+              <a:t>Serverlabel</a:t>
+            </a:r>
+            <a:r>
+              <a:rPr lang="en-US" altLang="zh-TW" sz="1000" dirty="0"/>
+              <a:t> = </a:t>
+            </a:r>
+            <a:r>
+              <a:rPr lang="en-US" altLang="zh-TW" sz="1000" dirty="0" err="1"/>
+              <a:t>tk.Label</a:t>
+            </a:r>
+            <a:r>
+              <a:rPr lang="en-US" altLang="zh-TW" sz="1000" dirty="0"/>
+              <a:t>(</a:t>
+            </a:r>
+            <a:r>
+              <a:rPr lang="en-US" altLang="zh-TW" sz="1000" dirty="0" err="1"/>
+              <a:t>root,textvariable</a:t>
+            </a:r>
+            <a:r>
+              <a:rPr lang="en-US" altLang="zh-TW" sz="1000" dirty="0"/>
+              <a:t>=</a:t>
+            </a:r>
+            <a:r>
+              <a:rPr lang="en-US" altLang="zh-TW" sz="1000" dirty="0" err="1"/>
+              <a:t>serverText,font</a:t>
+            </a:r>
+            <a:r>
+              <a:rPr lang="en-US" altLang="zh-TW" sz="1000" dirty="0"/>
+              <a:t>=('Arial',20,'bold'),</a:t>
+            </a:r>
+            <a:r>
+              <a:rPr lang="en-US" altLang="zh-TW" sz="1000" dirty="0" err="1"/>
+              <a:t>fg</a:t>
+            </a:r>
+            <a:r>
+              <a:rPr lang="en-US" altLang="zh-TW" sz="1000" dirty="0"/>
+              <a:t>='#00f')</a:t>
+            </a:r>
+          </a:p>
+        </p:txBody>
+      </p:sp>
+      <p:sp>
+        <p:nvSpPr>
+          <p:cNvPr id="14" name="文字方塊 13">
+            <a:extLst>
+              <a:ext uri="{FF2B5EF4-FFF2-40B4-BE49-F238E27FC236}">
+                <a16:creationId xmlns:a16="http://schemas.microsoft.com/office/drawing/2014/main" id="{E3CBCE83-964D-4D74-BEB0-A08584D575E0}"/>
+              </a:ext>
+            </a:extLst>
+          </p:cNvPr>
+          <p:cNvSpPr txBox="1"/>
+          <p:nvPr/>
+        </p:nvSpPr>
+        <p:spPr>
+          <a:xfrm>
+            <a:off x="7797409" y="272480"/>
+            <a:ext cx="4318391" cy="6555641"/>
+          </a:xfrm>
+          <a:prstGeom prst="rect">
+            <a:avLst/>
+          </a:prstGeom>
+          <a:solidFill>
+            <a:schemeClr val="bg1">
+              <a:lumMod val="95000"/>
+            </a:schemeClr>
+          </a:solidFill>
+        </p:spPr>
+        <p:txBody>
+          <a:bodyPr wrap="square">
+            <a:spAutoFit/>
+          </a:bodyPr>
+          <a:lstStyle/>
+          <a:p>
+            <a:r>
+              <a:rPr lang="zh-TW" altLang="en-US" sz="1000" dirty="0"/>
+              <a:t>def submit():</a:t>
+            </a:r>
+          </a:p>
+          <a:p>
+            <a:r>
+              <a:rPr lang="zh-TW" altLang="en-US" sz="1000" dirty="0"/>
+              <a:t>    global gender,name,password,birthday,height,weight,jsonText</a:t>
+            </a:r>
+          </a:p>
+          <a:p>
+            <a:r>
+              <a:rPr lang="zh-TW" altLang="en-US" sz="1000" dirty="0"/>
+              <a:t>    temp =f'gender={gender.get()}\nname={name.get()}\npassword={password.get()}\nbirthday={birthday.get()}\nheight={height.get()}\nweight={weight.get()}'</a:t>
+            </a:r>
+          </a:p>
+          <a:p>
+            <a:r>
+              <a:rPr lang="zh-TW" altLang="en-US" sz="1000" dirty="0"/>
+              <a:t>    jsonText.set(temp)</a:t>
+            </a:r>
+          </a:p>
+          <a:p>
+            <a:r>
+              <a:rPr lang="zh-TW" altLang="en-US" sz="1000" dirty="0">
+                <a:solidFill>
+                  <a:schemeClr val="accent2">
+                    <a:lumMod val="75000"/>
+                  </a:schemeClr>
+                </a:solidFill>
+              </a:rPr>
+              <a:t>    url = 'http://wiciar.com/bmi/submit'</a:t>
+            </a:r>
+          </a:p>
+          <a:p>
+            <a:r>
+              <a:rPr lang="zh-TW" altLang="en-US" sz="1000" dirty="0">
+                <a:solidFill>
+                  <a:schemeClr val="accent2">
+                    <a:lumMod val="75000"/>
+                  </a:schemeClr>
+                </a:solidFill>
+              </a:rPr>
+              <a:t>    jsonSet = {'name': name.get(),</a:t>
+            </a:r>
+          </a:p>
+          <a:p>
+            <a:r>
+              <a:rPr lang="zh-TW" altLang="en-US" sz="1000" dirty="0">
+                <a:solidFill>
+                  <a:schemeClr val="accent2">
+                    <a:lumMod val="75000"/>
+                  </a:schemeClr>
+                </a:solidFill>
+              </a:rPr>
+              <a:t>               'password': password.get(),</a:t>
+            </a:r>
+          </a:p>
+          <a:p>
+            <a:r>
+              <a:rPr lang="zh-TW" altLang="en-US" sz="1000" dirty="0">
+                <a:solidFill>
+                  <a:schemeClr val="accent2">
+                    <a:lumMod val="75000"/>
+                  </a:schemeClr>
+                </a:solidFill>
+              </a:rPr>
+              <a:t>               'birthday':birthday.get(),</a:t>
+            </a:r>
+          </a:p>
+          <a:p>
+            <a:r>
+              <a:rPr lang="zh-TW" altLang="en-US" sz="1000" dirty="0">
+                <a:solidFill>
+                  <a:schemeClr val="accent2">
+                    <a:lumMod val="75000"/>
+                  </a:schemeClr>
+                </a:solidFill>
+              </a:rPr>
+              <a:t>               'gender':gender.get(),</a:t>
+            </a:r>
+          </a:p>
+          <a:p>
+            <a:r>
+              <a:rPr lang="zh-TW" altLang="en-US" sz="1000" dirty="0">
+                <a:solidFill>
+                  <a:schemeClr val="accent2">
+                    <a:lumMod val="75000"/>
+                  </a:schemeClr>
+                </a:solidFill>
+              </a:rPr>
+              <a:t>               'height':float(height.get()),</a:t>
+            </a:r>
+          </a:p>
+          <a:p>
+            <a:r>
+              <a:rPr lang="zh-TW" altLang="en-US" sz="1000" dirty="0">
+                <a:solidFill>
+                  <a:schemeClr val="accent2">
+                    <a:lumMod val="75000"/>
+                  </a:schemeClr>
+                </a:solidFill>
+              </a:rPr>
+              <a:t>               'weight':float(weight.get())}</a:t>
+            </a:r>
+          </a:p>
+          <a:p>
+            <a:r>
+              <a:rPr lang="zh-TW" altLang="en-US" sz="1000" dirty="0">
+                <a:solidFill>
+                  <a:schemeClr val="accent2">
+                    <a:lumMod val="75000"/>
+                  </a:schemeClr>
+                </a:solidFill>
+              </a:rPr>
+              <a:t>    #print(jsonSet)</a:t>
+            </a:r>
+          </a:p>
+          <a:p>
+            <a:r>
+              <a:rPr lang="zh-TW" altLang="en-US" sz="1000" dirty="0">
+                <a:solidFill>
+                  <a:schemeClr val="accent2">
+                    <a:lumMod val="75000"/>
+                  </a:schemeClr>
+                </a:solidFill>
+              </a:rPr>
+              <a:t>    try:</a:t>
+            </a:r>
+          </a:p>
+          <a:p>
+            <a:r>
+              <a:rPr lang="zh-TW" altLang="en-US" sz="1000" dirty="0">
+                <a:solidFill>
+                  <a:schemeClr val="accent2">
+                    <a:lumMod val="75000"/>
+                  </a:schemeClr>
+                </a:solidFill>
+              </a:rPr>
+              <a:t>        response = requests.post(url, json=jsonSet)</a:t>
+            </a:r>
+          </a:p>
+          <a:p>
+            <a:r>
+              <a:rPr lang="zh-TW" altLang="en-US" sz="1000" dirty="0">
+                <a:solidFill>
+                  <a:schemeClr val="accent2">
+                    <a:lumMod val="75000"/>
+                  </a:schemeClr>
+                </a:solidFill>
+              </a:rPr>
+              <a:t>        serverText.set(response.json()['message'])</a:t>
+            </a:r>
+          </a:p>
+          <a:p>
+            <a:r>
+              <a:rPr lang="zh-TW" altLang="en-US" sz="1000" dirty="0">
+                <a:solidFill>
+                  <a:schemeClr val="accent2">
+                    <a:lumMod val="75000"/>
+                  </a:schemeClr>
+                </a:solidFill>
+              </a:rPr>
+              <a:t>        print('Response JSON:', response.json())</a:t>
+            </a:r>
+          </a:p>
+          <a:p>
+            <a:r>
+              <a:rPr lang="zh-TW" altLang="en-US" sz="1000" dirty="0">
+                <a:solidFill>
+                  <a:schemeClr val="accent2">
+                    <a:lumMod val="75000"/>
+                  </a:schemeClr>
+                </a:solidFill>
+              </a:rPr>
+              <a:t>    except:</a:t>
+            </a:r>
+          </a:p>
+          <a:p>
+            <a:r>
+              <a:rPr lang="zh-TW" altLang="en-US" sz="1000" dirty="0">
+                <a:solidFill>
+                  <a:schemeClr val="accent2">
+                    <a:lumMod val="75000"/>
+                  </a:schemeClr>
+                </a:solidFill>
+              </a:rPr>
+              <a:t>        serverText.set('Server Link error!!!')</a:t>
+            </a:r>
+          </a:p>
+          <a:p>
+            <a:r>
+              <a:rPr lang="zh-TW" altLang="en-US" sz="1000" dirty="0">
+                <a:solidFill>
+                  <a:schemeClr val="accent2">
+                    <a:lumMod val="75000"/>
+                  </a:schemeClr>
+                </a:solidFill>
+              </a:rPr>
+              <a:t>        print('Status Code:', response.status_code)</a:t>
+            </a:r>
+          </a:p>
+          <a:p>
+            <a:r>
+              <a:rPr lang="zh-TW" altLang="en-US" sz="1000" dirty="0"/>
+              <a:t>    </a:t>
+            </a:r>
+          </a:p>
+          <a:p>
+            <a:r>
+              <a:rPr lang="zh-TW" altLang="en-US" sz="1000" dirty="0"/>
+              <a:t>submit_btn1 = tk.Button(root,command=submit,text='PassData',font=('Arial',30,'bold'),padx=10,pady=10,activeforeground='#f00')</a:t>
+            </a:r>
+          </a:p>
+          <a:p>
+            <a:endParaRPr lang="zh-TW" altLang="en-US" sz="1000" dirty="0"/>
+          </a:p>
+          <a:p>
+            <a:r>
+              <a:rPr lang="zh-TW" altLang="en-US" sz="1000" dirty="0"/>
+              <a:t>radio_btn1.grid(column=0, row=0) </a:t>
+            </a:r>
+          </a:p>
+          <a:p>
+            <a:r>
+              <a:rPr lang="zh-TW" altLang="en-US" sz="1000" dirty="0"/>
+              <a:t>radio_btn2.grid(column=1, row=0)</a:t>
+            </a:r>
+          </a:p>
+          <a:p>
+            <a:r>
+              <a:rPr lang="zh-TW" altLang="en-US" sz="1000" dirty="0"/>
+              <a:t>labelName.grid(column=0, row=1)</a:t>
+            </a:r>
+          </a:p>
+          <a:p>
+            <a:r>
+              <a:rPr lang="zh-TW" altLang="en-US" sz="1000" dirty="0"/>
+              <a:t>entryName.grid(column=1, row=1)</a:t>
+            </a:r>
+          </a:p>
+          <a:p>
+            <a:r>
+              <a:rPr lang="zh-TW" altLang="en-US" sz="1000" dirty="0"/>
+              <a:t>labelPassword.grid(column=0, row=2)</a:t>
+            </a:r>
+          </a:p>
+          <a:p>
+            <a:r>
+              <a:rPr lang="zh-TW" altLang="en-US" sz="1000" dirty="0"/>
+              <a:t>entryPassword.grid(column=1, row=2)</a:t>
+            </a:r>
+          </a:p>
+          <a:p>
+            <a:r>
+              <a:rPr lang="zh-TW" altLang="en-US" sz="1000" dirty="0"/>
+              <a:t>labelHeight.grid(column=0, row=3)</a:t>
+            </a:r>
+          </a:p>
+          <a:p>
+            <a:r>
+              <a:rPr lang="zh-TW" altLang="en-US" sz="1000" dirty="0"/>
+              <a:t>entryHeight.grid(column=1, row=3)</a:t>
+            </a:r>
+          </a:p>
+          <a:p>
+            <a:r>
+              <a:rPr lang="zh-TW" altLang="en-US" sz="1000" dirty="0"/>
+              <a:t>labelWeight.grid(column=0, row=4)</a:t>
+            </a:r>
+          </a:p>
+          <a:p>
+            <a:r>
+              <a:rPr lang="zh-TW" altLang="en-US" sz="1000" dirty="0"/>
+              <a:t>entryWeight.grid(column=1, row=4)</a:t>
+            </a:r>
+          </a:p>
+          <a:p>
+            <a:r>
+              <a:rPr lang="zh-TW" altLang="en-US" sz="1000" dirty="0"/>
+              <a:t>labelBirthday.grid(column=0, row=5)</a:t>
+            </a:r>
+          </a:p>
+          <a:p>
+            <a:r>
+              <a:rPr lang="zh-TW" altLang="en-US" sz="1000" dirty="0"/>
+              <a:t>entryBirthday.grid(column=1, row=5)</a:t>
+            </a:r>
+          </a:p>
+          <a:p>
+            <a:r>
+              <a:rPr lang="zh-TW" altLang="en-US" sz="1000" dirty="0"/>
+              <a:t>submit_btn1.grid(column=1, row=6)</a:t>
+            </a:r>
+          </a:p>
+          <a:p>
+            <a:r>
+              <a:rPr lang="zh-TW" altLang="en-US" sz="1000" dirty="0"/>
+              <a:t>Jsonlabel.grid(column=1, row=7)</a:t>
+            </a:r>
+          </a:p>
+          <a:p>
+            <a:r>
+              <a:rPr lang="zh-TW" altLang="en-US" sz="1000" dirty="0"/>
+              <a:t>Serverlabel.grid(column=1, row=8)</a:t>
+            </a:r>
+          </a:p>
+          <a:p>
+            <a:r>
+              <a:rPr lang="zh-TW" altLang="en-US" sz="1000" dirty="0"/>
+              <a:t>root.mainloop()</a:t>
+            </a:r>
+          </a:p>
+        </p:txBody>
+      </p:sp>
+      <p:cxnSp>
+        <p:nvCxnSpPr>
+          <p:cNvPr id="15" name="接點: 肘形 14">
+            <a:extLst>
+              <a:ext uri="{FF2B5EF4-FFF2-40B4-BE49-F238E27FC236}">
+                <a16:creationId xmlns:a16="http://schemas.microsoft.com/office/drawing/2014/main" id="{4A6301E0-D73A-4A40-B74E-9D73BCA62DB8}"/>
+              </a:ext>
+            </a:extLst>
+          </p:cNvPr>
+          <p:cNvCxnSpPr>
+            <a:cxnSpLocks/>
+            <a:stCxn id="12" idx="2"/>
+            <a:endCxn id="14" idx="0"/>
+          </p:cNvCxnSpPr>
+          <p:nvPr/>
+        </p:nvCxnSpPr>
+        <p:spPr>
+          <a:xfrm rot="5400000" flipH="1" flipV="1">
+            <a:off x="3222242" y="-121895"/>
+            <a:ext cx="6339987" cy="7128738"/>
+          </a:xfrm>
+          <a:prstGeom prst="bentConnector5">
+            <a:avLst>
+              <a:gd name="adj1" fmla="val -2805"/>
+              <a:gd name="adj2" fmla="val 53206"/>
+              <a:gd name="adj3" fmla="val 103606"/>
+            </a:avLst>
+          </a:prstGeom>
+          <a:ln>
+            <a:tailEnd type="triangle"/>
+          </a:ln>
+        </p:spPr>
+        <p:style>
+          <a:lnRef idx="1">
+            <a:schemeClr val="accent1"/>
+          </a:lnRef>
+          <a:fillRef idx="0">
+            <a:schemeClr val="accent1"/>
+          </a:fillRef>
+          <a:effectRef idx="0">
+            <a:schemeClr val="accent1"/>
+          </a:effectRef>
+          <a:fontRef idx="minor">
+            <a:schemeClr val="tx1"/>
+          </a:fontRef>
+        </p:style>
+      </p:cxnSp>
+      <p:sp>
+        <p:nvSpPr>
+          <p:cNvPr id="8" name="文字方塊 7">
+            <a:extLst>
+              <a:ext uri="{FF2B5EF4-FFF2-40B4-BE49-F238E27FC236}">
+                <a16:creationId xmlns:a16="http://schemas.microsoft.com/office/drawing/2014/main" id="{4A8AA91F-A3ED-423C-B62E-E596574B16A6}"/>
+              </a:ext>
+            </a:extLst>
+          </p:cNvPr>
+          <p:cNvSpPr txBox="1"/>
+          <p:nvPr/>
+        </p:nvSpPr>
+        <p:spPr>
+          <a:xfrm>
+            <a:off x="2328528" y="734145"/>
+            <a:ext cx="3536282" cy="369332"/>
+          </a:xfrm>
+          <a:prstGeom prst="rect">
+            <a:avLst/>
+          </a:prstGeom>
+          <a:noFill/>
+        </p:spPr>
+        <p:txBody>
+          <a:bodyPr wrap="square" rtlCol="0">
+            <a:spAutoFit/>
+          </a:bodyPr>
+          <a:lstStyle/>
+          <a:p>
+            <a:r>
+              <a:rPr lang="en-US" altLang="zh-TW" dirty="0"/>
+              <a:t>Step1: Write Code--Client_UI1.py</a:t>
+            </a:r>
+          </a:p>
+        </p:txBody>
+      </p:sp>
+    </p:spTree>
+    <p:extLst>
+      <p:ext uri="{BB962C8B-B14F-4D97-AF65-F5344CB8AC3E}">
+        <p14:creationId xmlns:p14="http://schemas.microsoft.com/office/powerpoint/2010/main" val="3059346436"/>
+      </p:ext>
+    </p:extLst>
+  </p:cSld>
+  <p:clrMapOvr>
+    <a:masterClrMapping/>
+  </p:clrMapOvr>
+</p:sld>
+</file>
+
+<file path=ppt/slides/slide24.xml><?xml version="1.0" encoding="utf-8"?>
+<p:sld xmlns:a="http://schemas.openxmlformats.org/drawingml/2006/main" xmlns:r="http://schemas.openxmlformats.org/officeDocument/2006/relationships" xmlns:p="http://schemas.openxmlformats.org/presentationml/2006/main">
+  <p:cSld>
+    <p:spTree>
+      <p:nvGrpSpPr>
+        <p:cNvPr id="1" name=""/>
+        <p:cNvGrpSpPr/>
+        <p:nvPr/>
+      </p:nvGrpSpPr>
+      <p:grpSpPr>
+        <a:xfrm>
+          <a:off x="0" y="0"/>
+          <a:ext cx="0" cy="0"/>
+          <a:chOff x="0" y="0"/>
+          <a:chExt cx="0" cy="0"/>
+        </a:xfrm>
+      </p:grpSpPr>
+      <p:sp>
+        <p:nvSpPr>
+          <p:cNvPr id="8" name="文字方塊 7">
+            <a:extLst>
+              <a:ext uri="{FF2B5EF4-FFF2-40B4-BE49-F238E27FC236}">
+                <a16:creationId xmlns:a16="http://schemas.microsoft.com/office/drawing/2014/main" id="{4A8AA91F-A3ED-423C-B62E-E596574B16A6}"/>
+              </a:ext>
+            </a:extLst>
+          </p:cNvPr>
+          <p:cNvSpPr txBox="1"/>
+          <p:nvPr/>
+        </p:nvSpPr>
+        <p:spPr>
+          <a:xfrm>
+            <a:off x="2370862" y="729626"/>
+            <a:ext cx="3536282" cy="369332"/>
+          </a:xfrm>
+          <a:prstGeom prst="rect">
+            <a:avLst/>
+          </a:prstGeom>
+          <a:noFill/>
+        </p:spPr>
+        <p:txBody>
+          <a:bodyPr wrap="square" rtlCol="0">
+            <a:spAutoFit/>
+          </a:bodyPr>
+          <a:lstStyle/>
+          <a:p>
+            <a:r>
+              <a:rPr lang="en-US" altLang="zh-TW" dirty="0"/>
+              <a:t>Step2: Run Client_UI1.py</a:t>
+            </a:r>
+          </a:p>
+        </p:txBody>
+      </p:sp>
+      <p:pic>
+        <p:nvPicPr>
+          <p:cNvPr id="6" name="圖片 5">
+            <a:extLst>
+              <a:ext uri="{FF2B5EF4-FFF2-40B4-BE49-F238E27FC236}">
+                <a16:creationId xmlns:a16="http://schemas.microsoft.com/office/drawing/2014/main" id="{E0CF228C-431B-45B2-AF5D-7F3AF60CF725}"/>
+              </a:ext>
+            </a:extLst>
+          </p:cNvPr>
+          <p:cNvPicPr>
+            <a:picLocks noChangeAspect="1"/>
+          </p:cNvPicPr>
+          <p:nvPr/>
+        </p:nvPicPr>
+        <p:blipFill>
+          <a:blip r:embed="rId3"/>
+          <a:stretch>
+            <a:fillRect/>
+          </a:stretch>
+        </p:blipFill>
+        <p:spPr>
+          <a:xfrm>
+            <a:off x="1182840" y="1098958"/>
+            <a:ext cx="9516998" cy="5657442"/>
+          </a:xfrm>
+          <a:prstGeom prst="rect">
+            <a:avLst/>
+          </a:prstGeom>
+        </p:spPr>
+      </p:pic>
+      <p:sp>
+        <p:nvSpPr>
+          <p:cNvPr id="13" name="標題 1">
+            <a:extLst>
+              <a:ext uri="{FF2B5EF4-FFF2-40B4-BE49-F238E27FC236}">
+                <a16:creationId xmlns:a16="http://schemas.microsoft.com/office/drawing/2014/main" id="{4CF1DEF1-9264-4363-810A-F9F341A53BF1}"/>
+              </a:ext>
+            </a:extLst>
+          </p:cNvPr>
+          <p:cNvSpPr txBox="1">
+            <a:spLocks/>
+          </p:cNvSpPr>
+          <p:nvPr/>
+        </p:nvSpPr>
+        <p:spPr>
+          <a:xfrm>
+            <a:off x="880533" y="-180147"/>
+            <a:ext cx="11150600" cy="1098958"/>
+          </a:xfrm>
+          <a:prstGeom prst="rect">
+            <a:avLst/>
+          </a:prstGeom>
+        </p:spPr>
+        <p:txBody>
+          <a:bodyPr vert="horz" lIns="91440" tIns="45720" rIns="91440" bIns="45720" rtlCol="0" anchor="ctr">
+            <a:normAutofit/>
+          </a:bodyPr>
+          <a:lstStyle>
+            <a:lvl1pPr algn="l" defTabSz="914400" rtl="0" eaLnBrk="1" latinLnBrk="0" hangingPunct="1">
+              <a:lnSpc>
+                <a:spcPct val="90000"/>
+              </a:lnSpc>
+              <a:spcBef>
+                <a:spcPct val="0"/>
+              </a:spcBef>
+              <a:buNone/>
+              <a:defRPr sz="4400" kern="1200">
+                <a:solidFill>
+                  <a:schemeClr val="tx1"/>
+                </a:solidFill>
+                <a:latin typeface="+mj-lt"/>
+                <a:ea typeface="+mj-ea"/>
+                <a:cs typeface="+mj-cs"/>
+              </a:defRPr>
+            </a:lvl1pPr>
+          </a:lstStyle>
+          <a:p>
+            <a:r>
+              <a:rPr lang="en-US" altLang="zh-TW"/>
+              <a:t>11.Client UI Design</a:t>
+            </a:r>
+            <a:r>
+              <a:rPr lang="zh-TW" altLang="en-US"/>
+              <a:t> </a:t>
+            </a:r>
+            <a:r>
+              <a:rPr lang="en-US" altLang="zh-TW"/>
+              <a:t>for Python</a:t>
+            </a:r>
+            <a:endParaRPr lang="zh-TW" altLang="en-US" dirty="0"/>
+          </a:p>
+        </p:txBody>
+      </p:sp>
+    </p:spTree>
+    <p:extLst>
+      <p:ext uri="{BB962C8B-B14F-4D97-AF65-F5344CB8AC3E}">
+        <p14:creationId xmlns:p14="http://schemas.microsoft.com/office/powerpoint/2010/main" val="3695799830"/>
       </p:ext>
     </p:extLst>
   </p:cSld>

</xml_diff>

<commit_message>
Client2--User Historical Information Get and Data Visualization
</commit_message>
<xml_diff>
--- a/PythonFlask/Teach.pptx
+++ b/PythonFlask/Teach.pptx
@@ -5,7 +5,7 @@
     <p:sldMasterId id="2147483648" r:id="rId1"/>
   </p:sldMasterIdLst>
   <p:notesMasterIdLst>
-    <p:notesMasterId r:id="rId26"/>
+    <p:notesMasterId r:id="rId28"/>
   </p:notesMasterIdLst>
   <p:sldIdLst>
     <p:sldId id="256" r:id="rId2"/>
@@ -32,6 +32,8 @@
     <p:sldId id="278" r:id="rId23"/>
     <p:sldId id="279" r:id="rId24"/>
     <p:sldId id="280" r:id="rId25"/>
+    <p:sldId id="281" r:id="rId26"/>
+    <p:sldId id="282" r:id="rId27"/>
   </p:sldIdLst>
   <p:sldSz cx="12192000" cy="6858000"/>
   <p:notesSz cx="6858000" cy="9144000"/>
@@ -730,6 +732,174 @@
     <p:extLst>
       <p:ext uri="{BB962C8B-B14F-4D97-AF65-F5344CB8AC3E}">
         <p14:creationId xmlns:p14="http://schemas.microsoft.com/office/powerpoint/2010/main" val="58443040"/>
+      </p:ext>
+    </p:extLst>
+  </p:cSld>
+  <p:clrMapOvr>
+    <a:masterClrMapping/>
+  </p:clrMapOvr>
+</p:notes>
+</file>
+
+<file path=ppt/notesSlides/notesSlide4.xml><?xml version="1.0" encoding="utf-8"?>
+<p:notes xmlns:a="http://schemas.openxmlformats.org/drawingml/2006/main" xmlns:r="http://schemas.openxmlformats.org/officeDocument/2006/relationships" xmlns:p="http://schemas.openxmlformats.org/presentationml/2006/main">
+  <p:cSld>
+    <p:spTree>
+      <p:nvGrpSpPr>
+        <p:cNvPr id="1" name=""/>
+        <p:cNvGrpSpPr/>
+        <p:nvPr/>
+      </p:nvGrpSpPr>
+      <p:grpSpPr>
+        <a:xfrm>
+          <a:off x="0" y="0"/>
+          <a:ext cx="0" cy="0"/>
+          <a:chOff x="0" y="0"/>
+          <a:chExt cx="0" cy="0"/>
+        </a:xfrm>
+      </p:grpSpPr>
+      <p:sp>
+        <p:nvSpPr>
+          <p:cNvPr id="2" name="投影片影像版面配置區 1"/>
+          <p:cNvSpPr>
+            <a:spLocks noGrp="1" noRot="1" noChangeAspect="1"/>
+          </p:cNvSpPr>
+          <p:nvPr>
+            <p:ph type="sldImg"/>
+          </p:nvPr>
+        </p:nvSpPr>
+        <p:spPr/>
+      </p:sp>
+      <p:sp>
+        <p:nvSpPr>
+          <p:cNvPr id="3" name="備忘稿版面配置區 2"/>
+          <p:cNvSpPr>
+            <a:spLocks noGrp="1"/>
+          </p:cNvSpPr>
+          <p:nvPr>
+            <p:ph type="body" idx="1"/>
+          </p:nvPr>
+        </p:nvSpPr>
+        <p:spPr/>
+        <p:txBody>
+          <a:bodyPr/>
+          <a:lstStyle/>
+          <a:p>
+            <a:endParaRPr lang="zh-TW" altLang="en-US" dirty="0"/>
+          </a:p>
+        </p:txBody>
+      </p:sp>
+      <p:sp>
+        <p:nvSpPr>
+          <p:cNvPr id="4" name="投影片編號版面配置區 3"/>
+          <p:cNvSpPr>
+            <a:spLocks noGrp="1"/>
+          </p:cNvSpPr>
+          <p:nvPr>
+            <p:ph type="sldNum" sz="quarter" idx="5"/>
+          </p:nvPr>
+        </p:nvSpPr>
+        <p:spPr/>
+        <p:txBody>
+          <a:bodyPr/>
+          <a:lstStyle/>
+          <a:p>
+            <a:fld id="{A9FCBE1C-0420-43B9-B59B-38F9F1B71FEA}" type="slidenum">
+              <a:rPr lang="zh-TW" altLang="en-US" smtClean="0"/>
+              <a:t>25</a:t>
+            </a:fld>
+            <a:endParaRPr lang="zh-TW" altLang="en-US"/>
+          </a:p>
+        </p:txBody>
+      </p:sp>
+    </p:spTree>
+    <p:extLst>
+      <p:ext uri="{BB962C8B-B14F-4D97-AF65-F5344CB8AC3E}">
+        <p14:creationId xmlns:p14="http://schemas.microsoft.com/office/powerpoint/2010/main" val="4202447767"/>
+      </p:ext>
+    </p:extLst>
+  </p:cSld>
+  <p:clrMapOvr>
+    <a:masterClrMapping/>
+  </p:clrMapOvr>
+</p:notes>
+</file>
+
+<file path=ppt/notesSlides/notesSlide5.xml><?xml version="1.0" encoding="utf-8"?>
+<p:notes xmlns:a="http://schemas.openxmlformats.org/drawingml/2006/main" xmlns:r="http://schemas.openxmlformats.org/officeDocument/2006/relationships" xmlns:p="http://schemas.openxmlformats.org/presentationml/2006/main">
+  <p:cSld>
+    <p:spTree>
+      <p:nvGrpSpPr>
+        <p:cNvPr id="1" name=""/>
+        <p:cNvGrpSpPr/>
+        <p:nvPr/>
+      </p:nvGrpSpPr>
+      <p:grpSpPr>
+        <a:xfrm>
+          <a:off x="0" y="0"/>
+          <a:ext cx="0" cy="0"/>
+          <a:chOff x="0" y="0"/>
+          <a:chExt cx="0" cy="0"/>
+        </a:xfrm>
+      </p:grpSpPr>
+      <p:sp>
+        <p:nvSpPr>
+          <p:cNvPr id="2" name="投影片影像版面配置區 1"/>
+          <p:cNvSpPr>
+            <a:spLocks noGrp="1" noRot="1" noChangeAspect="1"/>
+          </p:cNvSpPr>
+          <p:nvPr>
+            <p:ph type="sldImg"/>
+          </p:nvPr>
+        </p:nvSpPr>
+        <p:spPr/>
+      </p:sp>
+      <p:sp>
+        <p:nvSpPr>
+          <p:cNvPr id="3" name="備忘稿版面配置區 2"/>
+          <p:cNvSpPr>
+            <a:spLocks noGrp="1"/>
+          </p:cNvSpPr>
+          <p:nvPr>
+            <p:ph type="body" idx="1"/>
+          </p:nvPr>
+        </p:nvSpPr>
+        <p:spPr/>
+        <p:txBody>
+          <a:bodyPr/>
+          <a:lstStyle/>
+          <a:p>
+            <a:endParaRPr lang="zh-TW" altLang="en-US" dirty="0"/>
+          </a:p>
+        </p:txBody>
+      </p:sp>
+      <p:sp>
+        <p:nvSpPr>
+          <p:cNvPr id="4" name="投影片編號版面配置區 3"/>
+          <p:cNvSpPr>
+            <a:spLocks noGrp="1"/>
+          </p:cNvSpPr>
+          <p:nvPr>
+            <p:ph type="sldNum" sz="quarter" idx="5"/>
+          </p:nvPr>
+        </p:nvSpPr>
+        <p:spPr/>
+        <p:txBody>
+          <a:bodyPr/>
+          <a:lstStyle/>
+          <a:p>
+            <a:fld id="{A9FCBE1C-0420-43B9-B59B-38F9F1B71FEA}" type="slidenum">
+              <a:rPr lang="zh-TW" altLang="en-US" smtClean="0"/>
+              <a:t>26</a:t>
+            </a:fld>
+            <a:endParaRPr lang="zh-TW" altLang="en-US"/>
+          </a:p>
+        </p:txBody>
+      </p:sp>
+    </p:spTree>
+    <p:extLst>
+      <p:ext uri="{BB962C8B-B14F-4D97-AF65-F5344CB8AC3E}">
+        <p14:creationId xmlns:p14="http://schemas.microsoft.com/office/powerpoint/2010/main" val="4090231275"/>
       </p:ext>
     </p:extLst>
   </p:cSld>
@@ -9722,6 +9892,1064 @@
     <p:extLst>
       <p:ext uri="{BB962C8B-B14F-4D97-AF65-F5344CB8AC3E}">
         <p14:creationId xmlns:p14="http://schemas.microsoft.com/office/powerpoint/2010/main" val="3695799830"/>
+      </p:ext>
+    </p:extLst>
+  </p:cSld>
+  <p:clrMapOvr>
+    <a:masterClrMapping/>
+  </p:clrMapOvr>
+</p:sld>
+</file>
+
+<file path=ppt/slides/slide25.xml><?xml version="1.0" encoding="utf-8"?>
+<p:sld xmlns:a="http://schemas.openxmlformats.org/drawingml/2006/main" xmlns:r="http://schemas.openxmlformats.org/officeDocument/2006/relationships" xmlns:p="http://schemas.openxmlformats.org/presentationml/2006/main">
+  <p:cSld>
+    <p:spTree>
+      <p:nvGrpSpPr>
+        <p:cNvPr id="1" name=""/>
+        <p:cNvGrpSpPr/>
+        <p:nvPr/>
+      </p:nvGrpSpPr>
+      <p:grpSpPr>
+        <a:xfrm>
+          <a:off x="0" y="0"/>
+          <a:ext cx="0" cy="0"/>
+          <a:chOff x="0" y="0"/>
+          <a:chExt cx="0" cy="0"/>
+        </a:xfrm>
+      </p:grpSpPr>
+      <p:sp>
+        <p:nvSpPr>
+          <p:cNvPr id="8" name="文字方塊 7">
+            <a:extLst>
+              <a:ext uri="{FF2B5EF4-FFF2-40B4-BE49-F238E27FC236}">
+                <a16:creationId xmlns:a16="http://schemas.microsoft.com/office/drawing/2014/main" id="{4A8AA91F-A3ED-423C-B62E-E596574B16A6}"/>
+              </a:ext>
+            </a:extLst>
+          </p:cNvPr>
+          <p:cNvSpPr txBox="1"/>
+          <p:nvPr/>
+        </p:nvSpPr>
+        <p:spPr>
+          <a:xfrm>
+            <a:off x="880533" y="549479"/>
+            <a:ext cx="3536282" cy="369332"/>
+          </a:xfrm>
+          <a:prstGeom prst="rect">
+            <a:avLst/>
+          </a:prstGeom>
+          <a:noFill/>
+        </p:spPr>
+        <p:txBody>
+          <a:bodyPr wrap="square" rtlCol="0">
+            <a:spAutoFit/>
+          </a:bodyPr>
+          <a:lstStyle/>
+          <a:p>
+            <a:r>
+              <a:rPr lang="en-US" altLang="zh-TW" dirty="0" smtClean="0"/>
+              <a:t>Step1</a:t>
+            </a:r>
+            <a:r>
+              <a:rPr lang="en-US" altLang="zh-TW" dirty="0"/>
+              <a:t>: Write </a:t>
+            </a:r>
+            <a:r>
+              <a:rPr lang="en-US" altLang="zh-TW" dirty="0" smtClean="0"/>
+              <a:t>Code--Client2.py</a:t>
+            </a:r>
+            <a:endParaRPr lang="en-US" altLang="zh-TW" dirty="0"/>
+          </a:p>
+        </p:txBody>
+      </p:sp>
+      <p:sp>
+        <p:nvSpPr>
+          <p:cNvPr id="13" name="標題 1">
+            <a:extLst>
+              <a:ext uri="{FF2B5EF4-FFF2-40B4-BE49-F238E27FC236}">
+                <a16:creationId xmlns:a16="http://schemas.microsoft.com/office/drawing/2014/main" id="{4CF1DEF1-9264-4363-810A-F9F341A53BF1}"/>
+              </a:ext>
+            </a:extLst>
+          </p:cNvPr>
+          <p:cNvSpPr txBox="1">
+            <a:spLocks/>
+          </p:cNvSpPr>
+          <p:nvPr/>
+        </p:nvSpPr>
+        <p:spPr>
+          <a:xfrm>
+            <a:off x="880533" y="-180147"/>
+            <a:ext cx="11150600" cy="1098958"/>
+          </a:xfrm>
+          <a:prstGeom prst="rect">
+            <a:avLst/>
+          </a:prstGeom>
+        </p:spPr>
+        <p:txBody>
+          <a:bodyPr vert="horz" lIns="91440" tIns="45720" rIns="91440" bIns="45720" rtlCol="0" anchor="ctr">
+            <a:normAutofit/>
+          </a:bodyPr>
+          <a:lstStyle>
+            <a:lvl1pPr algn="l" defTabSz="914400" rtl="0" eaLnBrk="1" latinLnBrk="0" hangingPunct="1">
+              <a:lnSpc>
+                <a:spcPct val="90000"/>
+              </a:lnSpc>
+              <a:spcBef>
+                <a:spcPct val="0"/>
+              </a:spcBef>
+              <a:buNone/>
+              <a:defRPr sz="4400" kern="1200">
+                <a:solidFill>
+                  <a:schemeClr val="tx1"/>
+                </a:solidFill>
+                <a:latin typeface="+mj-lt"/>
+                <a:ea typeface="+mj-ea"/>
+                <a:cs typeface="+mj-cs"/>
+              </a:defRPr>
+            </a:lvl1pPr>
+          </a:lstStyle>
+          <a:p>
+            <a:r>
+              <a:rPr lang="en-US" altLang="zh-TW" dirty="0" smtClean="0"/>
+              <a:t>12.Client</a:t>
+            </a:r>
+            <a:r>
+              <a:rPr lang="zh-TW" altLang="en-US" dirty="0" smtClean="0"/>
+              <a:t> </a:t>
+            </a:r>
+            <a:r>
+              <a:rPr lang="en-US" altLang="zh-TW" dirty="0" smtClean="0"/>
+              <a:t>get </a:t>
+            </a:r>
+            <a:r>
+              <a:rPr lang="en-US" altLang="zh-TW" dirty="0"/>
+              <a:t>User </a:t>
+            </a:r>
+            <a:r>
+              <a:rPr lang="en-US" altLang="zh-TW" dirty="0" smtClean="0"/>
+              <a:t>historical information</a:t>
+            </a:r>
+            <a:endParaRPr lang="zh-TW" altLang="en-US" dirty="0"/>
+          </a:p>
+        </p:txBody>
+      </p:sp>
+      <p:sp>
+        <p:nvSpPr>
+          <p:cNvPr id="2" name="矩形 1"/>
+          <p:cNvSpPr/>
+          <p:nvPr/>
+        </p:nvSpPr>
+        <p:spPr>
+          <a:xfrm>
+            <a:off x="209973" y="918811"/>
+            <a:ext cx="5337387" cy="5078313"/>
+          </a:xfrm>
+          <a:prstGeom prst="rect">
+            <a:avLst/>
+          </a:prstGeom>
+          <a:solidFill>
+            <a:schemeClr val="bg1">
+              <a:lumMod val="95000"/>
+            </a:schemeClr>
+          </a:solidFill>
+        </p:spPr>
+        <p:txBody>
+          <a:bodyPr wrap="square">
+            <a:spAutoFit/>
+          </a:bodyPr>
+          <a:lstStyle/>
+          <a:p>
+            <a:r>
+              <a:rPr lang="zh-TW" altLang="en-US" sz="1200" dirty="0"/>
+              <a:t>import requests</a:t>
+            </a:r>
+          </a:p>
+          <a:p>
+            <a:r>
+              <a:rPr lang="zh-TW" altLang="en-US" sz="1200" dirty="0"/>
+              <a:t>import pandas as pd</a:t>
+            </a:r>
+          </a:p>
+          <a:p>
+            <a:r>
+              <a:rPr lang="zh-TW" altLang="en-US" sz="1200" dirty="0"/>
+              <a:t>import matplotlib.pyplot as </a:t>
+            </a:r>
+            <a:r>
+              <a:rPr lang="zh-TW" altLang="en-US" sz="1200" dirty="0" smtClean="0"/>
+              <a:t>plt</a:t>
+            </a:r>
+          </a:p>
+          <a:p>
+            <a:endParaRPr lang="zh-TW" altLang="en-US" sz="1200" dirty="0" smtClean="0"/>
+          </a:p>
+          <a:p>
+            <a:r>
+              <a:rPr lang="zh-TW" altLang="en-US" sz="1200" dirty="0" smtClean="0"/>
+              <a:t>url </a:t>
+            </a:r>
+            <a:r>
+              <a:rPr lang="zh-TW" altLang="en-US" sz="1200" dirty="0"/>
+              <a:t>= 'http://wiciar.com/bmi/data_get'</a:t>
+            </a:r>
+          </a:p>
+          <a:p>
+            <a:r>
+              <a:rPr lang="zh-TW" altLang="en-US" sz="1200" dirty="0"/>
+              <a:t>payload = {'name': 'wiki2',</a:t>
+            </a:r>
+          </a:p>
+          <a:p>
+            <a:r>
+              <a:rPr lang="zh-TW" altLang="en-US" sz="1200" dirty="0"/>
+              <a:t>           'password': 'abc123'}</a:t>
+            </a:r>
+          </a:p>
+          <a:p>
+            <a:r>
+              <a:rPr lang="zh-TW" altLang="en-US" sz="1200" dirty="0"/>
+              <a:t>print('Json Code:', payload)</a:t>
+            </a:r>
+          </a:p>
+          <a:p>
+            <a:r>
+              <a:rPr lang="zh-TW" altLang="en-US" sz="1200" dirty="0"/>
+              <a:t>response = requests.post(url, json=payload)</a:t>
+            </a:r>
+          </a:p>
+          <a:p>
+            <a:r>
+              <a:rPr lang="zh-TW" altLang="en-US" sz="1200" dirty="0"/>
+              <a:t>print('Status Code:', response.status_code)</a:t>
+            </a:r>
+          </a:p>
+          <a:p>
+            <a:r>
+              <a:rPr lang="zh-TW" altLang="en-US" sz="1200" dirty="0"/>
+              <a:t>#print('Response JSON:', response.json()['message'])</a:t>
+            </a:r>
+          </a:p>
+          <a:p>
+            <a:r>
+              <a:rPr lang="en-US" altLang="zh-TW" sz="1200" dirty="0"/>
+              <a:t>#Data visualization </a:t>
+            </a:r>
+            <a:r>
+              <a:rPr lang="en-US" altLang="zh-TW" sz="1200" dirty="0" smtClean="0"/>
+              <a:t>output</a:t>
+            </a:r>
+          </a:p>
+          <a:p>
+            <a:r>
+              <a:rPr lang="zh-TW" altLang="en-US" sz="1200" dirty="0" smtClean="0"/>
+              <a:t>data</a:t>
+            </a:r>
+            <a:r>
+              <a:rPr lang="zh-TW" altLang="en-US" sz="1200" dirty="0"/>
+              <a:t>_list = response.json()['message']</a:t>
+            </a:r>
+          </a:p>
+          <a:p>
+            <a:r>
+              <a:rPr lang="zh-TW" altLang="en-US" sz="1200" dirty="0"/>
+              <a:t>df = pd.DataFrame(data_list)</a:t>
+            </a:r>
+          </a:p>
+          <a:p>
+            <a:r>
+              <a:rPr lang="zh-TW" altLang="en-US" sz="1200" dirty="0"/>
+              <a:t>df['build_time'] = pd.to_datetime(df['build_time'])</a:t>
+            </a:r>
+          </a:p>
+          <a:p>
+            <a:r>
+              <a:rPr lang="zh-TW" altLang="en-US" sz="1200" dirty="0"/>
+              <a:t>df = df.dropna(subset=['bmi', 'build_time'])</a:t>
+            </a:r>
+          </a:p>
+          <a:p>
+            <a:r>
+              <a:rPr lang="zh-TW" altLang="en-US" sz="1200" dirty="0"/>
+              <a:t>df = df.sort_values(by='build_time')</a:t>
+            </a:r>
+          </a:p>
+          <a:p>
+            <a:r>
+              <a:rPr lang="zh-TW" altLang="en-US" sz="1200" dirty="0"/>
+              <a:t>plt.figure(figsize=(10, 5))</a:t>
+            </a:r>
+          </a:p>
+          <a:p>
+            <a:r>
+              <a:rPr lang="zh-TW" altLang="en-US" sz="1200" dirty="0"/>
+              <a:t>plt.plot(df['build_time'], df['bmi'], marker='o', linestyle='-', color='blue', label='BMI')</a:t>
+            </a:r>
+          </a:p>
+          <a:p>
+            <a:r>
+              <a:rPr lang="zh-TW" altLang="en-US" sz="1200" dirty="0"/>
+              <a:t>plt.title('BMI Trend Over Time')</a:t>
+            </a:r>
+          </a:p>
+          <a:p>
+            <a:r>
+              <a:rPr lang="zh-TW" altLang="en-US" sz="1200" dirty="0"/>
+              <a:t>plt.xlabel('Build Time')</a:t>
+            </a:r>
+          </a:p>
+          <a:p>
+            <a:r>
+              <a:rPr lang="zh-TW" altLang="en-US" sz="1200" dirty="0"/>
+              <a:t>plt.ylabel('BMI')</a:t>
+            </a:r>
+          </a:p>
+          <a:p>
+            <a:r>
+              <a:rPr lang="zh-TW" altLang="en-US" sz="1200" dirty="0"/>
+              <a:t>plt.grid(True)</a:t>
+            </a:r>
+          </a:p>
+          <a:p>
+            <a:r>
+              <a:rPr lang="zh-TW" altLang="en-US" sz="1200" dirty="0"/>
+              <a:t>plt.xticks(rotation=45)</a:t>
+            </a:r>
+          </a:p>
+          <a:p>
+            <a:r>
+              <a:rPr lang="zh-TW" altLang="en-US" sz="1200" dirty="0"/>
+              <a:t>plt.tight_layout()</a:t>
+            </a:r>
+          </a:p>
+          <a:p>
+            <a:r>
+              <a:rPr lang="zh-TW" altLang="en-US" sz="1200" dirty="0"/>
+              <a:t>plt.legend()</a:t>
+            </a:r>
+          </a:p>
+          <a:p>
+            <a:r>
+              <a:rPr lang="zh-TW" altLang="en-US" sz="1200" dirty="0"/>
+              <a:t>plt.show()</a:t>
+            </a:r>
+          </a:p>
+        </p:txBody>
+      </p:sp>
+      <p:sp>
+        <p:nvSpPr>
+          <p:cNvPr id="9" name="文字方塊 8"/>
+          <p:cNvSpPr txBox="1"/>
+          <p:nvPr/>
+        </p:nvSpPr>
+        <p:spPr>
+          <a:xfrm>
+            <a:off x="6566382" y="549479"/>
+            <a:ext cx="2631939" cy="369332"/>
+          </a:xfrm>
+          <a:prstGeom prst="rect">
+            <a:avLst/>
+          </a:prstGeom>
+          <a:noFill/>
+        </p:spPr>
+        <p:txBody>
+          <a:bodyPr wrap="square" rtlCol="0">
+            <a:spAutoFit/>
+          </a:bodyPr>
+          <a:lstStyle/>
+          <a:p>
+            <a:r>
+              <a:rPr lang="en-US" altLang="zh-TW" dirty="0"/>
+              <a:t>Server1.py  </a:t>
+            </a:r>
+            <a:r>
+              <a:rPr lang="en-US" altLang="zh-TW" dirty="0" smtClean="0"/>
+              <a:t>Code Design</a:t>
+            </a:r>
+            <a:endParaRPr lang="en-US" altLang="zh-TW" dirty="0"/>
+          </a:p>
+        </p:txBody>
+      </p:sp>
+      <p:sp>
+        <p:nvSpPr>
+          <p:cNvPr id="4" name="矩形 3"/>
+          <p:cNvSpPr/>
+          <p:nvPr/>
+        </p:nvSpPr>
+        <p:spPr>
+          <a:xfrm>
+            <a:off x="6566382" y="918811"/>
+            <a:ext cx="4676503" cy="5632311"/>
+          </a:xfrm>
+          <a:prstGeom prst="rect">
+            <a:avLst/>
+          </a:prstGeom>
+          <a:solidFill>
+            <a:schemeClr val="bg1">
+              <a:lumMod val="95000"/>
+            </a:schemeClr>
+          </a:solidFill>
+        </p:spPr>
+        <p:txBody>
+          <a:bodyPr wrap="square">
+            <a:spAutoFit/>
+          </a:bodyPr>
+          <a:lstStyle/>
+          <a:p>
+            <a:r>
+              <a:rPr lang="en-US" altLang="zh-TW" sz="1000" dirty="0"/>
+              <a:t>#</a:t>
+            </a:r>
+            <a:r>
+              <a:rPr lang="en-US" altLang="zh-TW" sz="1000" dirty="0" smtClean="0"/>
+              <a:t>omit…</a:t>
+            </a:r>
+            <a:endParaRPr lang="zh-TW" altLang="en-US" sz="1000" dirty="0"/>
+          </a:p>
+          <a:p>
+            <a:r>
+              <a:rPr lang="zh-TW" altLang="en-US" sz="1000" dirty="0"/>
+              <a:t># GET Method</a:t>
+            </a:r>
+          </a:p>
+          <a:p>
+            <a:r>
+              <a:rPr lang="zh-TW" altLang="en-US" sz="1000" dirty="0"/>
+              <a:t>@app.route('/')</a:t>
+            </a:r>
+          </a:p>
+          <a:p>
+            <a:r>
+              <a:rPr lang="zh-TW" altLang="en-US" sz="1000" dirty="0"/>
+              <a:t>def hello():</a:t>
+            </a:r>
+          </a:p>
+          <a:p>
+            <a:r>
+              <a:rPr lang="zh-TW" altLang="en-US" sz="1000" dirty="0"/>
+              <a:t>    return 'Hello BMI...'</a:t>
+            </a:r>
+          </a:p>
+          <a:p>
+            <a:endParaRPr lang="zh-TW" altLang="en-US" sz="1000" dirty="0"/>
+          </a:p>
+          <a:p>
+            <a:r>
+              <a:rPr lang="zh-TW" altLang="en-US" sz="1000" dirty="0">
+                <a:solidFill>
+                  <a:schemeClr val="accent4">
+                    <a:lumMod val="50000"/>
+                  </a:schemeClr>
+                </a:solidFill>
+              </a:rPr>
+              <a:t># POST Method</a:t>
+            </a:r>
+          </a:p>
+          <a:p>
+            <a:r>
+              <a:rPr lang="zh-TW" altLang="en-US" sz="1000" dirty="0">
+                <a:solidFill>
+                  <a:schemeClr val="accent4">
+                    <a:lumMod val="50000"/>
+                  </a:schemeClr>
+                </a:solidFill>
+              </a:rPr>
+              <a:t>@app.route('/data_get', methods=['POST'])</a:t>
+            </a:r>
+          </a:p>
+          <a:p>
+            <a:r>
+              <a:rPr lang="zh-TW" altLang="en-US" sz="1000" dirty="0">
+                <a:solidFill>
+                  <a:schemeClr val="accent4">
+                    <a:lumMod val="50000"/>
+                  </a:schemeClr>
+                </a:solidFill>
+              </a:rPr>
+              <a:t>def UserDataGet():</a:t>
+            </a:r>
+          </a:p>
+          <a:p>
+            <a:r>
+              <a:rPr lang="zh-TW" altLang="en-US" sz="1000" dirty="0">
+                <a:solidFill>
+                  <a:schemeClr val="accent4">
+                    <a:lumMod val="50000"/>
+                  </a:schemeClr>
+                </a:solidFill>
+              </a:rPr>
+              <a:t>    data = request.get_json()</a:t>
+            </a:r>
+          </a:p>
+          <a:p>
+            <a:r>
+              <a:rPr lang="zh-TW" altLang="en-US" sz="1000" dirty="0">
+                <a:solidFill>
+                  <a:schemeClr val="accent4">
+                    <a:lumMod val="50000"/>
+                  </a:schemeClr>
+                </a:solidFill>
+              </a:rPr>
+              <a:t>    name = data.get('name')</a:t>
+            </a:r>
+          </a:p>
+          <a:p>
+            <a:r>
+              <a:rPr lang="zh-TW" altLang="en-US" sz="1000" dirty="0">
+                <a:solidFill>
+                  <a:schemeClr val="accent4">
+                    <a:lumMod val="50000"/>
+                  </a:schemeClr>
+                </a:solidFill>
+              </a:rPr>
+              <a:t>    password = data.get('password')</a:t>
+            </a:r>
+          </a:p>
+          <a:p>
+            <a:r>
+              <a:rPr lang="zh-TW" altLang="en-US" sz="1000" dirty="0" smtClean="0">
+                <a:solidFill>
+                  <a:schemeClr val="accent4">
+                    <a:lumMod val="50000"/>
+                  </a:schemeClr>
+                </a:solidFill>
+              </a:rPr>
+              <a:t>       </a:t>
+            </a:r>
+          </a:p>
+          <a:p>
+            <a:r>
+              <a:rPr lang="zh-TW" altLang="en-US" sz="1000" dirty="0" smtClean="0">
+                <a:solidFill>
+                  <a:schemeClr val="accent4">
+                    <a:lumMod val="50000"/>
+                  </a:schemeClr>
+                </a:solidFill>
+              </a:rPr>
+              <a:t>    if not name or not password:</a:t>
+            </a:r>
+          </a:p>
+          <a:p>
+            <a:r>
+              <a:rPr lang="zh-TW" altLang="en-US" sz="1000" dirty="0" smtClean="0">
+                <a:solidFill>
+                  <a:schemeClr val="accent4">
+                    <a:lumMod val="50000"/>
+                  </a:schemeClr>
+                </a:solidFill>
+              </a:rPr>
+              <a:t>        </a:t>
+            </a:r>
+            <a:r>
+              <a:rPr lang="zh-TW" altLang="en-US" sz="1000" dirty="0">
+                <a:solidFill>
+                  <a:schemeClr val="accent4">
+                    <a:lumMod val="50000"/>
+                  </a:schemeClr>
+                </a:solidFill>
+              </a:rPr>
+              <a:t>return jsonify(message="get me 'name' &amp; 'password'."), 400</a:t>
+            </a:r>
+          </a:p>
+          <a:p>
+            <a:r>
+              <a:rPr lang="zh-TW" altLang="en-US" sz="1000" dirty="0">
+                <a:solidFill>
+                  <a:schemeClr val="accent4">
+                    <a:lumMod val="50000"/>
+                  </a:schemeClr>
+                </a:solidFill>
+              </a:rPr>
+              <a:t>    </a:t>
+            </a:r>
+          </a:p>
+          <a:p>
+            <a:r>
+              <a:rPr lang="zh-TW" altLang="en-US" sz="1000" dirty="0">
+                <a:solidFill>
+                  <a:schemeClr val="accent4">
+                    <a:lumMod val="50000"/>
+                  </a:schemeClr>
+                </a:solidFill>
+              </a:rPr>
+              <a:t>    filename = f"UserData//{name}.csv"</a:t>
+            </a:r>
+          </a:p>
+          <a:p>
+            <a:endParaRPr lang="zh-TW" altLang="en-US" sz="1000" dirty="0">
+              <a:solidFill>
+                <a:schemeClr val="accent4">
+                  <a:lumMod val="50000"/>
+                </a:schemeClr>
+              </a:solidFill>
+            </a:endParaRPr>
+          </a:p>
+          <a:p>
+            <a:r>
+              <a:rPr lang="zh-TW" altLang="en-US" sz="1000" dirty="0">
+                <a:solidFill>
+                  <a:schemeClr val="accent4">
+                    <a:lumMod val="50000"/>
+                  </a:schemeClr>
+                </a:solidFill>
+              </a:rPr>
+              <a:t>    if os.path.exists(filename):</a:t>
+            </a:r>
+          </a:p>
+          <a:p>
+            <a:r>
+              <a:rPr lang="zh-TW" altLang="en-US" sz="1000" dirty="0">
+                <a:solidFill>
+                  <a:schemeClr val="accent4">
+                    <a:lumMod val="50000"/>
+                  </a:schemeClr>
+                </a:solidFill>
+              </a:rPr>
+              <a:t>        df = pd.read_csv(filename)</a:t>
+            </a:r>
+          </a:p>
+          <a:p>
+            <a:r>
+              <a:rPr lang="zh-TW" altLang="en-US" sz="1000" dirty="0">
+                <a:solidFill>
+                  <a:schemeClr val="accent4">
+                    <a:lumMod val="50000"/>
+                  </a:schemeClr>
+                </a:solidFill>
+              </a:rPr>
+              <a:t>       </a:t>
+            </a:r>
+            <a:r>
+              <a:rPr lang="zh-TW" altLang="en-US" sz="1000" dirty="0" smtClean="0">
+                <a:solidFill>
+                  <a:schemeClr val="accent4">
+                    <a:lumMod val="50000"/>
+                  </a:schemeClr>
+                </a:solidFill>
+              </a:rPr>
+              <a:t> if (df["password"] == password).any():</a:t>
+            </a:r>
+          </a:p>
+          <a:p>
+            <a:r>
+              <a:rPr lang="zh-TW" altLang="en-US" sz="1000" dirty="0" smtClean="0">
+                <a:solidFill>
+                  <a:schemeClr val="accent4">
+                    <a:lumMod val="50000"/>
+                  </a:schemeClr>
+                </a:solidFill>
+              </a:rPr>
+              <a:t>            </a:t>
+            </a:r>
+            <a:r>
+              <a:rPr lang="zh-TW" altLang="en-US" sz="1000" dirty="0">
+                <a:solidFill>
+                  <a:schemeClr val="accent4">
+                    <a:lumMod val="50000"/>
+                  </a:schemeClr>
+                </a:solidFill>
+              </a:rPr>
+              <a:t>df = pd.concat([df, pd.DataFrame()], ignore_index=True)</a:t>
+            </a:r>
+          </a:p>
+          <a:p>
+            <a:r>
+              <a:rPr lang="zh-TW" altLang="en-US" sz="1000" dirty="0">
+                <a:solidFill>
+                  <a:schemeClr val="accent4">
+                    <a:lumMod val="50000"/>
+                  </a:schemeClr>
+                </a:solidFill>
+              </a:rPr>
+              <a:t>        else:</a:t>
+            </a:r>
+          </a:p>
+          <a:p>
+            <a:r>
+              <a:rPr lang="zh-TW" altLang="en-US" sz="1000" dirty="0">
+                <a:solidFill>
+                  <a:schemeClr val="accent4">
+                    <a:lumMod val="50000"/>
+                  </a:schemeClr>
+                </a:solidFill>
+              </a:rPr>
+              <a:t>            return jsonify(message="Password error!"), </a:t>
+            </a:r>
+            <a:r>
+              <a:rPr lang="zh-TW" altLang="en-US" sz="1000" dirty="0" smtClean="0">
+                <a:solidFill>
+                  <a:schemeClr val="accent4">
+                    <a:lumMod val="50000"/>
+                  </a:schemeClr>
+                </a:solidFill>
+              </a:rPr>
+              <a:t>403</a:t>
+            </a:r>
+            <a:endParaRPr lang="en-US" altLang="zh-TW" sz="1000" dirty="0" smtClean="0">
+              <a:solidFill>
+                <a:schemeClr val="accent4">
+                  <a:lumMod val="50000"/>
+                </a:schemeClr>
+              </a:solidFill>
+            </a:endParaRPr>
+          </a:p>
+          <a:p>
+            <a:endParaRPr lang="zh-TW" altLang="en-US" sz="1000" dirty="0">
+              <a:solidFill>
+                <a:schemeClr val="accent4">
+                  <a:lumMod val="50000"/>
+                </a:schemeClr>
+              </a:solidFill>
+            </a:endParaRPr>
+          </a:p>
+          <a:p>
+            <a:r>
+              <a:rPr lang="zh-TW" altLang="en-US" sz="1000" dirty="0">
+                <a:solidFill>
+                  <a:schemeClr val="accent4">
+                    <a:lumMod val="50000"/>
+                  </a:schemeClr>
+                </a:solidFill>
+              </a:rPr>
+              <a:t>        df = df.drop(columns=["password"], errors="ignore")</a:t>
+            </a:r>
+          </a:p>
+          <a:p>
+            <a:r>
+              <a:rPr lang="zh-TW" altLang="en-US" sz="1000" dirty="0">
+                <a:solidFill>
+                  <a:schemeClr val="accent4">
+                    <a:lumMod val="50000"/>
+                  </a:schemeClr>
+                </a:solidFill>
+              </a:rPr>
+              <a:t>        print(df)</a:t>
+            </a:r>
+          </a:p>
+          <a:p>
+            <a:r>
+              <a:rPr lang="zh-TW" altLang="en-US" sz="1000" dirty="0">
+                <a:solidFill>
+                  <a:schemeClr val="accent4">
+                    <a:lumMod val="50000"/>
+                  </a:schemeClr>
+                </a:solidFill>
+              </a:rPr>
+              <a:t>        return jsonify(message=df.to_dict(orient="records"))</a:t>
+            </a:r>
+          </a:p>
+          <a:p>
+            <a:r>
+              <a:rPr lang="zh-TW" altLang="en-US" sz="1000" dirty="0">
+                <a:solidFill>
+                  <a:schemeClr val="accent4">
+                    <a:lumMod val="50000"/>
+                  </a:schemeClr>
+                </a:solidFill>
+              </a:rPr>
+              <a:t>        </a:t>
+            </a:r>
+          </a:p>
+          <a:p>
+            <a:r>
+              <a:rPr lang="zh-TW" altLang="en-US" sz="1000" dirty="0">
+                <a:solidFill>
+                  <a:schemeClr val="accent4">
+                    <a:lumMod val="50000"/>
+                  </a:schemeClr>
+                </a:solidFill>
+              </a:rPr>
+              <a:t>    else:</a:t>
+            </a:r>
+          </a:p>
+          <a:p>
+            <a:r>
+              <a:rPr lang="zh-TW" altLang="en-US" sz="1000" dirty="0">
+                <a:solidFill>
+                  <a:schemeClr val="accent4">
+                    <a:lumMod val="50000"/>
+                  </a:schemeClr>
+                </a:solidFill>
+              </a:rPr>
+              <a:t>        return jsonify(message="No User Data!"), </a:t>
+            </a:r>
+            <a:r>
+              <a:rPr lang="zh-TW" altLang="en-US" sz="1000" dirty="0" smtClean="0">
+                <a:solidFill>
+                  <a:schemeClr val="accent4">
+                    <a:lumMod val="50000"/>
+                  </a:schemeClr>
+                </a:solidFill>
+              </a:rPr>
+              <a:t>403</a:t>
+            </a:r>
+            <a:endParaRPr lang="en-US" altLang="zh-TW" sz="1000" dirty="0" smtClean="0">
+              <a:solidFill>
+                <a:schemeClr val="accent4">
+                  <a:lumMod val="50000"/>
+                </a:schemeClr>
+              </a:solidFill>
+            </a:endParaRPr>
+          </a:p>
+          <a:p>
+            <a:endParaRPr lang="en-US" altLang="zh-TW" sz="1000" dirty="0" smtClean="0"/>
+          </a:p>
+          <a:p>
+            <a:r>
+              <a:rPr lang="en-US" altLang="zh-TW" sz="1000" dirty="0" smtClean="0"/>
+              <a:t># </a:t>
+            </a:r>
+            <a:r>
+              <a:rPr lang="en-US" altLang="zh-TW" sz="1000" dirty="0"/>
+              <a:t>POST Method</a:t>
+            </a:r>
+          </a:p>
+          <a:p>
+            <a:r>
+              <a:rPr lang="en-US" altLang="zh-TW" sz="1000" dirty="0"/>
+              <a:t>@</a:t>
+            </a:r>
+            <a:r>
+              <a:rPr lang="en-US" altLang="zh-TW" sz="1000" dirty="0" err="1"/>
+              <a:t>app.route</a:t>
+            </a:r>
+            <a:r>
+              <a:rPr lang="en-US" altLang="zh-TW" sz="1000" dirty="0"/>
+              <a:t>('/submit', methods=['POST'])</a:t>
+            </a:r>
+          </a:p>
+          <a:p>
+            <a:r>
+              <a:rPr lang="en-US" altLang="zh-TW" sz="1000" dirty="0" err="1"/>
+              <a:t>def</a:t>
+            </a:r>
+            <a:r>
+              <a:rPr lang="en-US" altLang="zh-TW" sz="1000" dirty="0"/>
+              <a:t> </a:t>
+            </a:r>
+            <a:r>
+              <a:rPr lang="en-US" altLang="zh-TW" sz="1000" dirty="0" err="1"/>
+              <a:t>submit_form</a:t>
+            </a:r>
+            <a:r>
+              <a:rPr lang="en-US" altLang="zh-TW" sz="1000" dirty="0" smtClean="0"/>
+              <a:t>():</a:t>
+            </a:r>
+          </a:p>
+          <a:p>
+            <a:r>
+              <a:rPr lang="en-US" altLang="zh-TW" sz="1000" dirty="0" smtClean="0"/>
+              <a:t>#omit…</a:t>
+            </a:r>
+            <a:endParaRPr lang="zh-TW" altLang="en-US" sz="1000" dirty="0"/>
+          </a:p>
+        </p:txBody>
+      </p:sp>
+      <p:sp>
+        <p:nvSpPr>
+          <p:cNvPr id="5" name="矩形 4"/>
+          <p:cNvSpPr/>
+          <p:nvPr/>
+        </p:nvSpPr>
+        <p:spPr>
+          <a:xfrm>
+            <a:off x="6566382" y="6488668"/>
+            <a:ext cx="5141656" cy="369332"/>
+          </a:xfrm>
+          <a:prstGeom prst="rect">
+            <a:avLst/>
+          </a:prstGeom>
+        </p:spPr>
+        <p:txBody>
+          <a:bodyPr wrap="square">
+            <a:spAutoFit/>
+          </a:bodyPr>
+          <a:lstStyle/>
+          <a:p>
+            <a:r>
+              <a:rPr lang="en-US" altLang="zh-TW" dirty="0" smtClean="0"/>
+              <a:t>#omit</a:t>
+            </a:r>
+            <a:r>
+              <a:rPr lang="en-US" altLang="zh-TW" dirty="0"/>
+              <a:t>… this can Refer to Section 10 </a:t>
+            </a:r>
+            <a:endParaRPr lang="zh-TW" altLang="en-US" dirty="0"/>
+          </a:p>
+        </p:txBody>
+      </p:sp>
+    </p:spTree>
+    <p:extLst>
+      <p:ext uri="{BB962C8B-B14F-4D97-AF65-F5344CB8AC3E}">
+        <p14:creationId xmlns:p14="http://schemas.microsoft.com/office/powerpoint/2010/main" val="3756583038"/>
+      </p:ext>
+    </p:extLst>
+  </p:cSld>
+  <p:clrMapOvr>
+    <a:masterClrMapping/>
+  </p:clrMapOvr>
+</p:sld>
+</file>
+
+<file path=ppt/slides/slide26.xml><?xml version="1.0" encoding="utf-8"?>
+<p:sld xmlns:a="http://schemas.openxmlformats.org/drawingml/2006/main" xmlns:r="http://schemas.openxmlformats.org/officeDocument/2006/relationships" xmlns:p="http://schemas.openxmlformats.org/presentationml/2006/main">
+  <p:cSld>
+    <p:spTree>
+      <p:nvGrpSpPr>
+        <p:cNvPr id="1" name=""/>
+        <p:cNvGrpSpPr/>
+        <p:nvPr/>
+      </p:nvGrpSpPr>
+      <p:grpSpPr>
+        <a:xfrm>
+          <a:off x="0" y="0"/>
+          <a:ext cx="0" cy="0"/>
+          <a:chOff x="0" y="0"/>
+          <a:chExt cx="0" cy="0"/>
+        </a:xfrm>
+      </p:grpSpPr>
+      <p:sp>
+        <p:nvSpPr>
+          <p:cNvPr id="8" name="文字方塊 7">
+            <a:extLst>
+              <a:ext uri="{FF2B5EF4-FFF2-40B4-BE49-F238E27FC236}">
+                <a16:creationId xmlns:a16="http://schemas.microsoft.com/office/drawing/2014/main" id="{4A8AA91F-A3ED-423C-B62E-E596574B16A6}"/>
+              </a:ext>
+            </a:extLst>
+          </p:cNvPr>
+          <p:cNvSpPr txBox="1"/>
+          <p:nvPr/>
+        </p:nvSpPr>
+        <p:spPr>
+          <a:xfrm>
+            <a:off x="880533" y="549479"/>
+            <a:ext cx="3536282" cy="369332"/>
+          </a:xfrm>
+          <a:prstGeom prst="rect">
+            <a:avLst/>
+          </a:prstGeom>
+          <a:noFill/>
+        </p:spPr>
+        <p:txBody>
+          <a:bodyPr wrap="square" rtlCol="0">
+            <a:spAutoFit/>
+          </a:bodyPr>
+          <a:lstStyle/>
+          <a:p>
+            <a:r>
+              <a:rPr lang="en-US" altLang="zh-TW" dirty="0" smtClean="0"/>
+              <a:t>Step1</a:t>
+            </a:r>
+            <a:r>
+              <a:rPr lang="en-US" altLang="zh-TW" dirty="0"/>
+              <a:t>: </a:t>
+            </a:r>
+            <a:r>
+              <a:rPr lang="en-US" altLang="zh-TW" dirty="0" smtClean="0"/>
+              <a:t>Run Code--Client2.py</a:t>
+            </a:r>
+            <a:endParaRPr lang="en-US" altLang="zh-TW" dirty="0"/>
+          </a:p>
+        </p:txBody>
+      </p:sp>
+      <p:sp>
+        <p:nvSpPr>
+          <p:cNvPr id="13" name="標題 1">
+            <a:extLst>
+              <a:ext uri="{FF2B5EF4-FFF2-40B4-BE49-F238E27FC236}">
+                <a16:creationId xmlns:a16="http://schemas.microsoft.com/office/drawing/2014/main" id="{4CF1DEF1-9264-4363-810A-F9F341A53BF1}"/>
+              </a:ext>
+            </a:extLst>
+          </p:cNvPr>
+          <p:cNvSpPr txBox="1">
+            <a:spLocks/>
+          </p:cNvSpPr>
+          <p:nvPr/>
+        </p:nvSpPr>
+        <p:spPr>
+          <a:xfrm>
+            <a:off x="880533" y="-180147"/>
+            <a:ext cx="11150600" cy="1098958"/>
+          </a:xfrm>
+          <a:prstGeom prst="rect">
+            <a:avLst/>
+          </a:prstGeom>
+        </p:spPr>
+        <p:txBody>
+          <a:bodyPr vert="horz" lIns="91440" tIns="45720" rIns="91440" bIns="45720" rtlCol="0" anchor="ctr">
+            <a:normAutofit/>
+          </a:bodyPr>
+          <a:lstStyle>
+            <a:lvl1pPr algn="l" defTabSz="914400" rtl="0" eaLnBrk="1" latinLnBrk="0" hangingPunct="1">
+              <a:lnSpc>
+                <a:spcPct val="90000"/>
+              </a:lnSpc>
+              <a:spcBef>
+                <a:spcPct val="0"/>
+              </a:spcBef>
+              <a:buNone/>
+              <a:defRPr sz="4400" kern="1200">
+                <a:solidFill>
+                  <a:schemeClr val="tx1"/>
+                </a:solidFill>
+                <a:latin typeface="+mj-lt"/>
+                <a:ea typeface="+mj-ea"/>
+                <a:cs typeface="+mj-cs"/>
+              </a:defRPr>
+            </a:lvl1pPr>
+          </a:lstStyle>
+          <a:p>
+            <a:r>
+              <a:rPr lang="en-US" altLang="zh-TW" dirty="0" smtClean="0"/>
+              <a:t>12.Client</a:t>
+            </a:r>
+            <a:r>
+              <a:rPr lang="zh-TW" altLang="en-US" dirty="0" smtClean="0"/>
+              <a:t> </a:t>
+            </a:r>
+            <a:r>
+              <a:rPr lang="en-US" altLang="zh-TW" dirty="0" smtClean="0"/>
+              <a:t>get </a:t>
+            </a:r>
+            <a:r>
+              <a:rPr lang="en-US" altLang="zh-TW" dirty="0"/>
+              <a:t>User </a:t>
+            </a:r>
+            <a:r>
+              <a:rPr lang="en-US" altLang="zh-TW" dirty="0" smtClean="0"/>
+              <a:t>historical information</a:t>
+            </a:r>
+            <a:endParaRPr lang="zh-TW" altLang="en-US" dirty="0"/>
+          </a:p>
+        </p:txBody>
+      </p:sp>
+      <p:pic>
+        <p:nvPicPr>
+          <p:cNvPr id="3" name="圖片 2"/>
+          <p:cNvPicPr>
+            <a:picLocks noChangeAspect="1"/>
+          </p:cNvPicPr>
+          <p:nvPr/>
+        </p:nvPicPr>
+        <p:blipFill>
+          <a:blip r:embed="rId3"/>
+          <a:stretch>
+            <a:fillRect/>
+          </a:stretch>
+        </p:blipFill>
+        <p:spPr>
+          <a:xfrm>
+            <a:off x="179287" y="989090"/>
+            <a:ext cx="11851846" cy="5177800"/>
+          </a:xfrm>
+          <a:prstGeom prst="rect">
+            <a:avLst/>
+          </a:prstGeom>
+        </p:spPr>
+      </p:pic>
+    </p:spTree>
+    <p:extLst>
+      <p:ext uri="{BB962C8B-B14F-4D97-AF65-F5344CB8AC3E}">
+        <p14:creationId xmlns:p14="http://schemas.microsoft.com/office/powerpoint/2010/main" val="2107526753"/>
       </p:ext>
     </p:extLst>
   </p:cSld>

</xml_diff>

<commit_message>
Client_UI1--Button of User Historical Information, and Teach
</commit_message>
<xml_diff>
--- a/PythonFlask/Teach.pptx
+++ b/PythonFlask/Teach.pptx
@@ -5,7 +5,7 @@
     <p:sldMasterId id="2147483648" r:id="rId1"/>
   </p:sldMasterIdLst>
   <p:notesMasterIdLst>
-    <p:notesMasterId r:id="rId28"/>
+    <p:notesMasterId r:id="rId30"/>
   </p:notesMasterIdLst>
   <p:sldIdLst>
     <p:sldId id="256" r:id="rId2"/>
@@ -34,6 +34,8 @@
     <p:sldId id="280" r:id="rId25"/>
     <p:sldId id="281" r:id="rId26"/>
     <p:sldId id="282" r:id="rId27"/>
+    <p:sldId id="283" r:id="rId28"/>
+    <p:sldId id="284" r:id="rId29"/>
   </p:sldIdLst>
   <p:sldSz cx="12192000" cy="6858000"/>
   <p:notesSz cx="6858000" cy="9144000"/>
@@ -900,6 +902,174 @@
     <p:extLst>
       <p:ext uri="{BB962C8B-B14F-4D97-AF65-F5344CB8AC3E}">
         <p14:creationId xmlns:p14="http://schemas.microsoft.com/office/powerpoint/2010/main" val="4090231275"/>
+      </p:ext>
+    </p:extLst>
+  </p:cSld>
+  <p:clrMapOvr>
+    <a:masterClrMapping/>
+  </p:clrMapOvr>
+</p:notes>
+</file>
+
+<file path=ppt/notesSlides/notesSlide6.xml><?xml version="1.0" encoding="utf-8"?>
+<p:notes xmlns:a="http://schemas.openxmlformats.org/drawingml/2006/main" xmlns:r="http://schemas.openxmlformats.org/officeDocument/2006/relationships" xmlns:p="http://schemas.openxmlformats.org/presentationml/2006/main">
+  <p:cSld>
+    <p:spTree>
+      <p:nvGrpSpPr>
+        <p:cNvPr id="1" name=""/>
+        <p:cNvGrpSpPr/>
+        <p:nvPr/>
+      </p:nvGrpSpPr>
+      <p:grpSpPr>
+        <a:xfrm>
+          <a:off x="0" y="0"/>
+          <a:ext cx="0" cy="0"/>
+          <a:chOff x="0" y="0"/>
+          <a:chExt cx="0" cy="0"/>
+        </a:xfrm>
+      </p:grpSpPr>
+      <p:sp>
+        <p:nvSpPr>
+          <p:cNvPr id="2" name="投影片影像版面配置區 1"/>
+          <p:cNvSpPr>
+            <a:spLocks noGrp="1" noRot="1" noChangeAspect="1"/>
+          </p:cNvSpPr>
+          <p:nvPr>
+            <p:ph type="sldImg"/>
+          </p:nvPr>
+        </p:nvSpPr>
+        <p:spPr/>
+      </p:sp>
+      <p:sp>
+        <p:nvSpPr>
+          <p:cNvPr id="3" name="備忘稿版面配置區 2"/>
+          <p:cNvSpPr>
+            <a:spLocks noGrp="1"/>
+          </p:cNvSpPr>
+          <p:nvPr>
+            <p:ph type="body" idx="1"/>
+          </p:nvPr>
+        </p:nvSpPr>
+        <p:spPr/>
+        <p:txBody>
+          <a:bodyPr/>
+          <a:lstStyle/>
+          <a:p>
+            <a:endParaRPr lang="zh-TW" altLang="en-US" dirty="0"/>
+          </a:p>
+        </p:txBody>
+      </p:sp>
+      <p:sp>
+        <p:nvSpPr>
+          <p:cNvPr id="4" name="投影片編號版面配置區 3"/>
+          <p:cNvSpPr>
+            <a:spLocks noGrp="1"/>
+          </p:cNvSpPr>
+          <p:nvPr>
+            <p:ph type="sldNum" sz="quarter" idx="5"/>
+          </p:nvPr>
+        </p:nvSpPr>
+        <p:spPr/>
+        <p:txBody>
+          <a:bodyPr/>
+          <a:lstStyle/>
+          <a:p>
+            <a:fld id="{A9FCBE1C-0420-43B9-B59B-38F9F1B71FEA}" type="slidenum">
+              <a:rPr lang="zh-TW" altLang="en-US" smtClean="0"/>
+              <a:t>27</a:t>
+            </a:fld>
+            <a:endParaRPr lang="zh-TW" altLang="en-US"/>
+          </a:p>
+        </p:txBody>
+      </p:sp>
+    </p:spTree>
+    <p:extLst>
+      <p:ext uri="{BB962C8B-B14F-4D97-AF65-F5344CB8AC3E}">
+        <p14:creationId xmlns:p14="http://schemas.microsoft.com/office/powerpoint/2010/main" val="1258293267"/>
+      </p:ext>
+    </p:extLst>
+  </p:cSld>
+  <p:clrMapOvr>
+    <a:masterClrMapping/>
+  </p:clrMapOvr>
+</p:notes>
+</file>
+
+<file path=ppt/notesSlides/notesSlide7.xml><?xml version="1.0" encoding="utf-8"?>
+<p:notes xmlns:a="http://schemas.openxmlformats.org/drawingml/2006/main" xmlns:r="http://schemas.openxmlformats.org/officeDocument/2006/relationships" xmlns:p="http://schemas.openxmlformats.org/presentationml/2006/main">
+  <p:cSld>
+    <p:spTree>
+      <p:nvGrpSpPr>
+        <p:cNvPr id="1" name=""/>
+        <p:cNvGrpSpPr/>
+        <p:nvPr/>
+      </p:nvGrpSpPr>
+      <p:grpSpPr>
+        <a:xfrm>
+          <a:off x="0" y="0"/>
+          <a:ext cx="0" cy="0"/>
+          <a:chOff x="0" y="0"/>
+          <a:chExt cx="0" cy="0"/>
+        </a:xfrm>
+      </p:grpSpPr>
+      <p:sp>
+        <p:nvSpPr>
+          <p:cNvPr id="2" name="投影片影像版面配置區 1"/>
+          <p:cNvSpPr>
+            <a:spLocks noGrp="1" noRot="1" noChangeAspect="1"/>
+          </p:cNvSpPr>
+          <p:nvPr>
+            <p:ph type="sldImg"/>
+          </p:nvPr>
+        </p:nvSpPr>
+        <p:spPr/>
+      </p:sp>
+      <p:sp>
+        <p:nvSpPr>
+          <p:cNvPr id="3" name="備忘稿版面配置區 2"/>
+          <p:cNvSpPr>
+            <a:spLocks noGrp="1"/>
+          </p:cNvSpPr>
+          <p:nvPr>
+            <p:ph type="body" idx="1"/>
+          </p:nvPr>
+        </p:nvSpPr>
+        <p:spPr/>
+        <p:txBody>
+          <a:bodyPr/>
+          <a:lstStyle/>
+          <a:p>
+            <a:endParaRPr lang="zh-TW" altLang="en-US" dirty="0"/>
+          </a:p>
+        </p:txBody>
+      </p:sp>
+      <p:sp>
+        <p:nvSpPr>
+          <p:cNvPr id="4" name="投影片編號版面配置區 3"/>
+          <p:cNvSpPr>
+            <a:spLocks noGrp="1"/>
+          </p:cNvSpPr>
+          <p:nvPr>
+            <p:ph type="sldNum" sz="quarter" idx="5"/>
+          </p:nvPr>
+        </p:nvSpPr>
+        <p:spPr/>
+        <p:txBody>
+          <a:bodyPr/>
+          <a:lstStyle/>
+          <a:p>
+            <a:fld id="{A9FCBE1C-0420-43B9-B59B-38F9F1B71FEA}" type="slidenum">
+              <a:rPr lang="zh-TW" altLang="en-US" smtClean="0"/>
+              <a:t>28</a:t>
+            </a:fld>
+            <a:endParaRPr lang="zh-TW" altLang="en-US"/>
+          </a:p>
+        </p:txBody>
+      </p:sp>
+    </p:spTree>
+    <p:extLst>
+      <p:ext uri="{BB962C8B-B14F-4D97-AF65-F5344CB8AC3E}">
+        <p14:creationId xmlns:p14="http://schemas.microsoft.com/office/powerpoint/2010/main" val="1920628183"/>
       </p:ext>
     </p:extLst>
   </p:cSld>
@@ -10837,11 +11007,7 @@
           <a:p>
             <a:r>
               <a:rPr lang="en-US" altLang="zh-TW" dirty="0" smtClean="0"/>
-              <a:t>Step1</a:t>
-            </a:r>
-            <a:r>
-              <a:rPr lang="en-US" altLang="zh-TW" dirty="0"/>
-              <a:t>: </a:t>
+              <a:t>Step2: </a:t>
             </a:r>
             <a:r>
               <a:rPr lang="en-US" altLang="zh-TW" dirty="0" smtClean="0"/>
@@ -10950,6 +11116,810 @@
     <p:extLst>
       <p:ext uri="{BB962C8B-B14F-4D97-AF65-F5344CB8AC3E}">
         <p14:creationId xmlns:p14="http://schemas.microsoft.com/office/powerpoint/2010/main" val="2107526753"/>
+      </p:ext>
+    </p:extLst>
+  </p:cSld>
+  <p:clrMapOvr>
+    <a:masterClrMapping/>
+  </p:clrMapOvr>
+</p:sld>
+</file>
+
+<file path=ppt/slides/slide27.xml><?xml version="1.0" encoding="utf-8"?>
+<p:sld xmlns:a="http://schemas.openxmlformats.org/drawingml/2006/main" xmlns:r="http://schemas.openxmlformats.org/officeDocument/2006/relationships" xmlns:p="http://schemas.openxmlformats.org/presentationml/2006/main">
+  <p:cSld>
+    <p:spTree>
+      <p:nvGrpSpPr>
+        <p:cNvPr id="1" name=""/>
+        <p:cNvGrpSpPr/>
+        <p:nvPr/>
+      </p:nvGrpSpPr>
+      <p:grpSpPr>
+        <a:xfrm>
+          <a:off x="0" y="0"/>
+          <a:ext cx="0" cy="0"/>
+          <a:chOff x="0" y="0"/>
+          <a:chExt cx="0" cy="0"/>
+        </a:xfrm>
+      </p:grpSpPr>
+      <p:sp>
+        <p:nvSpPr>
+          <p:cNvPr id="8" name="文字方塊 7">
+            <a:extLst>
+              <a:ext uri="{FF2B5EF4-FFF2-40B4-BE49-F238E27FC236}">
+                <a16:creationId xmlns:a16="http://schemas.microsoft.com/office/drawing/2014/main" id="{4A8AA91F-A3ED-423C-B62E-E596574B16A6}"/>
+              </a:ext>
+            </a:extLst>
+          </p:cNvPr>
+          <p:cNvSpPr txBox="1"/>
+          <p:nvPr/>
+        </p:nvSpPr>
+        <p:spPr>
+          <a:xfrm>
+            <a:off x="880533" y="592437"/>
+            <a:ext cx="3536282" cy="369332"/>
+          </a:xfrm>
+          <a:prstGeom prst="rect">
+            <a:avLst/>
+          </a:prstGeom>
+          <a:noFill/>
+        </p:spPr>
+        <p:txBody>
+          <a:bodyPr wrap="square" rtlCol="0">
+            <a:spAutoFit/>
+          </a:bodyPr>
+          <a:lstStyle/>
+          <a:p>
+            <a:r>
+              <a:rPr lang="en-US" altLang="zh-TW" dirty="0" smtClean="0"/>
+              <a:t>Step1</a:t>
+            </a:r>
+            <a:r>
+              <a:rPr lang="en-US" altLang="zh-TW" dirty="0"/>
+              <a:t>: </a:t>
+            </a:r>
+            <a:r>
+              <a:rPr lang="en-US" altLang="zh-TW" dirty="0" smtClean="0"/>
+              <a:t>Client2.py</a:t>
+            </a:r>
+            <a:r>
+              <a:rPr lang="zh-TW" altLang="en-US" dirty="0" smtClean="0"/>
+              <a:t> </a:t>
+            </a:r>
+            <a:r>
+              <a:rPr lang="en-US" altLang="zh-TW" dirty="0"/>
+              <a:t>Redesign</a:t>
+            </a:r>
+            <a:endParaRPr lang="en-US" altLang="zh-TW" dirty="0"/>
+          </a:p>
+        </p:txBody>
+      </p:sp>
+      <p:sp>
+        <p:nvSpPr>
+          <p:cNvPr id="13" name="標題 1">
+            <a:extLst>
+              <a:ext uri="{FF2B5EF4-FFF2-40B4-BE49-F238E27FC236}">
+                <a16:creationId xmlns:a16="http://schemas.microsoft.com/office/drawing/2014/main" id="{4CF1DEF1-9264-4363-810A-F9F341A53BF1}"/>
+              </a:ext>
+            </a:extLst>
+          </p:cNvPr>
+          <p:cNvSpPr txBox="1">
+            <a:spLocks/>
+          </p:cNvSpPr>
+          <p:nvPr/>
+        </p:nvSpPr>
+        <p:spPr>
+          <a:xfrm>
+            <a:off x="880533" y="-180147"/>
+            <a:ext cx="11150600" cy="1098958"/>
+          </a:xfrm>
+          <a:prstGeom prst="rect">
+            <a:avLst/>
+          </a:prstGeom>
+        </p:spPr>
+        <p:txBody>
+          <a:bodyPr vert="horz" lIns="91440" tIns="45720" rIns="91440" bIns="45720" rtlCol="0" anchor="ctr">
+            <a:normAutofit/>
+          </a:bodyPr>
+          <a:lstStyle>
+            <a:lvl1pPr algn="l" defTabSz="914400" rtl="0" eaLnBrk="1" latinLnBrk="0" hangingPunct="1">
+              <a:lnSpc>
+                <a:spcPct val="90000"/>
+              </a:lnSpc>
+              <a:spcBef>
+                <a:spcPct val="0"/>
+              </a:spcBef>
+              <a:buNone/>
+              <a:defRPr sz="4400" kern="1200">
+                <a:solidFill>
+                  <a:schemeClr val="tx1"/>
+                </a:solidFill>
+                <a:latin typeface="+mj-lt"/>
+                <a:ea typeface="+mj-ea"/>
+                <a:cs typeface="+mj-cs"/>
+              </a:defRPr>
+            </a:lvl1pPr>
+          </a:lstStyle>
+          <a:p>
+            <a:r>
+              <a:rPr lang="en-US" altLang="zh-TW" dirty="0" smtClean="0"/>
+              <a:t>13.Client</a:t>
+            </a:r>
+            <a:r>
+              <a:rPr lang="zh-TW" altLang="en-US" dirty="0" smtClean="0"/>
+              <a:t> </a:t>
+            </a:r>
+            <a:r>
+              <a:rPr lang="en-US" altLang="zh-TW" dirty="0" smtClean="0"/>
+              <a:t>get </a:t>
+            </a:r>
+            <a:r>
+              <a:rPr lang="en-US" altLang="zh-TW" dirty="0"/>
+              <a:t>User </a:t>
+            </a:r>
+            <a:r>
+              <a:rPr lang="en-US" altLang="zh-TW" dirty="0" smtClean="0"/>
+              <a:t>historical information</a:t>
+            </a:r>
+            <a:endParaRPr lang="zh-TW" altLang="en-US" dirty="0"/>
+          </a:p>
+        </p:txBody>
+      </p:sp>
+      <p:sp>
+        <p:nvSpPr>
+          <p:cNvPr id="2" name="矩形 1"/>
+          <p:cNvSpPr/>
+          <p:nvPr/>
+        </p:nvSpPr>
+        <p:spPr>
+          <a:xfrm>
+            <a:off x="6107395" y="1075508"/>
+            <a:ext cx="5625981" cy="5262979"/>
+          </a:xfrm>
+          <a:prstGeom prst="rect">
+            <a:avLst/>
+          </a:prstGeom>
+          <a:solidFill>
+            <a:schemeClr val="bg1">
+              <a:lumMod val="95000"/>
+            </a:schemeClr>
+          </a:solidFill>
+        </p:spPr>
+        <p:txBody>
+          <a:bodyPr wrap="square">
+            <a:spAutoFit/>
+          </a:bodyPr>
+          <a:lstStyle/>
+          <a:p>
+            <a:r>
+              <a:rPr lang="zh-TW" altLang="en-US" sz="1200" dirty="0"/>
+              <a:t>import requests</a:t>
+            </a:r>
+          </a:p>
+          <a:p>
+            <a:r>
+              <a:rPr lang="zh-TW" altLang="en-US" sz="1200" dirty="0"/>
+              <a:t>import pandas as pd</a:t>
+            </a:r>
+          </a:p>
+          <a:p>
+            <a:r>
+              <a:rPr lang="zh-TW" altLang="en-US" sz="1200" dirty="0"/>
+              <a:t>import matplotlib.pyplot as plt</a:t>
+            </a:r>
+          </a:p>
+          <a:p>
+            <a:endParaRPr lang="zh-TW" altLang="en-US" sz="1200" dirty="0"/>
+          </a:p>
+          <a:p>
+            <a:r>
+              <a:rPr lang="zh-TW" altLang="en-US" sz="1200" dirty="0">
+                <a:solidFill>
+                  <a:schemeClr val="accent4">
+                    <a:lumMod val="50000"/>
+                  </a:schemeClr>
+                </a:solidFill>
+              </a:rPr>
+              <a:t>class UserHistoricalInformation:</a:t>
+            </a:r>
+          </a:p>
+          <a:p>
+            <a:r>
+              <a:rPr lang="zh-TW" altLang="en-US" sz="1200" dirty="0">
+                <a:solidFill>
+                  <a:schemeClr val="accent4">
+                    <a:lumMod val="50000"/>
+                  </a:schemeClr>
+                </a:solidFill>
+              </a:rPr>
+              <a:t>    def BMIshow():</a:t>
+            </a:r>
+          </a:p>
+          <a:p>
+            <a:r>
+              <a:rPr lang="zh-TW" altLang="en-US" sz="1200" dirty="0"/>
+              <a:t>        url = 'http://wiciar.com/bmi/data_get'</a:t>
+            </a:r>
+          </a:p>
+          <a:p>
+            <a:r>
+              <a:rPr lang="zh-TW" altLang="en-US" sz="1200" dirty="0"/>
+              <a:t>        payload = {'name': 'wiki2',</a:t>
+            </a:r>
+          </a:p>
+          <a:p>
+            <a:r>
+              <a:rPr lang="zh-TW" altLang="en-US" sz="1200" dirty="0"/>
+              <a:t>                   'password': 'abc123'}</a:t>
+            </a:r>
+          </a:p>
+          <a:p>
+            <a:r>
+              <a:rPr lang="zh-TW" altLang="en-US" sz="1200" dirty="0"/>
+              <a:t>        print('Json Code:', payload)</a:t>
+            </a:r>
+          </a:p>
+          <a:p>
+            <a:r>
+              <a:rPr lang="zh-TW" altLang="en-US" sz="1200" dirty="0"/>
+              <a:t>        response = requests.post(url, json=payload)</a:t>
+            </a:r>
+          </a:p>
+          <a:p>
+            <a:r>
+              <a:rPr lang="zh-TW" altLang="en-US" sz="1200" dirty="0"/>
+              <a:t>        print('Status Code:', response.status_code)</a:t>
+            </a:r>
+          </a:p>
+          <a:p>
+            <a:r>
+              <a:rPr lang="zh-TW" altLang="en-US" sz="1200" dirty="0"/>
+              <a:t>        #print('Response JSON:', response.json()['message'])</a:t>
+            </a:r>
+          </a:p>
+          <a:p>
+            <a:r>
+              <a:rPr lang="zh-TW" altLang="en-US" sz="1200" dirty="0"/>
+              <a:t>        data_list = response.json()['message']</a:t>
+            </a:r>
+          </a:p>
+          <a:p>
+            <a:r>
+              <a:rPr lang="zh-TW" altLang="en-US" sz="1200" dirty="0"/>
+              <a:t>        df = pd.DataFrame(data_list)</a:t>
+            </a:r>
+          </a:p>
+          <a:p>
+            <a:r>
+              <a:rPr lang="zh-TW" altLang="en-US" sz="1200" dirty="0"/>
+              <a:t>        df['build_time'] = pd.to_datetime(df['build_time'])</a:t>
+            </a:r>
+          </a:p>
+          <a:p>
+            <a:r>
+              <a:rPr lang="zh-TW" altLang="en-US" sz="1200" dirty="0"/>
+              <a:t>        df = df.dropna(subset=['bmi', 'build_time'])</a:t>
+            </a:r>
+          </a:p>
+          <a:p>
+            <a:r>
+              <a:rPr lang="zh-TW" altLang="en-US" sz="1200" dirty="0"/>
+              <a:t>        df = df.sort_values(by='build_time')</a:t>
+            </a:r>
+          </a:p>
+          <a:p>
+            <a:r>
+              <a:rPr lang="zh-TW" altLang="en-US" sz="1200" dirty="0"/>
+              <a:t>        plt.figure(figsize=(10, 5))</a:t>
+            </a:r>
+          </a:p>
+          <a:p>
+            <a:r>
+              <a:rPr lang="zh-TW" altLang="en-US" sz="1200" dirty="0"/>
+              <a:t>        plt.plot(df['build_time'], df['bmi'], marker='o', linestyle='-', color='blue', label='BMI')</a:t>
+            </a:r>
+          </a:p>
+          <a:p>
+            <a:r>
+              <a:rPr lang="zh-TW" altLang="en-US" sz="1200" dirty="0"/>
+              <a:t>        plt.title('BMI Trend Over Time')</a:t>
+            </a:r>
+          </a:p>
+          <a:p>
+            <a:r>
+              <a:rPr lang="zh-TW" altLang="en-US" sz="1200" dirty="0"/>
+              <a:t>        plt.xlabel('Build Time')</a:t>
+            </a:r>
+          </a:p>
+          <a:p>
+            <a:r>
+              <a:rPr lang="zh-TW" altLang="en-US" sz="1200" dirty="0"/>
+              <a:t>        plt.ylabel('BMI')</a:t>
+            </a:r>
+          </a:p>
+          <a:p>
+            <a:r>
+              <a:rPr lang="zh-TW" altLang="en-US" sz="1200" dirty="0"/>
+              <a:t>        plt.grid(True)</a:t>
+            </a:r>
+          </a:p>
+          <a:p>
+            <a:r>
+              <a:rPr lang="zh-TW" altLang="en-US" sz="1200" dirty="0"/>
+              <a:t>        plt.xticks(rotation=45)</a:t>
+            </a:r>
+          </a:p>
+          <a:p>
+            <a:r>
+              <a:rPr lang="zh-TW" altLang="en-US" sz="1200" dirty="0"/>
+              <a:t>        plt.tight_layout()</a:t>
+            </a:r>
+          </a:p>
+          <a:p>
+            <a:r>
+              <a:rPr lang="zh-TW" altLang="en-US" sz="1200" dirty="0"/>
+              <a:t>        plt.legend()</a:t>
+            </a:r>
+          </a:p>
+          <a:p>
+            <a:r>
+              <a:rPr lang="zh-TW" altLang="en-US" sz="1200" dirty="0"/>
+              <a:t>        plt.show()</a:t>
+            </a:r>
+          </a:p>
+        </p:txBody>
+      </p:sp>
+      <p:pic>
+        <p:nvPicPr>
+          <p:cNvPr id="4" name="圖片 3"/>
+          <p:cNvPicPr>
+            <a:picLocks noChangeAspect="1"/>
+          </p:cNvPicPr>
+          <p:nvPr/>
+        </p:nvPicPr>
+        <p:blipFill>
+          <a:blip r:embed="rId3"/>
+          <a:stretch>
+            <a:fillRect/>
+          </a:stretch>
+        </p:blipFill>
+        <p:spPr>
+          <a:xfrm>
+            <a:off x="224682" y="1004726"/>
+            <a:ext cx="5509545" cy="5367945"/>
+          </a:xfrm>
+          <a:prstGeom prst="rect">
+            <a:avLst/>
+          </a:prstGeom>
+        </p:spPr>
+      </p:pic>
+    </p:spTree>
+    <p:extLst>
+      <p:ext uri="{BB962C8B-B14F-4D97-AF65-F5344CB8AC3E}">
+        <p14:creationId xmlns:p14="http://schemas.microsoft.com/office/powerpoint/2010/main" val="455645717"/>
+      </p:ext>
+    </p:extLst>
+  </p:cSld>
+  <p:clrMapOvr>
+    <a:masterClrMapping/>
+  </p:clrMapOvr>
+</p:sld>
+</file>
+
+<file path=ppt/slides/slide28.xml><?xml version="1.0" encoding="utf-8"?>
+<p:sld xmlns:a="http://schemas.openxmlformats.org/drawingml/2006/main" xmlns:r="http://schemas.openxmlformats.org/officeDocument/2006/relationships" xmlns:p="http://schemas.openxmlformats.org/presentationml/2006/main">
+  <p:cSld>
+    <p:spTree>
+      <p:nvGrpSpPr>
+        <p:cNvPr id="1" name=""/>
+        <p:cNvGrpSpPr/>
+        <p:nvPr/>
+      </p:nvGrpSpPr>
+      <p:grpSpPr>
+        <a:xfrm>
+          <a:off x="0" y="0"/>
+          <a:ext cx="0" cy="0"/>
+          <a:chOff x="0" y="0"/>
+          <a:chExt cx="0" cy="0"/>
+        </a:xfrm>
+      </p:grpSpPr>
+      <p:sp>
+        <p:nvSpPr>
+          <p:cNvPr id="8" name="文字方塊 7">
+            <a:extLst>
+              <a:ext uri="{FF2B5EF4-FFF2-40B4-BE49-F238E27FC236}">
+                <a16:creationId xmlns:a16="http://schemas.microsoft.com/office/drawing/2014/main" id="{4A8AA91F-A3ED-423C-B62E-E596574B16A6}"/>
+              </a:ext>
+            </a:extLst>
+          </p:cNvPr>
+          <p:cNvSpPr txBox="1"/>
+          <p:nvPr/>
+        </p:nvSpPr>
+        <p:spPr>
+          <a:xfrm>
+            <a:off x="880533" y="592437"/>
+            <a:ext cx="3536282" cy="369332"/>
+          </a:xfrm>
+          <a:prstGeom prst="rect">
+            <a:avLst/>
+          </a:prstGeom>
+          <a:noFill/>
+        </p:spPr>
+        <p:txBody>
+          <a:bodyPr wrap="square" rtlCol="0">
+            <a:spAutoFit/>
+          </a:bodyPr>
+          <a:lstStyle/>
+          <a:p>
+            <a:r>
+              <a:rPr lang="en-US" altLang="zh-TW" dirty="0" smtClean="0"/>
+              <a:t>Step2: Client_UI1.py</a:t>
+            </a:r>
+            <a:r>
+              <a:rPr lang="zh-TW" altLang="en-US" dirty="0" smtClean="0"/>
+              <a:t> </a:t>
+            </a:r>
+            <a:r>
+              <a:rPr lang="en-US" altLang="zh-TW" dirty="0"/>
+              <a:t>Redesign</a:t>
+            </a:r>
+            <a:endParaRPr lang="en-US" altLang="zh-TW" dirty="0"/>
+          </a:p>
+        </p:txBody>
+      </p:sp>
+      <p:sp>
+        <p:nvSpPr>
+          <p:cNvPr id="13" name="標題 1">
+            <a:extLst>
+              <a:ext uri="{FF2B5EF4-FFF2-40B4-BE49-F238E27FC236}">
+                <a16:creationId xmlns:a16="http://schemas.microsoft.com/office/drawing/2014/main" id="{4CF1DEF1-9264-4363-810A-F9F341A53BF1}"/>
+              </a:ext>
+            </a:extLst>
+          </p:cNvPr>
+          <p:cNvSpPr txBox="1">
+            <a:spLocks/>
+          </p:cNvSpPr>
+          <p:nvPr/>
+        </p:nvSpPr>
+        <p:spPr>
+          <a:xfrm>
+            <a:off x="880533" y="-180147"/>
+            <a:ext cx="11150600" cy="1098958"/>
+          </a:xfrm>
+          <a:prstGeom prst="rect">
+            <a:avLst/>
+          </a:prstGeom>
+        </p:spPr>
+        <p:txBody>
+          <a:bodyPr vert="horz" lIns="91440" tIns="45720" rIns="91440" bIns="45720" rtlCol="0" anchor="ctr">
+            <a:normAutofit/>
+          </a:bodyPr>
+          <a:lstStyle>
+            <a:lvl1pPr algn="l" defTabSz="914400" rtl="0" eaLnBrk="1" latinLnBrk="0" hangingPunct="1">
+              <a:lnSpc>
+                <a:spcPct val="90000"/>
+              </a:lnSpc>
+              <a:spcBef>
+                <a:spcPct val="0"/>
+              </a:spcBef>
+              <a:buNone/>
+              <a:defRPr sz="4400" kern="1200">
+                <a:solidFill>
+                  <a:schemeClr val="tx1"/>
+                </a:solidFill>
+                <a:latin typeface="+mj-lt"/>
+                <a:ea typeface="+mj-ea"/>
+                <a:cs typeface="+mj-cs"/>
+              </a:defRPr>
+            </a:lvl1pPr>
+          </a:lstStyle>
+          <a:p>
+            <a:r>
+              <a:rPr lang="en-US" altLang="zh-TW" dirty="0" smtClean="0"/>
+              <a:t>13.Client</a:t>
+            </a:r>
+            <a:r>
+              <a:rPr lang="zh-TW" altLang="en-US" dirty="0" smtClean="0"/>
+              <a:t> </a:t>
+            </a:r>
+            <a:r>
+              <a:rPr lang="en-US" altLang="zh-TW" dirty="0" smtClean="0"/>
+              <a:t>get </a:t>
+            </a:r>
+            <a:r>
+              <a:rPr lang="en-US" altLang="zh-TW" dirty="0"/>
+              <a:t>User </a:t>
+            </a:r>
+            <a:r>
+              <a:rPr lang="en-US" altLang="zh-TW" dirty="0" smtClean="0"/>
+              <a:t>historical information</a:t>
+            </a:r>
+            <a:endParaRPr lang="zh-TW" altLang="en-US" dirty="0"/>
+          </a:p>
+        </p:txBody>
+      </p:sp>
+      <p:sp>
+        <p:nvSpPr>
+          <p:cNvPr id="3" name="矩形 2"/>
+          <p:cNvSpPr/>
+          <p:nvPr/>
+        </p:nvSpPr>
+        <p:spPr>
+          <a:xfrm>
+            <a:off x="436746" y="961769"/>
+            <a:ext cx="4135255" cy="3231654"/>
+          </a:xfrm>
+          <a:prstGeom prst="rect">
+            <a:avLst/>
+          </a:prstGeom>
+          <a:solidFill>
+            <a:schemeClr val="bg1">
+              <a:lumMod val="95000"/>
+            </a:schemeClr>
+          </a:solidFill>
+        </p:spPr>
+        <p:txBody>
+          <a:bodyPr wrap="square">
+            <a:spAutoFit/>
+          </a:bodyPr>
+          <a:lstStyle/>
+          <a:p>
+            <a:r>
+              <a:rPr lang="en-US" altLang="zh-TW" sz="1200" dirty="0"/>
+              <a:t>#omit</a:t>
+            </a:r>
+            <a:r>
+              <a:rPr lang="en-US" altLang="zh-TW" sz="1200" dirty="0" smtClean="0"/>
+              <a:t>…</a:t>
+            </a:r>
+          </a:p>
+          <a:p>
+            <a:r>
+              <a:rPr lang="zh-TW" altLang="en-US" sz="1200" dirty="0" smtClean="0"/>
+              <a:t>submit</a:t>
+            </a:r>
+            <a:r>
+              <a:rPr lang="zh-TW" altLang="en-US" sz="1200" dirty="0"/>
+              <a:t>_btn1 = tk.Button(root,command=submit,text='PassData',font=('Arial',30,'bold'),padx=10,pady=10,activeforeground='#f00')</a:t>
+            </a:r>
+          </a:p>
+          <a:p>
+            <a:endParaRPr lang="zh-TW" altLang="en-US" sz="1200" dirty="0"/>
+          </a:p>
+          <a:p>
+            <a:r>
+              <a:rPr lang="zh-TW" altLang="en-US" sz="1200" dirty="0">
+                <a:solidFill>
+                  <a:schemeClr val="accent4">
+                    <a:lumMod val="50000"/>
+                  </a:schemeClr>
+                </a:solidFill>
+              </a:rPr>
+              <a:t>from Client2 import UserHistoricalInformation as UHI</a:t>
+            </a:r>
+          </a:p>
+          <a:p>
+            <a:r>
+              <a:rPr lang="zh-TW" altLang="en-US" sz="1200" dirty="0">
+                <a:solidFill>
+                  <a:schemeClr val="accent4">
+                    <a:lumMod val="50000"/>
+                  </a:schemeClr>
+                </a:solidFill>
+              </a:rPr>
+              <a:t>def submit_UHI():</a:t>
+            </a:r>
+          </a:p>
+          <a:p>
+            <a:r>
+              <a:rPr lang="zh-TW" altLang="en-US" sz="1200" dirty="0">
+                <a:solidFill>
+                  <a:schemeClr val="accent4">
+                    <a:lumMod val="50000"/>
+                  </a:schemeClr>
+                </a:solidFill>
+              </a:rPr>
+              <a:t>    UHI.BMIshow()</a:t>
+            </a:r>
+          </a:p>
+          <a:p>
+            <a:r>
+              <a:rPr lang="zh-TW" altLang="en-US" sz="1200" dirty="0">
+                <a:solidFill>
+                  <a:schemeClr val="accent4">
+                    <a:lumMod val="50000"/>
+                  </a:schemeClr>
+                </a:solidFill>
+              </a:rPr>
+              <a:t>    </a:t>
+            </a:r>
+          </a:p>
+          <a:p>
+            <a:r>
+              <a:rPr lang="zh-TW" altLang="en-US" sz="1200" dirty="0">
+                <a:solidFill>
+                  <a:schemeClr val="accent4">
+                    <a:lumMod val="50000"/>
+                  </a:schemeClr>
+                </a:solidFill>
+              </a:rPr>
+              <a:t>submit_btn2 = tk.Button(root,command=submit_UHI,text='UserBmiHistory',font=('Arial',30,'bold'),padx=10,pady=10,activeforeground='#f00')</a:t>
+            </a:r>
+          </a:p>
+          <a:p>
+            <a:r>
+              <a:rPr lang="zh-TW" altLang="en-US" sz="1200" dirty="0">
+                <a:solidFill>
+                  <a:schemeClr val="accent4">
+                    <a:lumMod val="50000"/>
+                  </a:schemeClr>
+                </a:solidFill>
+              </a:rPr>
+              <a:t>submit_btn2.grid(column=1, row=6)</a:t>
+            </a:r>
+          </a:p>
+          <a:p>
+            <a:endParaRPr lang="zh-TW" altLang="en-US" sz="1200" dirty="0"/>
+          </a:p>
+          <a:p>
+            <a:r>
+              <a:rPr lang="zh-TW" altLang="en-US" sz="1200" dirty="0"/>
+              <a:t>radio_btn1.grid(column=0, row=0) </a:t>
+            </a:r>
+          </a:p>
+          <a:p>
+            <a:r>
+              <a:rPr lang="zh-TW" altLang="en-US" sz="1200" dirty="0"/>
+              <a:t>radio_btn2.grid(column=1, row=0</a:t>
+            </a:r>
+            <a:r>
+              <a:rPr lang="zh-TW" altLang="en-US" sz="1200" dirty="0" smtClean="0"/>
+              <a:t>)</a:t>
+            </a:r>
+            <a:endParaRPr lang="en-US" altLang="zh-TW" sz="1200" dirty="0" smtClean="0"/>
+          </a:p>
+          <a:p>
+            <a:r>
+              <a:rPr lang="en-US" altLang="zh-TW" sz="1200" dirty="0"/>
+              <a:t>#omit</a:t>
+            </a:r>
+            <a:r>
+              <a:rPr lang="en-US" altLang="zh-TW" sz="1200" dirty="0" smtClean="0"/>
+              <a:t>…</a:t>
+            </a:r>
+            <a:endParaRPr lang="zh-TW" altLang="en-US" sz="1200" dirty="0"/>
+          </a:p>
+        </p:txBody>
+      </p:sp>
+      <p:sp>
+        <p:nvSpPr>
+          <p:cNvPr id="7" name="矩形 6"/>
+          <p:cNvSpPr/>
+          <p:nvPr/>
+        </p:nvSpPr>
+        <p:spPr>
+          <a:xfrm>
+            <a:off x="436746" y="4107844"/>
+            <a:ext cx="5141656" cy="369332"/>
+          </a:xfrm>
+          <a:prstGeom prst="rect">
+            <a:avLst/>
+          </a:prstGeom>
+        </p:spPr>
+        <p:txBody>
+          <a:bodyPr wrap="square">
+            <a:spAutoFit/>
+          </a:bodyPr>
+          <a:lstStyle/>
+          <a:p>
+            <a:r>
+              <a:rPr lang="en-US" altLang="zh-TW" dirty="0" smtClean="0"/>
+              <a:t>#omit</a:t>
+            </a:r>
+            <a:r>
+              <a:rPr lang="en-US" altLang="zh-TW" dirty="0"/>
+              <a:t>… this can Refer to Section </a:t>
+            </a:r>
+            <a:r>
+              <a:rPr lang="en-US" altLang="zh-TW" dirty="0" smtClean="0"/>
+              <a:t>11 </a:t>
+            </a:r>
+            <a:endParaRPr lang="zh-TW" altLang="en-US" dirty="0"/>
+          </a:p>
+        </p:txBody>
+      </p:sp>
+      <p:pic>
+        <p:nvPicPr>
+          <p:cNvPr id="5" name="圖片 4"/>
+          <p:cNvPicPr>
+            <a:picLocks noChangeAspect="1"/>
+          </p:cNvPicPr>
+          <p:nvPr/>
+        </p:nvPicPr>
+        <p:blipFill>
+          <a:blip r:embed="rId3"/>
+          <a:stretch>
+            <a:fillRect/>
+          </a:stretch>
+        </p:blipFill>
+        <p:spPr>
+          <a:xfrm>
+            <a:off x="338469" y="4410118"/>
+            <a:ext cx="4331807" cy="2422018"/>
+          </a:xfrm>
+          <a:prstGeom prst="rect">
+            <a:avLst/>
+          </a:prstGeom>
+        </p:spPr>
+      </p:pic>
+      <p:sp>
+        <p:nvSpPr>
+          <p:cNvPr id="9" name="文字方塊 8">
+            <a:extLst>
+              <a:ext uri="{FF2B5EF4-FFF2-40B4-BE49-F238E27FC236}">
+                <a16:creationId xmlns:a16="http://schemas.microsoft.com/office/drawing/2014/main" id="{4A8AA91F-A3ED-423C-B62E-E596574B16A6}"/>
+              </a:ext>
+            </a:extLst>
+          </p:cNvPr>
+          <p:cNvSpPr txBox="1"/>
+          <p:nvPr/>
+        </p:nvSpPr>
+        <p:spPr>
+          <a:xfrm>
+            <a:off x="6202372" y="549479"/>
+            <a:ext cx="2912312" cy="369332"/>
+          </a:xfrm>
+          <a:prstGeom prst="rect">
+            <a:avLst/>
+          </a:prstGeom>
+          <a:noFill/>
+        </p:spPr>
+        <p:txBody>
+          <a:bodyPr wrap="square" rtlCol="0">
+            <a:spAutoFit/>
+          </a:bodyPr>
+          <a:lstStyle/>
+          <a:p>
+            <a:r>
+              <a:rPr lang="en-US" altLang="zh-TW" dirty="0" smtClean="0"/>
+              <a:t>Step3: </a:t>
+            </a:r>
+            <a:r>
+              <a:rPr lang="en-US" altLang="zh-TW" dirty="0"/>
+              <a:t>Run Client_UI1.py</a:t>
+            </a:r>
+            <a:endParaRPr lang="en-US" altLang="zh-TW" dirty="0"/>
+          </a:p>
+        </p:txBody>
+      </p:sp>
+      <p:pic>
+        <p:nvPicPr>
+          <p:cNvPr id="11" name="圖片 10"/>
+          <p:cNvPicPr>
+            <a:picLocks noChangeAspect="1"/>
+          </p:cNvPicPr>
+          <p:nvPr/>
+        </p:nvPicPr>
+        <p:blipFill>
+          <a:blip r:embed="rId4"/>
+          <a:stretch>
+            <a:fillRect/>
+          </a:stretch>
+        </p:blipFill>
+        <p:spPr>
+          <a:xfrm>
+            <a:off x="5676679" y="908287"/>
+            <a:ext cx="5657213" cy="5949713"/>
+          </a:xfrm>
+          <a:prstGeom prst="rect">
+            <a:avLst/>
+          </a:prstGeom>
+        </p:spPr>
+      </p:pic>
+    </p:spTree>
+    <p:extLst>
+      <p:ext uri="{BB962C8B-B14F-4D97-AF65-F5344CB8AC3E}">
+        <p14:creationId xmlns:p14="http://schemas.microsoft.com/office/powerpoint/2010/main" val="2312085397"/>
       </p:ext>
     </p:extLst>
   </p:cSld>

</xml_diff>